<commit_message>
Izveidota definīcija teksta datnei
</commit_message>
<xml_diff>
--- a/MacibuMaterials.pptx
+++ b/MacibuMaterials.pptx
@@ -2,10 +2,11 @@
 <file path=ppt/presentation.xml><?xml version="1.0" encoding="utf-8"?>
 <p:presentation xmlns:a="http://schemas.openxmlformats.org/drawingml/2006/main" xmlns:r="http://schemas.openxmlformats.org/officeDocument/2006/relationships" xmlns:p="http://schemas.openxmlformats.org/presentationml/2006/main" saveSubsetFonts="1">
   <p:sldMasterIdLst>
-    <p:sldMasterId id="2147483648" r:id="rId1"/>
+    <p:sldMasterId id="2147483708" r:id="rId1"/>
   </p:sldMasterIdLst>
   <p:sldIdLst>
     <p:sldId id="256" r:id="rId2"/>
+    <p:sldId id="257" r:id="rId3"/>
   </p:sldIdLst>
   <p:sldSz cx="12192000" cy="6858000"/>
   <p:notesSz cx="6858000" cy="9144000"/>
@@ -13,7 +14,7 @@
     <a:defPPr>
       <a:defRPr lang="en-US"/>
     </a:defPPr>
-    <a:lvl1pPr marL="0" algn="l" defTabSz="914400" rtl="0" eaLnBrk="1" latinLnBrk="0" hangingPunct="1">
+    <a:lvl1pPr marL="0" algn="l" defTabSz="457200" rtl="0" eaLnBrk="1" latinLnBrk="0" hangingPunct="1">
       <a:defRPr sz="1800" kern="1200">
         <a:solidFill>
           <a:schemeClr val="tx1"/>
@@ -23,7 +24,7 @@
         <a:cs typeface="+mn-cs"/>
       </a:defRPr>
     </a:lvl1pPr>
-    <a:lvl2pPr marL="457200" algn="l" defTabSz="914400" rtl="0" eaLnBrk="1" latinLnBrk="0" hangingPunct="1">
+    <a:lvl2pPr marL="457200" algn="l" defTabSz="457200" rtl="0" eaLnBrk="1" latinLnBrk="0" hangingPunct="1">
       <a:defRPr sz="1800" kern="1200">
         <a:solidFill>
           <a:schemeClr val="tx1"/>
@@ -33,7 +34,7 @@
         <a:cs typeface="+mn-cs"/>
       </a:defRPr>
     </a:lvl2pPr>
-    <a:lvl3pPr marL="914400" algn="l" defTabSz="914400" rtl="0" eaLnBrk="1" latinLnBrk="0" hangingPunct="1">
+    <a:lvl3pPr marL="914400" algn="l" defTabSz="457200" rtl="0" eaLnBrk="1" latinLnBrk="0" hangingPunct="1">
       <a:defRPr sz="1800" kern="1200">
         <a:solidFill>
           <a:schemeClr val="tx1"/>
@@ -43,7 +44,7 @@
         <a:cs typeface="+mn-cs"/>
       </a:defRPr>
     </a:lvl3pPr>
-    <a:lvl4pPr marL="1371600" algn="l" defTabSz="914400" rtl="0" eaLnBrk="1" latinLnBrk="0" hangingPunct="1">
+    <a:lvl4pPr marL="1371600" algn="l" defTabSz="457200" rtl="0" eaLnBrk="1" latinLnBrk="0" hangingPunct="1">
       <a:defRPr sz="1800" kern="1200">
         <a:solidFill>
           <a:schemeClr val="tx1"/>
@@ -53,7 +54,7 @@
         <a:cs typeface="+mn-cs"/>
       </a:defRPr>
     </a:lvl4pPr>
-    <a:lvl5pPr marL="1828800" algn="l" defTabSz="914400" rtl="0" eaLnBrk="1" latinLnBrk="0" hangingPunct="1">
+    <a:lvl5pPr marL="1828800" algn="l" defTabSz="457200" rtl="0" eaLnBrk="1" latinLnBrk="0" hangingPunct="1">
       <a:defRPr sz="1800" kern="1200">
         <a:solidFill>
           <a:schemeClr val="tx1"/>
@@ -63,7 +64,7 @@
         <a:cs typeface="+mn-cs"/>
       </a:defRPr>
     </a:lvl5pPr>
-    <a:lvl6pPr marL="2286000" algn="l" defTabSz="914400" rtl="0" eaLnBrk="1" latinLnBrk="0" hangingPunct="1">
+    <a:lvl6pPr marL="2286000" algn="l" defTabSz="457200" rtl="0" eaLnBrk="1" latinLnBrk="0" hangingPunct="1">
       <a:defRPr sz="1800" kern="1200">
         <a:solidFill>
           <a:schemeClr val="tx1"/>
@@ -73,7 +74,7 @@
         <a:cs typeface="+mn-cs"/>
       </a:defRPr>
     </a:lvl6pPr>
-    <a:lvl7pPr marL="2743200" algn="l" defTabSz="914400" rtl="0" eaLnBrk="1" latinLnBrk="0" hangingPunct="1">
+    <a:lvl7pPr marL="2743200" algn="l" defTabSz="457200" rtl="0" eaLnBrk="1" latinLnBrk="0" hangingPunct="1">
       <a:defRPr sz="1800" kern="1200">
         <a:solidFill>
           <a:schemeClr val="tx1"/>
@@ -83,7 +84,7 @@
         <a:cs typeface="+mn-cs"/>
       </a:defRPr>
     </a:lvl7pPr>
-    <a:lvl8pPr marL="3200400" algn="l" defTabSz="914400" rtl="0" eaLnBrk="1" latinLnBrk="0" hangingPunct="1">
+    <a:lvl8pPr marL="3200400" algn="l" defTabSz="457200" rtl="0" eaLnBrk="1" latinLnBrk="0" hangingPunct="1">
       <a:defRPr sz="1800" kern="1200">
         <a:solidFill>
           <a:schemeClr val="tx1"/>
@@ -93,7 +94,7 @@
         <a:cs typeface="+mn-cs"/>
       </a:defRPr>
     </a:lvl8pPr>
-    <a:lvl9pPr marL="3657600" algn="l" defTabSz="914400" rtl="0" eaLnBrk="1" latinLnBrk="0" hangingPunct="1">
+    <a:lvl9pPr marL="3657600" algn="l" defTabSz="457200" rtl="0" eaLnBrk="1" latinLnBrk="0" hangingPunct="1">
       <a:defRPr sz="1800" kern="1200">
         <a:solidFill>
           <a:schemeClr val="tx1"/>
@@ -105,6 +106,103 @@
     </a:lvl9pPr>
   </p:defaultTextStyle>
 </p:presentation>
+</file>
+
+<file path=ppt/changesInfos/changesInfo1.xml><?xml version="1.0" encoding="utf-8"?>
+<pc:chgInfo xmlns:a="http://schemas.openxmlformats.org/drawingml/2006/main" xmlns:r="http://schemas.openxmlformats.org/officeDocument/2006/relationships" xmlns:ac="http://schemas.microsoft.com/office/drawing/2013/main/command" xmlns:pc="http://schemas.microsoft.com/office/powerpoint/2013/main/command">
+  <pc:docChgLst>
+    <pc:chgData name="Rihards Mikuts" userId="3f680863f303c92b" providerId="LiveId" clId="{7ECA00DE-8CB5-4FFD-8DC5-57B39CF038BB}"/>
+    <pc:docChg chg="undo custSel addSld delSld modSld">
+      <pc:chgData name="Rihards Mikuts" userId="3f680863f303c92b" providerId="LiveId" clId="{7ECA00DE-8CB5-4FFD-8DC5-57B39CF038BB}" dt="2025-06-05T19:55:36.006" v="402" actId="20577"/>
+      <pc:docMkLst>
+        <pc:docMk/>
+      </pc:docMkLst>
+      <pc:sldChg chg="modSp mod setBg">
+        <pc:chgData name="Rihards Mikuts" userId="3f680863f303c92b" providerId="LiveId" clId="{7ECA00DE-8CB5-4FFD-8DC5-57B39CF038BB}" dt="2025-06-05T14:47:25.250" v="41"/>
+        <pc:sldMkLst>
+          <pc:docMk/>
+          <pc:sldMk cId="1020096247" sldId="256"/>
+        </pc:sldMkLst>
+        <pc:spChg chg="mod">
+          <ac:chgData name="Rihards Mikuts" userId="3f680863f303c92b" providerId="LiveId" clId="{7ECA00DE-8CB5-4FFD-8DC5-57B39CF038BB}" dt="2025-06-05T14:46:49.506" v="30"/>
+          <ac:spMkLst>
+            <pc:docMk/>
+            <pc:sldMk cId="1020096247" sldId="256"/>
+            <ac:spMk id="2" creationId="{7D83829B-9617-45AE-9781-8702269CBC69}"/>
+          </ac:spMkLst>
+        </pc:spChg>
+        <pc:spChg chg="mod">
+          <ac:chgData name="Rihards Mikuts" userId="3f680863f303c92b" providerId="LiveId" clId="{7ECA00DE-8CB5-4FFD-8DC5-57B39CF038BB}" dt="2025-06-05T14:46:49.506" v="30"/>
+          <ac:spMkLst>
+            <pc:docMk/>
+            <pc:sldMk cId="1020096247" sldId="256"/>
+            <ac:spMk id="3" creationId="{1A2B68FF-2779-4BC2-82B2-80A757E0909C}"/>
+          </ac:spMkLst>
+        </pc:spChg>
+      </pc:sldChg>
+      <pc:sldChg chg="new del">
+        <pc:chgData name="Rihards Mikuts" userId="3f680863f303c92b" providerId="LiveId" clId="{7ECA00DE-8CB5-4FFD-8DC5-57B39CF038BB}" dt="2025-06-05T14:55:21.868" v="45" actId="680"/>
+        <pc:sldMkLst>
+          <pc:docMk/>
+          <pc:sldMk cId="342159062" sldId="257"/>
+        </pc:sldMkLst>
+      </pc:sldChg>
+      <pc:sldChg chg="addSp delSp modSp new mod setBg">
+        <pc:chgData name="Rihards Mikuts" userId="3f680863f303c92b" providerId="LiveId" clId="{7ECA00DE-8CB5-4FFD-8DC5-57B39CF038BB}" dt="2025-06-05T19:55:36.006" v="402" actId="20577"/>
+        <pc:sldMkLst>
+          <pc:docMk/>
+          <pc:sldMk cId="743291785" sldId="257"/>
+        </pc:sldMkLst>
+        <pc:spChg chg="mod">
+          <ac:chgData name="Rihards Mikuts" userId="3f680863f303c92b" providerId="LiveId" clId="{7ECA00DE-8CB5-4FFD-8DC5-57B39CF038BB}" dt="2025-06-05T19:55:36.006" v="402" actId="20577"/>
+          <ac:spMkLst>
+            <pc:docMk/>
+            <pc:sldMk cId="743291785" sldId="257"/>
+            <ac:spMk id="2" creationId="{77FD5A51-1ACD-4171-9E62-A65089091B40}"/>
+          </ac:spMkLst>
+        </pc:spChg>
+        <pc:spChg chg="mod">
+          <ac:chgData name="Rihards Mikuts" userId="3f680863f303c92b" providerId="LiveId" clId="{7ECA00DE-8CB5-4FFD-8DC5-57B39CF038BB}" dt="2025-06-05T19:55:15.460" v="364" actId="1076"/>
+          <ac:spMkLst>
+            <pc:docMk/>
+            <pc:sldMk cId="743291785" sldId="257"/>
+            <ac:spMk id="3" creationId="{BCD45001-2C21-45FC-9796-119A3DDD95F5}"/>
+          </ac:spMkLst>
+        </pc:spChg>
+        <pc:picChg chg="add del mod">
+          <ac:chgData name="Rihards Mikuts" userId="3f680863f303c92b" providerId="LiveId" clId="{7ECA00DE-8CB5-4FFD-8DC5-57B39CF038BB}" dt="2025-06-05T19:52:43.189" v="333" actId="22"/>
+          <ac:picMkLst>
+            <pc:docMk/>
+            <pc:sldMk cId="743291785" sldId="257"/>
+            <ac:picMk id="5" creationId="{A6DFA3BE-9097-4465-BEE6-A675E1B8A9E2}"/>
+          </ac:picMkLst>
+        </pc:picChg>
+        <pc:picChg chg="add mod">
+          <ac:chgData name="Rihards Mikuts" userId="3f680863f303c92b" providerId="LiveId" clId="{7ECA00DE-8CB5-4FFD-8DC5-57B39CF038BB}" dt="2025-06-05T19:53:17.041" v="337" actId="1076"/>
+          <ac:picMkLst>
+            <pc:docMk/>
+            <pc:sldMk cId="743291785" sldId="257"/>
+            <ac:picMk id="7" creationId="{1A614D5F-2379-4A1A-9543-D2524BE2BAD0}"/>
+          </ac:picMkLst>
+        </pc:picChg>
+      </pc:sldChg>
+      <pc:sldChg chg="new del">
+        <pc:chgData name="Rihards Mikuts" userId="3f680863f303c92b" providerId="LiveId" clId="{7ECA00DE-8CB5-4FFD-8DC5-57B39CF038BB}" dt="2025-06-05T14:55:25.433" v="47" actId="680"/>
+        <pc:sldMkLst>
+          <pc:docMk/>
+          <pc:sldMk cId="2567244784" sldId="257"/>
+        </pc:sldMkLst>
+      </pc:sldChg>
+      <pc:sldChg chg="new del">
+        <pc:chgData name="Rihards Mikuts" userId="3f680863f303c92b" providerId="LiveId" clId="{7ECA00DE-8CB5-4FFD-8DC5-57B39CF038BB}" dt="2025-06-05T14:55:19.093" v="43" actId="47"/>
+        <pc:sldMkLst>
+          <pc:docMk/>
+          <pc:sldMk cId="2739507624" sldId="257"/>
+        </pc:sldMkLst>
+      </pc:sldChg>
+    </pc:docChg>
+  </pc:docChgLst>
+</pc:chgInfo>
 </file>
 
 <file path=ppt/slideLayouts/slideLayout1.xml><?xml version="1.0" encoding="utf-8"?>
@@ -126,13 +224,7 @@
       </p:grpSpPr>
       <p:sp>
         <p:nvSpPr>
-          <p:cNvPr id="2" name="Title 1">
-            <a:extLst>
-              <a:ext uri="{FF2B5EF4-FFF2-40B4-BE49-F238E27FC236}">
-                <a16:creationId xmlns:a16="http://schemas.microsoft.com/office/drawing/2014/main" id="{137356ED-78D0-48EF-A93B-4BA7B25DF8E3}"/>
-              </a:ext>
-            </a:extLst>
-          </p:cNvPr>
+          <p:cNvPr id="2" name="Title 1"/>
           <p:cNvSpPr>
             <a:spLocks noGrp="1"/>
           </p:cNvSpPr>
@@ -158,19 +250,13 @@
               <a:rPr lang="en-US"/>
               <a:t>Click to edit Master title style</a:t>
             </a:r>
-            <a:endParaRPr lang="en-GB"/>
-          </a:p>
-        </p:txBody>
-      </p:sp>
-      <p:sp>
-        <p:nvSpPr>
-          <p:cNvPr id="3" name="Subtitle 2">
-            <a:extLst>
-              <a:ext uri="{FF2B5EF4-FFF2-40B4-BE49-F238E27FC236}">
-                <a16:creationId xmlns:a16="http://schemas.microsoft.com/office/drawing/2014/main" id="{B39D4D99-8CB0-438A-B116-DD3ADED05D20}"/>
-              </a:ext>
-            </a:extLst>
-          </p:cNvPr>
+            <a:endParaRPr lang="en-US" dirty="0"/>
+          </a:p>
+        </p:txBody>
+      </p:sp>
+      <p:sp>
+        <p:nvSpPr>
+          <p:cNvPr id="3" name="Subtitle 2"/>
           <p:cNvSpPr>
             <a:spLocks noGrp="1"/>
           </p:cNvSpPr>
@@ -229,19 +315,13 @@
               <a:rPr lang="en-US"/>
               <a:t>Click to edit Master subtitle style</a:t>
             </a:r>
-            <a:endParaRPr lang="en-GB"/>
-          </a:p>
-        </p:txBody>
-      </p:sp>
-      <p:sp>
-        <p:nvSpPr>
-          <p:cNvPr id="4" name="Date Placeholder 3">
-            <a:extLst>
-              <a:ext uri="{FF2B5EF4-FFF2-40B4-BE49-F238E27FC236}">
-                <a16:creationId xmlns:a16="http://schemas.microsoft.com/office/drawing/2014/main" id="{D6928563-C069-4859-A46C-674219AFED09}"/>
-              </a:ext>
-            </a:extLst>
-          </p:cNvPr>
+            <a:endParaRPr lang="en-US" dirty="0"/>
+          </a:p>
+        </p:txBody>
+      </p:sp>
+      <p:sp>
+        <p:nvSpPr>
+          <p:cNvPr id="4" name="Date Placeholder 3"/>
           <p:cNvSpPr>
             <a:spLocks noGrp="1"/>
           </p:cNvSpPr>
@@ -264,13 +344,7 @@
       </p:sp>
       <p:sp>
         <p:nvSpPr>
-          <p:cNvPr id="5" name="Footer Placeholder 4">
-            <a:extLst>
-              <a:ext uri="{FF2B5EF4-FFF2-40B4-BE49-F238E27FC236}">
-                <a16:creationId xmlns:a16="http://schemas.microsoft.com/office/drawing/2014/main" id="{A55D9031-5BE0-465E-B903-CD1F738C0ECC}"/>
-              </a:ext>
-            </a:extLst>
-          </p:cNvPr>
+          <p:cNvPr id="5" name="Footer Placeholder 4"/>
           <p:cNvSpPr>
             <a:spLocks noGrp="1"/>
           </p:cNvSpPr>
@@ -289,13 +363,7 @@
       </p:sp>
       <p:sp>
         <p:nvSpPr>
-          <p:cNvPr id="6" name="Slide Number Placeholder 5">
-            <a:extLst>
-              <a:ext uri="{FF2B5EF4-FFF2-40B4-BE49-F238E27FC236}">
-                <a16:creationId xmlns:a16="http://schemas.microsoft.com/office/drawing/2014/main" id="{132EF9F6-A7AE-43B9-A7F6-260DA61F451B}"/>
-              </a:ext>
-            </a:extLst>
-          </p:cNvPr>
+          <p:cNvPr id="6" name="Slide Number Placeholder 5"/>
           <p:cNvSpPr>
             <a:spLocks noGrp="1"/>
           </p:cNvSpPr>
@@ -319,7 +387,7 @@
     </p:spTree>
     <p:extLst>
       <p:ext uri="{BB962C8B-B14F-4D97-AF65-F5344CB8AC3E}">
-        <p14:creationId xmlns:p14="http://schemas.microsoft.com/office/powerpoint/2010/main" val="2665975590"/>
+        <p14:creationId xmlns:p14="http://schemas.microsoft.com/office/powerpoint/2010/main" val="3045721363"/>
       </p:ext>
     </p:extLst>
   </p:cSld>
@@ -348,13 +416,7 @@
       </p:grpSpPr>
       <p:sp>
         <p:nvSpPr>
-          <p:cNvPr id="2" name="Title 1">
-            <a:extLst>
-              <a:ext uri="{FF2B5EF4-FFF2-40B4-BE49-F238E27FC236}">
-                <a16:creationId xmlns:a16="http://schemas.microsoft.com/office/drawing/2014/main" id="{F928ED2B-64C6-45A2-8F7A-FD71D3D28A77}"/>
-              </a:ext>
-            </a:extLst>
-          </p:cNvPr>
+          <p:cNvPr id="2" name="Title 1"/>
           <p:cNvSpPr>
             <a:spLocks noGrp="1"/>
           </p:cNvSpPr>
@@ -371,19 +433,13 @@
               <a:rPr lang="en-US"/>
               <a:t>Click to edit Master title style</a:t>
             </a:r>
-            <a:endParaRPr lang="en-GB"/>
-          </a:p>
-        </p:txBody>
-      </p:sp>
-      <p:sp>
-        <p:nvSpPr>
-          <p:cNvPr id="3" name="Vertical Text Placeholder 2">
-            <a:extLst>
-              <a:ext uri="{FF2B5EF4-FFF2-40B4-BE49-F238E27FC236}">
-                <a16:creationId xmlns:a16="http://schemas.microsoft.com/office/drawing/2014/main" id="{5A875C88-675F-49EC-9F01-D28BF17FD168}"/>
-              </a:ext>
-            </a:extLst>
-          </p:cNvPr>
+            <a:endParaRPr lang="en-US" dirty="0"/>
+          </a:p>
+        </p:txBody>
+      </p:sp>
+      <p:sp>
+        <p:nvSpPr>
+          <p:cNvPr id="3" name="Vertical Text Placeholder 2"/>
           <p:cNvSpPr>
             <a:spLocks noGrp="1"/>
           </p:cNvSpPr>
@@ -429,19 +485,13 @@
               <a:rPr lang="en-US"/>
               <a:t>Fifth level</a:t>
             </a:r>
-            <a:endParaRPr lang="en-GB"/>
-          </a:p>
-        </p:txBody>
-      </p:sp>
-      <p:sp>
-        <p:nvSpPr>
-          <p:cNvPr id="4" name="Date Placeholder 3">
-            <a:extLst>
-              <a:ext uri="{FF2B5EF4-FFF2-40B4-BE49-F238E27FC236}">
-                <a16:creationId xmlns:a16="http://schemas.microsoft.com/office/drawing/2014/main" id="{53A348AD-71EF-4AC7-909C-3E5C88EF870D}"/>
-              </a:ext>
-            </a:extLst>
-          </p:cNvPr>
+            <a:endParaRPr lang="en-US" dirty="0"/>
+          </a:p>
+        </p:txBody>
+      </p:sp>
+      <p:sp>
+        <p:nvSpPr>
+          <p:cNvPr id="4" name="Date Placeholder 3"/>
           <p:cNvSpPr>
             <a:spLocks noGrp="1"/>
           </p:cNvSpPr>
@@ -464,13 +514,7 @@
       </p:sp>
       <p:sp>
         <p:nvSpPr>
-          <p:cNvPr id="5" name="Footer Placeholder 4">
-            <a:extLst>
-              <a:ext uri="{FF2B5EF4-FFF2-40B4-BE49-F238E27FC236}">
-                <a16:creationId xmlns:a16="http://schemas.microsoft.com/office/drawing/2014/main" id="{A2909567-6AF8-4C26-807D-F20BD6962C9D}"/>
-              </a:ext>
-            </a:extLst>
-          </p:cNvPr>
+          <p:cNvPr id="5" name="Footer Placeholder 4"/>
           <p:cNvSpPr>
             <a:spLocks noGrp="1"/>
           </p:cNvSpPr>
@@ -489,13 +533,7 @@
       </p:sp>
       <p:sp>
         <p:nvSpPr>
-          <p:cNvPr id="6" name="Slide Number Placeholder 5">
-            <a:extLst>
-              <a:ext uri="{FF2B5EF4-FFF2-40B4-BE49-F238E27FC236}">
-                <a16:creationId xmlns:a16="http://schemas.microsoft.com/office/drawing/2014/main" id="{EB180074-0E16-4034-A123-8CF69F7BFFED}"/>
-              </a:ext>
-            </a:extLst>
-          </p:cNvPr>
+          <p:cNvPr id="6" name="Slide Number Placeholder 5"/>
           <p:cNvSpPr>
             <a:spLocks noGrp="1"/>
           </p:cNvSpPr>
@@ -519,7 +557,7 @@
     </p:spTree>
     <p:extLst>
       <p:ext uri="{BB962C8B-B14F-4D97-AF65-F5344CB8AC3E}">
-        <p14:creationId xmlns:p14="http://schemas.microsoft.com/office/powerpoint/2010/main" val="872423635"/>
+        <p14:creationId xmlns:p14="http://schemas.microsoft.com/office/powerpoint/2010/main" val="3153098343"/>
       </p:ext>
     </p:extLst>
   </p:cSld>
@@ -548,13 +586,7 @@
       </p:grpSpPr>
       <p:sp>
         <p:nvSpPr>
-          <p:cNvPr id="2" name="Vertical Title 1">
-            <a:extLst>
-              <a:ext uri="{FF2B5EF4-FFF2-40B4-BE49-F238E27FC236}">
-                <a16:creationId xmlns:a16="http://schemas.microsoft.com/office/drawing/2014/main" id="{7627D281-9E3A-4633-83AD-3A1EFA0A74E9}"/>
-              </a:ext>
-            </a:extLst>
-          </p:cNvPr>
+          <p:cNvPr id="2" name="Vertical Title 1"/>
           <p:cNvSpPr>
             <a:spLocks noGrp="1"/>
           </p:cNvSpPr>
@@ -576,19 +608,13 @@
               <a:rPr lang="en-US"/>
               <a:t>Click to edit Master title style</a:t>
             </a:r>
-            <a:endParaRPr lang="en-GB"/>
-          </a:p>
-        </p:txBody>
-      </p:sp>
-      <p:sp>
-        <p:nvSpPr>
-          <p:cNvPr id="3" name="Vertical Text Placeholder 2">
-            <a:extLst>
-              <a:ext uri="{FF2B5EF4-FFF2-40B4-BE49-F238E27FC236}">
-                <a16:creationId xmlns:a16="http://schemas.microsoft.com/office/drawing/2014/main" id="{9EDB4B43-3A83-40CD-829F-33C1E50558FD}"/>
-              </a:ext>
-            </a:extLst>
-          </p:cNvPr>
+            <a:endParaRPr lang="en-US" dirty="0"/>
+          </a:p>
+        </p:txBody>
+      </p:sp>
+      <p:sp>
+        <p:nvSpPr>
+          <p:cNvPr id="3" name="Vertical Text Placeholder 2"/>
           <p:cNvSpPr>
             <a:spLocks noGrp="1"/>
           </p:cNvSpPr>
@@ -639,19 +665,13 @@
               <a:rPr lang="en-US"/>
               <a:t>Fifth level</a:t>
             </a:r>
-            <a:endParaRPr lang="en-GB"/>
-          </a:p>
-        </p:txBody>
-      </p:sp>
-      <p:sp>
-        <p:nvSpPr>
-          <p:cNvPr id="4" name="Date Placeholder 3">
-            <a:extLst>
-              <a:ext uri="{FF2B5EF4-FFF2-40B4-BE49-F238E27FC236}">
-                <a16:creationId xmlns:a16="http://schemas.microsoft.com/office/drawing/2014/main" id="{ECC9BD68-4A54-4ED8-9828-F4F5539E481F}"/>
-              </a:ext>
-            </a:extLst>
-          </p:cNvPr>
+            <a:endParaRPr lang="en-US" dirty="0"/>
+          </a:p>
+        </p:txBody>
+      </p:sp>
+      <p:sp>
+        <p:nvSpPr>
+          <p:cNvPr id="4" name="Date Placeholder 3"/>
           <p:cNvSpPr>
             <a:spLocks noGrp="1"/>
           </p:cNvSpPr>
@@ -674,13 +694,7 @@
       </p:sp>
       <p:sp>
         <p:nvSpPr>
-          <p:cNvPr id="5" name="Footer Placeholder 4">
-            <a:extLst>
-              <a:ext uri="{FF2B5EF4-FFF2-40B4-BE49-F238E27FC236}">
-                <a16:creationId xmlns:a16="http://schemas.microsoft.com/office/drawing/2014/main" id="{C98BA016-2127-482B-AC27-1216B3616AC8}"/>
-              </a:ext>
-            </a:extLst>
-          </p:cNvPr>
+          <p:cNvPr id="5" name="Footer Placeholder 4"/>
           <p:cNvSpPr>
             <a:spLocks noGrp="1"/>
           </p:cNvSpPr>
@@ -699,13 +713,7 @@
       </p:sp>
       <p:sp>
         <p:nvSpPr>
-          <p:cNvPr id="6" name="Slide Number Placeholder 5">
-            <a:extLst>
-              <a:ext uri="{FF2B5EF4-FFF2-40B4-BE49-F238E27FC236}">
-                <a16:creationId xmlns:a16="http://schemas.microsoft.com/office/drawing/2014/main" id="{5C561850-06DE-4FC5-AC41-D6C68F923E69}"/>
-              </a:ext>
-            </a:extLst>
-          </p:cNvPr>
+          <p:cNvPr id="6" name="Slide Number Placeholder 5"/>
           <p:cNvSpPr>
             <a:spLocks noGrp="1"/>
           </p:cNvSpPr>
@@ -729,7 +737,7 @@
     </p:spTree>
     <p:extLst>
       <p:ext uri="{BB962C8B-B14F-4D97-AF65-F5344CB8AC3E}">
-        <p14:creationId xmlns:p14="http://schemas.microsoft.com/office/powerpoint/2010/main" val="3957940216"/>
+        <p14:creationId xmlns:p14="http://schemas.microsoft.com/office/powerpoint/2010/main" val="3189346117"/>
       </p:ext>
     </p:extLst>
   </p:cSld>
@@ -758,13 +766,7 @@
       </p:grpSpPr>
       <p:sp>
         <p:nvSpPr>
-          <p:cNvPr id="2" name="Title 1">
-            <a:extLst>
-              <a:ext uri="{FF2B5EF4-FFF2-40B4-BE49-F238E27FC236}">
-                <a16:creationId xmlns:a16="http://schemas.microsoft.com/office/drawing/2014/main" id="{36F65AEB-92BE-4F40-85BB-21CEB2063009}"/>
-              </a:ext>
-            </a:extLst>
-          </p:cNvPr>
+          <p:cNvPr id="2" name="Title 1"/>
           <p:cNvSpPr>
             <a:spLocks noGrp="1"/>
           </p:cNvSpPr>
@@ -781,19 +783,13 @@
               <a:rPr lang="en-US"/>
               <a:t>Click to edit Master title style</a:t>
             </a:r>
-            <a:endParaRPr lang="en-GB"/>
-          </a:p>
-        </p:txBody>
-      </p:sp>
-      <p:sp>
-        <p:nvSpPr>
-          <p:cNvPr id="3" name="Content Placeholder 2">
-            <a:extLst>
-              <a:ext uri="{FF2B5EF4-FFF2-40B4-BE49-F238E27FC236}">
-                <a16:creationId xmlns:a16="http://schemas.microsoft.com/office/drawing/2014/main" id="{71899A9B-D748-4E2F-A75E-F3081C8848B0}"/>
-              </a:ext>
-            </a:extLst>
-          </p:cNvPr>
+            <a:endParaRPr lang="en-US" dirty="0"/>
+          </a:p>
+        </p:txBody>
+      </p:sp>
+      <p:sp>
+        <p:nvSpPr>
+          <p:cNvPr id="3" name="Content Placeholder 2"/>
           <p:cNvSpPr>
             <a:spLocks noGrp="1"/>
           </p:cNvSpPr>
@@ -839,19 +835,13 @@
               <a:rPr lang="en-US"/>
               <a:t>Fifth level</a:t>
             </a:r>
-            <a:endParaRPr lang="en-GB"/>
-          </a:p>
-        </p:txBody>
-      </p:sp>
-      <p:sp>
-        <p:nvSpPr>
-          <p:cNvPr id="4" name="Date Placeholder 3">
-            <a:extLst>
-              <a:ext uri="{FF2B5EF4-FFF2-40B4-BE49-F238E27FC236}">
-                <a16:creationId xmlns:a16="http://schemas.microsoft.com/office/drawing/2014/main" id="{8E5E89AD-58F9-42F6-B142-CFC9C53A426E}"/>
-              </a:ext>
-            </a:extLst>
-          </p:cNvPr>
+            <a:endParaRPr lang="en-US" dirty="0"/>
+          </a:p>
+        </p:txBody>
+      </p:sp>
+      <p:sp>
+        <p:nvSpPr>
+          <p:cNvPr id="4" name="Date Placeholder 3"/>
           <p:cNvSpPr>
             <a:spLocks noGrp="1"/>
           </p:cNvSpPr>
@@ -874,13 +864,7 @@
       </p:sp>
       <p:sp>
         <p:nvSpPr>
-          <p:cNvPr id="5" name="Footer Placeholder 4">
-            <a:extLst>
-              <a:ext uri="{FF2B5EF4-FFF2-40B4-BE49-F238E27FC236}">
-                <a16:creationId xmlns:a16="http://schemas.microsoft.com/office/drawing/2014/main" id="{EE107021-784B-4B77-A1D5-980E51D8BBFA}"/>
-              </a:ext>
-            </a:extLst>
-          </p:cNvPr>
+          <p:cNvPr id="5" name="Footer Placeholder 4"/>
           <p:cNvSpPr>
             <a:spLocks noGrp="1"/>
           </p:cNvSpPr>
@@ -899,13 +883,7 @@
       </p:sp>
       <p:sp>
         <p:nvSpPr>
-          <p:cNvPr id="6" name="Slide Number Placeholder 5">
-            <a:extLst>
-              <a:ext uri="{FF2B5EF4-FFF2-40B4-BE49-F238E27FC236}">
-                <a16:creationId xmlns:a16="http://schemas.microsoft.com/office/drawing/2014/main" id="{3EA116B6-F0A9-43D2-8288-3515982116A7}"/>
-              </a:ext>
-            </a:extLst>
-          </p:cNvPr>
+          <p:cNvPr id="6" name="Slide Number Placeholder 5"/>
           <p:cNvSpPr>
             <a:spLocks noGrp="1"/>
           </p:cNvSpPr>
@@ -929,7 +907,7 @@
     </p:spTree>
     <p:extLst>
       <p:ext uri="{BB962C8B-B14F-4D97-AF65-F5344CB8AC3E}">
-        <p14:creationId xmlns:p14="http://schemas.microsoft.com/office/powerpoint/2010/main" val="2103240192"/>
+        <p14:creationId xmlns:p14="http://schemas.microsoft.com/office/powerpoint/2010/main" val="3170732033"/>
       </p:ext>
     </p:extLst>
   </p:cSld>
@@ -958,13 +936,7 @@
       </p:grpSpPr>
       <p:sp>
         <p:nvSpPr>
-          <p:cNvPr id="2" name="Title 1">
-            <a:extLst>
-              <a:ext uri="{FF2B5EF4-FFF2-40B4-BE49-F238E27FC236}">
-                <a16:creationId xmlns:a16="http://schemas.microsoft.com/office/drawing/2014/main" id="{053FFC59-7CA8-4166-90D9-F4F3BB63F5ED}"/>
-              </a:ext>
-            </a:extLst>
-          </p:cNvPr>
+          <p:cNvPr id="2" name="Title 1"/>
           <p:cNvSpPr>
             <a:spLocks noGrp="1"/>
           </p:cNvSpPr>
@@ -990,19 +962,13 @@
               <a:rPr lang="en-US"/>
               <a:t>Click to edit Master title style</a:t>
             </a:r>
-            <a:endParaRPr lang="en-GB"/>
-          </a:p>
-        </p:txBody>
-      </p:sp>
-      <p:sp>
-        <p:nvSpPr>
-          <p:cNvPr id="3" name="Text Placeholder 2">
-            <a:extLst>
-              <a:ext uri="{FF2B5EF4-FFF2-40B4-BE49-F238E27FC236}">
-                <a16:creationId xmlns:a16="http://schemas.microsoft.com/office/drawing/2014/main" id="{8FF8759B-3C3D-4A6F-A998-E0BD1AB5A58F}"/>
-              </a:ext>
-            </a:extLst>
-          </p:cNvPr>
+            <a:endParaRPr lang="en-US" dirty="0"/>
+          </a:p>
+        </p:txBody>
+      </p:sp>
+      <p:sp>
+        <p:nvSpPr>
+          <p:cNvPr id="3" name="Text Placeholder 2"/>
           <p:cNvSpPr>
             <a:spLocks noGrp="1"/>
           </p:cNvSpPr>
@@ -1121,13 +1087,7 @@
       </p:sp>
       <p:sp>
         <p:nvSpPr>
-          <p:cNvPr id="4" name="Date Placeholder 3">
-            <a:extLst>
-              <a:ext uri="{FF2B5EF4-FFF2-40B4-BE49-F238E27FC236}">
-                <a16:creationId xmlns:a16="http://schemas.microsoft.com/office/drawing/2014/main" id="{B2C83FDA-F5DB-4D25-A940-97370126F55C}"/>
-              </a:ext>
-            </a:extLst>
-          </p:cNvPr>
+          <p:cNvPr id="4" name="Date Placeholder 3"/>
           <p:cNvSpPr>
             <a:spLocks noGrp="1"/>
           </p:cNvSpPr>
@@ -1150,13 +1110,7 @@
       </p:sp>
       <p:sp>
         <p:nvSpPr>
-          <p:cNvPr id="5" name="Footer Placeholder 4">
-            <a:extLst>
-              <a:ext uri="{FF2B5EF4-FFF2-40B4-BE49-F238E27FC236}">
-                <a16:creationId xmlns:a16="http://schemas.microsoft.com/office/drawing/2014/main" id="{38139F2C-A84C-4C9D-B334-CFC744AEFFF5}"/>
-              </a:ext>
-            </a:extLst>
-          </p:cNvPr>
+          <p:cNvPr id="5" name="Footer Placeholder 4"/>
           <p:cNvSpPr>
             <a:spLocks noGrp="1"/>
           </p:cNvSpPr>
@@ -1175,13 +1129,7 @@
       </p:sp>
       <p:sp>
         <p:nvSpPr>
-          <p:cNvPr id="6" name="Slide Number Placeholder 5">
-            <a:extLst>
-              <a:ext uri="{FF2B5EF4-FFF2-40B4-BE49-F238E27FC236}">
-                <a16:creationId xmlns:a16="http://schemas.microsoft.com/office/drawing/2014/main" id="{B51268D4-4AD2-4F2D-A930-AC376D8D8E8D}"/>
-              </a:ext>
-            </a:extLst>
-          </p:cNvPr>
+          <p:cNvPr id="6" name="Slide Number Placeholder 5"/>
           <p:cNvSpPr>
             <a:spLocks noGrp="1"/>
           </p:cNvSpPr>
@@ -1205,7 +1153,7 @@
     </p:spTree>
     <p:extLst>
       <p:ext uri="{BB962C8B-B14F-4D97-AF65-F5344CB8AC3E}">
-        <p14:creationId xmlns:p14="http://schemas.microsoft.com/office/powerpoint/2010/main" val="3281204877"/>
+        <p14:creationId xmlns:p14="http://schemas.microsoft.com/office/powerpoint/2010/main" val="2908602402"/>
       </p:ext>
     </p:extLst>
   </p:cSld>
@@ -1234,13 +1182,7 @@
       </p:grpSpPr>
       <p:sp>
         <p:nvSpPr>
-          <p:cNvPr id="2" name="Title 1">
-            <a:extLst>
-              <a:ext uri="{FF2B5EF4-FFF2-40B4-BE49-F238E27FC236}">
-                <a16:creationId xmlns:a16="http://schemas.microsoft.com/office/drawing/2014/main" id="{BFE85E7E-6B75-40D0-A47B-A793AB3DDAAB}"/>
-              </a:ext>
-            </a:extLst>
-          </p:cNvPr>
+          <p:cNvPr id="2" name="Title 1"/>
           <p:cNvSpPr>
             <a:spLocks noGrp="1"/>
           </p:cNvSpPr>
@@ -1257,19 +1199,13 @@
               <a:rPr lang="en-US"/>
               <a:t>Click to edit Master title style</a:t>
             </a:r>
-            <a:endParaRPr lang="en-GB"/>
-          </a:p>
-        </p:txBody>
-      </p:sp>
-      <p:sp>
-        <p:nvSpPr>
-          <p:cNvPr id="3" name="Content Placeholder 2">
-            <a:extLst>
-              <a:ext uri="{FF2B5EF4-FFF2-40B4-BE49-F238E27FC236}">
-                <a16:creationId xmlns:a16="http://schemas.microsoft.com/office/drawing/2014/main" id="{B6D1593A-1ADA-455C-8A79-BBF13D299AA9}"/>
-              </a:ext>
-            </a:extLst>
-          </p:cNvPr>
+            <a:endParaRPr lang="en-US" dirty="0"/>
+          </a:p>
+        </p:txBody>
+      </p:sp>
+      <p:sp>
+        <p:nvSpPr>
+          <p:cNvPr id="3" name="Content Placeholder 2"/>
           <p:cNvSpPr>
             <a:spLocks noGrp="1"/>
           </p:cNvSpPr>
@@ -1320,19 +1256,13 @@
               <a:rPr lang="en-US"/>
               <a:t>Fifth level</a:t>
             </a:r>
-            <a:endParaRPr lang="en-GB"/>
-          </a:p>
-        </p:txBody>
-      </p:sp>
-      <p:sp>
-        <p:nvSpPr>
-          <p:cNvPr id="4" name="Content Placeholder 3">
-            <a:extLst>
-              <a:ext uri="{FF2B5EF4-FFF2-40B4-BE49-F238E27FC236}">
-                <a16:creationId xmlns:a16="http://schemas.microsoft.com/office/drawing/2014/main" id="{8D2086E0-4DEE-4273-A4F8-620EAE877830}"/>
-              </a:ext>
-            </a:extLst>
-          </p:cNvPr>
+            <a:endParaRPr lang="en-US" dirty="0"/>
+          </a:p>
+        </p:txBody>
+      </p:sp>
+      <p:sp>
+        <p:nvSpPr>
+          <p:cNvPr id="4" name="Content Placeholder 3"/>
           <p:cNvSpPr>
             <a:spLocks noGrp="1"/>
           </p:cNvSpPr>
@@ -1383,19 +1313,13 @@
               <a:rPr lang="en-US"/>
               <a:t>Fifth level</a:t>
             </a:r>
-            <a:endParaRPr lang="en-GB"/>
-          </a:p>
-        </p:txBody>
-      </p:sp>
-      <p:sp>
-        <p:nvSpPr>
-          <p:cNvPr id="5" name="Date Placeholder 4">
-            <a:extLst>
-              <a:ext uri="{FF2B5EF4-FFF2-40B4-BE49-F238E27FC236}">
-                <a16:creationId xmlns:a16="http://schemas.microsoft.com/office/drawing/2014/main" id="{7939BF71-51AB-422E-980A-12890C66A75F}"/>
-              </a:ext>
-            </a:extLst>
-          </p:cNvPr>
+            <a:endParaRPr lang="en-US" dirty="0"/>
+          </a:p>
+        </p:txBody>
+      </p:sp>
+      <p:sp>
+        <p:nvSpPr>
+          <p:cNvPr id="5" name="Date Placeholder 4"/>
           <p:cNvSpPr>
             <a:spLocks noGrp="1"/>
           </p:cNvSpPr>
@@ -1418,13 +1342,7 @@
       </p:sp>
       <p:sp>
         <p:nvSpPr>
-          <p:cNvPr id="6" name="Footer Placeholder 5">
-            <a:extLst>
-              <a:ext uri="{FF2B5EF4-FFF2-40B4-BE49-F238E27FC236}">
-                <a16:creationId xmlns:a16="http://schemas.microsoft.com/office/drawing/2014/main" id="{A0E2019C-4DC8-43A5-A001-6750D7AF1FD6}"/>
-              </a:ext>
-            </a:extLst>
-          </p:cNvPr>
+          <p:cNvPr id="6" name="Footer Placeholder 5"/>
           <p:cNvSpPr>
             <a:spLocks noGrp="1"/>
           </p:cNvSpPr>
@@ -1443,13 +1361,7 @@
       </p:sp>
       <p:sp>
         <p:nvSpPr>
-          <p:cNvPr id="7" name="Slide Number Placeholder 6">
-            <a:extLst>
-              <a:ext uri="{FF2B5EF4-FFF2-40B4-BE49-F238E27FC236}">
-                <a16:creationId xmlns:a16="http://schemas.microsoft.com/office/drawing/2014/main" id="{EA9E1D1E-64D6-44AD-A558-057077263B74}"/>
-              </a:ext>
-            </a:extLst>
-          </p:cNvPr>
+          <p:cNvPr id="7" name="Slide Number Placeholder 6"/>
           <p:cNvSpPr>
             <a:spLocks noGrp="1"/>
           </p:cNvSpPr>
@@ -1473,7 +1385,7 @@
     </p:spTree>
     <p:extLst>
       <p:ext uri="{BB962C8B-B14F-4D97-AF65-F5344CB8AC3E}">
-        <p14:creationId xmlns:p14="http://schemas.microsoft.com/office/powerpoint/2010/main" val="2911429778"/>
+        <p14:creationId xmlns:p14="http://schemas.microsoft.com/office/powerpoint/2010/main" val="1125323935"/>
       </p:ext>
     </p:extLst>
   </p:cSld>
@@ -1502,13 +1414,7 @@
       </p:grpSpPr>
       <p:sp>
         <p:nvSpPr>
-          <p:cNvPr id="2" name="Title 1">
-            <a:extLst>
-              <a:ext uri="{FF2B5EF4-FFF2-40B4-BE49-F238E27FC236}">
-                <a16:creationId xmlns:a16="http://schemas.microsoft.com/office/drawing/2014/main" id="{4C48644A-A720-4357-9944-4B0568007668}"/>
-              </a:ext>
-            </a:extLst>
-          </p:cNvPr>
+          <p:cNvPr id="2" name="Title 1"/>
           <p:cNvSpPr>
             <a:spLocks noGrp="1"/>
           </p:cNvSpPr>
@@ -1530,19 +1436,13 @@
               <a:rPr lang="en-US"/>
               <a:t>Click to edit Master title style</a:t>
             </a:r>
-            <a:endParaRPr lang="en-GB"/>
-          </a:p>
-        </p:txBody>
-      </p:sp>
-      <p:sp>
-        <p:nvSpPr>
-          <p:cNvPr id="3" name="Text Placeholder 2">
-            <a:extLst>
-              <a:ext uri="{FF2B5EF4-FFF2-40B4-BE49-F238E27FC236}">
-                <a16:creationId xmlns:a16="http://schemas.microsoft.com/office/drawing/2014/main" id="{26F8B2B8-88F4-4129-98A2-AA6EB9BB8855}"/>
-              </a:ext>
-            </a:extLst>
-          </p:cNvPr>
+            <a:endParaRPr lang="en-US" dirty="0"/>
+          </a:p>
+        </p:txBody>
+      </p:sp>
+      <p:sp>
+        <p:nvSpPr>
+          <p:cNvPr id="3" name="Text Placeholder 2"/>
           <p:cNvSpPr>
             <a:spLocks noGrp="1"/>
           </p:cNvSpPr>
@@ -1607,13 +1507,7 @@
       </p:sp>
       <p:sp>
         <p:nvSpPr>
-          <p:cNvPr id="4" name="Content Placeholder 3">
-            <a:extLst>
-              <a:ext uri="{FF2B5EF4-FFF2-40B4-BE49-F238E27FC236}">
-                <a16:creationId xmlns:a16="http://schemas.microsoft.com/office/drawing/2014/main" id="{4CCBF7C8-9689-4388-9033-C738D23D0A28}"/>
-              </a:ext>
-            </a:extLst>
-          </p:cNvPr>
+          <p:cNvPr id="4" name="Content Placeholder 3"/>
           <p:cNvSpPr>
             <a:spLocks noGrp="1"/>
           </p:cNvSpPr>
@@ -1664,19 +1558,13 @@
               <a:rPr lang="en-US"/>
               <a:t>Fifth level</a:t>
             </a:r>
-            <a:endParaRPr lang="en-GB"/>
-          </a:p>
-        </p:txBody>
-      </p:sp>
-      <p:sp>
-        <p:nvSpPr>
-          <p:cNvPr id="5" name="Text Placeholder 4">
-            <a:extLst>
-              <a:ext uri="{FF2B5EF4-FFF2-40B4-BE49-F238E27FC236}">
-                <a16:creationId xmlns:a16="http://schemas.microsoft.com/office/drawing/2014/main" id="{A44718EC-E755-4B4B-9EA5-36FE1BA04BDD}"/>
-              </a:ext>
-            </a:extLst>
-          </p:cNvPr>
+            <a:endParaRPr lang="en-US" dirty="0"/>
+          </a:p>
+        </p:txBody>
+      </p:sp>
+      <p:sp>
+        <p:nvSpPr>
+          <p:cNvPr id="5" name="Text Placeholder 4"/>
           <p:cNvSpPr>
             <a:spLocks noGrp="1"/>
           </p:cNvSpPr>
@@ -1741,13 +1629,7 @@
       </p:sp>
       <p:sp>
         <p:nvSpPr>
-          <p:cNvPr id="6" name="Content Placeholder 5">
-            <a:extLst>
-              <a:ext uri="{FF2B5EF4-FFF2-40B4-BE49-F238E27FC236}">
-                <a16:creationId xmlns:a16="http://schemas.microsoft.com/office/drawing/2014/main" id="{BEE7B50B-2AB3-46D9-9990-EEDE62B414E2}"/>
-              </a:ext>
-            </a:extLst>
-          </p:cNvPr>
+          <p:cNvPr id="6" name="Content Placeholder 5"/>
           <p:cNvSpPr>
             <a:spLocks noGrp="1"/>
           </p:cNvSpPr>
@@ -1798,19 +1680,13 @@
               <a:rPr lang="en-US"/>
               <a:t>Fifth level</a:t>
             </a:r>
-            <a:endParaRPr lang="en-GB"/>
-          </a:p>
-        </p:txBody>
-      </p:sp>
-      <p:sp>
-        <p:nvSpPr>
-          <p:cNvPr id="7" name="Date Placeholder 6">
-            <a:extLst>
-              <a:ext uri="{FF2B5EF4-FFF2-40B4-BE49-F238E27FC236}">
-                <a16:creationId xmlns:a16="http://schemas.microsoft.com/office/drawing/2014/main" id="{B104C8E6-05E4-45A8-82BB-6D1DF5CA42EF}"/>
-              </a:ext>
-            </a:extLst>
-          </p:cNvPr>
+            <a:endParaRPr lang="en-US" dirty="0"/>
+          </a:p>
+        </p:txBody>
+      </p:sp>
+      <p:sp>
+        <p:nvSpPr>
+          <p:cNvPr id="7" name="Date Placeholder 6"/>
           <p:cNvSpPr>
             <a:spLocks noGrp="1"/>
           </p:cNvSpPr>
@@ -1833,13 +1709,7 @@
       </p:sp>
       <p:sp>
         <p:nvSpPr>
-          <p:cNvPr id="8" name="Footer Placeholder 7">
-            <a:extLst>
-              <a:ext uri="{FF2B5EF4-FFF2-40B4-BE49-F238E27FC236}">
-                <a16:creationId xmlns:a16="http://schemas.microsoft.com/office/drawing/2014/main" id="{F1D850F9-777E-4A00-9FFA-61117872E815}"/>
-              </a:ext>
-            </a:extLst>
-          </p:cNvPr>
+          <p:cNvPr id="8" name="Footer Placeholder 7"/>
           <p:cNvSpPr>
             <a:spLocks noGrp="1"/>
           </p:cNvSpPr>
@@ -1858,13 +1728,7 @@
       </p:sp>
       <p:sp>
         <p:nvSpPr>
-          <p:cNvPr id="9" name="Slide Number Placeholder 8">
-            <a:extLst>
-              <a:ext uri="{FF2B5EF4-FFF2-40B4-BE49-F238E27FC236}">
-                <a16:creationId xmlns:a16="http://schemas.microsoft.com/office/drawing/2014/main" id="{31C7E234-D432-4539-820C-F47E152FB7C2}"/>
-              </a:ext>
-            </a:extLst>
-          </p:cNvPr>
+          <p:cNvPr id="9" name="Slide Number Placeholder 8"/>
           <p:cNvSpPr>
             <a:spLocks noGrp="1"/>
           </p:cNvSpPr>
@@ -1888,7 +1752,7 @@
     </p:spTree>
     <p:extLst>
       <p:ext uri="{BB962C8B-B14F-4D97-AF65-F5344CB8AC3E}">
-        <p14:creationId xmlns:p14="http://schemas.microsoft.com/office/powerpoint/2010/main" val="3903999802"/>
+        <p14:creationId xmlns:p14="http://schemas.microsoft.com/office/powerpoint/2010/main" val="2655862236"/>
       </p:ext>
     </p:extLst>
   </p:cSld>
@@ -1917,13 +1781,7 @@
       </p:grpSpPr>
       <p:sp>
         <p:nvSpPr>
-          <p:cNvPr id="2" name="Title 1">
-            <a:extLst>
-              <a:ext uri="{FF2B5EF4-FFF2-40B4-BE49-F238E27FC236}">
-                <a16:creationId xmlns:a16="http://schemas.microsoft.com/office/drawing/2014/main" id="{16510F67-0F01-4569-8699-C0B34887E0A6}"/>
-              </a:ext>
-            </a:extLst>
-          </p:cNvPr>
+          <p:cNvPr id="2" name="Title 1"/>
           <p:cNvSpPr>
             <a:spLocks noGrp="1"/>
           </p:cNvSpPr>
@@ -1940,19 +1798,13 @@
               <a:rPr lang="en-US"/>
               <a:t>Click to edit Master title style</a:t>
             </a:r>
-            <a:endParaRPr lang="en-GB"/>
-          </a:p>
-        </p:txBody>
-      </p:sp>
-      <p:sp>
-        <p:nvSpPr>
-          <p:cNvPr id="3" name="Date Placeholder 2">
-            <a:extLst>
-              <a:ext uri="{FF2B5EF4-FFF2-40B4-BE49-F238E27FC236}">
-                <a16:creationId xmlns:a16="http://schemas.microsoft.com/office/drawing/2014/main" id="{38DBCDF5-5C9D-4ABE-9A8E-592EAD74FE57}"/>
-              </a:ext>
-            </a:extLst>
-          </p:cNvPr>
+            <a:endParaRPr lang="en-US" dirty="0"/>
+          </a:p>
+        </p:txBody>
+      </p:sp>
+      <p:sp>
+        <p:nvSpPr>
+          <p:cNvPr id="3" name="Date Placeholder 2"/>
           <p:cNvSpPr>
             <a:spLocks noGrp="1"/>
           </p:cNvSpPr>
@@ -1975,13 +1827,7 @@
       </p:sp>
       <p:sp>
         <p:nvSpPr>
-          <p:cNvPr id="4" name="Footer Placeholder 3">
-            <a:extLst>
-              <a:ext uri="{FF2B5EF4-FFF2-40B4-BE49-F238E27FC236}">
-                <a16:creationId xmlns:a16="http://schemas.microsoft.com/office/drawing/2014/main" id="{FBE702A0-F741-44E0-9213-0F0D95A80DEC}"/>
-              </a:ext>
-            </a:extLst>
-          </p:cNvPr>
+          <p:cNvPr id="4" name="Footer Placeholder 3"/>
           <p:cNvSpPr>
             <a:spLocks noGrp="1"/>
           </p:cNvSpPr>
@@ -2000,13 +1846,7 @@
       </p:sp>
       <p:sp>
         <p:nvSpPr>
-          <p:cNvPr id="5" name="Slide Number Placeholder 4">
-            <a:extLst>
-              <a:ext uri="{FF2B5EF4-FFF2-40B4-BE49-F238E27FC236}">
-                <a16:creationId xmlns:a16="http://schemas.microsoft.com/office/drawing/2014/main" id="{2F1E420D-4ECB-417E-9988-6FC6E0D24404}"/>
-              </a:ext>
-            </a:extLst>
-          </p:cNvPr>
+          <p:cNvPr id="5" name="Slide Number Placeholder 4"/>
           <p:cNvSpPr>
             <a:spLocks noGrp="1"/>
           </p:cNvSpPr>
@@ -2030,7 +1870,7 @@
     </p:spTree>
     <p:extLst>
       <p:ext uri="{BB962C8B-B14F-4D97-AF65-F5344CB8AC3E}">
-        <p14:creationId xmlns:p14="http://schemas.microsoft.com/office/powerpoint/2010/main" val="3393402972"/>
+        <p14:creationId xmlns:p14="http://schemas.microsoft.com/office/powerpoint/2010/main" val="2728951631"/>
       </p:ext>
     </p:extLst>
   </p:cSld>
@@ -2059,13 +1899,7 @@
       </p:grpSpPr>
       <p:sp>
         <p:nvSpPr>
-          <p:cNvPr id="2" name="Date Placeholder 1">
-            <a:extLst>
-              <a:ext uri="{FF2B5EF4-FFF2-40B4-BE49-F238E27FC236}">
-                <a16:creationId xmlns:a16="http://schemas.microsoft.com/office/drawing/2014/main" id="{A0FBF600-A43C-4970-83E5-6BFA692AAE92}"/>
-              </a:ext>
-            </a:extLst>
-          </p:cNvPr>
+          <p:cNvPr id="2" name="Date Placeholder 1"/>
           <p:cNvSpPr>
             <a:spLocks noGrp="1"/>
           </p:cNvSpPr>
@@ -2088,13 +1922,7 @@
       </p:sp>
       <p:sp>
         <p:nvSpPr>
-          <p:cNvPr id="3" name="Footer Placeholder 2">
-            <a:extLst>
-              <a:ext uri="{FF2B5EF4-FFF2-40B4-BE49-F238E27FC236}">
-                <a16:creationId xmlns:a16="http://schemas.microsoft.com/office/drawing/2014/main" id="{C134B235-9BC6-4B9B-88B2-11FB89AA960A}"/>
-              </a:ext>
-            </a:extLst>
-          </p:cNvPr>
+          <p:cNvPr id="3" name="Footer Placeholder 2"/>
           <p:cNvSpPr>
             <a:spLocks noGrp="1"/>
           </p:cNvSpPr>
@@ -2113,13 +1941,7 @@
       </p:sp>
       <p:sp>
         <p:nvSpPr>
-          <p:cNvPr id="4" name="Slide Number Placeholder 3">
-            <a:extLst>
-              <a:ext uri="{FF2B5EF4-FFF2-40B4-BE49-F238E27FC236}">
-                <a16:creationId xmlns:a16="http://schemas.microsoft.com/office/drawing/2014/main" id="{44B08FD5-35A9-4F5C-982A-5907727AAE77}"/>
-              </a:ext>
-            </a:extLst>
-          </p:cNvPr>
+          <p:cNvPr id="4" name="Slide Number Placeholder 3"/>
           <p:cNvSpPr>
             <a:spLocks noGrp="1"/>
           </p:cNvSpPr>
@@ -2143,7 +1965,7 @@
     </p:spTree>
     <p:extLst>
       <p:ext uri="{BB962C8B-B14F-4D97-AF65-F5344CB8AC3E}">
-        <p14:creationId xmlns:p14="http://schemas.microsoft.com/office/powerpoint/2010/main" val="4024049936"/>
+        <p14:creationId xmlns:p14="http://schemas.microsoft.com/office/powerpoint/2010/main" val="3395426206"/>
       </p:ext>
     </p:extLst>
   </p:cSld>
@@ -2172,13 +1994,7 @@
       </p:grpSpPr>
       <p:sp>
         <p:nvSpPr>
-          <p:cNvPr id="2" name="Title 1">
-            <a:extLst>
-              <a:ext uri="{FF2B5EF4-FFF2-40B4-BE49-F238E27FC236}">
-                <a16:creationId xmlns:a16="http://schemas.microsoft.com/office/drawing/2014/main" id="{493BD0BA-B321-47D9-920B-77A6F6C0E5F5}"/>
-              </a:ext>
-            </a:extLst>
-          </p:cNvPr>
+          <p:cNvPr id="2" name="Title 1"/>
           <p:cNvSpPr>
             <a:spLocks noGrp="1"/>
           </p:cNvSpPr>
@@ -2204,19 +2020,13 @@
               <a:rPr lang="en-US"/>
               <a:t>Click to edit Master title style</a:t>
             </a:r>
-            <a:endParaRPr lang="en-GB"/>
-          </a:p>
-        </p:txBody>
-      </p:sp>
-      <p:sp>
-        <p:nvSpPr>
-          <p:cNvPr id="3" name="Content Placeholder 2">
-            <a:extLst>
-              <a:ext uri="{FF2B5EF4-FFF2-40B4-BE49-F238E27FC236}">
-                <a16:creationId xmlns:a16="http://schemas.microsoft.com/office/drawing/2014/main" id="{87DA9908-409E-4B3E-BE9D-137174F0EB4A}"/>
-              </a:ext>
-            </a:extLst>
-          </p:cNvPr>
+            <a:endParaRPr lang="en-US" dirty="0"/>
+          </a:p>
+        </p:txBody>
+      </p:sp>
+      <p:sp>
+        <p:nvSpPr>
+          <p:cNvPr id="3" name="Content Placeholder 2"/>
           <p:cNvSpPr>
             <a:spLocks noGrp="1"/>
           </p:cNvSpPr>
@@ -2295,19 +2105,13 @@
               <a:rPr lang="en-US"/>
               <a:t>Fifth level</a:t>
             </a:r>
-            <a:endParaRPr lang="en-GB"/>
-          </a:p>
-        </p:txBody>
-      </p:sp>
-      <p:sp>
-        <p:nvSpPr>
-          <p:cNvPr id="4" name="Text Placeholder 3">
-            <a:extLst>
-              <a:ext uri="{FF2B5EF4-FFF2-40B4-BE49-F238E27FC236}">
-                <a16:creationId xmlns:a16="http://schemas.microsoft.com/office/drawing/2014/main" id="{D9A72F93-B7E3-4B0A-A6A0-BE1507655790}"/>
-              </a:ext>
-            </a:extLst>
-          </p:cNvPr>
+            <a:endParaRPr lang="en-US" dirty="0"/>
+          </a:p>
+        </p:txBody>
+      </p:sp>
+      <p:sp>
+        <p:nvSpPr>
+          <p:cNvPr id="4" name="Text Placeholder 3"/>
           <p:cNvSpPr>
             <a:spLocks noGrp="1"/>
           </p:cNvSpPr>
@@ -2372,13 +2176,7 @@
       </p:sp>
       <p:sp>
         <p:nvSpPr>
-          <p:cNvPr id="5" name="Date Placeholder 4">
-            <a:extLst>
-              <a:ext uri="{FF2B5EF4-FFF2-40B4-BE49-F238E27FC236}">
-                <a16:creationId xmlns:a16="http://schemas.microsoft.com/office/drawing/2014/main" id="{9DDA24C7-3CE2-4B70-8CF0-535CA8881F34}"/>
-              </a:ext>
-            </a:extLst>
-          </p:cNvPr>
+          <p:cNvPr id="5" name="Date Placeholder 4"/>
           <p:cNvSpPr>
             <a:spLocks noGrp="1"/>
           </p:cNvSpPr>
@@ -2401,13 +2199,7 @@
       </p:sp>
       <p:sp>
         <p:nvSpPr>
-          <p:cNvPr id="6" name="Footer Placeholder 5">
-            <a:extLst>
-              <a:ext uri="{FF2B5EF4-FFF2-40B4-BE49-F238E27FC236}">
-                <a16:creationId xmlns:a16="http://schemas.microsoft.com/office/drawing/2014/main" id="{96529842-54C2-45AF-8BF1-29BD895EB9BE}"/>
-              </a:ext>
-            </a:extLst>
-          </p:cNvPr>
+          <p:cNvPr id="6" name="Footer Placeholder 5"/>
           <p:cNvSpPr>
             <a:spLocks noGrp="1"/>
           </p:cNvSpPr>
@@ -2426,13 +2218,7 @@
       </p:sp>
       <p:sp>
         <p:nvSpPr>
-          <p:cNvPr id="7" name="Slide Number Placeholder 6">
-            <a:extLst>
-              <a:ext uri="{FF2B5EF4-FFF2-40B4-BE49-F238E27FC236}">
-                <a16:creationId xmlns:a16="http://schemas.microsoft.com/office/drawing/2014/main" id="{5BE341E6-3475-45C4-AF78-5F8B235379AF}"/>
-              </a:ext>
-            </a:extLst>
-          </p:cNvPr>
+          <p:cNvPr id="7" name="Slide Number Placeholder 6"/>
           <p:cNvSpPr>
             <a:spLocks noGrp="1"/>
           </p:cNvSpPr>
@@ -2456,7 +2242,7 @@
     </p:spTree>
     <p:extLst>
       <p:ext uri="{BB962C8B-B14F-4D97-AF65-F5344CB8AC3E}">
-        <p14:creationId xmlns:p14="http://schemas.microsoft.com/office/powerpoint/2010/main" val="4236835623"/>
+        <p14:creationId xmlns:p14="http://schemas.microsoft.com/office/powerpoint/2010/main" val="1138342249"/>
       </p:ext>
     </p:extLst>
   </p:cSld>
@@ -2485,13 +2271,7 @@
       </p:grpSpPr>
       <p:sp>
         <p:nvSpPr>
-          <p:cNvPr id="2" name="Title 1">
-            <a:extLst>
-              <a:ext uri="{FF2B5EF4-FFF2-40B4-BE49-F238E27FC236}">
-                <a16:creationId xmlns:a16="http://schemas.microsoft.com/office/drawing/2014/main" id="{A25C77BB-E12E-442E-B99C-90FBC7CDF843}"/>
-              </a:ext>
-            </a:extLst>
-          </p:cNvPr>
+          <p:cNvPr id="2" name="Title 1"/>
           <p:cNvSpPr>
             <a:spLocks noGrp="1"/>
           </p:cNvSpPr>
@@ -2517,21 +2297,15 @@
               <a:rPr lang="en-US"/>
               <a:t>Click to edit Master title style</a:t>
             </a:r>
-            <a:endParaRPr lang="en-GB"/>
-          </a:p>
-        </p:txBody>
-      </p:sp>
-      <p:sp>
-        <p:nvSpPr>
-          <p:cNvPr id="3" name="Picture Placeholder 2">
-            <a:extLst>
-              <a:ext uri="{FF2B5EF4-FFF2-40B4-BE49-F238E27FC236}">
-                <a16:creationId xmlns:a16="http://schemas.microsoft.com/office/drawing/2014/main" id="{797F4A2A-C6F1-4C6A-B81A-14B5F7A5A4A5}"/>
-              </a:ext>
-            </a:extLst>
-          </p:cNvPr>
-          <p:cNvSpPr>
-            <a:spLocks noGrp="1"/>
+            <a:endParaRPr lang="en-US" dirty="0"/>
+          </a:p>
+        </p:txBody>
+      </p:sp>
+      <p:sp>
+        <p:nvSpPr>
+          <p:cNvPr id="3" name="Picture Placeholder 2"/>
+          <p:cNvSpPr>
+            <a:spLocks noGrp="1" noChangeAspect="1"/>
           </p:cNvSpPr>
           <p:nvPr>
             <p:ph type="pic" idx="1"/>
@@ -2544,7 +2318,7 @@
           </a:xfrm>
         </p:spPr>
         <p:txBody>
-          <a:bodyPr/>
+          <a:bodyPr anchor="t"/>
           <a:lstStyle>
             <a:lvl1pPr marL="0" indent="0">
               <a:buNone/>
@@ -2584,19 +2358,17 @@
             </a:lvl9pPr>
           </a:lstStyle>
           <a:p>
-            <a:endParaRPr lang="en-GB"/>
-          </a:p>
-        </p:txBody>
-      </p:sp>
-      <p:sp>
-        <p:nvSpPr>
-          <p:cNvPr id="4" name="Text Placeholder 3">
-            <a:extLst>
-              <a:ext uri="{FF2B5EF4-FFF2-40B4-BE49-F238E27FC236}">
-                <a16:creationId xmlns:a16="http://schemas.microsoft.com/office/drawing/2014/main" id="{2438A3F8-D4A2-4F94-8845-78ABC35C8502}"/>
-              </a:ext>
-            </a:extLst>
-          </p:cNvPr>
+            <a:r>
+              <a:rPr lang="en-US"/>
+              <a:t>Click icon to add picture</a:t>
+            </a:r>
+            <a:endParaRPr lang="en-US" dirty="0"/>
+          </a:p>
+        </p:txBody>
+      </p:sp>
+      <p:sp>
+        <p:nvSpPr>
+          <p:cNvPr id="4" name="Text Placeholder 3"/>
           <p:cNvSpPr>
             <a:spLocks noGrp="1"/>
           </p:cNvSpPr>
@@ -2661,13 +2433,7 @@
       </p:sp>
       <p:sp>
         <p:nvSpPr>
-          <p:cNvPr id="5" name="Date Placeholder 4">
-            <a:extLst>
-              <a:ext uri="{FF2B5EF4-FFF2-40B4-BE49-F238E27FC236}">
-                <a16:creationId xmlns:a16="http://schemas.microsoft.com/office/drawing/2014/main" id="{F306A79E-18C8-4E62-A4E9-CBEB286190C0}"/>
-              </a:ext>
-            </a:extLst>
-          </p:cNvPr>
+          <p:cNvPr id="5" name="Date Placeholder 4"/>
           <p:cNvSpPr>
             <a:spLocks noGrp="1"/>
           </p:cNvSpPr>
@@ -2690,13 +2456,7 @@
       </p:sp>
       <p:sp>
         <p:nvSpPr>
-          <p:cNvPr id="6" name="Footer Placeholder 5">
-            <a:extLst>
-              <a:ext uri="{FF2B5EF4-FFF2-40B4-BE49-F238E27FC236}">
-                <a16:creationId xmlns:a16="http://schemas.microsoft.com/office/drawing/2014/main" id="{46FB5671-A708-471F-8CCA-EC0B2013E1D0}"/>
-              </a:ext>
-            </a:extLst>
-          </p:cNvPr>
+          <p:cNvPr id="6" name="Footer Placeholder 5"/>
           <p:cNvSpPr>
             <a:spLocks noGrp="1"/>
           </p:cNvSpPr>
@@ -2715,13 +2475,7 @@
       </p:sp>
       <p:sp>
         <p:nvSpPr>
-          <p:cNvPr id="7" name="Slide Number Placeholder 6">
-            <a:extLst>
-              <a:ext uri="{FF2B5EF4-FFF2-40B4-BE49-F238E27FC236}">
-                <a16:creationId xmlns:a16="http://schemas.microsoft.com/office/drawing/2014/main" id="{3500F1F2-B19E-4E34-A637-BB40260E43CF}"/>
-              </a:ext>
-            </a:extLst>
-          </p:cNvPr>
+          <p:cNvPr id="7" name="Slide Number Placeholder 6"/>
           <p:cNvSpPr>
             <a:spLocks noGrp="1"/>
           </p:cNvSpPr>
@@ -2745,7 +2499,7 @@
     </p:spTree>
     <p:extLst>
       <p:ext uri="{BB962C8B-B14F-4D97-AF65-F5344CB8AC3E}">
-        <p14:creationId xmlns:p14="http://schemas.microsoft.com/office/powerpoint/2010/main" val="3212717027"/>
+        <p14:creationId xmlns:p14="http://schemas.microsoft.com/office/powerpoint/2010/main" val="2954112540"/>
       </p:ext>
     </p:extLst>
   </p:cSld>
@@ -2779,13 +2533,7 @@
       </p:grpSpPr>
       <p:sp>
         <p:nvSpPr>
-          <p:cNvPr id="2" name="Title Placeholder 1">
-            <a:extLst>
-              <a:ext uri="{FF2B5EF4-FFF2-40B4-BE49-F238E27FC236}">
-                <a16:creationId xmlns:a16="http://schemas.microsoft.com/office/drawing/2014/main" id="{19CD8CE1-97CB-46A6-8953-D06407387A41}"/>
-              </a:ext>
-            </a:extLst>
-          </p:cNvPr>
+          <p:cNvPr id="2" name="Title Placeholder 1"/>
           <p:cNvSpPr>
             <a:spLocks noGrp="1"/>
           </p:cNvSpPr>
@@ -2812,19 +2560,13 @@
               <a:rPr lang="en-US"/>
               <a:t>Click to edit Master title style</a:t>
             </a:r>
-            <a:endParaRPr lang="en-GB"/>
-          </a:p>
-        </p:txBody>
-      </p:sp>
-      <p:sp>
-        <p:nvSpPr>
-          <p:cNvPr id="3" name="Text Placeholder 2">
-            <a:extLst>
-              <a:ext uri="{FF2B5EF4-FFF2-40B4-BE49-F238E27FC236}">
-                <a16:creationId xmlns:a16="http://schemas.microsoft.com/office/drawing/2014/main" id="{85D81D26-2EAC-4F8A-A2FC-D9EC0321BB77}"/>
-              </a:ext>
-            </a:extLst>
-          </p:cNvPr>
+            <a:endParaRPr lang="en-US" dirty="0"/>
+          </a:p>
+        </p:txBody>
+      </p:sp>
+      <p:sp>
+        <p:nvSpPr>
+          <p:cNvPr id="3" name="Text Placeholder 2"/>
           <p:cNvSpPr>
             <a:spLocks noGrp="1"/>
           </p:cNvSpPr>
@@ -2880,19 +2622,13 @@
               <a:rPr lang="en-US"/>
               <a:t>Fifth level</a:t>
             </a:r>
-            <a:endParaRPr lang="en-GB"/>
-          </a:p>
-        </p:txBody>
-      </p:sp>
-      <p:sp>
-        <p:nvSpPr>
-          <p:cNvPr id="4" name="Date Placeholder 3">
-            <a:extLst>
-              <a:ext uri="{FF2B5EF4-FFF2-40B4-BE49-F238E27FC236}">
-                <a16:creationId xmlns:a16="http://schemas.microsoft.com/office/drawing/2014/main" id="{41C080D7-194D-411F-812B-BBC86119B1F8}"/>
-              </a:ext>
-            </a:extLst>
-          </p:cNvPr>
+            <a:endParaRPr lang="en-US" dirty="0"/>
+          </a:p>
+        </p:txBody>
+      </p:sp>
+      <p:sp>
+        <p:nvSpPr>
+          <p:cNvPr id="4" name="Date Placeholder 3"/>
           <p:cNvSpPr>
             <a:spLocks noGrp="1"/>
           </p:cNvSpPr>
@@ -2933,13 +2669,7 @@
       </p:sp>
       <p:sp>
         <p:nvSpPr>
-          <p:cNvPr id="5" name="Footer Placeholder 4">
-            <a:extLst>
-              <a:ext uri="{FF2B5EF4-FFF2-40B4-BE49-F238E27FC236}">
-                <a16:creationId xmlns:a16="http://schemas.microsoft.com/office/drawing/2014/main" id="{72F34BE7-5188-418F-B6B7-F5254C51D1F4}"/>
-              </a:ext>
-            </a:extLst>
-          </p:cNvPr>
+          <p:cNvPr id="5" name="Footer Placeholder 4"/>
           <p:cNvSpPr>
             <a:spLocks noGrp="1"/>
           </p:cNvSpPr>
@@ -2976,13 +2706,7 @@
       </p:sp>
       <p:sp>
         <p:nvSpPr>
-          <p:cNvPr id="6" name="Slide Number Placeholder 5">
-            <a:extLst>
-              <a:ext uri="{FF2B5EF4-FFF2-40B4-BE49-F238E27FC236}">
-                <a16:creationId xmlns:a16="http://schemas.microsoft.com/office/drawing/2014/main" id="{446ADEAA-D776-4B04-AB93-2A7E6793CF41}"/>
-              </a:ext>
-            </a:extLst>
-          </p:cNvPr>
+          <p:cNvPr id="6" name="Slide Number Placeholder 5"/>
           <p:cNvSpPr>
             <a:spLocks noGrp="1"/>
           </p:cNvSpPr>
@@ -3024,23 +2748,23 @@
     </p:spTree>
     <p:extLst>
       <p:ext uri="{BB962C8B-B14F-4D97-AF65-F5344CB8AC3E}">
-        <p14:creationId xmlns:p14="http://schemas.microsoft.com/office/powerpoint/2010/main" val="2011753452"/>
+        <p14:creationId xmlns:p14="http://schemas.microsoft.com/office/powerpoint/2010/main" val="2743554691"/>
       </p:ext>
     </p:extLst>
   </p:cSld>
   <p:clrMap bg1="lt1" tx1="dk1" bg2="lt2" tx2="dk2" accent1="accent1" accent2="accent2" accent3="accent3" accent4="accent4" accent5="accent5" accent6="accent6" hlink="hlink" folHlink="folHlink"/>
   <p:sldLayoutIdLst>
-    <p:sldLayoutId id="2147483649" r:id="rId1"/>
-    <p:sldLayoutId id="2147483650" r:id="rId2"/>
-    <p:sldLayoutId id="2147483651" r:id="rId3"/>
-    <p:sldLayoutId id="2147483652" r:id="rId4"/>
-    <p:sldLayoutId id="2147483653" r:id="rId5"/>
-    <p:sldLayoutId id="2147483654" r:id="rId6"/>
-    <p:sldLayoutId id="2147483655" r:id="rId7"/>
-    <p:sldLayoutId id="2147483656" r:id="rId8"/>
-    <p:sldLayoutId id="2147483657" r:id="rId9"/>
-    <p:sldLayoutId id="2147483658" r:id="rId10"/>
-    <p:sldLayoutId id="2147483659" r:id="rId11"/>
+    <p:sldLayoutId id="2147483709" r:id="rId1"/>
+    <p:sldLayoutId id="2147483710" r:id="rId2"/>
+    <p:sldLayoutId id="2147483711" r:id="rId3"/>
+    <p:sldLayoutId id="2147483712" r:id="rId4"/>
+    <p:sldLayoutId id="2147483713" r:id="rId5"/>
+    <p:sldLayoutId id="2147483714" r:id="rId6"/>
+    <p:sldLayoutId id="2147483715" r:id="rId7"/>
+    <p:sldLayoutId id="2147483716" r:id="rId8"/>
+    <p:sldLayoutId id="2147483717" r:id="rId9"/>
+    <p:sldLayoutId id="2147483718" r:id="rId10"/>
+    <p:sldLayoutId id="2147483719" r:id="rId11"/>
   </p:sldLayoutIdLst>
   <p:txStyles>
     <p:titleStyle>
@@ -3328,6 +3052,14 @@
 <file path=ppt/slides/slide1.xml><?xml version="1.0" encoding="utf-8"?>
 <p:sld xmlns:a="http://schemas.openxmlformats.org/drawingml/2006/main" xmlns:r="http://schemas.openxmlformats.org/officeDocument/2006/relationships" xmlns:p="http://schemas.openxmlformats.org/presentationml/2006/main">
   <p:cSld>
+    <p:bg>
+      <p:bgPr>
+        <a:solidFill>
+          <a:srgbClr val="E2F0D9"/>
+        </a:solidFill>
+        <a:effectLst/>
+      </p:bgPr>
+    </p:bg>
     <p:spTree>
       <p:nvGrpSpPr>
         <p:cNvPr id="1" name=""/>
@@ -3363,7 +3095,54 @@
           <a:bodyPr/>
           <a:lstStyle/>
           <a:p>
-            <a:endParaRPr lang="en-GB"/>
+            <a:r>
+              <a:rPr lang="en-GB" dirty="0" err="1"/>
+              <a:t>Darbs</a:t>
+            </a:r>
+            <a:r>
+              <a:rPr lang="en-GB" dirty="0"/>
+              <a:t> </a:t>
+            </a:r>
+            <a:r>
+              <a:rPr lang="en-GB" dirty="0" err="1"/>
+              <a:t>ar</a:t>
+            </a:r>
+            <a:r>
+              <a:rPr lang="en-GB" dirty="0"/>
+              <a:t> </a:t>
+            </a:r>
+            <a:r>
+              <a:rPr lang="en-GB" dirty="0" err="1"/>
+              <a:t>teksta</a:t>
+            </a:r>
+            <a:r>
+              <a:rPr lang="en-GB" dirty="0"/>
+              <a:t> </a:t>
+            </a:r>
+            <a:r>
+              <a:rPr lang="en-GB" dirty="0" err="1"/>
+              <a:t>datnēm</a:t>
+            </a:r>
+            <a:r>
+              <a:rPr lang="en-GB" dirty="0"/>
+              <a:t> </a:t>
+            </a:r>
+            <a:r>
+              <a:rPr lang="en-GB" dirty="0" err="1"/>
+              <a:t>programmēšanas</a:t>
+            </a:r>
+            <a:r>
+              <a:rPr lang="en-GB" dirty="0"/>
+              <a:t> </a:t>
+            </a:r>
+            <a:r>
+              <a:rPr lang="en-GB" dirty="0" err="1"/>
+              <a:t>valodā</a:t>
+            </a:r>
+            <a:r>
+              <a:rPr lang="en-GB" dirty="0"/>
+              <a:t> Java</a:t>
+            </a:r>
           </a:p>
         </p:txBody>
       </p:sp>
@@ -3388,7 +3167,11 @@
           <a:bodyPr/>
           <a:lstStyle/>
           <a:p>
-            <a:endParaRPr lang="en-GB"/>
+            <a:r>
+              <a:rPr lang="lv-LV" dirty="0"/>
+              <a:t>Rihards Mikuts 2PT</a:t>
+            </a:r>
+            <a:endParaRPr lang="en-GB" dirty="0"/>
           </a:p>
         </p:txBody>
       </p:sp>
@@ -3405,10 +3188,171 @@
 </p:sld>
 </file>
 
+<file path=ppt/slides/slide2.xml><?xml version="1.0" encoding="utf-8"?>
+<p:sld xmlns:a="http://schemas.openxmlformats.org/drawingml/2006/main" xmlns:r="http://schemas.openxmlformats.org/officeDocument/2006/relationships" xmlns:p="http://schemas.openxmlformats.org/presentationml/2006/main">
+  <p:cSld>
+    <p:bg>
+      <p:bgPr>
+        <a:solidFill>
+          <a:schemeClr val="accent6">
+            <a:lumMod val="20000"/>
+            <a:lumOff val="80000"/>
+          </a:schemeClr>
+        </a:solidFill>
+        <a:effectLst/>
+      </p:bgPr>
+    </p:bg>
+    <p:spTree>
+      <p:nvGrpSpPr>
+        <p:cNvPr id="1" name=""/>
+        <p:cNvGrpSpPr/>
+        <p:nvPr/>
+      </p:nvGrpSpPr>
+      <p:grpSpPr>
+        <a:xfrm>
+          <a:off x="0" y="0"/>
+          <a:ext cx="0" cy="0"/>
+          <a:chOff x="0" y="0"/>
+          <a:chExt cx="0" cy="0"/>
+        </a:xfrm>
+      </p:grpSpPr>
+      <p:sp>
+        <p:nvSpPr>
+          <p:cNvPr id="2" name="Title 1">
+            <a:extLst>
+              <a:ext uri="{FF2B5EF4-FFF2-40B4-BE49-F238E27FC236}">
+                <a16:creationId xmlns:a16="http://schemas.microsoft.com/office/drawing/2014/main" id="{77FD5A51-1ACD-4171-9E62-A65089091B40}"/>
+              </a:ext>
+            </a:extLst>
+          </p:cNvPr>
+          <p:cNvSpPr>
+            <a:spLocks noGrp="1"/>
+          </p:cNvSpPr>
+          <p:nvPr>
+            <p:ph type="title"/>
+          </p:nvPr>
+        </p:nvSpPr>
+        <p:spPr>
+          <a:xfrm>
+            <a:off x="838200" y="365125"/>
+            <a:ext cx="10515600" cy="483961"/>
+          </a:xfrm>
+        </p:spPr>
+        <p:txBody>
+          <a:bodyPr>
+            <a:normAutofit fontScale="90000"/>
+          </a:bodyPr>
+          <a:lstStyle/>
+          <a:p>
+            <a:pPr algn="ctr"/>
+            <a:r>
+              <a:rPr lang="lv-LV" b="1" dirty="0"/>
+              <a:t>Kas </a:t>
+            </a:r>
+            <a:r>
+              <a:rPr lang="lv-LV" b="1"/>
+              <a:t>ir teksta datnes?</a:t>
+            </a:r>
+            <a:endParaRPr lang="en-GB" b="1" dirty="0"/>
+          </a:p>
+        </p:txBody>
+      </p:sp>
+      <p:sp>
+        <p:nvSpPr>
+          <p:cNvPr id="3" name="Content Placeholder 2">
+            <a:extLst>
+              <a:ext uri="{FF2B5EF4-FFF2-40B4-BE49-F238E27FC236}">
+                <a16:creationId xmlns:a16="http://schemas.microsoft.com/office/drawing/2014/main" id="{BCD45001-2C21-45FC-9796-119A3DDD95F5}"/>
+              </a:ext>
+            </a:extLst>
+          </p:cNvPr>
+          <p:cNvSpPr>
+            <a:spLocks noGrp="1"/>
+          </p:cNvSpPr>
+          <p:nvPr>
+            <p:ph idx="1"/>
+          </p:nvPr>
+        </p:nvSpPr>
+        <p:spPr>
+          <a:xfrm>
+            <a:off x="660918" y="1079175"/>
+            <a:ext cx="11095653" cy="4351338"/>
+          </a:xfrm>
+        </p:spPr>
+        <p:txBody>
+          <a:bodyPr/>
+          <a:lstStyle/>
+          <a:p>
+            <a:pPr marL="0" indent="0">
+              <a:buNone/>
+            </a:pPr>
+            <a:r>
+              <a:rPr lang="lv-LV" dirty="0"/>
+              <a:t>Programmētāji Java valodā izmanto teksta datnes, strādājot ar Java lietojumprogrammām, kurām nepieciešama failu lasīšana un rakstīšana. Teksta datnes ir universāli veidi, kā glabāt informāciju, kodu vai citus datus.</a:t>
+            </a:r>
+            <a:br>
+              <a:rPr lang="lv-LV" dirty="0"/>
+            </a:br>
+            <a:r>
+              <a:rPr lang="lv-LV" dirty="0"/>
+              <a:t>Viens piemērs būtu, ka tiek saglabāti picas pasūtījums, ko lietotājs ir pasūtījis.</a:t>
+            </a:r>
+          </a:p>
+          <a:p>
+            <a:pPr marL="0" indent="0">
+              <a:buNone/>
+            </a:pPr>
+            <a:endParaRPr lang="en-GB" dirty="0"/>
+          </a:p>
+        </p:txBody>
+      </p:sp>
+      <p:pic>
+        <p:nvPicPr>
+          <p:cNvPr id="7" name="Picture 6">
+            <a:extLst>
+              <a:ext uri="{FF2B5EF4-FFF2-40B4-BE49-F238E27FC236}">
+                <a16:creationId xmlns:a16="http://schemas.microsoft.com/office/drawing/2014/main" id="{1A614D5F-2379-4A1A-9543-D2524BE2BAD0}"/>
+              </a:ext>
+            </a:extLst>
+          </p:cNvPr>
+          <p:cNvPicPr>
+            <a:picLocks noChangeAspect="1"/>
+          </p:cNvPicPr>
+          <p:nvPr/>
+        </p:nvPicPr>
+        <p:blipFill>
+          <a:blip r:embed="rId2"/>
+          <a:stretch>
+            <a:fillRect/>
+          </a:stretch>
+        </p:blipFill>
+        <p:spPr>
+          <a:xfrm>
+            <a:off x="3892025" y="3014004"/>
+            <a:ext cx="4277322" cy="3562847"/>
+          </a:xfrm>
+          <a:prstGeom prst="rect">
+            <a:avLst/>
+          </a:prstGeom>
+        </p:spPr>
+      </p:pic>
+    </p:spTree>
+    <p:extLst>
+      <p:ext uri="{BB962C8B-B14F-4D97-AF65-F5344CB8AC3E}">
+        <p14:creationId xmlns:p14="http://schemas.microsoft.com/office/powerpoint/2010/main" val="743291785"/>
+      </p:ext>
+    </p:extLst>
+  </p:cSld>
+  <p:clrMapOvr>
+    <a:masterClrMapping/>
+  </p:clrMapOvr>
+</p:sld>
+</file>
+
 <file path=ppt/theme/theme1.xml><?xml version="1.0" encoding="utf-8"?>
 <a:theme xmlns:a="http://schemas.openxmlformats.org/drawingml/2006/main" name="Office Theme">
   <a:themeElements>
-    <a:clrScheme name="Office">
+    <a:clrScheme name="Office Theme">
       <a:dk1>
         <a:sysClr val="windowText" lastClr="000000"/>
       </a:dk1>
@@ -3446,7 +3390,7 @@
         <a:srgbClr val="954F72"/>
       </a:folHlink>
     </a:clrScheme>
-    <a:fontScheme name="Office">
+    <a:fontScheme name="Office Theme">
       <a:majorFont>
         <a:latin typeface="Calibri Light" panose="020F0302020204030204"/>
         <a:ea typeface=""/>
@@ -3481,23 +3425,6 @@
         <a:font script="Viet" typeface="Times New Roman"/>
         <a:font script="Uigh" typeface="Microsoft Uighur"/>
         <a:font script="Geor" typeface="Sylfaen"/>
-        <a:font script="Armn" typeface="Arial"/>
-        <a:font script="Bugi" typeface="Leelawadee UI"/>
-        <a:font script="Bopo" typeface="Microsoft JhengHei"/>
-        <a:font script="Java" typeface="Javanese Text"/>
-        <a:font script="Lisu" typeface="Segoe UI"/>
-        <a:font script="Mymr" typeface="Myanmar Text"/>
-        <a:font script="Nkoo" typeface="Ebrima"/>
-        <a:font script="Olck" typeface="Nirmala UI"/>
-        <a:font script="Osma" typeface="Ebrima"/>
-        <a:font script="Phag" typeface="Phagspa"/>
-        <a:font script="Syrn" typeface="Estrangelo Edessa"/>
-        <a:font script="Syrj" typeface="Estrangelo Edessa"/>
-        <a:font script="Syre" typeface="Estrangelo Edessa"/>
-        <a:font script="Sora" typeface="Nirmala UI"/>
-        <a:font script="Tale" typeface="Microsoft Tai Le"/>
-        <a:font script="Talu" typeface="Microsoft New Tai Lue"/>
-        <a:font script="Tfng" typeface="Ebrima"/>
       </a:majorFont>
       <a:minorFont>
         <a:latin typeface="Calibri" panose="020F0502020204030204"/>
@@ -3533,26 +3460,9 @@
         <a:font script="Viet" typeface="Arial"/>
         <a:font script="Uigh" typeface="Microsoft Uighur"/>
         <a:font script="Geor" typeface="Sylfaen"/>
-        <a:font script="Armn" typeface="Arial"/>
-        <a:font script="Bugi" typeface="Leelawadee UI"/>
-        <a:font script="Bopo" typeface="Microsoft JhengHei"/>
-        <a:font script="Java" typeface="Javanese Text"/>
-        <a:font script="Lisu" typeface="Segoe UI"/>
-        <a:font script="Mymr" typeface="Myanmar Text"/>
-        <a:font script="Nkoo" typeface="Ebrima"/>
-        <a:font script="Olck" typeface="Nirmala UI"/>
-        <a:font script="Osma" typeface="Ebrima"/>
-        <a:font script="Phag" typeface="Phagspa"/>
-        <a:font script="Syrn" typeface="Estrangelo Edessa"/>
-        <a:font script="Syrj" typeface="Estrangelo Edessa"/>
-        <a:font script="Syre" typeface="Estrangelo Edessa"/>
-        <a:font script="Sora" typeface="Nirmala UI"/>
-        <a:font script="Tale" typeface="Microsoft Tai Le"/>
-        <a:font script="Talu" typeface="Microsoft New Tai Lue"/>
-        <a:font script="Tfng" typeface="Ebrima"/>
       </a:minorFont>
     </a:fontScheme>
-    <a:fmtScheme name="Office">
+    <a:fmtScheme name="Office Theme">
       <a:fillStyleLst>
         <a:solidFill>
           <a:schemeClr val="phClr"/>

</xml_diff>

<commit_message>
Izveidota informācija par pakotni un FileWriter
</commit_message>
<xml_diff>
--- a/MacibuMaterials.pptx
+++ b/MacibuMaterials.pptx
@@ -7,6 +7,14 @@
   <p:sldIdLst>
     <p:sldId id="256" r:id="rId2"/>
     <p:sldId id="257" r:id="rId3"/>
+    <p:sldId id="258" r:id="rId4"/>
+    <p:sldId id="259" r:id="rId5"/>
+    <p:sldId id="260" r:id="rId6"/>
+    <p:sldId id="261" r:id="rId7"/>
+    <p:sldId id="262" r:id="rId8"/>
+    <p:sldId id="263" r:id="rId9"/>
+    <p:sldId id="264" r:id="rId10"/>
+    <p:sldId id="265" r:id="rId11"/>
   </p:sldIdLst>
   <p:sldSz cx="12192000" cy="6858000"/>
   <p:notesSz cx="6858000" cy="9144000"/>
@@ -105,6 +113,11 @@
       </a:defRPr>
     </a:lvl9pPr>
   </p:defaultTextStyle>
+  <p:extLst>
+    <p:ext uri="{EFAFB233-063F-42B5-8137-9DF3F51BA10A}">
+      <p15:sldGuideLst xmlns:p15="http://schemas.microsoft.com/office/powerpoint/2012/main"/>
+    </p:ext>
+  </p:extLst>
 </p:presentation>
 </file>
 
@@ -113,7 +126,7 @@
   <pc:docChgLst>
     <pc:chgData name="Rihards Mikuts" userId="3f680863f303c92b" providerId="LiveId" clId="{7ECA00DE-8CB5-4FFD-8DC5-57B39CF038BB}"/>
     <pc:docChg chg="undo custSel addSld delSld modSld">
-      <pc:chgData name="Rihards Mikuts" userId="3f680863f303c92b" providerId="LiveId" clId="{7ECA00DE-8CB5-4FFD-8DC5-57B39CF038BB}" dt="2025-06-05T19:55:36.006" v="402" actId="20577"/>
+      <pc:chgData name="Rihards Mikuts" userId="3f680863f303c92b" providerId="LiveId" clId="{7ECA00DE-8CB5-4FFD-8DC5-57B39CF038BB}" dt="2025-06-06T10:36:39.064" v="738" actId="20577"/>
       <pc:docMkLst>
         <pc:docMk/>
       </pc:docMkLst>
@@ -148,13 +161,13 @@
         </pc:sldMkLst>
       </pc:sldChg>
       <pc:sldChg chg="addSp delSp modSp new mod setBg">
-        <pc:chgData name="Rihards Mikuts" userId="3f680863f303c92b" providerId="LiveId" clId="{7ECA00DE-8CB5-4FFD-8DC5-57B39CF038BB}" dt="2025-06-05T19:55:36.006" v="402" actId="20577"/>
+        <pc:chgData name="Rihards Mikuts" userId="3f680863f303c92b" providerId="LiveId" clId="{7ECA00DE-8CB5-4FFD-8DC5-57B39CF038BB}" dt="2025-06-06T09:31:34.267" v="410" actId="113"/>
         <pc:sldMkLst>
           <pc:docMk/>
           <pc:sldMk cId="743291785" sldId="257"/>
         </pc:sldMkLst>
         <pc:spChg chg="mod">
-          <ac:chgData name="Rihards Mikuts" userId="3f680863f303c92b" providerId="LiveId" clId="{7ECA00DE-8CB5-4FFD-8DC5-57B39CF038BB}" dt="2025-06-05T19:55:36.006" v="402" actId="20577"/>
+          <ac:chgData name="Rihards Mikuts" userId="3f680863f303c92b" providerId="LiveId" clId="{7ECA00DE-8CB5-4FFD-8DC5-57B39CF038BB}" dt="2025-06-06T09:31:34.267" v="410" actId="113"/>
           <ac:spMkLst>
             <pc:docMk/>
             <pc:sldMk cId="743291785" sldId="257"/>
@@ -200,6 +213,317 @@
           <pc:sldMk cId="2739507624" sldId="257"/>
         </pc:sldMkLst>
       </pc:sldChg>
+      <pc:sldChg chg="addSp delSp modSp new mod setBg">
+        <pc:chgData name="Rihards Mikuts" userId="3f680863f303c92b" providerId="LiveId" clId="{7ECA00DE-8CB5-4FFD-8DC5-57B39CF038BB}" dt="2025-06-06T09:33:00.454" v="435" actId="2711"/>
+        <pc:sldMkLst>
+          <pc:docMk/>
+          <pc:sldMk cId="446333089" sldId="258"/>
+        </pc:sldMkLst>
+        <pc:spChg chg="add del mod">
+          <ac:chgData name="Rihards Mikuts" userId="3f680863f303c92b" providerId="LiveId" clId="{7ECA00DE-8CB5-4FFD-8DC5-57B39CF038BB}" dt="2025-06-06T09:33:00.454" v="435" actId="2711"/>
+          <ac:spMkLst>
+            <pc:docMk/>
+            <pc:sldMk cId="446333089" sldId="258"/>
+            <ac:spMk id="2" creationId="{09D92BE7-4147-419C-8331-5D82849AB64E}"/>
+          </ac:spMkLst>
+        </pc:spChg>
+        <pc:spChg chg="add del mod">
+          <ac:chgData name="Rihards Mikuts" userId="3f680863f303c92b" providerId="LiveId" clId="{7ECA00DE-8CB5-4FFD-8DC5-57B39CF038BB}" dt="2025-06-06T09:32:29.487" v="423" actId="5793"/>
+          <ac:spMkLst>
+            <pc:docMk/>
+            <pc:sldMk cId="446333089" sldId="258"/>
+            <ac:spMk id="3" creationId="{CA8D1220-D217-416B-8E2D-6CF9D79C3985}"/>
+          </ac:spMkLst>
+        </pc:spChg>
+        <pc:spChg chg="add del mod">
+          <ac:chgData name="Rihards Mikuts" userId="3f680863f303c92b" providerId="LiveId" clId="{7ECA00DE-8CB5-4FFD-8DC5-57B39CF038BB}" dt="2025-06-06T09:31:52.552" v="412"/>
+          <ac:spMkLst>
+            <pc:docMk/>
+            <pc:sldMk cId="446333089" sldId="258"/>
+            <ac:spMk id="4" creationId="{C035D4E3-33A0-425F-80D7-2499E4FD81FD}"/>
+          </ac:spMkLst>
+        </pc:spChg>
+        <pc:spChg chg="add del mod">
+          <ac:chgData name="Rihards Mikuts" userId="3f680863f303c92b" providerId="LiveId" clId="{7ECA00DE-8CB5-4FFD-8DC5-57B39CF038BB}" dt="2025-06-06T09:31:54.105" v="414"/>
+          <ac:spMkLst>
+            <pc:docMk/>
+            <pc:sldMk cId="446333089" sldId="258"/>
+            <ac:spMk id="5" creationId="{5946499A-3941-4615-A1BC-CD6DB30E339D}"/>
+          </ac:spMkLst>
+        </pc:spChg>
+        <pc:picChg chg="add mod">
+          <ac:chgData name="Rihards Mikuts" userId="3f680863f303c92b" providerId="LiveId" clId="{7ECA00DE-8CB5-4FFD-8DC5-57B39CF038BB}" dt="2025-06-06T09:32:45.757" v="427" actId="1076"/>
+          <ac:picMkLst>
+            <pc:docMk/>
+            <pc:sldMk cId="446333089" sldId="258"/>
+            <ac:picMk id="7" creationId="{AEE8900B-DF0C-4D33-9937-C9B6111868A1}"/>
+          </ac:picMkLst>
+        </pc:picChg>
+      </pc:sldChg>
+      <pc:sldChg chg="modSp new mod setBg">
+        <pc:chgData name="Rihards Mikuts" userId="3f680863f303c92b" providerId="LiveId" clId="{7ECA00DE-8CB5-4FFD-8DC5-57B39CF038BB}" dt="2025-06-06T09:53:53.993" v="445" actId="2711"/>
+        <pc:sldMkLst>
+          <pc:docMk/>
+          <pc:sldMk cId="2234697324" sldId="259"/>
+        </pc:sldMkLst>
+        <pc:spChg chg="mod">
+          <ac:chgData name="Rihards Mikuts" userId="3f680863f303c92b" providerId="LiveId" clId="{7ECA00DE-8CB5-4FFD-8DC5-57B39CF038BB}" dt="2025-06-06T09:53:53.993" v="445" actId="2711"/>
+          <ac:spMkLst>
+            <pc:docMk/>
+            <pc:sldMk cId="2234697324" sldId="259"/>
+            <ac:spMk id="2" creationId="{DC598DD3-635B-4D67-ABB3-02B91E4A79B8}"/>
+          </ac:spMkLst>
+        </pc:spChg>
+        <pc:spChg chg="mod">
+          <ac:chgData name="Rihards Mikuts" userId="3f680863f303c92b" providerId="LiveId" clId="{7ECA00DE-8CB5-4FFD-8DC5-57B39CF038BB}" dt="2025-06-06T09:49:12.248" v="444" actId="20577"/>
+          <ac:spMkLst>
+            <pc:docMk/>
+            <pc:sldMk cId="2234697324" sldId="259"/>
+            <ac:spMk id="3" creationId="{DD2D8840-CC0E-49E7-93B7-354209F90F28}"/>
+          </ac:spMkLst>
+        </pc:spChg>
+      </pc:sldChg>
+      <pc:sldChg chg="addSp modSp add mod setBg">
+        <pc:chgData name="Rihards Mikuts" userId="3f680863f303c92b" providerId="LiveId" clId="{7ECA00DE-8CB5-4FFD-8DC5-57B39CF038BB}" dt="2025-06-06T10:27:55.903" v="623" actId="20577"/>
+        <pc:sldMkLst>
+          <pc:docMk/>
+          <pc:sldMk cId="2479667279" sldId="260"/>
+        </pc:sldMkLst>
+        <pc:spChg chg="mod">
+          <ac:chgData name="Rihards Mikuts" userId="3f680863f303c92b" providerId="LiveId" clId="{7ECA00DE-8CB5-4FFD-8DC5-57B39CF038BB}" dt="2025-06-06T09:54:21.994" v="450"/>
+          <ac:spMkLst>
+            <pc:docMk/>
+            <pc:sldMk cId="2479667279" sldId="260"/>
+            <ac:spMk id="2" creationId="{DC598DD3-635B-4D67-ABB3-02B91E4A79B8}"/>
+          </ac:spMkLst>
+        </pc:spChg>
+        <pc:spChg chg="mod">
+          <ac:chgData name="Rihards Mikuts" userId="3f680863f303c92b" providerId="LiveId" clId="{7ECA00DE-8CB5-4FFD-8DC5-57B39CF038BB}" dt="2025-06-06T10:27:55.903" v="623" actId="20577"/>
+          <ac:spMkLst>
+            <pc:docMk/>
+            <pc:sldMk cId="2479667279" sldId="260"/>
+            <ac:spMk id="3" creationId="{DD2D8840-CC0E-49E7-93B7-354209F90F28}"/>
+          </ac:spMkLst>
+        </pc:spChg>
+        <pc:picChg chg="add mod">
+          <ac:chgData name="Rihards Mikuts" userId="3f680863f303c92b" providerId="LiveId" clId="{7ECA00DE-8CB5-4FFD-8DC5-57B39CF038BB}" dt="2025-06-06T10:27:27.177" v="588" actId="14100"/>
+          <ac:picMkLst>
+            <pc:docMk/>
+            <pc:sldMk cId="2479667279" sldId="260"/>
+            <ac:picMk id="5" creationId="{06AD89A0-8BE6-4163-81F0-088B2A18F2C6}"/>
+          </ac:picMkLst>
+        </pc:picChg>
+      </pc:sldChg>
+      <pc:sldChg chg="addSp delSp modSp add mod setBg">
+        <pc:chgData name="Rihards Mikuts" userId="3f680863f303c92b" providerId="LiveId" clId="{7ECA00DE-8CB5-4FFD-8DC5-57B39CF038BB}" dt="2025-06-06T10:03:26.681" v="475" actId="22"/>
+        <pc:sldMkLst>
+          <pc:docMk/>
+          <pc:sldMk cId="2020515774" sldId="261"/>
+        </pc:sldMkLst>
+        <pc:spChg chg="mod">
+          <ac:chgData name="Rihards Mikuts" userId="3f680863f303c92b" providerId="LiveId" clId="{7ECA00DE-8CB5-4FFD-8DC5-57B39CF038BB}" dt="2025-06-06T10:03:21.840" v="473" actId="12"/>
+          <ac:spMkLst>
+            <pc:docMk/>
+            <pc:sldMk cId="2020515774" sldId="261"/>
+            <ac:spMk id="3" creationId="{DD2D8840-CC0E-49E7-93B7-354209F90F28}"/>
+          </ac:spMkLst>
+        </pc:spChg>
+        <pc:picChg chg="add del">
+          <ac:chgData name="Rihards Mikuts" userId="3f680863f303c92b" providerId="LiveId" clId="{7ECA00DE-8CB5-4FFD-8DC5-57B39CF038BB}" dt="2025-06-06T10:03:26.681" v="475" actId="22"/>
+          <ac:picMkLst>
+            <pc:docMk/>
+            <pc:sldMk cId="2020515774" sldId="261"/>
+            <ac:picMk id="5" creationId="{1C6716F4-F17B-4A68-BBAC-F839ADDD60F4}"/>
+          </ac:picMkLst>
+        </pc:picChg>
+      </pc:sldChg>
+      <pc:sldChg chg="addSp delSp modSp add mod setBg">
+        <pc:chgData name="Rihards Mikuts" userId="3f680863f303c92b" providerId="LiveId" clId="{7ECA00DE-8CB5-4FFD-8DC5-57B39CF038BB}" dt="2025-06-06T10:03:51.651" v="479"/>
+        <pc:sldMkLst>
+          <pc:docMk/>
+          <pc:sldMk cId="1062204103" sldId="262"/>
+        </pc:sldMkLst>
+        <pc:spChg chg="del mod">
+          <ac:chgData name="Rihards Mikuts" userId="3f680863f303c92b" providerId="LiveId" clId="{7ECA00DE-8CB5-4FFD-8DC5-57B39CF038BB}" dt="2025-06-06T10:03:40.577" v="478"/>
+          <ac:spMkLst>
+            <pc:docMk/>
+            <pc:sldMk cId="1062204103" sldId="262"/>
+            <ac:spMk id="3" creationId="{DD2D8840-CC0E-49E7-93B7-354209F90F28}"/>
+          </ac:spMkLst>
+        </pc:spChg>
+        <pc:picChg chg="add mod">
+          <ac:chgData name="Rihards Mikuts" userId="3f680863f303c92b" providerId="LiveId" clId="{7ECA00DE-8CB5-4FFD-8DC5-57B39CF038BB}" dt="2025-06-06T10:03:40.577" v="478"/>
+          <ac:picMkLst>
+            <pc:docMk/>
+            <pc:sldMk cId="1062204103" sldId="262"/>
+            <ac:picMk id="2050" creationId="{4E6BEFE0-65C3-4136-8E0E-3E07F77F2C71}"/>
+          </ac:picMkLst>
+        </pc:picChg>
+      </pc:sldChg>
+      <pc:sldChg chg="addSp delSp add del mod">
+        <pc:chgData name="Rihards Mikuts" userId="3f680863f303c92b" providerId="LiveId" clId="{7ECA00DE-8CB5-4FFD-8DC5-57B39CF038BB}" dt="2025-06-06T10:05:16.169" v="483" actId="2890"/>
+        <pc:sldMkLst>
+          <pc:docMk/>
+          <pc:sldMk cId="2620990126" sldId="263"/>
+        </pc:sldMkLst>
+        <pc:spChg chg="add del">
+          <ac:chgData name="Rihards Mikuts" userId="3f680863f303c92b" providerId="LiveId" clId="{7ECA00DE-8CB5-4FFD-8DC5-57B39CF038BB}" dt="2025-06-06T10:05:15.836" v="482" actId="22"/>
+          <ac:spMkLst>
+            <pc:docMk/>
+            <pc:sldMk cId="2620990126" sldId="263"/>
+            <ac:spMk id="5" creationId="{A539E72B-8AC8-4B20-916B-C2F5AC8F43B1}"/>
+          </ac:spMkLst>
+        </pc:spChg>
+      </pc:sldChg>
+      <pc:sldChg chg="modSp add mod setBg">
+        <pc:chgData name="Rihards Mikuts" userId="3f680863f303c92b" providerId="LiveId" clId="{7ECA00DE-8CB5-4FFD-8DC5-57B39CF038BB}" dt="2025-06-06T10:10:36.022" v="492"/>
+        <pc:sldMkLst>
+          <pc:docMk/>
+          <pc:sldMk cId="3632450931" sldId="263"/>
+        </pc:sldMkLst>
+        <pc:spChg chg="mod">
+          <ac:chgData name="Rihards Mikuts" userId="3f680863f303c92b" providerId="LiveId" clId="{7ECA00DE-8CB5-4FFD-8DC5-57B39CF038BB}" dt="2025-06-06T10:10:36.022" v="492"/>
+          <ac:spMkLst>
+            <pc:docMk/>
+            <pc:sldMk cId="3632450931" sldId="263"/>
+            <ac:spMk id="3" creationId="{DD2D8840-CC0E-49E7-93B7-354209F90F28}"/>
+          </ac:spMkLst>
+        </pc:spChg>
+      </pc:sldChg>
+      <pc:sldChg chg="addSp delSp modSp add mod setBg">
+        <pc:chgData name="Rihards Mikuts" userId="3f680863f303c92b" providerId="LiveId" clId="{7ECA00DE-8CB5-4FFD-8DC5-57B39CF038BB}" dt="2025-06-06T10:36:39.064" v="738" actId="20577"/>
+        <pc:sldMkLst>
+          <pc:docMk/>
+          <pc:sldMk cId="106921199" sldId="264"/>
+        </pc:sldMkLst>
+        <pc:spChg chg="mod">
+          <ac:chgData name="Rihards Mikuts" userId="3f680863f303c92b" providerId="LiveId" clId="{7ECA00DE-8CB5-4FFD-8DC5-57B39CF038BB}" dt="2025-06-06T10:14:58.453" v="507" actId="20577"/>
+          <ac:spMkLst>
+            <pc:docMk/>
+            <pc:sldMk cId="106921199" sldId="264"/>
+            <ac:spMk id="2" creationId="{DC598DD3-635B-4D67-ABB3-02B91E4A79B8}"/>
+          </ac:spMkLst>
+        </pc:spChg>
+        <pc:spChg chg="del mod">
+          <ac:chgData name="Rihards Mikuts" userId="3f680863f303c92b" providerId="LiveId" clId="{7ECA00DE-8CB5-4FFD-8DC5-57B39CF038BB}" dt="2025-06-06T10:30:52.985" v="655" actId="478"/>
+          <ac:spMkLst>
+            <pc:docMk/>
+            <pc:sldMk cId="106921199" sldId="264"/>
+            <ac:spMk id="3" creationId="{DD2D8840-CC0E-49E7-93B7-354209F90F28}"/>
+          </ac:spMkLst>
+        </pc:spChg>
+        <pc:spChg chg="add del">
+          <ac:chgData name="Rihards Mikuts" userId="3f680863f303c92b" providerId="LiveId" clId="{7ECA00DE-8CB5-4FFD-8DC5-57B39CF038BB}" dt="2025-06-06T10:19:13.874" v="526"/>
+          <ac:spMkLst>
+            <pc:docMk/>
+            <pc:sldMk cId="106921199" sldId="264"/>
+            <ac:spMk id="4" creationId="{45C6B79B-397B-458B-9EF4-E7DC93B7EB86}"/>
+          </ac:spMkLst>
+        </pc:spChg>
+        <pc:graphicFrameChg chg="add mod modGraphic">
+          <ac:chgData name="Rihards Mikuts" userId="3f680863f303c92b" providerId="LiveId" clId="{7ECA00DE-8CB5-4FFD-8DC5-57B39CF038BB}" dt="2025-06-06T10:36:39.064" v="738" actId="20577"/>
+          <ac:graphicFrameMkLst>
+            <pc:docMk/>
+            <pc:sldMk cId="106921199" sldId="264"/>
+            <ac:graphicFrameMk id="5" creationId="{52D92BD2-93CD-4488-BD1D-885E97C02357}"/>
+          </ac:graphicFrameMkLst>
+        </pc:graphicFrameChg>
+      </pc:sldChg>
+      <pc:sldChg chg="addSp delSp modSp add mod setBg">
+        <pc:chgData name="Rihards Mikuts" userId="3f680863f303c92b" providerId="LiveId" clId="{7ECA00DE-8CB5-4FFD-8DC5-57B39CF038BB}" dt="2025-06-06T10:29:59.722" v="647"/>
+        <pc:sldMkLst>
+          <pc:docMk/>
+          <pc:sldMk cId="1155189427" sldId="265"/>
+        </pc:sldMkLst>
+        <pc:spChg chg="mod">
+          <ac:chgData name="Rihards Mikuts" userId="3f680863f303c92b" providerId="LiveId" clId="{7ECA00DE-8CB5-4FFD-8DC5-57B39CF038BB}" dt="2025-06-06T10:21:07.666" v="551" actId="20577"/>
+          <ac:spMkLst>
+            <pc:docMk/>
+            <pc:sldMk cId="1155189427" sldId="265"/>
+            <ac:spMk id="2" creationId="{DC598DD3-635B-4D67-ABB3-02B91E4A79B8}"/>
+          </ac:spMkLst>
+        </pc:spChg>
+        <pc:spChg chg="del mod">
+          <ac:chgData name="Rihards Mikuts" userId="3f680863f303c92b" providerId="LiveId" clId="{7ECA00DE-8CB5-4FFD-8DC5-57B39CF038BB}" dt="2025-06-06T10:23:37.249" v="553" actId="478"/>
+          <ac:spMkLst>
+            <pc:docMk/>
+            <pc:sldMk cId="1155189427" sldId="265"/>
+            <ac:spMk id="3" creationId="{DD2D8840-CC0E-49E7-93B7-354209F90F28}"/>
+          </ac:spMkLst>
+        </pc:spChg>
+        <pc:spChg chg="add del">
+          <ac:chgData name="Rihards Mikuts" userId="3f680863f303c92b" providerId="LiveId" clId="{7ECA00DE-8CB5-4FFD-8DC5-57B39CF038BB}" dt="2025-06-06T10:19:36.988" v="530"/>
+          <ac:spMkLst>
+            <pc:docMk/>
+            <pc:sldMk cId="1155189427" sldId="265"/>
+            <ac:spMk id="4" creationId="{E10F9686-1A91-4415-8F88-9A7CD63139E5}"/>
+          </ac:spMkLst>
+        </pc:spChg>
+        <pc:spChg chg="add mod">
+          <ac:chgData name="Rihards Mikuts" userId="3f680863f303c92b" providerId="LiveId" clId="{7ECA00DE-8CB5-4FFD-8DC5-57B39CF038BB}" dt="2025-06-06T10:25:26.437" v="575" actId="114"/>
+          <ac:spMkLst>
+            <pc:docMk/>
+            <pc:sldMk cId="1155189427" sldId="265"/>
+            <ac:spMk id="7" creationId="{C2F71542-39DB-45F2-96DC-8578AC061E2C}"/>
+          </ac:spMkLst>
+        </pc:spChg>
+        <pc:spChg chg="add del mod">
+          <ac:chgData name="Rihards Mikuts" userId="3f680863f303c92b" providerId="LiveId" clId="{7ECA00DE-8CB5-4FFD-8DC5-57B39CF038BB}" dt="2025-06-06T10:25:35.730" v="579" actId="22"/>
+          <ac:spMkLst>
+            <pc:docMk/>
+            <pc:sldMk cId="1155189427" sldId="265"/>
+            <ac:spMk id="9" creationId="{390ECFFE-5A2A-42D0-AEA5-BB45C4B138A7}"/>
+          </ac:spMkLst>
+        </pc:spChg>
+        <pc:spChg chg="add mod">
+          <ac:chgData name="Rihards Mikuts" userId="3f680863f303c92b" providerId="LiveId" clId="{7ECA00DE-8CB5-4FFD-8DC5-57B39CF038BB}" dt="2025-06-06T10:25:57.491" v="582"/>
+          <ac:spMkLst>
+            <pc:docMk/>
+            <pc:sldMk cId="1155189427" sldId="265"/>
+            <ac:spMk id="10" creationId="{5477F512-192B-4DCB-8050-E184E7CD47CE}"/>
+          </ac:spMkLst>
+        </pc:spChg>
+        <pc:spChg chg="add mod">
+          <ac:chgData name="Rihards Mikuts" userId="3f680863f303c92b" providerId="LiveId" clId="{7ECA00DE-8CB5-4FFD-8DC5-57B39CF038BB}" dt="2025-06-06T10:26:31.121" v="585"/>
+          <ac:spMkLst>
+            <pc:docMk/>
+            <pc:sldMk cId="1155189427" sldId="265"/>
+            <ac:spMk id="11" creationId="{D5BEB802-8659-401E-A5FE-8FF0C326933B}"/>
+          </ac:spMkLst>
+        </pc:spChg>
+        <pc:spChg chg="add mod">
+          <ac:chgData name="Rihards Mikuts" userId="3f680863f303c92b" providerId="LiveId" clId="{7ECA00DE-8CB5-4FFD-8DC5-57B39CF038BB}" dt="2025-06-06T10:29:02.172" v="640"/>
+          <ac:spMkLst>
+            <pc:docMk/>
+            <pc:sldMk cId="1155189427" sldId="265"/>
+            <ac:spMk id="12" creationId="{6688717F-41EB-40BE-882D-F2D77669D1E7}"/>
+          </ac:spMkLst>
+        </pc:spChg>
+        <pc:spChg chg="add mod">
+          <ac:chgData name="Rihards Mikuts" userId="3f680863f303c92b" providerId="LiveId" clId="{7ECA00DE-8CB5-4FFD-8DC5-57B39CF038BB}" dt="2025-06-06T10:29:49.636" v="646" actId="1076"/>
+          <ac:spMkLst>
+            <pc:docMk/>
+            <pc:sldMk cId="1155189427" sldId="265"/>
+            <ac:spMk id="13" creationId="{CA4D9355-EF21-462A-8252-3E98D9F10781}"/>
+          </ac:spMkLst>
+        </pc:spChg>
+        <pc:spChg chg="add mod">
+          <ac:chgData name="Rihards Mikuts" userId="3f680863f303c92b" providerId="LiveId" clId="{7ECA00DE-8CB5-4FFD-8DC5-57B39CF038BB}" dt="2025-06-06T10:29:59.722" v="647"/>
+          <ac:spMkLst>
+            <pc:docMk/>
+            <pc:sldMk cId="1155189427" sldId="265"/>
+            <ac:spMk id="14" creationId="{969A0587-3715-40FD-A4D8-5B13A67E33D7}"/>
+          </ac:spMkLst>
+        </pc:spChg>
+        <pc:picChg chg="add mod">
+          <ac:chgData name="Rihards Mikuts" userId="3f680863f303c92b" providerId="LiveId" clId="{7ECA00DE-8CB5-4FFD-8DC5-57B39CF038BB}" dt="2025-06-06T10:28:14.733" v="631" actId="1076"/>
+          <ac:picMkLst>
+            <pc:docMk/>
+            <pc:sldMk cId="1155189427" sldId="265"/>
+            <ac:picMk id="6" creationId="{EA26F3C6-2861-4F60-9613-B5891D0AFEFA}"/>
+          </ac:picMkLst>
+        </pc:picChg>
+      </pc:sldChg>
     </pc:docChg>
   </pc:docChgLst>
 </pc:chgInfo>
@@ -336,9 +660,9 @@
           <a:p>
             <a:fld id="{B8977C40-4C13-4C59-8229-5B4DC279FD29}" type="datetimeFigureOut">
               <a:rPr lang="en-GB" smtClean="0"/>
-              <a:t>05/06/2025</a:t>
+              <a:t>06/06/2025</a:t>
             </a:fld>
-            <a:endParaRPr lang="en-GB"/>
+            <a:endParaRPr lang="en-GB" dirty="0"/>
           </a:p>
         </p:txBody>
       </p:sp>
@@ -357,7 +681,7 @@
           <a:bodyPr/>
           <a:lstStyle/>
           <a:p>
-            <a:endParaRPr lang="en-GB"/>
+            <a:endParaRPr lang="en-GB" dirty="0"/>
           </a:p>
         </p:txBody>
       </p:sp>
@@ -380,7 +704,7 @@
               <a:rPr lang="en-GB" smtClean="0"/>
               <a:t>‹#›</a:t>
             </a:fld>
-            <a:endParaRPr lang="en-GB"/>
+            <a:endParaRPr lang="en-GB" dirty="0"/>
           </a:p>
         </p:txBody>
       </p:sp>
@@ -506,9 +830,9 @@
           <a:p>
             <a:fld id="{B8977C40-4C13-4C59-8229-5B4DC279FD29}" type="datetimeFigureOut">
               <a:rPr lang="en-GB" smtClean="0"/>
-              <a:t>05/06/2025</a:t>
+              <a:t>06/06/2025</a:t>
             </a:fld>
-            <a:endParaRPr lang="en-GB"/>
+            <a:endParaRPr lang="en-GB" dirty="0"/>
           </a:p>
         </p:txBody>
       </p:sp>
@@ -527,7 +851,7 @@
           <a:bodyPr/>
           <a:lstStyle/>
           <a:p>
-            <a:endParaRPr lang="en-GB"/>
+            <a:endParaRPr lang="en-GB" dirty="0"/>
           </a:p>
         </p:txBody>
       </p:sp>
@@ -550,7 +874,7 @@
               <a:rPr lang="en-GB" smtClean="0"/>
               <a:t>‹#›</a:t>
             </a:fld>
-            <a:endParaRPr lang="en-GB"/>
+            <a:endParaRPr lang="en-GB" dirty="0"/>
           </a:p>
         </p:txBody>
       </p:sp>
@@ -686,9 +1010,9 @@
           <a:p>
             <a:fld id="{B8977C40-4C13-4C59-8229-5B4DC279FD29}" type="datetimeFigureOut">
               <a:rPr lang="en-GB" smtClean="0"/>
-              <a:t>05/06/2025</a:t>
+              <a:t>06/06/2025</a:t>
             </a:fld>
-            <a:endParaRPr lang="en-GB"/>
+            <a:endParaRPr lang="en-GB" dirty="0"/>
           </a:p>
         </p:txBody>
       </p:sp>
@@ -707,7 +1031,7 @@
           <a:bodyPr/>
           <a:lstStyle/>
           <a:p>
-            <a:endParaRPr lang="en-GB"/>
+            <a:endParaRPr lang="en-GB" dirty="0"/>
           </a:p>
         </p:txBody>
       </p:sp>
@@ -730,7 +1054,7 @@
               <a:rPr lang="en-GB" smtClean="0"/>
               <a:t>‹#›</a:t>
             </a:fld>
-            <a:endParaRPr lang="en-GB"/>
+            <a:endParaRPr lang="en-GB" dirty="0"/>
           </a:p>
         </p:txBody>
       </p:sp>
@@ -856,9 +1180,9 @@
           <a:p>
             <a:fld id="{B8977C40-4C13-4C59-8229-5B4DC279FD29}" type="datetimeFigureOut">
               <a:rPr lang="en-GB" smtClean="0"/>
-              <a:t>05/06/2025</a:t>
+              <a:t>06/06/2025</a:t>
             </a:fld>
-            <a:endParaRPr lang="en-GB"/>
+            <a:endParaRPr lang="en-GB" dirty="0"/>
           </a:p>
         </p:txBody>
       </p:sp>
@@ -877,7 +1201,7 @@
           <a:bodyPr/>
           <a:lstStyle/>
           <a:p>
-            <a:endParaRPr lang="en-GB"/>
+            <a:endParaRPr lang="en-GB" dirty="0"/>
           </a:p>
         </p:txBody>
       </p:sp>
@@ -900,7 +1224,7 @@
               <a:rPr lang="en-GB" smtClean="0"/>
               <a:t>‹#›</a:t>
             </a:fld>
-            <a:endParaRPr lang="en-GB"/>
+            <a:endParaRPr lang="en-GB" dirty="0"/>
           </a:p>
         </p:txBody>
       </p:sp>
@@ -1102,9 +1426,9 @@
           <a:p>
             <a:fld id="{B8977C40-4C13-4C59-8229-5B4DC279FD29}" type="datetimeFigureOut">
               <a:rPr lang="en-GB" smtClean="0"/>
-              <a:t>05/06/2025</a:t>
+              <a:t>06/06/2025</a:t>
             </a:fld>
-            <a:endParaRPr lang="en-GB"/>
+            <a:endParaRPr lang="en-GB" dirty="0"/>
           </a:p>
         </p:txBody>
       </p:sp>
@@ -1123,7 +1447,7 @@
           <a:bodyPr/>
           <a:lstStyle/>
           <a:p>
-            <a:endParaRPr lang="en-GB"/>
+            <a:endParaRPr lang="en-GB" dirty="0"/>
           </a:p>
         </p:txBody>
       </p:sp>
@@ -1146,7 +1470,7 @@
               <a:rPr lang="en-GB" smtClean="0"/>
               <a:t>‹#›</a:t>
             </a:fld>
-            <a:endParaRPr lang="en-GB"/>
+            <a:endParaRPr lang="en-GB" dirty="0"/>
           </a:p>
         </p:txBody>
       </p:sp>
@@ -1334,9 +1658,9 @@
           <a:p>
             <a:fld id="{B8977C40-4C13-4C59-8229-5B4DC279FD29}" type="datetimeFigureOut">
               <a:rPr lang="en-GB" smtClean="0"/>
-              <a:t>05/06/2025</a:t>
+              <a:t>06/06/2025</a:t>
             </a:fld>
-            <a:endParaRPr lang="en-GB"/>
+            <a:endParaRPr lang="en-GB" dirty="0"/>
           </a:p>
         </p:txBody>
       </p:sp>
@@ -1355,7 +1679,7 @@
           <a:bodyPr/>
           <a:lstStyle/>
           <a:p>
-            <a:endParaRPr lang="en-GB"/>
+            <a:endParaRPr lang="en-GB" dirty="0"/>
           </a:p>
         </p:txBody>
       </p:sp>
@@ -1378,7 +1702,7 @@
               <a:rPr lang="en-GB" smtClean="0"/>
               <a:t>‹#›</a:t>
             </a:fld>
-            <a:endParaRPr lang="en-GB"/>
+            <a:endParaRPr lang="en-GB" dirty="0"/>
           </a:p>
         </p:txBody>
       </p:sp>
@@ -1701,9 +2025,9 @@
           <a:p>
             <a:fld id="{B8977C40-4C13-4C59-8229-5B4DC279FD29}" type="datetimeFigureOut">
               <a:rPr lang="en-GB" smtClean="0"/>
-              <a:t>05/06/2025</a:t>
+              <a:t>06/06/2025</a:t>
             </a:fld>
-            <a:endParaRPr lang="en-GB"/>
+            <a:endParaRPr lang="en-GB" dirty="0"/>
           </a:p>
         </p:txBody>
       </p:sp>
@@ -1722,7 +2046,7 @@
           <a:bodyPr/>
           <a:lstStyle/>
           <a:p>
-            <a:endParaRPr lang="en-GB"/>
+            <a:endParaRPr lang="en-GB" dirty="0"/>
           </a:p>
         </p:txBody>
       </p:sp>
@@ -1745,7 +2069,7 @@
               <a:rPr lang="en-GB" smtClean="0"/>
               <a:t>‹#›</a:t>
             </a:fld>
-            <a:endParaRPr lang="en-GB"/>
+            <a:endParaRPr lang="en-GB" dirty="0"/>
           </a:p>
         </p:txBody>
       </p:sp>
@@ -1819,9 +2143,9 @@
           <a:p>
             <a:fld id="{B8977C40-4C13-4C59-8229-5B4DC279FD29}" type="datetimeFigureOut">
               <a:rPr lang="en-GB" smtClean="0"/>
-              <a:t>05/06/2025</a:t>
+              <a:t>06/06/2025</a:t>
             </a:fld>
-            <a:endParaRPr lang="en-GB"/>
+            <a:endParaRPr lang="en-GB" dirty="0"/>
           </a:p>
         </p:txBody>
       </p:sp>
@@ -1840,7 +2164,7 @@
           <a:bodyPr/>
           <a:lstStyle/>
           <a:p>
-            <a:endParaRPr lang="en-GB"/>
+            <a:endParaRPr lang="en-GB" dirty="0"/>
           </a:p>
         </p:txBody>
       </p:sp>
@@ -1863,7 +2187,7 @@
               <a:rPr lang="en-GB" smtClean="0"/>
               <a:t>‹#›</a:t>
             </a:fld>
-            <a:endParaRPr lang="en-GB"/>
+            <a:endParaRPr lang="en-GB" dirty="0"/>
           </a:p>
         </p:txBody>
       </p:sp>
@@ -1914,9 +2238,9 @@
           <a:p>
             <a:fld id="{B8977C40-4C13-4C59-8229-5B4DC279FD29}" type="datetimeFigureOut">
               <a:rPr lang="en-GB" smtClean="0"/>
-              <a:t>05/06/2025</a:t>
+              <a:t>06/06/2025</a:t>
             </a:fld>
-            <a:endParaRPr lang="en-GB"/>
+            <a:endParaRPr lang="en-GB" dirty="0"/>
           </a:p>
         </p:txBody>
       </p:sp>
@@ -1935,7 +2259,7 @@
           <a:bodyPr/>
           <a:lstStyle/>
           <a:p>
-            <a:endParaRPr lang="en-GB"/>
+            <a:endParaRPr lang="en-GB" dirty="0"/>
           </a:p>
         </p:txBody>
       </p:sp>
@@ -1958,7 +2282,7 @@
               <a:rPr lang="en-GB" smtClean="0"/>
               <a:t>‹#›</a:t>
             </a:fld>
-            <a:endParaRPr lang="en-GB"/>
+            <a:endParaRPr lang="en-GB" dirty="0"/>
           </a:p>
         </p:txBody>
       </p:sp>
@@ -2191,9 +2515,9 @@
           <a:p>
             <a:fld id="{B8977C40-4C13-4C59-8229-5B4DC279FD29}" type="datetimeFigureOut">
               <a:rPr lang="en-GB" smtClean="0"/>
-              <a:t>05/06/2025</a:t>
+              <a:t>06/06/2025</a:t>
             </a:fld>
-            <a:endParaRPr lang="en-GB"/>
+            <a:endParaRPr lang="en-GB" dirty="0"/>
           </a:p>
         </p:txBody>
       </p:sp>
@@ -2212,7 +2536,7 @@
           <a:bodyPr/>
           <a:lstStyle/>
           <a:p>
-            <a:endParaRPr lang="en-GB"/>
+            <a:endParaRPr lang="en-GB" dirty="0"/>
           </a:p>
         </p:txBody>
       </p:sp>
@@ -2235,7 +2559,7 @@
               <a:rPr lang="en-GB" smtClean="0"/>
               <a:t>‹#›</a:t>
             </a:fld>
-            <a:endParaRPr lang="en-GB"/>
+            <a:endParaRPr lang="en-GB" dirty="0"/>
           </a:p>
         </p:txBody>
       </p:sp>
@@ -2359,10 +2683,9 @@
           </a:lstStyle>
           <a:p>
             <a:r>
-              <a:rPr lang="en-US"/>
+              <a:rPr lang="en-US" dirty="0"/>
               <a:t>Click icon to add picture</a:t>
             </a:r>
-            <a:endParaRPr lang="en-US" dirty="0"/>
           </a:p>
         </p:txBody>
       </p:sp>
@@ -2448,9 +2771,9 @@
           <a:p>
             <a:fld id="{B8977C40-4C13-4C59-8229-5B4DC279FD29}" type="datetimeFigureOut">
               <a:rPr lang="en-GB" smtClean="0"/>
-              <a:t>05/06/2025</a:t>
+              <a:t>06/06/2025</a:t>
             </a:fld>
-            <a:endParaRPr lang="en-GB"/>
+            <a:endParaRPr lang="en-GB" dirty="0"/>
           </a:p>
         </p:txBody>
       </p:sp>
@@ -2469,7 +2792,7 @@
           <a:bodyPr/>
           <a:lstStyle/>
           <a:p>
-            <a:endParaRPr lang="en-GB"/>
+            <a:endParaRPr lang="en-GB" dirty="0"/>
           </a:p>
         </p:txBody>
       </p:sp>
@@ -2492,7 +2815,7 @@
               <a:rPr lang="en-GB" smtClean="0"/>
               <a:t>‹#›</a:t>
             </a:fld>
-            <a:endParaRPr lang="en-GB"/>
+            <a:endParaRPr lang="en-GB" dirty="0"/>
           </a:p>
         </p:txBody>
       </p:sp>
@@ -2661,9 +2984,9 @@
           <a:p>
             <a:fld id="{B8977C40-4C13-4C59-8229-5B4DC279FD29}" type="datetimeFigureOut">
               <a:rPr lang="en-GB" smtClean="0"/>
-              <a:t>05/06/2025</a:t>
+              <a:t>06/06/2025</a:t>
             </a:fld>
-            <a:endParaRPr lang="en-GB"/>
+            <a:endParaRPr lang="en-GB" dirty="0"/>
           </a:p>
         </p:txBody>
       </p:sp>
@@ -2700,7 +3023,7 @@
             </a:lvl1pPr>
           </a:lstStyle>
           <a:p>
-            <a:endParaRPr lang="en-GB"/>
+            <a:endParaRPr lang="en-GB" dirty="0"/>
           </a:p>
         </p:txBody>
       </p:sp>
@@ -2741,7 +3064,7 @@
               <a:rPr lang="en-GB" smtClean="0"/>
               <a:t>‹#›</a:t>
             </a:fld>
-            <a:endParaRPr lang="en-GB"/>
+            <a:endParaRPr lang="en-GB" dirty="0"/>
           </a:p>
         </p:txBody>
       </p:sp>
@@ -3188,6 +3511,666 @@
 </p:sld>
 </file>
 
+<file path=ppt/slides/slide10.xml><?xml version="1.0" encoding="utf-8"?>
+<p:sld xmlns:a="http://schemas.openxmlformats.org/drawingml/2006/main" xmlns:r="http://schemas.openxmlformats.org/officeDocument/2006/relationships" xmlns:p="http://schemas.openxmlformats.org/presentationml/2006/main">
+  <p:cSld>
+    <p:bg>
+      <p:bgPr>
+        <a:solidFill>
+          <a:schemeClr val="accent6">
+            <a:lumMod val="20000"/>
+            <a:lumOff val="80000"/>
+          </a:schemeClr>
+        </a:solidFill>
+        <a:effectLst/>
+      </p:bgPr>
+    </p:bg>
+    <p:spTree>
+      <p:nvGrpSpPr>
+        <p:cNvPr id="1" name=""/>
+        <p:cNvGrpSpPr/>
+        <p:nvPr/>
+      </p:nvGrpSpPr>
+      <p:grpSpPr>
+        <a:xfrm>
+          <a:off x="0" y="0"/>
+          <a:ext cx="0" cy="0"/>
+          <a:chOff x="0" y="0"/>
+          <a:chExt cx="0" cy="0"/>
+        </a:xfrm>
+      </p:grpSpPr>
+      <p:sp>
+        <p:nvSpPr>
+          <p:cNvPr id="2" name="Title 1">
+            <a:extLst>
+              <a:ext uri="{FF2B5EF4-FFF2-40B4-BE49-F238E27FC236}">
+                <a16:creationId xmlns:a16="http://schemas.microsoft.com/office/drawing/2014/main" id="{DC598DD3-635B-4D67-ABB3-02B91E4A79B8}"/>
+              </a:ext>
+            </a:extLst>
+          </p:cNvPr>
+          <p:cNvSpPr>
+            <a:spLocks noGrp="1"/>
+          </p:cNvSpPr>
+          <p:nvPr>
+            <p:ph type="title"/>
+          </p:nvPr>
+        </p:nvSpPr>
+        <p:spPr/>
+        <p:txBody>
+          <a:bodyPr/>
+          <a:lstStyle/>
+          <a:p>
+            <a:r>
+              <a:rPr lang="en-GB" dirty="0" err="1">
+                <a:latin typeface="Arial Black" panose="020B0A04020102020204" pitchFamily="34" charset="0"/>
+              </a:rPr>
+              <a:t>FileWriter</a:t>
+            </a:r>
+            <a:r>
+              <a:rPr lang="lv-LV" dirty="0">
+                <a:latin typeface="Arial Black" panose="020B0A04020102020204" pitchFamily="34" charset="0"/>
+              </a:rPr>
+              <a:t> piemērs</a:t>
+            </a:r>
+            <a:endParaRPr lang="en-GB" dirty="0">
+              <a:latin typeface="Arial Black" panose="020B0A04020102020204" pitchFamily="34" charset="0"/>
+            </a:endParaRPr>
+          </a:p>
+        </p:txBody>
+      </p:sp>
+      <p:pic>
+        <p:nvPicPr>
+          <p:cNvPr id="6" name="Picture 5">
+            <a:extLst>
+              <a:ext uri="{FF2B5EF4-FFF2-40B4-BE49-F238E27FC236}">
+                <a16:creationId xmlns:a16="http://schemas.microsoft.com/office/drawing/2014/main" id="{EA26F3C6-2861-4F60-9613-B5891D0AFEFA}"/>
+              </a:ext>
+            </a:extLst>
+          </p:cNvPr>
+          <p:cNvPicPr>
+            <a:picLocks noChangeAspect="1"/>
+          </p:cNvPicPr>
+          <p:nvPr/>
+        </p:nvPicPr>
+        <p:blipFill>
+          <a:blip r:embed="rId2"/>
+          <a:stretch>
+            <a:fillRect/>
+          </a:stretch>
+        </p:blipFill>
+        <p:spPr>
+          <a:xfrm>
+            <a:off x="2087763" y="1381748"/>
+            <a:ext cx="7792537" cy="5220429"/>
+          </a:xfrm>
+          <a:prstGeom prst="rect">
+            <a:avLst/>
+          </a:prstGeom>
+        </p:spPr>
+      </p:pic>
+      <p:sp>
+        <p:nvSpPr>
+          <p:cNvPr id="7" name="TextBox 6">
+            <a:extLst>
+              <a:ext uri="{FF2B5EF4-FFF2-40B4-BE49-F238E27FC236}">
+                <a16:creationId xmlns:a16="http://schemas.microsoft.com/office/drawing/2014/main" id="{C2F71542-39DB-45F2-96DC-8578AC061E2C}"/>
+              </a:ext>
+            </a:extLst>
+          </p:cNvPr>
+          <p:cNvSpPr txBox="1"/>
+          <p:nvPr/>
+        </p:nvSpPr>
+        <p:spPr>
+          <a:xfrm>
+            <a:off x="2087763" y="1381748"/>
+            <a:ext cx="5358066" cy="338554"/>
+          </a:xfrm>
+          <a:prstGeom prst="rect">
+            <a:avLst/>
+          </a:prstGeom>
+          <a:solidFill>
+            <a:srgbClr val="F9F9F9"/>
+          </a:solidFill>
+        </p:spPr>
+        <p:txBody>
+          <a:bodyPr wrap="square" rtlCol="0">
+            <a:spAutoFit/>
+          </a:bodyPr>
+          <a:lstStyle/>
+          <a:p>
+            <a:r>
+              <a:rPr lang="en-GB" sz="1600" i="1" dirty="0">
+                <a:solidFill>
+                  <a:schemeClr val="bg1">
+                    <a:lumMod val="50000"/>
+                  </a:schemeClr>
+                </a:solidFill>
+              </a:rPr>
+              <a:t>// </a:t>
+            </a:r>
+            <a:r>
+              <a:rPr lang="en-GB" sz="1600" i="1" dirty="0" err="1">
+                <a:solidFill>
+                  <a:schemeClr val="bg1">
+                    <a:lumMod val="50000"/>
+                  </a:schemeClr>
+                </a:solidFill>
+              </a:rPr>
+              <a:t>Teksta</a:t>
+            </a:r>
+            <a:r>
+              <a:rPr lang="en-GB" sz="1600" i="1" dirty="0">
+                <a:solidFill>
+                  <a:schemeClr val="bg1">
+                    <a:lumMod val="50000"/>
+                  </a:schemeClr>
+                </a:solidFill>
+              </a:rPr>
+              <a:t> </a:t>
+            </a:r>
+            <a:r>
+              <a:rPr lang="en-GB" sz="1600" i="1" dirty="0" err="1">
+                <a:solidFill>
+                  <a:schemeClr val="bg1">
+                    <a:lumMod val="50000"/>
+                  </a:schemeClr>
+                </a:solidFill>
+              </a:rPr>
+              <a:t>faila</a:t>
+            </a:r>
+            <a:r>
+              <a:rPr lang="en-GB" sz="1600" i="1" dirty="0">
+                <a:solidFill>
+                  <a:schemeClr val="bg1">
+                    <a:lumMod val="50000"/>
+                  </a:schemeClr>
+                </a:solidFill>
+              </a:rPr>
+              <a:t> </a:t>
+            </a:r>
+            <a:r>
+              <a:rPr lang="en-GB" sz="1600" i="1" dirty="0" err="1">
+                <a:solidFill>
+                  <a:schemeClr val="bg1">
+                    <a:lumMod val="50000"/>
+                  </a:schemeClr>
+                </a:solidFill>
+              </a:rPr>
+              <a:t>izveide</a:t>
+            </a:r>
+            <a:r>
+              <a:rPr lang="en-GB" sz="1600" i="1" dirty="0">
+                <a:solidFill>
+                  <a:schemeClr val="bg1">
+                    <a:lumMod val="50000"/>
+                  </a:schemeClr>
+                </a:solidFill>
+              </a:rPr>
+              <a:t>, </a:t>
+            </a:r>
+            <a:r>
+              <a:rPr lang="en-GB" sz="1600" i="1" dirty="0" err="1">
+                <a:solidFill>
+                  <a:schemeClr val="bg1">
+                    <a:lumMod val="50000"/>
+                  </a:schemeClr>
+                </a:solidFill>
+              </a:rPr>
+              <a:t>izmantojot</a:t>
+            </a:r>
+            <a:r>
+              <a:rPr lang="en-GB" sz="1600" i="1" dirty="0">
+                <a:solidFill>
+                  <a:schemeClr val="bg1">
+                    <a:lumMod val="50000"/>
+                  </a:schemeClr>
+                </a:solidFill>
+              </a:rPr>
+              <a:t> </a:t>
+            </a:r>
+            <a:r>
+              <a:rPr lang="en-GB" sz="1600" i="1" dirty="0" err="1">
+                <a:solidFill>
+                  <a:schemeClr val="bg1">
+                    <a:lumMod val="50000"/>
+                  </a:schemeClr>
+                </a:solidFill>
+              </a:rPr>
+              <a:t>FileWriter</a:t>
+            </a:r>
+            <a:endParaRPr lang="en-GB" sz="1600" i="1" dirty="0">
+              <a:solidFill>
+                <a:schemeClr val="bg1">
+                  <a:lumMod val="50000"/>
+                </a:schemeClr>
+              </a:solidFill>
+            </a:endParaRPr>
+          </a:p>
+        </p:txBody>
+      </p:sp>
+      <p:sp>
+        <p:nvSpPr>
+          <p:cNvPr id="10" name="TextBox 9">
+            <a:extLst>
+              <a:ext uri="{FF2B5EF4-FFF2-40B4-BE49-F238E27FC236}">
+                <a16:creationId xmlns:a16="http://schemas.microsoft.com/office/drawing/2014/main" id="{5477F512-192B-4DCB-8050-E184E7CD47CE}"/>
+              </a:ext>
+            </a:extLst>
+          </p:cNvPr>
+          <p:cNvSpPr txBox="1"/>
+          <p:nvPr/>
+        </p:nvSpPr>
+        <p:spPr>
+          <a:xfrm>
+            <a:off x="2706694" y="2849764"/>
+            <a:ext cx="5358066" cy="338554"/>
+          </a:xfrm>
+          <a:prstGeom prst="rect">
+            <a:avLst/>
+          </a:prstGeom>
+          <a:solidFill>
+            <a:srgbClr val="F9F9F9"/>
+          </a:solidFill>
+        </p:spPr>
+        <p:txBody>
+          <a:bodyPr wrap="square" rtlCol="0">
+            <a:spAutoFit/>
+          </a:bodyPr>
+          <a:lstStyle/>
+          <a:p>
+            <a:r>
+              <a:rPr lang="lv-LV" sz="1600" i="1" dirty="0">
+                <a:solidFill>
+                  <a:schemeClr val="bg1">
+                    <a:lumMod val="50000"/>
+                  </a:schemeClr>
+                </a:solidFill>
+              </a:rPr>
+              <a:t>// Pieņemt virkni</a:t>
+            </a:r>
+            <a:endParaRPr lang="en-GB" sz="1600" i="1" dirty="0">
+              <a:solidFill>
+                <a:schemeClr val="bg1">
+                  <a:lumMod val="50000"/>
+                </a:schemeClr>
+              </a:solidFill>
+            </a:endParaRPr>
+          </a:p>
+        </p:txBody>
+      </p:sp>
+      <p:sp>
+        <p:nvSpPr>
+          <p:cNvPr id="11" name="TextBox 10">
+            <a:extLst>
+              <a:ext uri="{FF2B5EF4-FFF2-40B4-BE49-F238E27FC236}">
+                <a16:creationId xmlns:a16="http://schemas.microsoft.com/office/drawing/2014/main" id="{D5BEB802-8659-401E-A5FE-8FF0C326933B}"/>
+              </a:ext>
+            </a:extLst>
+          </p:cNvPr>
+          <p:cNvSpPr txBox="1"/>
+          <p:nvPr/>
+        </p:nvSpPr>
+        <p:spPr>
+          <a:xfrm>
+            <a:off x="2800000" y="3671826"/>
+            <a:ext cx="5358066" cy="338554"/>
+          </a:xfrm>
+          <a:prstGeom prst="rect">
+            <a:avLst/>
+          </a:prstGeom>
+          <a:solidFill>
+            <a:srgbClr val="F9F9F9"/>
+          </a:solidFill>
+        </p:spPr>
+        <p:txBody>
+          <a:bodyPr wrap="square" rtlCol="0">
+            <a:spAutoFit/>
+          </a:bodyPr>
+          <a:lstStyle/>
+          <a:p>
+            <a:r>
+              <a:rPr lang="en-GB" sz="1600" i="1" dirty="0">
+                <a:solidFill>
+                  <a:schemeClr val="bg1">
+                    <a:lumMod val="50000"/>
+                  </a:schemeClr>
+                </a:solidFill>
+              </a:rPr>
+              <a:t>// </a:t>
+            </a:r>
+            <a:r>
+              <a:rPr lang="en-GB" sz="1600" i="1" dirty="0" err="1">
+                <a:solidFill>
+                  <a:schemeClr val="bg1">
+                    <a:lumMod val="50000"/>
+                  </a:schemeClr>
+                </a:solidFill>
+              </a:rPr>
+              <a:t>pievienot</a:t>
+            </a:r>
+            <a:r>
+              <a:rPr lang="en-GB" sz="1600" i="1" dirty="0">
+                <a:solidFill>
+                  <a:schemeClr val="bg1">
+                    <a:lumMod val="50000"/>
+                  </a:schemeClr>
+                </a:solidFill>
+              </a:rPr>
+              <a:t> </a:t>
+            </a:r>
+            <a:r>
+              <a:rPr lang="en-GB" sz="1600" i="1" dirty="0" err="1">
+                <a:solidFill>
+                  <a:schemeClr val="bg1">
+                    <a:lumMod val="50000"/>
+                  </a:schemeClr>
+                </a:solidFill>
+              </a:rPr>
+              <a:t>failu</a:t>
+            </a:r>
+            <a:r>
+              <a:rPr lang="en-GB" sz="1600" i="1" dirty="0">
+                <a:solidFill>
+                  <a:schemeClr val="bg1">
+                    <a:lumMod val="50000"/>
+                  </a:schemeClr>
+                </a:solidFill>
+              </a:rPr>
+              <a:t> </a:t>
+            </a:r>
+            <a:r>
+              <a:rPr lang="en-GB" sz="1600" i="1" dirty="0" err="1">
+                <a:solidFill>
+                  <a:schemeClr val="bg1">
+                    <a:lumMod val="50000"/>
+                  </a:schemeClr>
+                </a:solidFill>
+              </a:rPr>
+              <a:t>FileWriter</a:t>
+            </a:r>
+            <a:endParaRPr lang="en-GB" sz="1600" i="1" dirty="0">
+              <a:solidFill>
+                <a:schemeClr val="bg1">
+                  <a:lumMod val="50000"/>
+                </a:schemeClr>
+              </a:solidFill>
+            </a:endParaRPr>
+          </a:p>
+        </p:txBody>
+      </p:sp>
+      <p:sp>
+        <p:nvSpPr>
+          <p:cNvPr id="12" name="TextBox 11">
+            <a:extLst>
+              <a:ext uri="{FF2B5EF4-FFF2-40B4-BE49-F238E27FC236}">
+                <a16:creationId xmlns:a16="http://schemas.microsoft.com/office/drawing/2014/main" id="{6688717F-41EB-40BE-882D-F2D77669D1E7}"/>
+              </a:ext>
+            </a:extLst>
+          </p:cNvPr>
+          <p:cNvSpPr txBox="1"/>
+          <p:nvPr/>
+        </p:nvSpPr>
+        <p:spPr>
+          <a:xfrm>
+            <a:off x="2893307" y="4277346"/>
+            <a:ext cx="5358066" cy="338554"/>
+          </a:xfrm>
+          <a:prstGeom prst="rect">
+            <a:avLst/>
+          </a:prstGeom>
+          <a:solidFill>
+            <a:srgbClr val="F9F9F9"/>
+          </a:solidFill>
+        </p:spPr>
+        <p:txBody>
+          <a:bodyPr wrap="square" rtlCol="0">
+            <a:spAutoFit/>
+          </a:bodyPr>
+          <a:lstStyle/>
+          <a:p>
+            <a:r>
+              <a:rPr lang="en-GB" sz="1600" i="1" dirty="0">
+                <a:solidFill>
+                  <a:schemeClr val="bg1">
+                    <a:lumMod val="50000"/>
+                  </a:schemeClr>
+                </a:solidFill>
+              </a:rPr>
+              <a:t>// </a:t>
+            </a:r>
+            <a:r>
+              <a:rPr lang="en-GB" sz="1600" i="1" dirty="0" err="1">
+                <a:solidFill>
+                  <a:schemeClr val="bg1">
+                    <a:lumMod val="50000"/>
+                  </a:schemeClr>
+                </a:solidFill>
+              </a:rPr>
+              <a:t>nolasīt</a:t>
+            </a:r>
+            <a:r>
+              <a:rPr lang="en-GB" sz="1600" i="1" dirty="0">
+                <a:solidFill>
+                  <a:schemeClr val="bg1">
+                    <a:lumMod val="50000"/>
+                  </a:schemeClr>
+                </a:solidFill>
+              </a:rPr>
+              <a:t> pa </a:t>
+            </a:r>
+            <a:r>
+              <a:rPr lang="en-GB" sz="1600" i="1" dirty="0" err="1">
+                <a:solidFill>
+                  <a:schemeClr val="bg1">
+                    <a:lumMod val="50000"/>
+                  </a:schemeClr>
+                </a:solidFill>
+              </a:rPr>
+              <a:t>rakstzīmēm</a:t>
+            </a:r>
+            <a:r>
+              <a:rPr lang="en-GB" sz="1600" i="1" dirty="0">
+                <a:solidFill>
+                  <a:schemeClr val="bg1">
+                    <a:lumMod val="50000"/>
+                  </a:schemeClr>
+                </a:solidFill>
+              </a:rPr>
+              <a:t> no </a:t>
+            </a:r>
+            <a:r>
+              <a:rPr lang="en-GB" sz="1600" i="1" dirty="0" err="1">
+                <a:solidFill>
+                  <a:schemeClr val="bg1">
+                    <a:lumMod val="50000"/>
+                  </a:schemeClr>
+                </a:solidFill>
+              </a:rPr>
+              <a:t>virknes</a:t>
+            </a:r>
+            <a:r>
+              <a:rPr lang="en-GB" sz="1600" i="1" dirty="0">
+                <a:solidFill>
+                  <a:schemeClr val="bg1">
+                    <a:lumMod val="50000"/>
+                  </a:schemeClr>
+                </a:solidFill>
+              </a:rPr>
+              <a:t> un </a:t>
+            </a:r>
+            <a:r>
+              <a:rPr lang="en-GB" sz="1600" i="1" dirty="0" err="1">
+                <a:solidFill>
+                  <a:schemeClr val="bg1">
+                    <a:lumMod val="50000"/>
+                  </a:schemeClr>
+                </a:solidFill>
+              </a:rPr>
+              <a:t>ierakstīt</a:t>
+            </a:r>
+            <a:endParaRPr lang="en-GB" sz="1600" i="1" dirty="0">
+              <a:solidFill>
+                <a:schemeClr val="bg1">
+                  <a:lumMod val="50000"/>
+                </a:schemeClr>
+              </a:solidFill>
+            </a:endParaRPr>
+          </a:p>
+        </p:txBody>
+      </p:sp>
+      <p:sp>
+        <p:nvSpPr>
+          <p:cNvPr id="13" name="TextBox 12">
+            <a:extLst>
+              <a:ext uri="{FF2B5EF4-FFF2-40B4-BE49-F238E27FC236}">
+                <a16:creationId xmlns:a16="http://schemas.microsoft.com/office/drawing/2014/main" id="{CA4D9355-EF21-462A-8252-3E98D9F10781}"/>
+              </a:ext>
+            </a:extLst>
+          </p:cNvPr>
+          <p:cNvSpPr txBox="1"/>
+          <p:nvPr/>
+        </p:nvSpPr>
+        <p:spPr>
+          <a:xfrm>
+            <a:off x="3145233" y="4544312"/>
+            <a:ext cx="5358066" cy="338554"/>
+          </a:xfrm>
+          <a:prstGeom prst="rect">
+            <a:avLst/>
+          </a:prstGeom>
+          <a:solidFill>
+            <a:srgbClr val="F9F9F9"/>
+          </a:solidFill>
+        </p:spPr>
+        <p:txBody>
+          <a:bodyPr wrap="square" rtlCol="0">
+            <a:spAutoFit/>
+          </a:bodyPr>
+          <a:lstStyle/>
+          <a:p>
+            <a:r>
+              <a:rPr lang="en-GB" sz="1600" i="1" dirty="0">
+                <a:solidFill>
+                  <a:schemeClr val="bg1">
+                    <a:lumMod val="50000"/>
+                  </a:schemeClr>
+                </a:solidFill>
+              </a:rPr>
+              <a:t> </a:t>
+            </a:r>
+            <a:r>
+              <a:rPr lang="en-GB" sz="1400" i="1" dirty="0" err="1">
+                <a:solidFill>
+                  <a:schemeClr val="bg1">
+                    <a:lumMod val="50000"/>
+                  </a:schemeClr>
+                </a:solidFill>
+              </a:rPr>
+              <a:t>FileWriter</a:t>
+            </a:r>
+            <a:endParaRPr lang="en-GB" sz="1600" i="1" dirty="0">
+              <a:solidFill>
+                <a:schemeClr val="bg1">
+                  <a:lumMod val="50000"/>
+                </a:schemeClr>
+              </a:solidFill>
+            </a:endParaRPr>
+          </a:p>
+        </p:txBody>
+      </p:sp>
+      <p:sp>
+        <p:nvSpPr>
+          <p:cNvPr id="14" name="TextBox 13">
+            <a:extLst>
+              <a:ext uri="{FF2B5EF4-FFF2-40B4-BE49-F238E27FC236}">
+                <a16:creationId xmlns:a16="http://schemas.microsoft.com/office/drawing/2014/main" id="{969A0587-3715-40FD-A4D8-5B13A67E33D7}"/>
+              </a:ext>
+            </a:extLst>
+          </p:cNvPr>
+          <p:cNvSpPr txBox="1"/>
+          <p:nvPr/>
+        </p:nvSpPr>
+        <p:spPr>
+          <a:xfrm>
+            <a:off x="2800000" y="5634871"/>
+            <a:ext cx="5358066" cy="276999"/>
+          </a:xfrm>
+          <a:prstGeom prst="rect">
+            <a:avLst/>
+          </a:prstGeom>
+          <a:solidFill>
+            <a:srgbClr val="F9F9F9"/>
+          </a:solidFill>
+        </p:spPr>
+        <p:txBody>
+          <a:bodyPr wrap="square" rtlCol="0">
+            <a:spAutoFit/>
+          </a:bodyPr>
+          <a:lstStyle/>
+          <a:p>
+            <a:r>
+              <a:rPr lang="en-GB" sz="1200" i="1" dirty="0">
+                <a:solidFill>
+                  <a:schemeClr val="bg1">
+                    <a:lumMod val="50000"/>
+                  </a:schemeClr>
+                </a:solidFill>
+              </a:rPr>
+              <a:t>//</a:t>
+            </a:r>
+            <a:r>
+              <a:rPr lang="en-GB" sz="1200" i="1" dirty="0" err="1">
+                <a:solidFill>
+                  <a:schemeClr val="bg1">
+                    <a:lumMod val="50000"/>
+                  </a:schemeClr>
+                </a:solidFill>
+              </a:rPr>
+              <a:t>aizvērt</a:t>
+            </a:r>
+            <a:r>
+              <a:rPr lang="en-GB" sz="1200" i="1" dirty="0">
+                <a:solidFill>
+                  <a:schemeClr val="bg1">
+                    <a:lumMod val="50000"/>
+                  </a:schemeClr>
+                </a:solidFill>
+              </a:rPr>
+              <a:t> </a:t>
+            </a:r>
+            <a:r>
+              <a:rPr lang="en-GB" sz="1200" i="1" dirty="0" err="1">
+                <a:solidFill>
+                  <a:schemeClr val="bg1">
+                    <a:lumMod val="50000"/>
+                  </a:schemeClr>
+                </a:solidFill>
+              </a:rPr>
+              <a:t>failu</a:t>
+            </a:r>
+            <a:endParaRPr lang="en-GB" sz="1200" i="1" dirty="0">
+              <a:solidFill>
+                <a:schemeClr val="bg1">
+                  <a:lumMod val="50000"/>
+                </a:schemeClr>
+              </a:solidFill>
+            </a:endParaRPr>
+          </a:p>
+        </p:txBody>
+      </p:sp>
+    </p:spTree>
+    <p:extLst>
+      <p:ext uri="{BB962C8B-B14F-4D97-AF65-F5344CB8AC3E}">
+        <p14:creationId xmlns:p14="http://schemas.microsoft.com/office/powerpoint/2010/main" val="1155189427"/>
+      </p:ext>
+    </p:extLst>
+  </p:cSld>
+  <p:clrMapOvr>
+    <a:masterClrMapping/>
+  </p:clrMapOvr>
+</p:sld>
+</file>
+
 <file path=ppt/slides/slide2.xml><?xml version="1.0" encoding="utf-8"?>
 <p:sld xmlns:a="http://schemas.openxmlformats.org/drawingml/2006/main" xmlns:r="http://schemas.openxmlformats.org/officeDocument/2006/relationships" xmlns:p="http://schemas.openxmlformats.org/presentationml/2006/main">
   <p:cSld>
@@ -3246,14 +4229,14 @@
           <a:p>
             <a:pPr algn="ctr"/>
             <a:r>
-              <a:rPr lang="lv-LV" b="1" dirty="0"/>
-              <a:t>Kas </a:t>
-            </a:r>
-            <a:r>
-              <a:rPr lang="lv-LV" b="1"/>
-              <a:t>ir teksta datnes?</a:t>
-            </a:r>
-            <a:endParaRPr lang="en-GB" b="1" dirty="0"/>
+              <a:rPr lang="lv-LV" dirty="0">
+                <a:latin typeface="Arial Black" panose="020B0A04020102020204" pitchFamily="34" charset="0"/>
+              </a:rPr>
+              <a:t>Kas ir teksta datnes?</a:t>
+            </a:r>
+            <a:endParaRPr lang="en-GB" dirty="0">
+              <a:latin typeface="Arial Black" panose="020B0A04020102020204" pitchFamily="34" charset="0"/>
+            </a:endParaRPr>
           </a:p>
         </p:txBody>
       </p:sp>
@@ -3340,6 +4323,2669 @@
     <p:extLst>
       <p:ext uri="{BB962C8B-B14F-4D97-AF65-F5344CB8AC3E}">
         <p14:creationId xmlns:p14="http://schemas.microsoft.com/office/powerpoint/2010/main" val="743291785"/>
+      </p:ext>
+    </p:extLst>
+  </p:cSld>
+  <p:clrMapOvr>
+    <a:masterClrMapping/>
+  </p:clrMapOvr>
+</p:sld>
+</file>
+
+<file path=ppt/slides/slide3.xml><?xml version="1.0" encoding="utf-8"?>
+<p:sld xmlns:a="http://schemas.openxmlformats.org/drawingml/2006/main" xmlns:r="http://schemas.openxmlformats.org/officeDocument/2006/relationships" xmlns:p="http://schemas.openxmlformats.org/presentationml/2006/main">
+  <p:cSld>
+    <p:bg>
+      <p:bgPr>
+        <a:solidFill>
+          <a:schemeClr val="accent6">
+            <a:lumMod val="20000"/>
+            <a:lumOff val="80000"/>
+          </a:schemeClr>
+        </a:solidFill>
+        <a:effectLst/>
+      </p:bgPr>
+    </p:bg>
+    <p:spTree>
+      <p:nvGrpSpPr>
+        <p:cNvPr id="1" name=""/>
+        <p:cNvGrpSpPr/>
+        <p:nvPr/>
+      </p:nvGrpSpPr>
+      <p:grpSpPr>
+        <a:xfrm>
+          <a:off x="0" y="0"/>
+          <a:ext cx="0" cy="0"/>
+          <a:chOff x="0" y="0"/>
+          <a:chExt cx="0" cy="0"/>
+        </a:xfrm>
+      </p:grpSpPr>
+      <p:sp>
+        <p:nvSpPr>
+          <p:cNvPr id="2" name="Title 1">
+            <a:extLst>
+              <a:ext uri="{FF2B5EF4-FFF2-40B4-BE49-F238E27FC236}">
+                <a16:creationId xmlns:a16="http://schemas.microsoft.com/office/drawing/2014/main" id="{09D92BE7-4147-419C-8331-5D82849AB64E}"/>
+              </a:ext>
+            </a:extLst>
+          </p:cNvPr>
+          <p:cNvSpPr>
+            <a:spLocks noGrp="1"/>
+          </p:cNvSpPr>
+          <p:nvPr>
+            <p:ph type="title"/>
+          </p:nvPr>
+        </p:nvSpPr>
+        <p:spPr/>
+        <p:txBody>
+          <a:bodyPr/>
+          <a:lstStyle/>
+          <a:p>
+            <a:r>
+              <a:rPr lang="lv-LV" dirty="0">
+                <a:latin typeface="Arial Black" panose="020B0A04020102020204" pitchFamily="34" charset="0"/>
+              </a:rPr>
+              <a:t>Pakotne</a:t>
+            </a:r>
+            <a:endParaRPr lang="en-GB" dirty="0">
+              <a:latin typeface="Arial Black" panose="020B0A04020102020204" pitchFamily="34" charset="0"/>
+            </a:endParaRPr>
+          </a:p>
+        </p:txBody>
+      </p:sp>
+      <p:sp>
+        <p:nvSpPr>
+          <p:cNvPr id="3" name="Content Placeholder 2">
+            <a:extLst>
+              <a:ext uri="{FF2B5EF4-FFF2-40B4-BE49-F238E27FC236}">
+                <a16:creationId xmlns:a16="http://schemas.microsoft.com/office/drawing/2014/main" id="{CA8D1220-D217-416B-8E2D-6CF9D79C3985}"/>
+              </a:ext>
+            </a:extLst>
+          </p:cNvPr>
+          <p:cNvSpPr>
+            <a:spLocks noGrp="1"/>
+          </p:cNvSpPr>
+          <p:nvPr>
+            <p:ph idx="1"/>
+          </p:nvPr>
+        </p:nvSpPr>
+        <p:spPr/>
+        <p:txBody>
+          <a:bodyPr/>
+          <a:lstStyle/>
+          <a:p>
+            <a:r>
+              <a:rPr lang="lv-LV" dirty="0"/>
+              <a:t>Java.io pakotnes File klase ļauj mums strādāt ar failiem.</a:t>
+            </a:r>
+          </a:p>
+          <a:p>
+            <a:r>
+              <a:rPr lang="lv-LV" dirty="0"/>
+              <a:t>Lai izmantotu File klasi, izveidot klases objektu un norādiet faila vai direktorija nosaukumu.</a:t>
+            </a:r>
+          </a:p>
+          <a:p>
+            <a:pPr marL="0" indent="0">
+              <a:buNone/>
+            </a:pPr>
+            <a:endParaRPr lang="en-GB" dirty="0"/>
+          </a:p>
+        </p:txBody>
+      </p:sp>
+      <p:pic>
+        <p:nvPicPr>
+          <p:cNvPr id="7" name="Picture 6">
+            <a:extLst>
+              <a:ext uri="{FF2B5EF4-FFF2-40B4-BE49-F238E27FC236}">
+                <a16:creationId xmlns:a16="http://schemas.microsoft.com/office/drawing/2014/main" id="{AEE8900B-DF0C-4D33-9937-C9B6111868A1}"/>
+              </a:ext>
+            </a:extLst>
+          </p:cNvPr>
+          <p:cNvPicPr>
+            <a:picLocks noChangeAspect="1"/>
+          </p:cNvPicPr>
+          <p:nvPr/>
+        </p:nvPicPr>
+        <p:blipFill>
+          <a:blip r:embed="rId2"/>
+          <a:stretch>
+            <a:fillRect/>
+          </a:stretch>
+        </p:blipFill>
+        <p:spPr>
+          <a:xfrm>
+            <a:off x="1407408" y="3861466"/>
+            <a:ext cx="9526259" cy="1708909"/>
+          </a:xfrm>
+          <a:prstGeom prst="rect">
+            <a:avLst/>
+          </a:prstGeom>
+        </p:spPr>
+      </p:pic>
+    </p:spTree>
+    <p:extLst>
+      <p:ext uri="{BB962C8B-B14F-4D97-AF65-F5344CB8AC3E}">
+        <p14:creationId xmlns:p14="http://schemas.microsoft.com/office/powerpoint/2010/main" val="446333089"/>
+      </p:ext>
+    </p:extLst>
+  </p:cSld>
+  <p:clrMapOvr>
+    <a:masterClrMapping/>
+  </p:clrMapOvr>
+</p:sld>
+</file>
+
+<file path=ppt/slides/slide4.xml><?xml version="1.0" encoding="utf-8"?>
+<p:sld xmlns:a="http://schemas.openxmlformats.org/drawingml/2006/main" xmlns:r="http://schemas.openxmlformats.org/officeDocument/2006/relationships" xmlns:p="http://schemas.openxmlformats.org/presentationml/2006/main">
+  <p:cSld>
+    <p:bg>
+      <p:bgPr>
+        <a:solidFill>
+          <a:schemeClr val="accent6">
+            <a:lumMod val="20000"/>
+            <a:lumOff val="80000"/>
+          </a:schemeClr>
+        </a:solidFill>
+        <a:effectLst/>
+      </p:bgPr>
+    </p:bg>
+    <p:spTree>
+      <p:nvGrpSpPr>
+        <p:cNvPr id="1" name=""/>
+        <p:cNvGrpSpPr/>
+        <p:nvPr/>
+      </p:nvGrpSpPr>
+      <p:grpSpPr>
+        <a:xfrm>
+          <a:off x="0" y="0"/>
+          <a:ext cx="0" cy="0"/>
+          <a:chOff x="0" y="0"/>
+          <a:chExt cx="0" cy="0"/>
+        </a:xfrm>
+      </p:grpSpPr>
+      <p:sp>
+        <p:nvSpPr>
+          <p:cNvPr id="2" name="Title 1">
+            <a:extLst>
+              <a:ext uri="{FF2B5EF4-FFF2-40B4-BE49-F238E27FC236}">
+                <a16:creationId xmlns:a16="http://schemas.microsoft.com/office/drawing/2014/main" id="{DC598DD3-635B-4D67-ABB3-02B91E4A79B8}"/>
+              </a:ext>
+            </a:extLst>
+          </p:cNvPr>
+          <p:cNvSpPr>
+            <a:spLocks noGrp="1"/>
+          </p:cNvSpPr>
+          <p:nvPr>
+            <p:ph type="title"/>
+          </p:nvPr>
+        </p:nvSpPr>
+        <p:spPr/>
+        <p:txBody>
+          <a:bodyPr/>
+          <a:lstStyle/>
+          <a:p>
+            <a:r>
+              <a:rPr lang="en-GB" dirty="0" err="1">
+                <a:latin typeface="Arial Black" panose="020B0A04020102020204" pitchFamily="34" charset="0"/>
+              </a:rPr>
+              <a:t>Failu</a:t>
+            </a:r>
+            <a:r>
+              <a:rPr lang="en-GB" dirty="0">
+                <a:latin typeface="Arial Black" panose="020B0A04020102020204" pitchFamily="34" charset="0"/>
+              </a:rPr>
+              <a:t> </a:t>
+            </a:r>
+            <a:r>
+              <a:rPr lang="en-GB" dirty="0" err="1">
+                <a:latin typeface="Arial Black" panose="020B0A04020102020204" pitchFamily="34" charset="0"/>
+              </a:rPr>
+              <a:t>apstrāde</a:t>
+            </a:r>
+            <a:endParaRPr lang="en-GB" dirty="0">
+              <a:latin typeface="Arial Black" panose="020B0A04020102020204" pitchFamily="34" charset="0"/>
+            </a:endParaRPr>
+          </a:p>
+        </p:txBody>
+      </p:sp>
+      <p:sp>
+        <p:nvSpPr>
+          <p:cNvPr id="3" name="Content Placeholder 2">
+            <a:extLst>
+              <a:ext uri="{FF2B5EF4-FFF2-40B4-BE49-F238E27FC236}">
+                <a16:creationId xmlns:a16="http://schemas.microsoft.com/office/drawing/2014/main" id="{DD2D8840-CC0E-49E7-93B7-354209F90F28}"/>
+              </a:ext>
+            </a:extLst>
+          </p:cNvPr>
+          <p:cNvSpPr>
+            <a:spLocks noGrp="1"/>
+          </p:cNvSpPr>
+          <p:nvPr>
+            <p:ph idx="1"/>
+          </p:nvPr>
+        </p:nvSpPr>
+        <p:spPr/>
+        <p:txBody>
+          <a:bodyPr/>
+          <a:lstStyle/>
+          <a:p>
+            <a:pPr marL="0" indent="0">
+              <a:buNone/>
+            </a:pPr>
+            <a:r>
+              <a:rPr lang="en-GB" dirty="0"/>
+              <a:t>Java </a:t>
+            </a:r>
+            <a:r>
+              <a:rPr lang="en-GB" dirty="0" err="1"/>
+              <a:t>FileWriter</a:t>
+            </a:r>
+            <a:r>
+              <a:rPr lang="en-GB" dirty="0"/>
+              <a:t> un </a:t>
+            </a:r>
+            <a:r>
+              <a:rPr lang="en-GB" dirty="0" err="1"/>
+              <a:t>FileReader</a:t>
+            </a:r>
+            <a:r>
+              <a:rPr lang="en-GB" dirty="0"/>
+              <a:t> </a:t>
+            </a:r>
+            <a:r>
+              <a:rPr lang="en-GB" dirty="0" err="1"/>
+              <a:t>klases</a:t>
+            </a:r>
+            <a:r>
+              <a:rPr lang="en-GB" dirty="0"/>
+              <a:t> </a:t>
+            </a:r>
+            <a:r>
+              <a:rPr lang="en-GB" dirty="0" err="1"/>
+              <a:t>tiek</a:t>
+            </a:r>
+            <a:r>
+              <a:rPr lang="en-GB" dirty="0"/>
+              <a:t> </a:t>
+            </a:r>
+            <a:r>
+              <a:rPr lang="en-GB" dirty="0" err="1"/>
+              <a:t>izmantotas</a:t>
+            </a:r>
+            <a:r>
+              <a:rPr lang="en-GB" dirty="0"/>
+              <a:t>, </a:t>
+            </a:r>
+            <a:r>
+              <a:rPr lang="en-GB" dirty="0" err="1"/>
+              <a:t>lai</a:t>
+            </a:r>
+            <a:r>
+              <a:rPr lang="en-GB" dirty="0"/>
+              <a:t> </a:t>
+            </a:r>
+            <a:r>
+              <a:rPr lang="en-GB" dirty="0" err="1"/>
+              <a:t>rakstītu</a:t>
+            </a:r>
+            <a:r>
+              <a:rPr lang="en-GB" dirty="0"/>
+              <a:t> un </a:t>
+            </a:r>
+            <a:r>
+              <a:rPr lang="en-GB" dirty="0" err="1"/>
+              <a:t>lasītu</a:t>
+            </a:r>
+            <a:r>
+              <a:rPr lang="en-GB" dirty="0"/>
+              <a:t> </a:t>
+            </a:r>
+            <a:r>
+              <a:rPr lang="en-GB" dirty="0" err="1"/>
+              <a:t>datus</a:t>
+            </a:r>
+            <a:r>
+              <a:rPr lang="en-GB" dirty="0"/>
+              <a:t> no </a:t>
+            </a:r>
+            <a:r>
+              <a:rPr lang="en-GB" dirty="0" err="1"/>
+              <a:t>teksta</a:t>
+            </a:r>
+            <a:r>
+              <a:rPr lang="en-GB" dirty="0"/>
+              <a:t> </a:t>
+            </a:r>
+            <a:r>
+              <a:rPr lang="en-GB" dirty="0" err="1"/>
+              <a:t>failiem</a:t>
+            </a:r>
+            <a:r>
+              <a:rPr lang="lv-LV" dirty="0"/>
+              <a:t>. </a:t>
+            </a:r>
+            <a:r>
+              <a:rPr lang="en-GB" dirty="0"/>
+              <a:t>Nav </a:t>
+            </a:r>
+            <a:r>
+              <a:rPr lang="en-GB" dirty="0" err="1"/>
+              <a:t>ieteicams</a:t>
+            </a:r>
+            <a:r>
+              <a:rPr lang="en-GB" dirty="0"/>
+              <a:t> </a:t>
+            </a:r>
+            <a:r>
+              <a:rPr lang="en-GB" dirty="0" err="1"/>
+              <a:t>izmantot</a:t>
+            </a:r>
+            <a:r>
+              <a:rPr lang="en-GB" dirty="0"/>
+              <a:t> </a:t>
+            </a:r>
+            <a:r>
+              <a:rPr lang="en-GB" dirty="0" err="1"/>
+              <a:t>FileInputStream</a:t>
+            </a:r>
+            <a:r>
+              <a:rPr lang="en-GB" dirty="0"/>
+              <a:t> un </a:t>
+            </a:r>
+            <a:r>
+              <a:rPr lang="en-GB" dirty="0" err="1"/>
+              <a:t>FileOutputStream</a:t>
+            </a:r>
+            <a:r>
+              <a:rPr lang="en-GB" dirty="0"/>
+              <a:t> </a:t>
+            </a:r>
+            <a:r>
+              <a:rPr lang="en-GB" dirty="0" err="1"/>
+              <a:t>klases</a:t>
+            </a:r>
+            <a:r>
+              <a:rPr lang="en-GB" dirty="0"/>
+              <a:t>, </a:t>
+            </a:r>
+            <a:r>
+              <a:rPr lang="en-GB" dirty="0" err="1"/>
+              <a:t>ja</a:t>
+            </a:r>
+            <a:r>
+              <a:rPr lang="en-GB" dirty="0"/>
+              <a:t> </a:t>
+            </a:r>
+            <a:r>
+              <a:rPr lang="en-GB" dirty="0" err="1"/>
+              <a:t>jums</a:t>
+            </a:r>
+            <a:r>
+              <a:rPr lang="en-GB" dirty="0"/>
+              <a:t> </a:t>
+            </a:r>
+            <a:r>
+              <a:rPr lang="en-GB" dirty="0" err="1"/>
+              <a:t>ir</a:t>
+            </a:r>
+            <a:r>
+              <a:rPr lang="en-GB" dirty="0"/>
+              <a:t> </a:t>
+            </a:r>
+            <a:r>
+              <a:rPr lang="en-GB" dirty="0" err="1"/>
+              <a:t>jālasa</a:t>
+            </a:r>
+            <a:r>
+              <a:rPr lang="en-GB" dirty="0"/>
+              <a:t> un </a:t>
+            </a:r>
+            <a:r>
+              <a:rPr lang="en-GB" dirty="0" err="1"/>
+              <a:t>jāraksta</a:t>
+            </a:r>
+            <a:r>
+              <a:rPr lang="en-GB" dirty="0"/>
+              <a:t> </a:t>
+            </a:r>
+            <a:r>
+              <a:rPr lang="en-GB" dirty="0" err="1"/>
+              <a:t>jebkāda</a:t>
+            </a:r>
+            <a:r>
+              <a:rPr lang="en-GB" dirty="0"/>
+              <a:t> </a:t>
+            </a:r>
+            <a:r>
+              <a:rPr lang="en-GB" dirty="0" err="1"/>
+              <a:t>teksta</a:t>
+            </a:r>
+            <a:r>
+              <a:rPr lang="en-GB" dirty="0"/>
+              <a:t> </a:t>
+            </a:r>
+            <a:r>
+              <a:rPr lang="en-GB" dirty="0" err="1"/>
+              <a:t>informācija</a:t>
+            </a:r>
+            <a:r>
+              <a:rPr lang="en-GB" dirty="0"/>
+              <a:t>, jo </a:t>
+            </a:r>
+            <a:r>
+              <a:rPr lang="en-GB" dirty="0" err="1"/>
+              <a:t>tās</a:t>
+            </a:r>
+            <a:r>
+              <a:rPr lang="en-GB" dirty="0"/>
+              <a:t> </a:t>
+            </a:r>
+            <a:r>
+              <a:rPr lang="en-GB" dirty="0" err="1"/>
+              <a:t>ir</a:t>
+            </a:r>
+            <a:r>
+              <a:rPr lang="en-GB" dirty="0"/>
+              <a:t> </a:t>
+            </a:r>
+            <a:r>
+              <a:rPr lang="en-GB" dirty="0" err="1"/>
+              <a:t>baitu</a:t>
+            </a:r>
+            <a:r>
+              <a:rPr lang="en-GB" dirty="0"/>
+              <a:t> </a:t>
+            </a:r>
+            <a:r>
+              <a:rPr lang="en-GB" dirty="0" err="1"/>
+              <a:t>plūsmas</a:t>
+            </a:r>
+            <a:r>
+              <a:rPr lang="en-GB" dirty="0"/>
+              <a:t> </a:t>
+            </a:r>
+            <a:r>
+              <a:rPr lang="en-GB" dirty="0" err="1"/>
+              <a:t>klases</a:t>
+            </a:r>
+            <a:r>
+              <a:rPr lang="en-GB" dirty="0"/>
+              <a:t>.</a:t>
+            </a:r>
+          </a:p>
+        </p:txBody>
+      </p:sp>
+    </p:spTree>
+    <p:extLst>
+      <p:ext uri="{BB962C8B-B14F-4D97-AF65-F5344CB8AC3E}">
+        <p14:creationId xmlns:p14="http://schemas.microsoft.com/office/powerpoint/2010/main" val="2234697324"/>
+      </p:ext>
+    </p:extLst>
+  </p:cSld>
+  <p:clrMapOvr>
+    <a:masterClrMapping/>
+  </p:clrMapOvr>
+</p:sld>
+</file>
+
+<file path=ppt/slides/slide5.xml><?xml version="1.0" encoding="utf-8"?>
+<p:sld xmlns:a="http://schemas.openxmlformats.org/drawingml/2006/main" xmlns:r="http://schemas.openxmlformats.org/officeDocument/2006/relationships" xmlns:p="http://schemas.openxmlformats.org/presentationml/2006/main">
+  <p:cSld>
+    <p:bg>
+      <p:bgPr>
+        <a:solidFill>
+          <a:schemeClr val="accent6">
+            <a:lumMod val="20000"/>
+            <a:lumOff val="80000"/>
+          </a:schemeClr>
+        </a:solidFill>
+        <a:effectLst/>
+      </p:bgPr>
+    </p:bg>
+    <p:spTree>
+      <p:nvGrpSpPr>
+        <p:cNvPr id="1" name=""/>
+        <p:cNvGrpSpPr/>
+        <p:nvPr/>
+      </p:nvGrpSpPr>
+      <p:grpSpPr>
+        <a:xfrm>
+          <a:off x="0" y="0"/>
+          <a:ext cx="0" cy="0"/>
+          <a:chOff x="0" y="0"/>
+          <a:chExt cx="0" cy="0"/>
+        </a:xfrm>
+      </p:grpSpPr>
+      <p:sp>
+        <p:nvSpPr>
+          <p:cNvPr id="2" name="Title 1">
+            <a:extLst>
+              <a:ext uri="{FF2B5EF4-FFF2-40B4-BE49-F238E27FC236}">
+                <a16:creationId xmlns:a16="http://schemas.microsoft.com/office/drawing/2014/main" id="{DC598DD3-635B-4D67-ABB3-02B91E4A79B8}"/>
+              </a:ext>
+            </a:extLst>
+          </p:cNvPr>
+          <p:cNvSpPr>
+            <a:spLocks noGrp="1"/>
+          </p:cNvSpPr>
+          <p:nvPr>
+            <p:ph type="title"/>
+          </p:nvPr>
+        </p:nvSpPr>
+        <p:spPr/>
+        <p:txBody>
+          <a:bodyPr/>
+          <a:lstStyle/>
+          <a:p>
+            <a:r>
+              <a:rPr lang="en-GB" dirty="0" err="1">
+                <a:latin typeface="Arial Black" panose="020B0A04020102020204" pitchFamily="34" charset="0"/>
+              </a:rPr>
+              <a:t>FileWriter</a:t>
+            </a:r>
+            <a:endParaRPr lang="en-GB" dirty="0">
+              <a:latin typeface="Arial Black" panose="020B0A04020102020204" pitchFamily="34" charset="0"/>
+            </a:endParaRPr>
+          </a:p>
+        </p:txBody>
+      </p:sp>
+      <p:sp>
+        <p:nvSpPr>
+          <p:cNvPr id="3" name="Content Placeholder 2">
+            <a:extLst>
+              <a:ext uri="{FF2B5EF4-FFF2-40B4-BE49-F238E27FC236}">
+                <a16:creationId xmlns:a16="http://schemas.microsoft.com/office/drawing/2014/main" id="{DD2D8840-CC0E-49E7-93B7-354209F90F28}"/>
+              </a:ext>
+            </a:extLst>
+          </p:cNvPr>
+          <p:cNvSpPr>
+            <a:spLocks noGrp="1"/>
+          </p:cNvSpPr>
+          <p:nvPr>
+            <p:ph idx="1"/>
+          </p:nvPr>
+        </p:nvSpPr>
+        <p:spPr/>
+        <p:txBody>
+          <a:bodyPr>
+            <a:normAutofit/>
+          </a:bodyPr>
+          <a:lstStyle/>
+          <a:p>
+            <a:pPr marL="0" indent="0">
+              <a:buNone/>
+            </a:pPr>
+            <a:r>
+              <a:rPr lang="lv-LV" dirty="0"/>
+              <a:t>Java FileWriter klase no java.io pakotnes tiek izmantota, lai rakstītu datus rakstzīmju formā failā. FileWriter klase Java valodā tiek izmantota, lai rakstītu datus rakstzīmju formātā failā. Tā ir rakstzīmju orientēta klase, kas tiek izmantota failu apstrādei Java valodā.</a:t>
+            </a:r>
+          </a:p>
+          <a:p>
+            <a:pPr marL="0" indent="0">
+              <a:buNone/>
+            </a:pPr>
+            <a:r>
+              <a:rPr lang="lv-LV" dirty="0"/>
+              <a:t>Lai pievienot FileWriter:</a:t>
+            </a:r>
+          </a:p>
+        </p:txBody>
+      </p:sp>
+      <p:pic>
+        <p:nvPicPr>
+          <p:cNvPr id="5" name="Picture 4">
+            <a:extLst>
+              <a:ext uri="{FF2B5EF4-FFF2-40B4-BE49-F238E27FC236}">
+                <a16:creationId xmlns:a16="http://schemas.microsoft.com/office/drawing/2014/main" id="{06AD89A0-8BE6-4163-81F0-088B2A18F2C6}"/>
+              </a:ext>
+            </a:extLst>
+          </p:cNvPr>
+          <p:cNvPicPr>
+            <a:picLocks noChangeAspect="1"/>
+          </p:cNvPicPr>
+          <p:nvPr/>
+        </p:nvPicPr>
+        <p:blipFill>
+          <a:blip r:embed="rId2"/>
+          <a:stretch>
+            <a:fillRect/>
+          </a:stretch>
+        </p:blipFill>
+        <p:spPr>
+          <a:xfrm>
+            <a:off x="1023025" y="4001294"/>
+            <a:ext cx="9104298" cy="533384"/>
+          </a:xfrm>
+          <a:prstGeom prst="rect">
+            <a:avLst/>
+          </a:prstGeom>
+        </p:spPr>
+      </p:pic>
+    </p:spTree>
+    <p:extLst>
+      <p:ext uri="{BB962C8B-B14F-4D97-AF65-F5344CB8AC3E}">
+        <p14:creationId xmlns:p14="http://schemas.microsoft.com/office/powerpoint/2010/main" val="2479667279"/>
+      </p:ext>
+    </p:extLst>
+  </p:cSld>
+  <p:clrMapOvr>
+    <a:masterClrMapping/>
+  </p:clrMapOvr>
+</p:sld>
+</file>
+
+<file path=ppt/slides/slide6.xml><?xml version="1.0" encoding="utf-8"?>
+<p:sld xmlns:a="http://schemas.openxmlformats.org/drawingml/2006/main" xmlns:r="http://schemas.openxmlformats.org/officeDocument/2006/relationships" xmlns:p="http://schemas.openxmlformats.org/presentationml/2006/main">
+  <p:cSld>
+    <p:bg>
+      <p:bgPr>
+        <a:solidFill>
+          <a:schemeClr val="accent6">
+            <a:lumMod val="20000"/>
+            <a:lumOff val="80000"/>
+          </a:schemeClr>
+        </a:solidFill>
+        <a:effectLst/>
+      </p:bgPr>
+    </p:bg>
+    <p:spTree>
+      <p:nvGrpSpPr>
+        <p:cNvPr id="1" name=""/>
+        <p:cNvGrpSpPr/>
+        <p:nvPr/>
+      </p:nvGrpSpPr>
+      <p:grpSpPr>
+        <a:xfrm>
+          <a:off x="0" y="0"/>
+          <a:ext cx="0" cy="0"/>
+          <a:chOff x="0" y="0"/>
+          <a:chExt cx="0" cy="0"/>
+        </a:xfrm>
+      </p:grpSpPr>
+      <p:sp>
+        <p:nvSpPr>
+          <p:cNvPr id="2" name="Title 1">
+            <a:extLst>
+              <a:ext uri="{FF2B5EF4-FFF2-40B4-BE49-F238E27FC236}">
+                <a16:creationId xmlns:a16="http://schemas.microsoft.com/office/drawing/2014/main" id="{DC598DD3-635B-4D67-ABB3-02B91E4A79B8}"/>
+              </a:ext>
+            </a:extLst>
+          </p:cNvPr>
+          <p:cNvSpPr>
+            <a:spLocks noGrp="1"/>
+          </p:cNvSpPr>
+          <p:nvPr>
+            <p:ph type="title"/>
+          </p:nvPr>
+        </p:nvSpPr>
+        <p:spPr/>
+        <p:txBody>
+          <a:bodyPr/>
+          <a:lstStyle/>
+          <a:p>
+            <a:r>
+              <a:rPr lang="en-GB" dirty="0" err="1">
+                <a:latin typeface="Arial Black" panose="020B0A04020102020204" pitchFamily="34" charset="0"/>
+              </a:rPr>
+              <a:t>FileWriter</a:t>
+            </a:r>
+            <a:endParaRPr lang="en-GB" dirty="0">
+              <a:latin typeface="Arial Black" panose="020B0A04020102020204" pitchFamily="34" charset="0"/>
+            </a:endParaRPr>
+          </a:p>
+        </p:txBody>
+      </p:sp>
+      <p:sp>
+        <p:nvSpPr>
+          <p:cNvPr id="3" name="Content Placeholder 2">
+            <a:extLst>
+              <a:ext uri="{FF2B5EF4-FFF2-40B4-BE49-F238E27FC236}">
+                <a16:creationId xmlns:a16="http://schemas.microsoft.com/office/drawing/2014/main" id="{DD2D8840-CC0E-49E7-93B7-354209F90F28}"/>
+              </a:ext>
+            </a:extLst>
+          </p:cNvPr>
+          <p:cNvSpPr>
+            <a:spLocks noGrp="1"/>
+          </p:cNvSpPr>
+          <p:nvPr>
+            <p:ph idx="1"/>
+          </p:nvPr>
+        </p:nvSpPr>
+        <p:spPr/>
+        <p:txBody>
+          <a:bodyPr>
+            <a:normAutofit/>
+          </a:bodyPr>
+          <a:lstStyle/>
+          <a:p>
+            <a:r>
+              <a:rPr lang="lv-LV" dirty="0"/>
+              <a:t>Šī klase manto no OutputStreamWriter klases, kas savukārt manto no Writer klases.</a:t>
+            </a:r>
+          </a:p>
+          <a:p>
+            <a:r>
+              <a:rPr lang="lv-LV" dirty="0"/>
+              <a:t>Šīs klases konstruktori pieņem, ka noklusējuma rakstzīmju kodējums un noklusējuma baitu bufera lielums ir pieņemami. Lai pats norādītu šīs vērtības, izveidojiet OutputStreamWriter uz FileOutputStream.</a:t>
+            </a:r>
+          </a:p>
+          <a:p>
+            <a:r>
+              <a:rPr lang="lv-LV" dirty="0"/>
+              <a:t>FileWriter ir paredzēts rakstzīmju plūsmu rakstīšanai. Neapstrādātu baitu plūsmu rakstīšanai apsveriet iespēju izmantot FileOutputStream.</a:t>
+            </a:r>
+          </a:p>
+          <a:p>
+            <a:r>
+              <a:rPr lang="lv-LV" dirty="0"/>
+              <a:t>FileWriter izveido izvades failu, ja tas vēl nav izveidots.</a:t>
+            </a:r>
+          </a:p>
+        </p:txBody>
+      </p:sp>
+    </p:spTree>
+    <p:extLst>
+      <p:ext uri="{BB962C8B-B14F-4D97-AF65-F5344CB8AC3E}">
+        <p14:creationId xmlns:p14="http://schemas.microsoft.com/office/powerpoint/2010/main" val="2020515774"/>
+      </p:ext>
+    </p:extLst>
+  </p:cSld>
+  <p:clrMapOvr>
+    <a:masterClrMapping/>
+  </p:clrMapOvr>
+</p:sld>
+</file>
+
+<file path=ppt/slides/slide7.xml><?xml version="1.0" encoding="utf-8"?>
+<p:sld xmlns:a="http://schemas.openxmlformats.org/drawingml/2006/main" xmlns:r="http://schemas.openxmlformats.org/officeDocument/2006/relationships" xmlns:p="http://schemas.openxmlformats.org/presentationml/2006/main">
+  <p:cSld>
+    <p:bg>
+      <p:bgPr>
+        <a:solidFill>
+          <a:schemeClr val="accent6">
+            <a:lumMod val="20000"/>
+            <a:lumOff val="80000"/>
+          </a:schemeClr>
+        </a:solidFill>
+        <a:effectLst/>
+      </p:bgPr>
+    </p:bg>
+    <p:spTree>
+      <p:nvGrpSpPr>
+        <p:cNvPr id="1" name=""/>
+        <p:cNvGrpSpPr/>
+        <p:nvPr/>
+      </p:nvGrpSpPr>
+      <p:grpSpPr>
+        <a:xfrm>
+          <a:off x="0" y="0"/>
+          <a:ext cx="0" cy="0"/>
+          <a:chOff x="0" y="0"/>
+          <a:chExt cx="0" cy="0"/>
+        </a:xfrm>
+      </p:grpSpPr>
+      <p:sp>
+        <p:nvSpPr>
+          <p:cNvPr id="2" name="Title 1">
+            <a:extLst>
+              <a:ext uri="{FF2B5EF4-FFF2-40B4-BE49-F238E27FC236}">
+                <a16:creationId xmlns:a16="http://schemas.microsoft.com/office/drawing/2014/main" id="{DC598DD3-635B-4D67-ABB3-02B91E4A79B8}"/>
+              </a:ext>
+            </a:extLst>
+          </p:cNvPr>
+          <p:cNvSpPr>
+            <a:spLocks noGrp="1"/>
+          </p:cNvSpPr>
+          <p:nvPr>
+            <p:ph type="title"/>
+          </p:nvPr>
+        </p:nvSpPr>
+        <p:spPr/>
+        <p:txBody>
+          <a:bodyPr/>
+          <a:lstStyle/>
+          <a:p>
+            <a:r>
+              <a:rPr lang="en-GB" dirty="0" err="1">
+                <a:latin typeface="Arial Black" panose="020B0A04020102020204" pitchFamily="34" charset="0"/>
+              </a:rPr>
+              <a:t>FileWriter</a:t>
+            </a:r>
+            <a:endParaRPr lang="en-GB" dirty="0">
+              <a:latin typeface="Arial Black" panose="020B0A04020102020204" pitchFamily="34" charset="0"/>
+            </a:endParaRPr>
+          </a:p>
+        </p:txBody>
+      </p:sp>
+      <p:pic>
+        <p:nvPicPr>
+          <p:cNvPr id="2050" name="Picture 2" descr="FileWriter-Class-Hierarchy">
+            <a:extLst>
+              <a:ext uri="{FF2B5EF4-FFF2-40B4-BE49-F238E27FC236}">
+                <a16:creationId xmlns:a16="http://schemas.microsoft.com/office/drawing/2014/main" id="{4E6BEFE0-65C3-4136-8E0E-3E07F77F2C71}"/>
+              </a:ext>
+            </a:extLst>
+          </p:cNvPr>
+          <p:cNvPicPr>
+            <a:picLocks noGrp="1" noChangeAspect="1" noChangeArrowheads="1"/>
+          </p:cNvPicPr>
+          <p:nvPr>
+            <p:ph idx="1"/>
+          </p:nvPr>
+        </p:nvPicPr>
+        <p:blipFill>
+          <a:blip r:embed="rId2">
+            <a:extLst>
+              <a:ext uri="{28A0092B-C50C-407E-A947-70E740481C1C}">
+                <a14:useLocalDpi xmlns:a14="http://schemas.microsoft.com/office/drawing/2010/main" val="0"/>
+              </a:ext>
+            </a:extLst>
+          </a:blip>
+          <a:srcRect/>
+          <a:stretch>
+            <a:fillRect/>
+          </a:stretch>
+        </p:blipFill>
+        <p:spPr bwMode="auto">
+          <a:xfrm>
+            <a:off x="3259404" y="1825625"/>
+            <a:ext cx="5673191" cy="4351338"/>
+          </a:xfrm>
+          <a:prstGeom prst="rect">
+            <a:avLst/>
+          </a:prstGeom>
+          <a:noFill/>
+          <a:extLst>
+            <a:ext uri="{909E8E84-426E-40DD-AFC4-6F175D3DCCD1}">
+              <a14:hiddenFill xmlns:a14="http://schemas.microsoft.com/office/drawing/2010/main">
+                <a:solidFill>
+                  <a:srgbClr val="FFFFFF"/>
+                </a:solidFill>
+              </a14:hiddenFill>
+            </a:ext>
+          </a:extLst>
+        </p:spPr>
+      </p:pic>
+    </p:spTree>
+    <p:extLst>
+      <p:ext uri="{BB962C8B-B14F-4D97-AF65-F5344CB8AC3E}">
+        <p14:creationId xmlns:p14="http://schemas.microsoft.com/office/powerpoint/2010/main" val="1062204103"/>
+      </p:ext>
+    </p:extLst>
+  </p:cSld>
+  <p:clrMapOvr>
+    <a:masterClrMapping/>
+  </p:clrMapOvr>
+</p:sld>
+</file>
+
+<file path=ppt/slides/slide8.xml><?xml version="1.0" encoding="utf-8"?>
+<p:sld xmlns:a="http://schemas.openxmlformats.org/drawingml/2006/main" xmlns:r="http://schemas.openxmlformats.org/officeDocument/2006/relationships" xmlns:p="http://schemas.openxmlformats.org/presentationml/2006/main">
+  <p:cSld>
+    <p:bg>
+      <p:bgPr>
+        <a:solidFill>
+          <a:schemeClr val="accent6">
+            <a:lumMod val="20000"/>
+            <a:lumOff val="80000"/>
+          </a:schemeClr>
+        </a:solidFill>
+        <a:effectLst/>
+      </p:bgPr>
+    </p:bg>
+    <p:spTree>
+      <p:nvGrpSpPr>
+        <p:cNvPr id="1" name=""/>
+        <p:cNvGrpSpPr/>
+        <p:nvPr/>
+      </p:nvGrpSpPr>
+      <p:grpSpPr>
+        <a:xfrm>
+          <a:off x="0" y="0"/>
+          <a:ext cx="0" cy="0"/>
+          <a:chOff x="0" y="0"/>
+          <a:chExt cx="0" cy="0"/>
+        </a:xfrm>
+      </p:grpSpPr>
+      <p:sp>
+        <p:nvSpPr>
+          <p:cNvPr id="2" name="Title 1">
+            <a:extLst>
+              <a:ext uri="{FF2B5EF4-FFF2-40B4-BE49-F238E27FC236}">
+                <a16:creationId xmlns:a16="http://schemas.microsoft.com/office/drawing/2014/main" id="{DC598DD3-635B-4D67-ABB3-02B91E4A79B8}"/>
+              </a:ext>
+            </a:extLst>
+          </p:cNvPr>
+          <p:cNvSpPr>
+            <a:spLocks noGrp="1"/>
+          </p:cNvSpPr>
+          <p:nvPr>
+            <p:ph type="title"/>
+          </p:nvPr>
+        </p:nvSpPr>
+        <p:spPr/>
+        <p:txBody>
+          <a:bodyPr/>
+          <a:lstStyle/>
+          <a:p>
+            <a:r>
+              <a:rPr lang="en-GB" dirty="0" err="1">
+                <a:latin typeface="Arial Black" panose="020B0A04020102020204" pitchFamily="34" charset="0"/>
+              </a:rPr>
+              <a:t>FileWriter</a:t>
+            </a:r>
+            <a:endParaRPr lang="en-GB" dirty="0">
+              <a:latin typeface="Arial Black" panose="020B0A04020102020204" pitchFamily="34" charset="0"/>
+            </a:endParaRPr>
+          </a:p>
+        </p:txBody>
+      </p:sp>
+      <p:sp>
+        <p:nvSpPr>
+          <p:cNvPr id="3" name="Content Placeholder 2">
+            <a:extLst>
+              <a:ext uri="{FF2B5EF4-FFF2-40B4-BE49-F238E27FC236}">
+                <a16:creationId xmlns:a16="http://schemas.microsoft.com/office/drawing/2014/main" id="{DD2D8840-CC0E-49E7-93B7-354209F90F28}"/>
+              </a:ext>
+            </a:extLst>
+          </p:cNvPr>
+          <p:cNvSpPr>
+            <a:spLocks noGrp="1"/>
+          </p:cNvSpPr>
+          <p:nvPr>
+            <p:ph idx="1"/>
+          </p:nvPr>
+        </p:nvSpPr>
+        <p:spPr/>
+        <p:txBody>
+          <a:bodyPr>
+            <a:normAutofit/>
+          </a:bodyPr>
+          <a:lstStyle/>
+          <a:p>
+            <a:pPr marL="0" indent="0">
+              <a:buNone/>
+            </a:pPr>
+            <a:r>
+              <a:rPr lang="lv-LV" dirty="0"/>
+              <a:t>FileWriter paplašina OutputStreamWriter un Writer klases. Tas ievieš šādas saskarnes:</a:t>
+            </a:r>
+          </a:p>
+          <a:p>
+            <a:pPr algn="l" fontAlgn="base">
+              <a:buFont typeface="Arial" panose="020B0604020202020204" pitchFamily="34" charset="0"/>
+              <a:buChar char="•"/>
+            </a:pPr>
+            <a:r>
+              <a:rPr lang="en-GB" b="0" i="0" dirty="0" err="1">
+                <a:solidFill>
+                  <a:srgbClr val="273239"/>
+                </a:solidFill>
+                <a:effectLst/>
+                <a:latin typeface="Nunito" pitchFamily="2" charset="0"/>
+              </a:rPr>
+              <a:t>Closeable</a:t>
+            </a:r>
+            <a:endParaRPr lang="en-GB" b="0" i="0" dirty="0">
+              <a:solidFill>
+                <a:srgbClr val="273239"/>
+              </a:solidFill>
+              <a:effectLst/>
+              <a:latin typeface="Nunito" pitchFamily="2" charset="0"/>
+            </a:endParaRPr>
+          </a:p>
+          <a:p>
+            <a:pPr algn="l" fontAlgn="base">
+              <a:buFont typeface="Arial" panose="020B0604020202020204" pitchFamily="34" charset="0"/>
+              <a:buChar char="•"/>
+            </a:pPr>
+            <a:r>
+              <a:rPr lang="en-GB" b="0" i="0" dirty="0">
+                <a:solidFill>
+                  <a:srgbClr val="273239"/>
+                </a:solidFill>
+                <a:effectLst/>
+                <a:latin typeface="Nunito" pitchFamily="2" charset="0"/>
+              </a:rPr>
+              <a:t>Flushable</a:t>
+            </a:r>
+          </a:p>
+          <a:p>
+            <a:pPr algn="l" fontAlgn="base">
+              <a:buFont typeface="Arial" panose="020B0604020202020204" pitchFamily="34" charset="0"/>
+              <a:buChar char="•"/>
+            </a:pPr>
+            <a:r>
+              <a:rPr lang="en-GB" b="0" i="0" dirty="0" err="1">
+                <a:solidFill>
+                  <a:srgbClr val="273239"/>
+                </a:solidFill>
+                <a:effectLst/>
+                <a:latin typeface="Nunito" pitchFamily="2" charset="0"/>
+              </a:rPr>
+              <a:t>Appendable</a:t>
+            </a:r>
+            <a:endParaRPr lang="en-GB" b="0" i="0" dirty="0">
+              <a:solidFill>
+                <a:srgbClr val="273239"/>
+              </a:solidFill>
+              <a:effectLst/>
+              <a:latin typeface="Nunito" pitchFamily="2" charset="0"/>
+            </a:endParaRPr>
+          </a:p>
+          <a:p>
+            <a:pPr algn="l" fontAlgn="base">
+              <a:buFont typeface="Arial" panose="020B0604020202020204" pitchFamily="34" charset="0"/>
+              <a:buChar char="•"/>
+            </a:pPr>
+            <a:r>
+              <a:rPr lang="en-GB" b="0" i="0" dirty="0" err="1">
+                <a:solidFill>
+                  <a:srgbClr val="273239"/>
+                </a:solidFill>
+                <a:effectLst/>
+                <a:latin typeface="Nunito" pitchFamily="2" charset="0"/>
+              </a:rPr>
+              <a:t>AutoCloseable</a:t>
+            </a:r>
+            <a:endParaRPr lang="en-GB" b="0" i="0" dirty="0">
+              <a:solidFill>
+                <a:srgbClr val="273239"/>
+              </a:solidFill>
+              <a:effectLst/>
+              <a:latin typeface="Nunito" pitchFamily="2" charset="0"/>
+            </a:endParaRPr>
+          </a:p>
+        </p:txBody>
+      </p:sp>
+    </p:spTree>
+    <p:extLst>
+      <p:ext uri="{BB962C8B-B14F-4D97-AF65-F5344CB8AC3E}">
+        <p14:creationId xmlns:p14="http://schemas.microsoft.com/office/powerpoint/2010/main" val="3632450931"/>
+      </p:ext>
+    </p:extLst>
+  </p:cSld>
+  <p:clrMapOvr>
+    <a:masterClrMapping/>
+  </p:clrMapOvr>
+</p:sld>
+</file>
+
+<file path=ppt/slides/slide9.xml><?xml version="1.0" encoding="utf-8"?>
+<p:sld xmlns:a="http://schemas.openxmlformats.org/drawingml/2006/main" xmlns:r="http://schemas.openxmlformats.org/officeDocument/2006/relationships" xmlns:p="http://schemas.openxmlformats.org/presentationml/2006/main">
+  <p:cSld>
+    <p:bg>
+      <p:bgPr>
+        <a:solidFill>
+          <a:schemeClr val="accent6">
+            <a:lumMod val="20000"/>
+            <a:lumOff val="80000"/>
+          </a:schemeClr>
+        </a:solidFill>
+        <a:effectLst/>
+      </p:bgPr>
+    </p:bg>
+    <p:spTree>
+      <p:nvGrpSpPr>
+        <p:cNvPr id="1" name=""/>
+        <p:cNvGrpSpPr/>
+        <p:nvPr/>
+      </p:nvGrpSpPr>
+      <p:grpSpPr>
+        <a:xfrm>
+          <a:off x="0" y="0"/>
+          <a:ext cx="0" cy="0"/>
+          <a:chOff x="0" y="0"/>
+          <a:chExt cx="0" cy="0"/>
+        </a:xfrm>
+      </p:grpSpPr>
+      <p:sp>
+        <p:nvSpPr>
+          <p:cNvPr id="2" name="Title 1">
+            <a:extLst>
+              <a:ext uri="{FF2B5EF4-FFF2-40B4-BE49-F238E27FC236}">
+                <a16:creationId xmlns:a16="http://schemas.microsoft.com/office/drawing/2014/main" id="{DC598DD3-635B-4D67-ABB3-02B91E4A79B8}"/>
+              </a:ext>
+            </a:extLst>
+          </p:cNvPr>
+          <p:cNvSpPr>
+            <a:spLocks noGrp="1"/>
+          </p:cNvSpPr>
+          <p:nvPr>
+            <p:ph type="title"/>
+          </p:nvPr>
+        </p:nvSpPr>
+        <p:spPr/>
+        <p:txBody>
+          <a:bodyPr/>
+          <a:lstStyle/>
+          <a:p>
+            <a:r>
+              <a:rPr lang="en-GB" dirty="0" err="1">
+                <a:latin typeface="Arial Black" panose="020B0A04020102020204" pitchFamily="34" charset="0"/>
+              </a:rPr>
+              <a:t>FileWriter</a:t>
+            </a:r>
+            <a:r>
+              <a:rPr lang="lv-LV" dirty="0">
+                <a:latin typeface="Arial Black" panose="020B0A04020102020204" pitchFamily="34" charset="0"/>
+              </a:rPr>
+              <a:t> metodes</a:t>
+            </a:r>
+            <a:endParaRPr lang="en-GB" dirty="0">
+              <a:latin typeface="Arial Black" panose="020B0A04020102020204" pitchFamily="34" charset="0"/>
+            </a:endParaRPr>
+          </a:p>
+        </p:txBody>
+      </p:sp>
+      <p:graphicFrame>
+        <p:nvGraphicFramePr>
+          <p:cNvPr id="5" name="Table 4">
+            <a:extLst>
+              <a:ext uri="{FF2B5EF4-FFF2-40B4-BE49-F238E27FC236}">
+                <a16:creationId xmlns:a16="http://schemas.microsoft.com/office/drawing/2014/main" id="{52D92BD2-93CD-4488-BD1D-885E97C02357}"/>
+              </a:ext>
+            </a:extLst>
+          </p:cNvPr>
+          <p:cNvGraphicFramePr>
+            <a:graphicFrameLocks noGrp="1"/>
+          </p:cNvGraphicFramePr>
+          <p:nvPr>
+            <p:extLst>
+              <p:ext uri="{D42A27DB-BD31-4B8C-83A1-F6EECF244321}">
+                <p14:modId xmlns:p14="http://schemas.microsoft.com/office/powerpoint/2010/main" val="3334206858"/>
+              </p:ext>
+            </p:extLst>
+          </p:nvPr>
+        </p:nvGraphicFramePr>
+        <p:xfrm>
+          <a:off x="1053054" y="1433739"/>
+          <a:ext cx="9341247" cy="4984489"/>
+        </p:xfrm>
+        <a:graphic>
+          <a:graphicData uri="http://schemas.openxmlformats.org/drawingml/2006/table">
+            <a:tbl>
+              <a:tblPr/>
+              <a:tblGrid>
+                <a:gridCol w="3736446">
+                  <a:extLst>
+                    <a:ext uri="{9D8B030D-6E8A-4147-A177-3AD203B41FA5}">
+                      <a16:colId xmlns:a16="http://schemas.microsoft.com/office/drawing/2014/main" val="1904041200"/>
+                    </a:ext>
+                  </a:extLst>
+                </a:gridCol>
+                <a:gridCol w="5604801">
+                  <a:extLst>
+                    <a:ext uri="{9D8B030D-6E8A-4147-A177-3AD203B41FA5}">
+                      <a16:colId xmlns:a16="http://schemas.microsoft.com/office/drawing/2014/main" val="970277075"/>
+                    </a:ext>
+                  </a:extLst>
+                </a:gridCol>
+              </a:tblGrid>
+              <a:tr h="506897">
+                <a:tc>
+                  <a:txBody>
+                    <a:bodyPr/>
+                    <a:lstStyle/>
+                    <a:p>
+                      <a:pPr algn="ctr" rtl="0" fontAlgn="base"/>
+                      <a:r>
+                        <a:rPr lang="en-GB" sz="1200" b="1" dirty="0">
+                          <a:effectLst/>
+                        </a:rPr>
+                        <a:t>void write(int a)</a:t>
+                      </a:r>
+                    </a:p>
+                  </a:txBody>
+                  <a:tcPr marL="92189" marR="92189" marT="129065" marB="129065" anchor="ctr">
+                    <a:lnL w="12700" cap="flat" cmpd="sng" algn="ctr">
+                      <a:solidFill>
+                        <a:schemeClr val="tx1"/>
+                      </a:solidFill>
+                      <a:prstDash val="solid"/>
+                      <a:round/>
+                      <a:headEnd type="none" w="med" len="med"/>
+                      <a:tailEnd type="none" w="med" len="med"/>
+                    </a:lnL>
+                    <a:lnR w="12700" cap="flat" cmpd="sng" algn="ctr">
+                      <a:solidFill>
+                        <a:schemeClr val="tx1"/>
+                      </a:solidFill>
+                      <a:prstDash val="solid"/>
+                      <a:round/>
+                      <a:headEnd type="none" w="med" len="med"/>
+                      <a:tailEnd type="none" w="med" len="med"/>
+                    </a:lnR>
+                    <a:lnT w="12700" cap="flat" cmpd="sng" algn="ctr">
+                      <a:solidFill>
+                        <a:schemeClr val="tx1"/>
+                      </a:solidFill>
+                      <a:prstDash val="solid"/>
+                      <a:round/>
+                      <a:headEnd type="none" w="med" len="med"/>
+                      <a:tailEnd type="none" w="med" len="med"/>
+                    </a:lnT>
+                    <a:lnB w="12700" cap="flat" cmpd="sng" algn="ctr">
+                      <a:solidFill>
+                        <a:schemeClr val="tx1"/>
+                      </a:solidFill>
+                      <a:prstDash val="solid"/>
+                      <a:round/>
+                      <a:headEnd type="none" w="med" len="med"/>
+                      <a:tailEnd type="none" w="med" len="med"/>
+                    </a:lnB>
+                    <a:solidFill>
+                      <a:schemeClr val="bg1"/>
+                    </a:solidFill>
+                  </a:tcPr>
+                </a:tc>
+                <a:tc>
+                  <a:txBody>
+                    <a:bodyPr/>
+                    <a:lstStyle/>
+                    <a:p>
+                      <a:pPr algn="ctr" rtl="0" fontAlgn="base"/>
+                      <a:r>
+                        <a:rPr lang="lv-LV" sz="1200" b="0" dirty="0">
+                          <a:effectLst/>
+                        </a:rPr>
+                        <a:t>Raksta vienu rakstzīmi, kas norādīta ar vesela skaitļa vērtību.</a:t>
+                      </a:r>
+                      <a:endParaRPr lang="en-GB" sz="1200" b="0" dirty="0">
+                        <a:effectLst/>
+                      </a:endParaRPr>
+                    </a:p>
+                  </a:txBody>
+                  <a:tcPr marL="92189" marR="92189" marT="129065" marB="129065" anchor="ctr">
+                    <a:lnL w="12700" cap="flat" cmpd="sng" algn="ctr">
+                      <a:solidFill>
+                        <a:schemeClr val="tx1"/>
+                      </a:solidFill>
+                      <a:prstDash val="solid"/>
+                      <a:round/>
+                      <a:headEnd type="none" w="med" len="med"/>
+                      <a:tailEnd type="none" w="med" len="med"/>
+                    </a:lnL>
+                    <a:lnR w="12700" cap="flat" cmpd="sng" algn="ctr">
+                      <a:solidFill>
+                        <a:schemeClr val="tx1"/>
+                      </a:solidFill>
+                      <a:prstDash val="solid"/>
+                      <a:round/>
+                      <a:headEnd type="none" w="med" len="med"/>
+                      <a:tailEnd type="none" w="med" len="med"/>
+                    </a:lnR>
+                    <a:lnT w="12700" cap="flat" cmpd="sng" algn="ctr">
+                      <a:solidFill>
+                        <a:schemeClr val="tx1"/>
+                      </a:solidFill>
+                      <a:prstDash val="solid"/>
+                      <a:round/>
+                      <a:headEnd type="none" w="med" len="med"/>
+                      <a:tailEnd type="none" w="med" len="med"/>
+                    </a:lnT>
+                    <a:lnB w="12700" cap="flat" cmpd="sng" algn="ctr">
+                      <a:solidFill>
+                        <a:schemeClr val="tx1"/>
+                      </a:solidFill>
+                      <a:prstDash val="solid"/>
+                      <a:round/>
+                      <a:headEnd type="none" w="med" len="med"/>
+                      <a:tailEnd type="none" w="med" len="med"/>
+                    </a:lnB>
+                    <a:solidFill>
+                      <a:schemeClr val="bg1"/>
+                    </a:solidFill>
+                  </a:tcPr>
+                </a:tc>
+                <a:extLst>
+                  <a:ext uri="{0D108BD9-81ED-4DB2-BD59-A6C34878D82A}">
+                    <a16:rowId xmlns:a16="http://schemas.microsoft.com/office/drawing/2014/main" val="4007513344"/>
+                  </a:ext>
+                </a:extLst>
+              </a:tr>
+              <a:tr h="506897">
+                <a:tc>
+                  <a:txBody>
+                    <a:bodyPr/>
+                    <a:lstStyle/>
+                    <a:p>
+                      <a:pPr algn="ctr" fontAlgn="ctr"/>
+                      <a:r>
+                        <a:rPr lang="en-GB" sz="1200" b="1" dirty="0">
+                          <a:effectLst/>
+                        </a:rPr>
+                        <a:t>void write(String text)</a:t>
+                      </a:r>
+                    </a:p>
+                  </a:txBody>
+                  <a:tcPr marL="92189" marR="92189" marT="129065" marB="129065" anchor="ctr">
+                    <a:lnL w="12700" cap="flat" cmpd="sng" algn="ctr">
+                      <a:solidFill>
+                        <a:schemeClr val="tx1"/>
+                      </a:solidFill>
+                      <a:prstDash val="solid"/>
+                      <a:round/>
+                      <a:headEnd type="none" w="med" len="med"/>
+                      <a:tailEnd type="none" w="med" len="med"/>
+                    </a:lnL>
+                    <a:lnR w="12700" cap="flat" cmpd="sng" algn="ctr">
+                      <a:solidFill>
+                        <a:schemeClr val="tx1"/>
+                      </a:solidFill>
+                      <a:prstDash val="solid"/>
+                      <a:round/>
+                      <a:headEnd type="none" w="med" len="med"/>
+                      <a:tailEnd type="none" w="med" len="med"/>
+                    </a:lnR>
+                    <a:lnT w="12700" cap="flat" cmpd="sng" algn="ctr">
+                      <a:solidFill>
+                        <a:schemeClr val="tx1"/>
+                      </a:solidFill>
+                      <a:prstDash val="solid"/>
+                      <a:round/>
+                      <a:headEnd type="none" w="med" len="med"/>
+                      <a:tailEnd type="none" w="med" len="med"/>
+                    </a:lnT>
+                    <a:lnB w="12700" cap="flat" cmpd="sng" algn="ctr">
+                      <a:solidFill>
+                        <a:schemeClr val="tx1"/>
+                      </a:solidFill>
+                      <a:prstDash val="solid"/>
+                      <a:round/>
+                      <a:headEnd type="none" w="med" len="med"/>
+                      <a:tailEnd type="none" w="med" len="med"/>
+                    </a:lnB>
+                    <a:solidFill>
+                      <a:schemeClr val="bg1"/>
+                    </a:solidFill>
+                  </a:tcPr>
+                </a:tc>
+                <a:tc>
+                  <a:txBody>
+                    <a:bodyPr/>
+                    <a:lstStyle/>
+                    <a:p>
+                      <a:pPr algn="ctr" fontAlgn="ctr"/>
+                      <a:r>
+                        <a:rPr lang="en-GB" sz="1200" b="0" dirty="0" err="1">
+                          <a:effectLst/>
+                        </a:rPr>
+                        <a:t>Ierakst</a:t>
+                      </a:r>
+                      <a:r>
+                        <a:rPr lang="lv-LV" sz="1200" b="0" dirty="0">
+                          <a:effectLst/>
+                        </a:rPr>
+                        <a:t>īt</a:t>
+                      </a:r>
+                      <a:r>
+                        <a:rPr lang="en-GB" sz="1200" b="0" dirty="0">
+                          <a:effectLst/>
+                        </a:rPr>
+                        <a:t> </a:t>
+                      </a:r>
+                      <a:r>
+                        <a:rPr lang="lv-LV" sz="1200" b="0" dirty="0">
+                          <a:effectLst/>
+                        </a:rPr>
+                        <a:t>String</a:t>
+                      </a:r>
+                      <a:r>
+                        <a:rPr lang="en-GB" sz="1200" b="0" dirty="0">
+                          <a:effectLst/>
+                        </a:rPr>
+                        <a:t> </a:t>
+                      </a:r>
+                      <a:r>
+                        <a:rPr lang="en-GB" sz="1200" b="0" dirty="0" err="1">
+                          <a:effectLst/>
+                        </a:rPr>
+                        <a:t>programmā</a:t>
+                      </a:r>
+                      <a:r>
+                        <a:rPr lang="en-GB" sz="1200" b="0" dirty="0">
+                          <a:effectLst/>
+                        </a:rPr>
+                        <a:t> </a:t>
+                      </a:r>
+                      <a:r>
+                        <a:rPr lang="en-GB" sz="1200" b="0" dirty="0" err="1">
+                          <a:effectLst/>
+                        </a:rPr>
+                        <a:t>FileWriter</a:t>
+                      </a:r>
+                      <a:r>
+                        <a:rPr lang="en-GB" sz="1200" b="0" dirty="0">
+                          <a:effectLst/>
+                        </a:rPr>
+                        <a:t>.</a:t>
+                      </a:r>
+                    </a:p>
+                  </a:txBody>
+                  <a:tcPr marL="92189" marR="92189" marT="129065" marB="129065" anchor="ctr">
+                    <a:lnL w="12700" cap="flat" cmpd="sng" algn="ctr">
+                      <a:solidFill>
+                        <a:schemeClr val="tx1"/>
+                      </a:solidFill>
+                      <a:prstDash val="solid"/>
+                      <a:round/>
+                      <a:headEnd type="none" w="med" len="med"/>
+                      <a:tailEnd type="none" w="med" len="med"/>
+                    </a:lnL>
+                    <a:lnR w="12700" cap="flat" cmpd="sng" algn="ctr">
+                      <a:solidFill>
+                        <a:schemeClr val="tx1"/>
+                      </a:solidFill>
+                      <a:prstDash val="solid"/>
+                      <a:round/>
+                      <a:headEnd type="none" w="med" len="med"/>
+                      <a:tailEnd type="none" w="med" len="med"/>
+                    </a:lnR>
+                    <a:lnT w="12700" cap="flat" cmpd="sng" algn="ctr">
+                      <a:solidFill>
+                        <a:schemeClr val="tx1"/>
+                      </a:solidFill>
+                      <a:prstDash val="solid"/>
+                      <a:round/>
+                      <a:headEnd type="none" w="med" len="med"/>
+                      <a:tailEnd type="none" w="med" len="med"/>
+                    </a:lnT>
+                    <a:lnB w="12700" cap="flat" cmpd="sng" algn="ctr">
+                      <a:solidFill>
+                        <a:schemeClr val="tx1"/>
+                      </a:solidFill>
+                      <a:prstDash val="solid"/>
+                      <a:round/>
+                      <a:headEnd type="none" w="med" len="med"/>
+                      <a:tailEnd type="none" w="med" len="med"/>
+                    </a:lnB>
+                    <a:solidFill>
+                      <a:schemeClr val="bg1"/>
+                    </a:solidFill>
+                  </a:tcPr>
+                </a:tc>
+                <a:extLst>
+                  <a:ext uri="{0D108BD9-81ED-4DB2-BD59-A6C34878D82A}">
+                    <a16:rowId xmlns:a16="http://schemas.microsoft.com/office/drawing/2014/main" val="4252553073"/>
+                  </a:ext>
+                </a:extLst>
+              </a:tr>
+              <a:tr h="506897">
+                <a:tc>
+                  <a:txBody>
+                    <a:bodyPr/>
+                    <a:lstStyle/>
+                    <a:p>
+                      <a:pPr algn="ctr" fontAlgn="ctr"/>
+                      <a:r>
+                        <a:rPr lang="en-GB" sz="1200" b="1" dirty="0">
+                          <a:effectLst/>
+                        </a:rPr>
+                        <a:t>void write(char c)</a:t>
+                      </a:r>
+                    </a:p>
+                  </a:txBody>
+                  <a:tcPr marL="92189" marR="92189" marT="129065" marB="129065" anchor="ctr">
+                    <a:lnL w="12700" cap="flat" cmpd="sng" algn="ctr">
+                      <a:solidFill>
+                        <a:schemeClr val="tx1"/>
+                      </a:solidFill>
+                      <a:prstDash val="solid"/>
+                      <a:round/>
+                      <a:headEnd type="none" w="med" len="med"/>
+                      <a:tailEnd type="none" w="med" len="med"/>
+                    </a:lnL>
+                    <a:lnR w="12700" cap="flat" cmpd="sng" algn="ctr">
+                      <a:solidFill>
+                        <a:schemeClr val="tx1"/>
+                      </a:solidFill>
+                      <a:prstDash val="solid"/>
+                      <a:round/>
+                      <a:headEnd type="none" w="med" len="med"/>
+                      <a:tailEnd type="none" w="med" len="med"/>
+                    </a:lnR>
+                    <a:lnT w="12700" cap="flat" cmpd="sng" algn="ctr">
+                      <a:solidFill>
+                        <a:schemeClr val="tx1"/>
+                      </a:solidFill>
+                      <a:prstDash val="solid"/>
+                      <a:round/>
+                      <a:headEnd type="none" w="med" len="med"/>
+                      <a:tailEnd type="none" w="med" len="med"/>
+                    </a:lnT>
+                    <a:lnB w="12700" cap="flat" cmpd="sng" algn="ctr">
+                      <a:solidFill>
+                        <a:schemeClr val="tx1"/>
+                      </a:solidFill>
+                      <a:prstDash val="solid"/>
+                      <a:round/>
+                      <a:headEnd type="none" w="med" len="med"/>
+                      <a:tailEnd type="none" w="med" len="med"/>
+                    </a:lnB>
+                    <a:solidFill>
+                      <a:schemeClr val="bg1"/>
+                    </a:solidFill>
+                  </a:tcPr>
+                </a:tc>
+                <a:tc>
+                  <a:txBody>
+                    <a:bodyPr/>
+                    <a:lstStyle/>
+                    <a:p>
+                      <a:pPr algn="ctr" fontAlgn="ctr"/>
+                      <a:r>
+                        <a:rPr lang="en-GB" sz="1200" b="0" dirty="0" err="1">
+                          <a:effectLst/>
+                        </a:rPr>
+                        <a:t>Ierakst</a:t>
+                      </a:r>
+                      <a:r>
+                        <a:rPr lang="lv-LV" sz="1200" b="0" dirty="0">
+                          <a:effectLst/>
+                        </a:rPr>
+                        <a:t>ī</a:t>
+                      </a:r>
+                      <a:r>
+                        <a:rPr lang="en-GB" sz="1200" b="0" dirty="0">
+                          <a:effectLst/>
+                        </a:rPr>
+                        <a:t>t </a:t>
+                      </a:r>
+                      <a:r>
+                        <a:rPr lang="lv-LV" sz="1200" b="0" dirty="0">
+                          <a:effectLst/>
+                        </a:rPr>
+                        <a:t>char</a:t>
+                      </a:r>
+                      <a:r>
+                        <a:rPr lang="en-GB" sz="1200" b="0" dirty="0">
+                          <a:effectLst/>
+                        </a:rPr>
+                        <a:t> </a:t>
+                      </a:r>
+                      <a:r>
+                        <a:rPr lang="en-GB" sz="1200" b="0" dirty="0" err="1">
+                          <a:effectLst/>
+                        </a:rPr>
+                        <a:t>programmā</a:t>
+                      </a:r>
+                      <a:r>
+                        <a:rPr lang="en-GB" sz="1200" b="0" dirty="0">
+                          <a:effectLst/>
+                        </a:rPr>
+                        <a:t> </a:t>
+                      </a:r>
+                      <a:r>
+                        <a:rPr lang="en-GB" sz="1200" b="0" dirty="0" err="1">
+                          <a:effectLst/>
+                        </a:rPr>
+                        <a:t>FileWriter</a:t>
+                      </a:r>
+                      <a:r>
+                        <a:rPr lang="en-GB" sz="1200" b="0" dirty="0">
+                          <a:effectLst/>
+                        </a:rPr>
+                        <a:t>.</a:t>
+                      </a:r>
+                    </a:p>
+                  </a:txBody>
+                  <a:tcPr marL="92189" marR="92189" marT="129065" marB="129065" anchor="ctr">
+                    <a:lnL w="12700" cap="flat" cmpd="sng" algn="ctr">
+                      <a:solidFill>
+                        <a:schemeClr val="tx1"/>
+                      </a:solidFill>
+                      <a:prstDash val="solid"/>
+                      <a:round/>
+                      <a:headEnd type="none" w="med" len="med"/>
+                      <a:tailEnd type="none" w="med" len="med"/>
+                    </a:lnL>
+                    <a:lnR w="12700" cap="flat" cmpd="sng" algn="ctr">
+                      <a:solidFill>
+                        <a:schemeClr val="tx1"/>
+                      </a:solidFill>
+                      <a:prstDash val="solid"/>
+                      <a:round/>
+                      <a:headEnd type="none" w="med" len="med"/>
+                      <a:tailEnd type="none" w="med" len="med"/>
+                    </a:lnR>
+                    <a:lnT w="12700" cap="flat" cmpd="sng" algn="ctr">
+                      <a:solidFill>
+                        <a:schemeClr val="tx1"/>
+                      </a:solidFill>
+                      <a:prstDash val="solid"/>
+                      <a:round/>
+                      <a:headEnd type="none" w="med" len="med"/>
+                      <a:tailEnd type="none" w="med" len="med"/>
+                    </a:lnT>
+                    <a:lnB w="12700" cap="flat" cmpd="sng" algn="ctr">
+                      <a:solidFill>
+                        <a:schemeClr val="tx1"/>
+                      </a:solidFill>
+                      <a:prstDash val="solid"/>
+                      <a:round/>
+                      <a:headEnd type="none" w="med" len="med"/>
+                      <a:tailEnd type="none" w="med" len="med"/>
+                    </a:lnB>
+                    <a:solidFill>
+                      <a:schemeClr val="bg1"/>
+                    </a:solidFill>
+                  </a:tcPr>
+                </a:tc>
+                <a:extLst>
+                  <a:ext uri="{0D108BD9-81ED-4DB2-BD59-A6C34878D82A}">
+                    <a16:rowId xmlns:a16="http://schemas.microsoft.com/office/drawing/2014/main" val="3562518161"/>
+                  </a:ext>
+                </a:extLst>
+              </a:tr>
+              <a:tr h="506897">
+                <a:tc>
+                  <a:txBody>
+                    <a:bodyPr/>
+                    <a:lstStyle/>
+                    <a:p>
+                      <a:pPr algn="ctr" fontAlgn="ctr"/>
+                      <a:r>
+                        <a:rPr lang="en-GB" sz="1200" b="1" dirty="0">
+                          <a:effectLst/>
+                        </a:rPr>
+                        <a:t>void write(char[] c)</a:t>
+                      </a:r>
+                    </a:p>
+                  </a:txBody>
+                  <a:tcPr marL="92189" marR="92189" marT="129065" marB="129065" anchor="ctr">
+                    <a:lnL w="12700" cap="flat" cmpd="sng" algn="ctr">
+                      <a:solidFill>
+                        <a:schemeClr val="tx1"/>
+                      </a:solidFill>
+                      <a:prstDash val="solid"/>
+                      <a:round/>
+                      <a:headEnd type="none" w="med" len="med"/>
+                      <a:tailEnd type="none" w="med" len="med"/>
+                    </a:lnL>
+                    <a:lnR w="12700" cap="flat" cmpd="sng" algn="ctr">
+                      <a:solidFill>
+                        <a:schemeClr val="tx1"/>
+                      </a:solidFill>
+                      <a:prstDash val="solid"/>
+                      <a:round/>
+                      <a:headEnd type="none" w="med" len="med"/>
+                      <a:tailEnd type="none" w="med" len="med"/>
+                    </a:lnR>
+                    <a:lnT w="12700" cap="flat" cmpd="sng" algn="ctr">
+                      <a:solidFill>
+                        <a:schemeClr val="tx1"/>
+                      </a:solidFill>
+                      <a:prstDash val="solid"/>
+                      <a:round/>
+                      <a:headEnd type="none" w="med" len="med"/>
+                      <a:tailEnd type="none" w="med" len="med"/>
+                    </a:lnT>
+                    <a:lnB w="12700" cap="flat" cmpd="sng" algn="ctr">
+                      <a:solidFill>
+                        <a:schemeClr val="tx1"/>
+                      </a:solidFill>
+                      <a:prstDash val="solid"/>
+                      <a:round/>
+                      <a:headEnd type="none" w="med" len="med"/>
+                      <a:tailEnd type="none" w="med" len="med"/>
+                    </a:lnB>
+                    <a:solidFill>
+                      <a:schemeClr val="bg1"/>
+                    </a:solidFill>
+                  </a:tcPr>
+                </a:tc>
+                <a:tc>
+                  <a:txBody>
+                    <a:bodyPr/>
+                    <a:lstStyle/>
+                    <a:p>
+                      <a:pPr algn="ctr" fontAlgn="ctr"/>
+                      <a:r>
+                        <a:rPr lang="en-GB" sz="1200" b="0" dirty="0" err="1">
+                          <a:effectLst/>
+                        </a:rPr>
+                        <a:t>Ieraks</a:t>
+                      </a:r>
+                      <a:r>
+                        <a:rPr lang="lv-LV" sz="1200" b="0" dirty="0">
+                          <a:effectLst/>
+                        </a:rPr>
+                        <a:t>īt char </a:t>
+                      </a:r>
+                      <a:r>
+                        <a:rPr lang="en-GB" sz="1200" b="0" dirty="0" err="1">
+                          <a:effectLst/>
+                        </a:rPr>
+                        <a:t>masīvu</a:t>
+                      </a:r>
+                      <a:r>
+                        <a:rPr lang="en-GB" sz="1200" b="0" dirty="0">
+                          <a:effectLst/>
+                        </a:rPr>
+                        <a:t> </a:t>
+                      </a:r>
+                      <a:r>
+                        <a:rPr lang="en-GB" sz="1200" b="0" dirty="0" err="1">
+                          <a:effectLst/>
+                        </a:rPr>
+                        <a:t>programmā</a:t>
+                      </a:r>
+                      <a:r>
+                        <a:rPr lang="en-GB" sz="1200" b="0" dirty="0">
+                          <a:effectLst/>
+                        </a:rPr>
+                        <a:t> </a:t>
+                      </a:r>
+                      <a:r>
+                        <a:rPr lang="en-GB" sz="1200" b="0" dirty="0" err="1">
+                          <a:effectLst/>
+                        </a:rPr>
+                        <a:t>FileWriter</a:t>
+                      </a:r>
+                      <a:r>
+                        <a:rPr lang="en-GB" sz="1200" b="0" dirty="0">
+                          <a:effectLst/>
+                        </a:rPr>
+                        <a:t>.</a:t>
+                      </a:r>
+                    </a:p>
+                  </a:txBody>
+                  <a:tcPr marL="92189" marR="92189" marT="129065" marB="129065" anchor="ctr">
+                    <a:lnL w="12700" cap="flat" cmpd="sng" algn="ctr">
+                      <a:solidFill>
+                        <a:schemeClr val="tx1"/>
+                      </a:solidFill>
+                      <a:prstDash val="solid"/>
+                      <a:round/>
+                      <a:headEnd type="none" w="med" len="med"/>
+                      <a:tailEnd type="none" w="med" len="med"/>
+                    </a:lnL>
+                    <a:lnR w="12700" cap="flat" cmpd="sng" algn="ctr">
+                      <a:solidFill>
+                        <a:schemeClr val="tx1"/>
+                      </a:solidFill>
+                      <a:prstDash val="solid"/>
+                      <a:round/>
+                      <a:headEnd type="none" w="med" len="med"/>
+                      <a:tailEnd type="none" w="med" len="med"/>
+                    </a:lnR>
+                    <a:lnT w="12700" cap="flat" cmpd="sng" algn="ctr">
+                      <a:solidFill>
+                        <a:schemeClr val="tx1"/>
+                      </a:solidFill>
+                      <a:prstDash val="solid"/>
+                      <a:round/>
+                      <a:headEnd type="none" w="med" len="med"/>
+                      <a:tailEnd type="none" w="med" len="med"/>
+                    </a:lnT>
+                    <a:lnB w="12700" cap="flat" cmpd="sng" algn="ctr">
+                      <a:solidFill>
+                        <a:schemeClr val="tx1"/>
+                      </a:solidFill>
+                      <a:prstDash val="solid"/>
+                      <a:round/>
+                      <a:headEnd type="none" w="med" len="med"/>
+                      <a:tailEnd type="none" w="med" len="med"/>
+                    </a:lnB>
+                    <a:solidFill>
+                      <a:schemeClr val="bg1"/>
+                    </a:solidFill>
+                  </a:tcPr>
+                </a:tc>
+                <a:extLst>
+                  <a:ext uri="{0D108BD9-81ED-4DB2-BD59-A6C34878D82A}">
+                    <a16:rowId xmlns:a16="http://schemas.microsoft.com/office/drawing/2014/main" val="1234273586"/>
+                  </a:ext>
+                </a:extLst>
+              </a:tr>
+              <a:tr h="718105">
+                <a:tc>
+                  <a:txBody>
+                    <a:bodyPr/>
+                    <a:lstStyle/>
+                    <a:p>
+                      <a:pPr algn="ctr" rtl="0" fontAlgn="base"/>
+                      <a:r>
+                        <a:rPr lang="en-GB" sz="1200" b="1">
+                          <a:effectLst/>
+                        </a:rPr>
+                        <a:t>void write(String str, int pos, int length)</a:t>
+                      </a:r>
+                    </a:p>
+                  </a:txBody>
+                  <a:tcPr marL="92189" marR="92189" marT="129065" marB="129065" anchor="ctr">
+                    <a:lnL w="12700" cap="flat" cmpd="sng" algn="ctr">
+                      <a:solidFill>
+                        <a:schemeClr val="tx1"/>
+                      </a:solidFill>
+                      <a:prstDash val="solid"/>
+                      <a:round/>
+                      <a:headEnd type="none" w="med" len="med"/>
+                      <a:tailEnd type="none" w="med" len="med"/>
+                    </a:lnL>
+                    <a:lnR w="12700" cap="flat" cmpd="sng" algn="ctr">
+                      <a:solidFill>
+                        <a:schemeClr val="tx1"/>
+                      </a:solidFill>
+                      <a:prstDash val="solid"/>
+                      <a:round/>
+                      <a:headEnd type="none" w="med" len="med"/>
+                      <a:tailEnd type="none" w="med" len="med"/>
+                    </a:lnR>
+                    <a:lnT w="12700" cap="flat" cmpd="sng" algn="ctr">
+                      <a:solidFill>
+                        <a:schemeClr val="tx1"/>
+                      </a:solidFill>
+                      <a:prstDash val="solid"/>
+                      <a:round/>
+                      <a:headEnd type="none" w="med" len="med"/>
+                      <a:tailEnd type="none" w="med" len="med"/>
+                    </a:lnT>
+                    <a:lnB w="12700" cap="flat" cmpd="sng" algn="ctr">
+                      <a:solidFill>
+                        <a:schemeClr val="tx1"/>
+                      </a:solidFill>
+                      <a:prstDash val="solid"/>
+                      <a:round/>
+                      <a:headEnd type="none" w="med" len="med"/>
+                      <a:tailEnd type="none" w="med" len="med"/>
+                    </a:lnB>
+                    <a:solidFill>
+                      <a:schemeClr val="bg1"/>
+                    </a:solidFill>
+                  </a:tcPr>
+                </a:tc>
+                <a:tc>
+                  <a:txBody>
+                    <a:bodyPr/>
+                    <a:lstStyle/>
+                    <a:p>
+                      <a:pPr algn="ctr" rtl="0" fontAlgn="base"/>
+                      <a:r>
+                        <a:rPr lang="lv-LV" sz="1200" b="0" dirty="0">
+                          <a:effectLst/>
+                        </a:rPr>
+                        <a:t>Ieraksta String daļu no pozīcijas pos līdz length char skaitam.</a:t>
+                      </a:r>
+                      <a:endParaRPr lang="en-GB" sz="1200" b="0" dirty="0">
+                        <a:effectLst/>
+                      </a:endParaRPr>
+                    </a:p>
+                  </a:txBody>
+                  <a:tcPr marL="92189" marR="92189" marT="129065" marB="129065" anchor="ctr">
+                    <a:lnL w="12700" cap="flat" cmpd="sng" algn="ctr">
+                      <a:solidFill>
+                        <a:schemeClr val="tx1"/>
+                      </a:solidFill>
+                      <a:prstDash val="solid"/>
+                      <a:round/>
+                      <a:headEnd type="none" w="med" len="med"/>
+                      <a:tailEnd type="none" w="med" len="med"/>
+                    </a:lnL>
+                    <a:lnR w="12700" cap="flat" cmpd="sng" algn="ctr">
+                      <a:solidFill>
+                        <a:schemeClr val="tx1"/>
+                      </a:solidFill>
+                      <a:prstDash val="solid"/>
+                      <a:round/>
+                      <a:headEnd type="none" w="med" len="med"/>
+                      <a:tailEnd type="none" w="med" len="med"/>
+                    </a:lnR>
+                    <a:lnT w="12700" cap="flat" cmpd="sng" algn="ctr">
+                      <a:solidFill>
+                        <a:schemeClr val="tx1"/>
+                      </a:solidFill>
+                      <a:prstDash val="solid"/>
+                      <a:round/>
+                      <a:headEnd type="none" w="med" len="med"/>
+                      <a:tailEnd type="none" w="med" len="med"/>
+                    </a:lnT>
+                    <a:lnB w="12700" cap="flat" cmpd="sng" algn="ctr">
+                      <a:solidFill>
+                        <a:schemeClr val="tx1"/>
+                      </a:solidFill>
+                      <a:prstDash val="solid"/>
+                      <a:round/>
+                      <a:headEnd type="none" w="med" len="med"/>
+                      <a:tailEnd type="none" w="med" len="med"/>
+                    </a:lnB>
+                    <a:solidFill>
+                      <a:schemeClr val="bg1"/>
+                    </a:solidFill>
+                  </a:tcPr>
+                </a:tc>
+                <a:extLst>
+                  <a:ext uri="{0D108BD9-81ED-4DB2-BD59-A6C34878D82A}">
+                    <a16:rowId xmlns:a16="http://schemas.microsoft.com/office/drawing/2014/main" val="3764082134"/>
+                  </a:ext>
+                </a:extLst>
+              </a:tr>
+              <a:tr h="718105">
+                <a:tc>
+                  <a:txBody>
+                    <a:bodyPr/>
+                    <a:lstStyle/>
+                    <a:p>
+                      <a:pPr algn="ctr" rtl="0" fontAlgn="base"/>
+                      <a:r>
+                        <a:rPr lang="en-GB" sz="1200" b="1">
+                          <a:effectLst/>
+                        </a:rPr>
+                        <a:t>void write(char ch[], int pos, int length)</a:t>
+                      </a:r>
+                    </a:p>
+                  </a:txBody>
+                  <a:tcPr marL="92189" marR="92189" marT="129065" marB="129065" anchor="ctr">
+                    <a:lnL w="12700" cap="flat" cmpd="sng" algn="ctr">
+                      <a:solidFill>
+                        <a:schemeClr val="tx1"/>
+                      </a:solidFill>
+                      <a:prstDash val="solid"/>
+                      <a:round/>
+                      <a:headEnd type="none" w="med" len="med"/>
+                      <a:tailEnd type="none" w="med" len="med"/>
+                    </a:lnL>
+                    <a:lnR w="12700" cap="flat" cmpd="sng" algn="ctr">
+                      <a:solidFill>
+                        <a:schemeClr val="tx1"/>
+                      </a:solidFill>
+                      <a:prstDash val="solid"/>
+                      <a:round/>
+                      <a:headEnd type="none" w="med" len="med"/>
+                      <a:tailEnd type="none" w="med" len="med"/>
+                    </a:lnR>
+                    <a:lnT w="12700" cap="flat" cmpd="sng" algn="ctr">
+                      <a:solidFill>
+                        <a:schemeClr val="tx1"/>
+                      </a:solidFill>
+                      <a:prstDash val="solid"/>
+                      <a:round/>
+                      <a:headEnd type="none" w="med" len="med"/>
+                      <a:tailEnd type="none" w="med" len="med"/>
+                    </a:lnT>
+                    <a:lnB w="12700" cap="flat" cmpd="sng" algn="ctr">
+                      <a:solidFill>
+                        <a:schemeClr val="tx1"/>
+                      </a:solidFill>
+                      <a:prstDash val="solid"/>
+                      <a:round/>
+                      <a:headEnd type="none" w="med" len="med"/>
+                      <a:tailEnd type="none" w="med" len="med"/>
+                    </a:lnB>
+                    <a:solidFill>
+                      <a:schemeClr val="bg1"/>
+                    </a:solidFill>
+                  </a:tcPr>
+                </a:tc>
+                <a:tc>
+                  <a:txBody>
+                    <a:bodyPr/>
+                    <a:lstStyle/>
+                    <a:p>
+                      <a:pPr algn="ctr" rtl="0" fontAlgn="base"/>
+                      <a:r>
+                        <a:rPr lang="en-GB" sz="1200" b="0" dirty="0" err="1">
+                          <a:effectLst/>
+                        </a:rPr>
+                        <a:t>Ieraksta</a:t>
+                      </a:r>
+                      <a:r>
+                        <a:rPr lang="en-GB" sz="1200" b="0" dirty="0">
+                          <a:effectLst/>
+                        </a:rPr>
+                        <a:t> </a:t>
+                      </a:r>
+                      <a:r>
+                        <a:rPr lang="lv-LV" sz="1200" b="0" dirty="0">
+                          <a:effectLst/>
+                        </a:rPr>
+                        <a:t>char</a:t>
+                      </a:r>
+                      <a:r>
+                        <a:rPr lang="en-GB" sz="1200" b="0" dirty="0">
+                          <a:effectLst/>
+                        </a:rPr>
+                        <a:t> </a:t>
+                      </a:r>
+                      <a:r>
+                        <a:rPr lang="en-GB" sz="1200" b="0" dirty="0" err="1">
+                          <a:effectLst/>
+                        </a:rPr>
+                        <a:t>pozīciju</a:t>
+                      </a:r>
+                      <a:r>
+                        <a:rPr lang="en-GB" sz="1200" b="0" dirty="0">
+                          <a:effectLst/>
+                        </a:rPr>
+                        <a:t> no </a:t>
+                      </a:r>
+                      <a:r>
+                        <a:rPr lang="en-GB" sz="1200" b="0" dirty="0" err="1">
+                          <a:effectLst/>
+                        </a:rPr>
+                        <a:t>masīva</a:t>
+                      </a:r>
+                      <a:r>
+                        <a:rPr lang="en-GB" sz="1200" b="0" dirty="0">
+                          <a:effectLst/>
+                        </a:rPr>
+                        <a:t> </a:t>
+                      </a:r>
+                      <a:r>
+                        <a:rPr lang="en-GB" sz="1200" b="0" dirty="0" err="1">
+                          <a:effectLst/>
+                        </a:rPr>
+                        <a:t>ch</a:t>
+                      </a:r>
+                      <a:r>
+                        <a:rPr lang="en-GB" sz="1200" b="0" dirty="0">
+                          <a:effectLst/>
+                        </a:rPr>
+                        <a:t>[] no </a:t>
+                      </a:r>
+                      <a:r>
+                        <a:rPr lang="en-GB" sz="1200" b="0" dirty="0" err="1">
+                          <a:effectLst/>
+                        </a:rPr>
+                        <a:t>pozīcijas</a:t>
+                      </a:r>
+                      <a:r>
+                        <a:rPr lang="en-GB" sz="1200" b="0" dirty="0">
+                          <a:effectLst/>
+                        </a:rPr>
+                        <a:t> </a:t>
+                      </a:r>
+                      <a:r>
+                        <a:rPr lang="en-GB" sz="1200" b="0" dirty="0" err="1">
+                          <a:effectLst/>
+                        </a:rPr>
+                        <a:t>pos</a:t>
+                      </a:r>
+                      <a:r>
+                        <a:rPr lang="en-GB" sz="1200" b="0" dirty="0">
+                          <a:effectLst/>
+                        </a:rPr>
+                        <a:t> </a:t>
+                      </a:r>
+                      <a:r>
+                        <a:rPr lang="en-GB" sz="1200" b="0" dirty="0" err="1">
+                          <a:effectLst/>
+                        </a:rPr>
+                        <a:t>līdz</a:t>
+                      </a:r>
+                      <a:r>
+                        <a:rPr lang="en-GB" sz="1200" b="0" dirty="0">
+                          <a:effectLst/>
+                        </a:rPr>
+                        <a:t> </a:t>
+                      </a:r>
+                      <a:r>
+                        <a:rPr lang="lv-LV" sz="1200" b="0" dirty="0">
+                          <a:effectLst/>
+                        </a:rPr>
+                        <a:t>rakstzīmju</a:t>
+                      </a:r>
+                      <a:r>
+                        <a:rPr lang="en-GB" sz="1200" b="0" dirty="0">
+                          <a:effectLst/>
+                        </a:rPr>
+                        <a:t> </a:t>
+                      </a:r>
+                      <a:r>
+                        <a:rPr lang="en-GB" sz="1200" b="0" dirty="0" err="1">
+                          <a:effectLst/>
+                        </a:rPr>
+                        <a:t>skaitlim</a:t>
+                      </a:r>
+                      <a:r>
+                        <a:rPr lang="en-GB" sz="1200" b="0" dirty="0">
+                          <a:effectLst/>
+                        </a:rPr>
+                        <a:t>.</a:t>
+                      </a:r>
+                    </a:p>
+                  </a:txBody>
+                  <a:tcPr marL="92189" marR="92189" marT="129065" marB="129065" anchor="ctr">
+                    <a:lnL w="12700" cap="flat" cmpd="sng" algn="ctr">
+                      <a:solidFill>
+                        <a:schemeClr val="tx1"/>
+                      </a:solidFill>
+                      <a:prstDash val="solid"/>
+                      <a:round/>
+                      <a:headEnd type="none" w="med" len="med"/>
+                      <a:tailEnd type="none" w="med" len="med"/>
+                    </a:lnL>
+                    <a:lnR w="12700" cap="flat" cmpd="sng" algn="ctr">
+                      <a:solidFill>
+                        <a:schemeClr val="tx1"/>
+                      </a:solidFill>
+                      <a:prstDash val="solid"/>
+                      <a:round/>
+                      <a:headEnd type="none" w="med" len="med"/>
+                      <a:tailEnd type="none" w="med" len="med"/>
+                    </a:lnR>
+                    <a:lnT w="12700" cap="flat" cmpd="sng" algn="ctr">
+                      <a:solidFill>
+                        <a:schemeClr val="tx1"/>
+                      </a:solidFill>
+                      <a:prstDash val="solid"/>
+                      <a:round/>
+                      <a:headEnd type="none" w="med" len="med"/>
+                      <a:tailEnd type="none" w="med" len="med"/>
+                    </a:lnT>
+                    <a:lnB w="12700" cap="flat" cmpd="sng" algn="ctr">
+                      <a:solidFill>
+                        <a:schemeClr val="tx1"/>
+                      </a:solidFill>
+                      <a:prstDash val="solid"/>
+                      <a:round/>
+                      <a:headEnd type="none" w="med" len="med"/>
+                      <a:tailEnd type="none" w="med" len="med"/>
+                    </a:lnB>
+                    <a:solidFill>
+                      <a:schemeClr val="bg1"/>
+                    </a:solidFill>
+                  </a:tcPr>
+                </a:tc>
+                <a:extLst>
+                  <a:ext uri="{0D108BD9-81ED-4DB2-BD59-A6C34878D82A}">
+                    <a16:rowId xmlns:a16="http://schemas.microsoft.com/office/drawing/2014/main" val="1828371154"/>
+                  </a:ext>
+                </a:extLst>
+              </a:tr>
+              <a:tr h="506897">
+                <a:tc>
+                  <a:txBody>
+                    <a:bodyPr/>
+                    <a:lstStyle/>
+                    <a:p>
+                      <a:pPr algn="ctr" fontAlgn="ctr"/>
+                      <a:r>
+                        <a:rPr lang="en-GB" sz="1200" b="1">
+                          <a:effectLst/>
+                        </a:rPr>
+                        <a:t>void flush()</a:t>
+                      </a:r>
+                    </a:p>
+                  </a:txBody>
+                  <a:tcPr marL="92189" marR="92189" marT="129065" marB="129065" anchor="ctr">
+                    <a:lnL w="12700" cap="flat" cmpd="sng" algn="ctr">
+                      <a:solidFill>
+                        <a:schemeClr val="tx1"/>
+                      </a:solidFill>
+                      <a:prstDash val="solid"/>
+                      <a:round/>
+                      <a:headEnd type="none" w="med" len="med"/>
+                      <a:tailEnd type="none" w="med" len="med"/>
+                    </a:lnL>
+                    <a:lnR w="12700" cap="flat" cmpd="sng" algn="ctr">
+                      <a:solidFill>
+                        <a:schemeClr val="tx1"/>
+                      </a:solidFill>
+                      <a:prstDash val="solid"/>
+                      <a:round/>
+                      <a:headEnd type="none" w="med" len="med"/>
+                      <a:tailEnd type="none" w="med" len="med"/>
+                    </a:lnR>
+                    <a:lnT w="12700" cap="flat" cmpd="sng" algn="ctr">
+                      <a:solidFill>
+                        <a:schemeClr val="tx1"/>
+                      </a:solidFill>
+                      <a:prstDash val="solid"/>
+                      <a:round/>
+                      <a:headEnd type="none" w="med" len="med"/>
+                      <a:tailEnd type="none" w="med" len="med"/>
+                    </a:lnT>
+                    <a:lnB w="12700" cap="flat" cmpd="sng" algn="ctr">
+                      <a:solidFill>
+                        <a:schemeClr val="tx1"/>
+                      </a:solidFill>
+                      <a:prstDash val="solid"/>
+                      <a:round/>
+                      <a:headEnd type="none" w="med" len="med"/>
+                      <a:tailEnd type="none" w="med" len="med"/>
+                    </a:lnB>
+                    <a:solidFill>
+                      <a:schemeClr val="bg1"/>
+                    </a:solidFill>
+                  </a:tcPr>
+                </a:tc>
+                <a:tc>
+                  <a:txBody>
+                    <a:bodyPr/>
+                    <a:lstStyle/>
+                    <a:p>
+                      <a:pPr algn="ctr" fontAlgn="ctr"/>
+                      <a:r>
+                        <a:rPr lang="en-GB" sz="1200" b="0" dirty="0" err="1">
+                          <a:effectLst/>
+                        </a:rPr>
+                        <a:t>Izdzēš</a:t>
+                      </a:r>
+                      <a:r>
+                        <a:rPr lang="en-GB" sz="1200" b="0" dirty="0">
+                          <a:effectLst/>
+                        </a:rPr>
+                        <a:t> </a:t>
+                      </a:r>
+                      <a:r>
+                        <a:rPr lang="en-GB" sz="1200" b="0" dirty="0" err="1">
+                          <a:effectLst/>
+                        </a:rPr>
+                        <a:t>FileWriter</a:t>
+                      </a:r>
+                      <a:r>
+                        <a:rPr lang="en-GB" sz="1200" b="0" dirty="0">
+                          <a:effectLst/>
+                        </a:rPr>
+                        <a:t> </a:t>
+                      </a:r>
+                      <a:r>
+                        <a:rPr lang="en-GB" sz="1200" b="0" dirty="0" err="1">
+                          <a:effectLst/>
+                        </a:rPr>
+                        <a:t>datus</a:t>
+                      </a:r>
+                      <a:r>
+                        <a:rPr lang="en-GB" sz="1200" b="0" dirty="0">
+                          <a:effectLst/>
+                        </a:rPr>
+                        <a:t>.</a:t>
+                      </a:r>
+                    </a:p>
+                  </a:txBody>
+                  <a:tcPr marL="92189" marR="92189" marT="129065" marB="129065" anchor="ctr">
+                    <a:lnL w="12700" cap="flat" cmpd="sng" algn="ctr">
+                      <a:solidFill>
+                        <a:schemeClr val="tx1"/>
+                      </a:solidFill>
+                      <a:prstDash val="solid"/>
+                      <a:round/>
+                      <a:headEnd type="none" w="med" len="med"/>
+                      <a:tailEnd type="none" w="med" len="med"/>
+                    </a:lnL>
+                    <a:lnR w="12700" cap="flat" cmpd="sng" algn="ctr">
+                      <a:solidFill>
+                        <a:schemeClr val="tx1"/>
+                      </a:solidFill>
+                      <a:prstDash val="solid"/>
+                      <a:round/>
+                      <a:headEnd type="none" w="med" len="med"/>
+                      <a:tailEnd type="none" w="med" len="med"/>
+                    </a:lnR>
+                    <a:lnT w="12700" cap="flat" cmpd="sng" algn="ctr">
+                      <a:solidFill>
+                        <a:schemeClr val="tx1"/>
+                      </a:solidFill>
+                      <a:prstDash val="solid"/>
+                      <a:round/>
+                      <a:headEnd type="none" w="med" len="med"/>
+                      <a:tailEnd type="none" w="med" len="med"/>
+                    </a:lnT>
+                    <a:lnB w="12700" cap="flat" cmpd="sng" algn="ctr">
+                      <a:solidFill>
+                        <a:schemeClr val="tx1"/>
+                      </a:solidFill>
+                      <a:prstDash val="solid"/>
+                      <a:round/>
+                      <a:headEnd type="none" w="med" len="med"/>
+                      <a:tailEnd type="none" w="med" len="med"/>
+                    </a:lnB>
+                    <a:solidFill>
+                      <a:schemeClr val="bg1"/>
+                    </a:solidFill>
+                  </a:tcPr>
+                </a:tc>
+                <a:extLst>
+                  <a:ext uri="{0D108BD9-81ED-4DB2-BD59-A6C34878D82A}">
+                    <a16:rowId xmlns:a16="http://schemas.microsoft.com/office/drawing/2014/main" val="1394201916"/>
+                  </a:ext>
+                </a:extLst>
+              </a:tr>
+              <a:tr h="506897">
+                <a:tc>
+                  <a:txBody>
+                    <a:bodyPr/>
+                    <a:lstStyle/>
+                    <a:p>
+                      <a:pPr algn="ctr" fontAlgn="ctr"/>
+                      <a:r>
+                        <a:rPr lang="en-GB" sz="1200" b="1">
+                          <a:effectLst/>
+                        </a:rPr>
+                        <a:t>void close()</a:t>
+                      </a:r>
+                    </a:p>
+                  </a:txBody>
+                  <a:tcPr marL="92189" marR="92189" marT="129065" marB="129065" anchor="ctr">
+                    <a:lnL w="12700" cap="flat" cmpd="sng" algn="ctr">
+                      <a:solidFill>
+                        <a:schemeClr val="tx1"/>
+                      </a:solidFill>
+                      <a:prstDash val="solid"/>
+                      <a:round/>
+                      <a:headEnd type="none" w="med" len="med"/>
+                      <a:tailEnd type="none" w="med" len="med"/>
+                    </a:lnL>
+                    <a:lnR w="12700" cap="flat" cmpd="sng" algn="ctr">
+                      <a:solidFill>
+                        <a:schemeClr val="tx1"/>
+                      </a:solidFill>
+                      <a:prstDash val="solid"/>
+                      <a:round/>
+                      <a:headEnd type="none" w="med" len="med"/>
+                      <a:tailEnd type="none" w="med" len="med"/>
+                    </a:lnR>
+                    <a:lnT w="12700" cap="flat" cmpd="sng" algn="ctr">
+                      <a:solidFill>
+                        <a:schemeClr val="tx1"/>
+                      </a:solidFill>
+                      <a:prstDash val="solid"/>
+                      <a:round/>
+                      <a:headEnd type="none" w="med" len="med"/>
+                      <a:tailEnd type="none" w="med" len="med"/>
+                    </a:lnT>
+                    <a:lnB w="12700" cap="flat" cmpd="sng" algn="ctr">
+                      <a:solidFill>
+                        <a:schemeClr val="tx1"/>
+                      </a:solidFill>
+                      <a:prstDash val="solid"/>
+                      <a:round/>
+                      <a:headEnd type="none" w="med" len="med"/>
+                      <a:tailEnd type="none" w="med" len="med"/>
+                    </a:lnB>
+                    <a:solidFill>
+                      <a:schemeClr val="bg1"/>
+                    </a:solidFill>
+                  </a:tcPr>
+                </a:tc>
+                <a:tc>
+                  <a:txBody>
+                    <a:bodyPr/>
+                    <a:lstStyle/>
+                    <a:p>
+                      <a:pPr algn="ctr" fontAlgn="ctr"/>
+                      <a:r>
+                        <a:rPr lang="en-GB" sz="1200" b="0" dirty="0" err="1">
+                          <a:effectLst/>
+                        </a:rPr>
+                        <a:t>Aizver</a:t>
+                      </a:r>
+                      <a:r>
+                        <a:rPr lang="en-GB" sz="1200" b="0" dirty="0">
+                          <a:effectLst/>
+                        </a:rPr>
+                        <a:t> </a:t>
+                      </a:r>
+                      <a:r>
+                        <a:rPr lang="en-GB" sz="1200" b="0" dirty="0" err="1">
+                          <a:effectLst/>
+                        </a:rPr>
+                        <a:t>failu</a:t>
+                      </a:r>
+                      <a:r>
+                        <a:rPr lang="en-GB" sz="1200" b="0" dirty="0">
+                          <a:effectLst/>
+                        </a:rPr>
+                        <a:t> </a:t>
+                      </a:r>
+                      <a:r>
+                        <a:rPr lang="en-GB" sz="1200" b="0" dirty="0" err="1">
+                          <a:effectLst/>
+                        </a:rPr>
+                        <a:t>rakstītāju</a:t>
+                      </a:r>
+                      <a:r>
+                        <a:rPr lang="en-GB" sz="1200" b="0" dirty="0">
+                          <a:effectLst/>
+                        </a:rPr>
+                        <a:t>.</a:t>
+                      </a:r>
+                    </a:p>
+                  </a:txBody>
+                  <a:tcPr marL="92189" marR="92189" marT="129065" marB="129065" anchor="ctr">
+                    <a:lnL w="12700" cap="flat" cmpd="sng" algn="ctr">
+                      <a:solidFill>
+                        <a:schemeClr val="tx1"/>
+                      </a:solidFill>
+                      <a:prstDash val="solid"/>
+                      <a:round/>
+                      <a:headEnd type="none" w="med" len="med"/>
+                      <a:tailEnd type="none" w="med" len="med"/>
+                    </a:lnL>
+                    <a:lnR w="12700" cap="flat" cmpd="sng" algn="ctr">
+                      <a:solidFill>
+                        <a:schemeClr val="tx1"/>
+                      </a:solidFill>
+                      <a:prstDash val="solid"/>
+                      <a:round/>
+                      <a:headEnd type="none" w="med" len="med"/>
+                      <a:tailEnd type="none" w="med" len="med"/>
+                    </a:lnR>
+                    <a:lnT w="12700" cap="flat" cmpd="sng" algn="ctr">
+                      <a:solidFill>
+                        <a:schemeClr val="tx1"/>
+                      </a:solidFill>
+                      <a:prstDash val="solid"/>
+                      <a:round/>
+                      <a:headEnd type="none" w="med" len="med"/>
+                      <a:tailEnd type="none" w="med" len="med"/>
+                    </a:lnT>
+                    <a:lnB w="12700" cap="flat" cmpd="sng" algn="ctr">
+                      <a:solidFill>
+                        <a:schemeClr val="tx1"/>
+                      </a:solidFill>
+                      <a:prstDash val="solid"/>
+                      <a:round/>
+                      <a:headEnd type="none" w="med" len="med"/>
+                      <a:tailEnd type="none" w="med" len="med"/>
+                    </a:lnB>
+                    <a:solidFill>
+                      <a:schemeClr val="bg1"/>
+                    </a:solidFill>
+                  </a:tcPr>
+                </a:tc>
+                <a:extLst>
+                  <a:ext uri="{0D108BD9-81ED-4DB2-BD59-A6C34878D82A}">
+                    <a16:rowId xmlns:a16="http://schemas.microsoft.com/office/drawing/2014/main" val="2781280223"/>
+                  </a:ext>
+                </a:extLst>
+              </a:tr>
+              <a:tr h="506897">
+                <a:tc>
+                  <a:txBody>
+                    <a:bodyPr/>
+                    <a:lstStyle/>
+                    <a:p>
+                      <a:pPr algn="ctr" rtl="0" fontAlgn="base"/>
+                      <a:r>
+                        <a:rPr lang="en-GB" sz="1200" b="1" dirty="0">
+                          <a:effectLst/>
+                        </a:rPr>
+                        <a:t>int </a:t>
+                      </a:r>
+                      <a:r>
+                        <a:rPr lang="en-GB" sz="1200" b="1" dirty="0" err="1">
+                          <a:effectLst/>
+                        </a:rPr>
+                        <a:t>getEncoding</a:t>
+                      </a:r>
+                      <a:r>
+                        <a:rPr lang="en-GB" sz="1200" b="1" dirty="0">
+                          <a:effectLst/>
+                        </a:rPr>
+                        <a:t>()</a:t>
+                      </a:r>
+                    </a:p>
+                  </a:txBody>
+                  <a:tcPr marL="92189" marR="92189" marT="129065" marB="129065" anchor="ctr">
+                    <a:lnL w="12700" cap="flat" cmpd="sng" algn="ctr">
+                      <a:solidFill>
+                        <a:schemeClr val="tx1"/>
+                      </a:solidFill>
+                      <a:prstDash val="solid"/>
+                      <a:round/>
+                      <a:headEnd type="none" w="med" len="med"/>
+                      <a:tailEnd type="none" w="med" len="med"/>
+                    </a:lnL>
+                    <a:lnR w="12700" cap="flat" cmpd="sng" algn="ctr">
+                      <a:solidFill>
+                        <a:schemeClr val="tx1"/>
+                      </a:solidFill>
+                      <a:prstDash val="solid"/>
+                      <a:round/>
+                      <a:headEnd type="none" w="med" len="med"/>
+                      <a:tailEnd type="none" w="med" len="med"/>
+                    </a:lnR>
+                    <a:lnT w="12700" cap="flat" cmpd="sng" algn="ctr">
+                      <a:solidFill>
+                        <a:schemeClr val="tx1"/>
+                      </a:solidFill>
+                      <a:prstDash val="solid"/>
+                      <a:round/>
+                      <a:headEnd type="none" w="med" len="med"/>
+                      <a:tailEnd type="none" w="med" len="med"/>
+                    </a:lnT>
+                    <a:lnB w="12700" cap="flat" cmpd="sng" algn="ctr">
+                      <a:solidFill>
+                        <a:schemeClr val="tx1"/>
+                      </a:solidFill>
+                      <a:prstDash val="solid"/>
+                      <a:round/>
+                      <a:headEnd type="none" w="med" len="med"/>
+                      <a:tailEnd type="none" w="med" len="med"/>
+                    </a:lnB>
+                    <a:solidFill>
+                      <a:schemeClr val="bg1"/>
+                    </a:solidFill>
+                  </a:tcPr>
+                </a:tc>
+                <a:tc>
+                  <a:txBody>
+                    <a:bodyPr/>
+                    <a:lstStyle/>
+                    <a:p>
+                      <a:pPr algn="ctr" rtl="0" fontAlgn="base"/>
+                      <a:r>
+                        <a:rPr lang="en-GB" sz="1200" b="0" dirty="0" err="1">
+                          <a:effectLst/>
+                        </a:rPr>
+                        <a:t>Atgriež</a:t>
+                      </a:r>
+                      <a:r>
+                        <a:rPr lang="en-GB" sz="1200" b="0" dirty="0">
+                          <a:effectLst/>
+                        </a:rPr>
+                        <a:t> </a:t>
+                      </a:r>
+                      <a:r>
+                        <a:rPr lang="en-GB" sz="1200" b="0" dirty="0" err="1">
+                          <a:effectLst/>
+                        </a:rPr>
+                        <a:t>FileWriter</a:t>
+                      </a:r>
+                      <a:r>
+                        <a:rPr lang="en-GB" sz="1200" b="0" dirty="0">
+                          <a:effectLst/>
+                        </a:rPr>
+                        <a:t> </a:t>
+                      </a:r>
+                      <a:r>
+                        <a:rPr lang="en-GB" sz="1200" b="0" dirty="0" err="1">
+                          <a:effectLst/>
+                        </a:rPr>
+                        <a:t>izmantoto</a:t>
+                      </a:r>
+                      <a:r>
+                        <a:rPr lang="en-GB" sz="1200" b="0" dirty="0">
+                          <a:effectLst/>
+                        </a:rPr>
+                        <a:t> </a:t>
+                      </a:r>
+                      <a:r>
+                        <a:rPr lang="en-GB" sz="1200" b="0" dirty="0" err="1">
+                          <a:effectLst/>
+                        </a:rPr>
+                        <a:t>rakstzīmju</a:t>
+                      </a:r>
+                      <a:r>
+                        <a:rPr lang="en-GB" sz="1200" b="0" dirty="0">
+                          <a:effectLst/>
+                        </a:rPr>
+                        <a:t> </a:t>
+                      </a:r>
+                      <a:r>
+                        <a:rPr lang="en-GB" sz="1200" b="0" dirty="0" err="1">
+                          <a:effectLst/>
+                        </a:rPr>
+                        <a:t>kodējumu</a:t>
+                      </a:r>
+                      <a:r>
+                        <a:rPr lang="en-GB" sz="1200" b="0" dirty="0">
+                          <a:effectLst/>
+                        </a:rPr>
+                        <a:t>.</a:t>
+                      </a:r>
+                    </a:p>
+                  </a:txBody>
+                  <a:tcPr marL="92189" marR="92189" marT="129065" marB="129065" anchor="ctr">
+                    <a:lnL w="12700" cap="flat" cmpd="sng" algn="ctr">
+                      <a:solidFill>
+                        <a:schemeClr val="tx1"/>
+                      </a:solidFill>
+                      <a:prstDash val="solid"/>
+                      <a:round/>
+                      <a:headEnd type="none" w="med" len="med"/>
+                      <a:tailEnd type="none" w="med" len="med"/>
+                    </a:lnL>
+                    <a:lnR w="12700" cap="flat" cmpd="sng" algn="ctr">
+                      <a:solidFill>
+                        <a:schemeClr val="tx1"/>
+                      </a:solidFill>
+                      <a:prstDash val="solid"/>
+                      <a:round/>
+                      <a:headEnd type="none" w="med" len="med"/>
+                      <a:tailEnd type="none" w="med" len="med"/>
+                    </a:lnR>
+                    <a:lnT w="12700" cap="flat" cmpd="sng" algn="ctr">
+                      <a:solidFill>
+                        <a:schemeClr val="tx1"/>
+                      </a:solidFill>
+                      <a:prstDash val="solid"/>
+                      <a:round/>
+                      <a:headEnd type="none" w="med" len="med"/>
+                      <a:tailEnd type="none" w="med" len="med"/>
+                    </a:lnT>
+                    <a:lnB w="12700" cap="flat" cmpd="sng" algn="ctr">
+                      <a:solidFill>
+                        <a:schemeClr val="tx1"/>
+                      </a:solidFill>
+                      <a:prstDash val="solid"/>
+                      <a:round/>
+                      <a:headEnd type="none" w="med" len="med"/>
+                      <a:tailEnd type="none" w="med" len="med"/>
+                    </a:lnB>
+                    <a:solidFill>
+                      <a:schemeClr val="bg1"/>
+                    </a:solidFill>
+                  </a:tcPr>
+                </a:tc>
+                <a:extLst>
+                  <a:ext uri="{0D108BD9-81ED-4DB2-BD59-A6C34878D82A}">
+                    <a16:rowId xmlns:a16="http://schemas.microsoft.com/office/drawing/2014/main" val="2327422801"/>
+                  </a:ext>
+                </a:extLst>
+              </a:tr>
+            </a:tbl>
+          </a:graphicData>
+        </a:graphic>
+      </p:graphicFrame>
+    </p:spTree>
+    <p:extLst>
+      <p:ext uri="{BB962C8B-B14F-4D97-AF65-F5344CB8AC3E}">
+        <p14:creationId xmlns:p14="http://schemas.microsoft.com/office/powerpoint/2010/main" val="106921199"/>
       </p:ext>
     </p:extLst>
   </p:cSld>

</xml_diff>

<commit_message>
Pievienota FileReader informācija mācību materiālam
</commit_message>
<xml_diff>
--- a/MacibuMaterials.pptx
+++ b/MacibuMaterials.pptx
@@ -15,6 +15,10 @@
     <p:sldId id="263" r:id="rId9"/>
     <p:sldId id="264" r:id="rId10"/>
     <p:sldId id="265" r:id="rId11"/>
+    <p:sldId id="266" r:id="rId12"/>
+    <p:sldId id="268" r:id="rId13"/>
+    <p:sldId id="269" r:id="rId14"/>
+    <p:sldId id="270" r:id="rId15"/>
   </p:sldIdLst>
   <p:sldSz cx="12192000" cy="6858000"/>
   <p:notesSz cx="6858000" cy="9144000"/>
@@ -126,18 +130,18 @@
   <pc:docChgLst>
     <pc:chgData name="Rihards Mikuts" userId="3f680863f303c92b" providerId="LiveId" clId="{7ECA00DE-8CB5-4FFD-8DC5-57B39CF038BB}"/>
     <pc:docChg chg="undo custSel addSld delSld modSld">
-      <pc:chgData name="Rihards Mikuts" userId="3f680863f303c92b" providerId="LiveId" clId="{7ECA00DE-8CB5-4FFD-8DC5-57B39CF038BB}" dt="2025-06-06T10:36:39.064" v="738" actId="20577"/>
+      <pc:chgData name="Rihards Mikuts" userId="3f680863f303c92b" providerId="LiveId" clId="{7ECA00DE-8CB5-4FFD-8DC5-57B39CF038BB}" dt="2025-06-06T13:53:50.926" v="1270" actId="27636"/>
       <pc:docMkLst>
         <pc:docMk/>
       </pc:docMkLst>
       <pc:sldChg chg="modSp mod setBg">
-        <pc:chgData name="Rihards Mikuts" userId="3f680863f303c92b" providerId="LiveId" clId="{7ECA00DE-8CB5-4FFD-8DC5-57B39CF038BB}" dt="2025-06-05T14:47:25.250" v="41"/>
+        <pc:chgData name="Rihards Mikuts" userId="3f680863f303c92b" providerId="LiveId" clId="{7ECA00DE-8CB5-4FFD-8DC5-57B39CF038BB}" dt="2025-06-06T13:53:50.926" v="1270" actId="27636"/>
         <pc:sldMkLst>
           <pc:docMk/>
           <pc:sldMk cId="1020096247" sldId="256"/>
         </pc:sldMkLst>
         <pc:spChg chg="mod">
-          <ac:chgData name="Rihards Mikuts" userId="3f680863f303c92b" providerId="LiveId" clId="{7ECA00DE-8CB5-4FFD-8DC5-57B39CF038BB}" dt="2025-06-05T14:46:49.506" v="30"/>
+          <ac:chgData name="Rihards Mikuts" userId="3f680863f303c92b" providerId="LiveId" clId="{7ECA00DE-8CB5-4FFD-8DC5-57B39CF038BB}" dt="2025-06-06T13:53:50.926" v="1270" actId="27636"/>
           <ac:spMkLst>
             <pc:docMk/>
             <pc:sldMk cId="1020096247" sldId="256"/>
@@ -260,8 +264,8 @@
           </ac:picMkLst>
         </pc:picChg>
       </pc:sldChg>
-      <pc:sldChg chg="modSp new mod setBg">
-        <pc:chgData name="Rihards Mikuts" userId="3f680863f303c92b" providerId="LiveId" clId="{7ECA00DE-8CB5-4FFD-8DC5-57B39CF038BB}" dt="2025-06-06T09:53:53.993" v="445" actId="2711"/>
+      <pc:sldChg chg="addSp delSp modSp new mod setBg">
+        <pc:chgData name="Rihards Mikuts" userId="3f680863f303c92b" providerId="LiveId" clId="{7ECA00DE-8CB5-4FFD-8DC5-57B39CF038BB}" dt="2025-06-06T13:53:27.142" v="1268" actId="207"/>
         <pc:sldMkLst>
           <pc:docMk/>
           <pc:sldMk cId="2234697324" sldId="259"/>
@@ -282,6 +286,38 @@
             <ac:spMk id="3" creationId="{DD2D8840-CC0E-49E7-93B7-354209F90F28}"/>
           </ac:spMkLst>
         </pc:spChg>
+        <pc:spChg chg="add del">
+          <ac:chgData name="Rihards Mikuts" userId="3f680863f303c92b" providerId="LiveId" clId="{7ECA00DE-8CB5-4FFD-8DC5-57B39CF038BB}" dt="2025-06-06T13:52:56.674" v="1182" actId="11529"/>
+          <ac:spMkLst>
+            <pc:docMk/>
+            <pc:sldMk cId="2234697324" sldId="259"/>
+            <ac:spMk id="6" creationId="{B6763835-0EB3-4A9C-9752-F7683C85AB73}"/>
+          </ac:spMkLst>
+        </pc:spChg>
+        <pc:spChg chg="add del">
+          <ac:chgData name="Rihards Mikuts" userId="3f680863f303c92b" providerId="LiveId" clId="{7ECA00DE-8CB5-4FFD-8DC5-57B39CF038BB}" dt="2025-06-06T13:53:04.325" v="1184" actId="11529"/>
+          <ac:spMkLst>
+            <pc:docMk/>
+            <pc:sldMk cId="2234697324" sldId="259"/>
+            <ac:spMk id="7" creationId="{2095F39B-D91B-4BB7-8A30-E4D4DDBDFA50}"/>
+          </ac:spMkLst>
+        </pc:spChg>
+        <pc:spChg chg="add mod">
+          <ac:chgData name="Rihards Mikuts" userId="3f680863f303c92b" providerId="LiveId" clId="{7ECA00DE-8CB5-4FFD-8DC5-57B39CF038BB}" dt="2025-06-06T13:53:27.142" v="1268" actId="207"/>
+          <ac:spMkLst>
+            <pc:docMk/>
+            <pc:sldMk cId="2234697324" sldId="259"/>
+            <ac:spMk id="8" creationId="{2DF34273-B3C1-419F-B84A-FB0571C34C4B}"/>
+          </ac:spMkLst>
+        </pc:spChg>
+        <pc:picChg chg="add mod">
+          <ac:chgData name="Rihards Mikuts" userId="3f680863f303c92b" providerId="LiveId" clId="{7ECA00DE-8CB5-4FFD-8DC5-57B39CF038BB}" dt="2025-06-06T13:52:44.400" v="1180" actId="1076"/>
+          <ac:picMkLst>
+            <pc:docMk/>
+            <pc:sldMk cId="2234697324" sldId="259"/>
+            <ac:picMk id="5" creationId="{3AF2A5AC-D608-4F1A-920E-BCB39EF7A62E}"/>
+          </ac:picMkLst>
+        </pc:picChg>
       </pc:sldChg>
       <pc:sldChg chg="addSp modSp add mod setBg">
         <pc:chgData name="Rihards Mikuts" userId="3f680863f303c92b" providerId="LiveId" clId="{7ECA00DE-8CB5-4FFD-8DC5-57B39CF038BB}" dt="2025-06-06T10:27:55.903" v="623" actId="20577"/>
@@ -391,7 +427,7 @@
         </pc:spChg>
       </pc:sldChg>
       <pc:sldChg chg="addSp delSp modSp add mod setBg">
-        <pc:chgData name="Rihards Mikuts" userId="3f680863f303c92b" providerId="LiveId" clId="{7ECA00DE-8CB5-4FFD-8DC5-57B39CF038BB}" dt="2025-06-06T10:36:39.064" v="738" actId="20577"/>
+        <pc:chgData name="Rihards Mikuts" userId="3f680863f303c92b" providerId="LiveId" clId="{7ECA00DE-8CB5-4FFD-8DC5-57B39CF038BB}" dt="2025-06-06T13:40:07.552" v="1040" actId="20577"/>
         <pc:sldMkLst>
           <pc:docMk/>
           <pc:sldMk cId="106921199" sldId="264"/>
@@ -421,7 +457,7 @@
           </ac:spMkLst>
         </pc:spChg>
         <pc:graphicFrameChg chg="add mod modGraphic">
-          <ac:chgData name="Rihards Mikuts" userId="3f680863f303c92b" providerId="LiveId" clId="{7ECA00DE-8CB5-4FFD-8DC5-57B39CF038BB}" dt="2025-06-06T10:36:39.064" v="738" actId="20577"/>
+          <ac:chgData name="Rihards Mikuts" userId="3f680863f303c92b" providerId="LiveId" clId="{7ECA00DE-8CB5-4FFD-8DC5-57B39CF038BB}" dt="2025-06-06T13:40:07.552" v="1040" actId="20577"/>
           <ac:graphicFrameMkLst>
             <pc:docMk/>
             <pc:sldMk cId="106921199" sldId="264"/>
@@ -523,6 +559,231 @@
             <ac:picMk id="6" creationId="{EA26F3C6-2861-4F60-9613-B5891D0AFEFA}"/>
           </ac:picMkLst>
         </pc:picChg>
+      </pc:sldChg>
+      <pc:sldChg chg="addSp modSp add mod setBg">
+        <pc:chgData name="Rihards Mikuts" userId="3f680863f303c92b" providerId="LiveId" clId="{7ECA00DE-8CB5-4FFD-8DC5-57B39CF038BB}" dt="2025-06-06T13:49:59.564" v="1159" actId="20577"/>
+        <pc:sldMkLst>
+          <pc:docMk/>
+          <pc:sldMk cId="2180219127" sldId="266"/>
+        </pc:sldMkLst>
+        <pc:spChg chg="mod">
+          <ac:chgData name="Rihards Mikuts" userId="3f680863f303c92b" providerId="LiveId" clId="{7ECA00DE-8CB5-4FFD-8DC5-57B39CF038BB}" dt="2025-06-06T13:24:31.791" v="746" actId="20577"/>
+          <ac:spMkLst>
+            <pc:docMk/>
+            <pc:sldMk cId="2180219127" sldId="266"/>
+            <ac:spMk id="2" creationId="{DC598DD3-635B-4D67-ABB3-02B91E4A79B8}"/>
+          </ac:spMkLst>
+        </pc:spChg>
+        <pc:spChg chg="mod">
+          <ac:chgData name="Rihards Mikuts" userId="3f680863f303c92b" providerId="LiveId" clId="{7ECA00DE-8CB5-4FFD-8DC5-57B39CF038BB}" dt="2025-06-06T13:49:59.564" v="1159" actId="20577"/>
+          <ac:spMkLst>
+            <pc:docMk/>
+            <pc:sldMk cId="2180219127" sldId="266"/>
+            <ac:spMk id="3" creationId="{DD2D8840-CC0E-49E7-93B7-354209F90F28}"/>
+          </ac:spMkLst>
+        </pc:spChg>
+        <pc:picChg chg="add mod">
+          <ac:chgData name="Rihards Mikuts" userId="3f680863f303c92b" providerId="LiveId" clId="{7ECA00DE-8CB5-4FFD-8DC5-57B39CF038BB}" dt="2025-06-06T13:49:40.828" v="1138" actId="1076"/>
+          <ac:picMkLst>
+            <pc:docMk/>
+            <pc:sldMk cId="2180219127" sldId="266"/>
+            <ac:picMk id="5" creationId="{89259CD2-4039-4846-A768-5A7DCB68A5A2}"/>
+          </ac:picMkLst>
+        </pc:picChg>
+      </pc:sldChg>
+      <pc:sldChg chg="modSp add del mod setBg">
+        <pc:chgData name="Rihards Mikuts" userId="3f680863f303c92b" providerId="LiveId" clId="{7ECA00DE-8CB5-4FFD-8DC5-57B39CF038BB}" dt="2025-06-06T13:37:30.380" v="884" actId="47"/>
+        <pc:sldMkLst>
+          <pc:docMk/>
+          <pc:sldMk cId="744650477" sldId="267"/>
+        </pc:sldMkLst>
+        <pc:spChg chg="mod">
+          <ac:chgData name="Rihards Mikuts" userId="3f680863f303c92b" providerId="LiveId" clId="{7ECA00DE-8CB5-4FFD-8DC5-57B39CF038BB}" dt="2025-06-06T13:31:47.892" v="763" actId="20577"/>
+          <ac:spMkLst>
+            <pc:docMk/>
+            <pc:sldMk cId="744650477" sldId="267"/>
+            <ac:spMk id="3" creationId="{DD2D8840-CC0E-49E7-93B7-354209F90F28}"/>
+          </ac:spMkLst>
+        </pc:spChg>
+      </pc:sldChg>
+      <pc:sldChg chg="addSp delSp modSp add mod setBg">
+        <pc:chgData name="Rihards Mikuts" userId="3f680863f303c92b" providerId="LiveId" clId="{7ECA00DE-8CB5-4FFD-8DC5-57B39CF038BB}" dt="2025-06-06T13:33:32.504" v="776" actId="1076"/>
+        <pc:sldMkLst>
+          <pc:docMk/>
+          <pc:sldMk cId="442892207" sldId="268"/>
+        </pc:sldMkLst>
+        <pc:spChg chg="del mod">
+          <ac:chgData name="Rihards Mikuts" userId="3f680863f303c92b" providerId="LiveId" clId="{7ECA00DE-8CB5-4FFD-8DC5-57B39CF038BB}" dt="2025-06-06T13:33:22.492" v="770" actId="478"/>
+          <ac:spMkLst>
+            <pc:docMk/>
+            <pc:sldMk cId="442892207" sldId="268"/>
+            <ac:spMk id="3" creationId="{DD2D8840-CC0E-49E7-93B7-354209F90F28}"/>
+          </ac:spMkLst>
+        </pc:spChg>
+        <pc:picChg chg="add mod">
+          <ac:chgData name="Rihards Mikuts" userId="3f680863f303c92b" providerId="LiveId" clId="{7ECA00DE-8CB5-4FFD-8DC5-57B39CF038BB}" dt="2025-06-06T13:33:32.504" v="776" actId="1076"/>
+          <ac:picMkLst>
+            <pc:docMk/>
+            <pc:sldMk cId="442892207" sldId="268"/>
+            <ac:picMk id="1026" creationId="{7079237B-D366-48BF-8E9A-CF5CE7DB97F4}"/>
+          </ac:picMkLst>
+        </pc:picChg>
+      </pc:sldChg>
+      <pc:sldChg chg="add del setBg">
+        <pc:chgData name="Rihards Mikuts" userId="3f680863f303c92b" providerId="LiveId" clId="{7ECA00DE-8CB5-4FFD-8DC5-57B39CF038BB}" dt="2025-06-06T13:33:15.695" v="768"/>
+        <pc:sldMkLst>
+          <pc:docMk/>
+          <pc:sldMk cId="1375696645" sldId="269"/>
+        </pc:sldMkLst>
+      </pc:sldChg>
+      <pc:sldChg chg="addSp delSp modSp add mod setBg">
+        <pc:chgData name="Rihards Mikuts" userId="3f680863f303c92b" providerId="LiveId" clId="{7ECA00DE-8CB5-4FFD-8DC5-57B39CF038BB}" dt="2025-06-06T13:41:32.369" v="1055"/>
+        <pc:sldMkLst>
+          <pc:docMk/>
+          <pc:sldMk cId="2707643133" sldId="269"/>
+        </pc:sldMkLst>
+        <pc:graphicFrameChg chg="add mod modGraphic">
+          <ac:chgData name="Rihards Mikuts" userId="3f680863f303c92b" providerId="LiveId" clId="{7ECA00DE-8CB5-4FFD-8DC5-57B39CF038BB}" dt="2025-06-06T13:41:32.369" v="1055"/>
+          <ac:graphicFrameMkLst>
+            <pc:docMk/>
+            <pc:sldMk cId="2707643133" sldId="269"/>
+            <ac:graphicFrameMk id="3" creationId="{AFDE064D-AD54-4AA0-8B03-69897DA07933}"/>
+          </ac:graphicFrameMkLst>
+        </pc:graphicFrameChg>
+        <pc:picChg chg="del mod">
+          <ac:chgData name="Rihards Mikuts" userId="3f680863f303c92b" providerId="LiveId" clId="{7ECA00DE-8CB5-4FFD-8DC5-57B39CF038BB}" dt="2025-06-06T13:34:09.424" v="779" actId="478"/>
+          <ac:picMkLst>
+            <pc:docMk/>
+            <pc:sldMk cId="2707643133" sldId="269"/>
+            <ac:picMk id="1026" creationId="{7079237B-D366-48BF-8E9A-CF5CE7DB97F4}"/>
+          </ac:picMkLst>
+        </pc:picChg>
+      </pc:sldChg>
+      <pc:sldChg chg="addSp delSp modSp add mod setBg">
+        <pc:chgData name="Rihards Mikuts" userId="3f680863f303c92b" providerId="LiveId" clId="{7ECA00DE-8CB5-4FFD-8DC5-57B39CF038BB}" dt="2025-06-06T13:51:06.474" v="1176" actId="20577"/>
+        <pc:sldMkLst>
+          <pc:docMk/>
+          <pc:sldMk cId="1046302628" sldId="270"/>
+        </pc:sldMkLst>
+        <pc:spChg chg="mod">
+          <ac:chgData name="Rihards Mikuts" userId="3f680863f303c92b" providerId="LiveId" clId="{7ECA00DE-8CB5-4FFD-8DC5-57B39CF038BB}" dt="2025-06-06T13:45:22.916" v="1079" actId="20577"/>
+          <ac:spMkLst>
+            <pc:docMk/>
+            <pc:sldMk cId="1046302628" sldId="270"/>
+            <ac:spMk id="2" creationId="{DC598DD3-635B-4D67-ABB3-02B91E4A79B8}"/>
+          </ac:spMkLst>
+        </pc:spChg>
+        <pc:spChg chg="add del">
+          <ac:chgData name="Rihards Mikuts" userId="3f680863f303c92b" providerId="LiveId" clId="{7ECA00DE-8CB5-4FFD-8DC5-57B39CF038BB}" dt="2025-06-06T13:50:53.795" v="1172"/>
+          <ac:spMkLst>
+            <pc:docMk/>
+            <pc:sldMk cId="1046302628" sldId="270"/>
+            <ac:spMk id="5" creationId="{35F936F9-F3A5-41B8-AC79-3F56D29DDAD3}"/>
+          </ac:spMkLst>
+        </pc:spChg>
+        <pc:spChg chg="del">
+          <ac:chgData name="Rihards Mikuts" userId="3f680863f303c92b" providerId="LiveId" clId="{7ECA00DE-8CB5-4FFD-8DC5-57B39CF038BB}" dt="2025-06-06T13:44:57.851" v="1064" actId="478"/>
+          <ac:spMkLst>
+            <pc:docMk/>
+            <pc:sldMk cId="1046302628" sldId="270"/>
+            <ac:spMk id="7" creationId="{C2F71542-39DB-45F2-96DC-8578AC061E2C}"/>
+          </ac:spMkLst>
+        </pc:spChg>
+        <pc:spChg chg="del">
+          <ac:chgData name="Rihards Mikuts" userId="3f680863f303c92b" providerId="LiveId" clId="{7ECA00DE-8CB5-4FFD-8DC5-57B39CF038BB}" dt="2025-06-06T13:44:56.345" v="1063" actId="478"/>
+          <ac:spMkLst>
+            <pc:docMk/>
+            <pc:sldMk cId="1046302628" sldId="270"/>
+            <ac:spMk id="10" creationId="{5477F512-192B-4DCB-8050-E184E7CD47CE}"/>
+          </ac:spMkLst>
+        </pc:spChg>
+        <pc:spChg chg="del">
+          <ac:chgData name="Rihards Mikuts" userId="3f680863f303c92b" providerId="LiveId" clId="{7ECA00DE-8CB5-4FFD-8DC5-57B39CF038BB}" dt="2025-06-06T13:45:01.997" v="1068" actId="478"/>
+          <ac:spMkLst>
+            <pc:docMk/>
+            <pc:sldMk cId="1046302628" sldId="270"/>
+            <ac:spMk id="11" creationId="{D5BEB802-8659-401E-A5FE-8FF0C326933B}"/>
+          </ac:spMkLst>
+        </pc:spChg>
+        <pc:spChg chg="del mod">
+          <ac:chgData name="Rihards Mikuts" userId="3f680863f303c92b" providerId="LiveId" clId="{7ECA00DE-8CB5-4FFD-8DC5-57B39CF038BB}" dt="2025-06-06T13:45:01.059" v="1067" actId="478"/>
+          <ac:spMkLst>
+            <pc:docMk/>
+            <pc:sldMk cId="1046302628" sldId="270"/>
+            <ac:spMk id="12" creationId="{6688717F-41EB-40BE-882D-F2D77669D1E7}"/>
+          </ac:spMkLst>
+        </pc:spChg>
+        <pc:spChg chg="del">
+          <ac:chgData name="Rihards Mikuts" userId="3f680863f303c92b" providerId="LiveId" clId="{7ECA00DE-8CB5-4FFD-8DC5-57B39CF038BB}" dt="2025-06-06T13:44:59.428" v="1065" actId="478"/>
+          <ac:spMkLst>
+            <pc:docMk/>
+            <pc:sldMk cId="1046302628" sldId="270"/>
+            <ac:spMk id="13" creationId="{CA4D9355-EF21-462A-8252-3E98D9F10781}"/>
+          </ac:spMkLst>
+        </pc:spChg>
+        <pc:spChg chg="mod ord">
+          <ac:chgData name="Rihards Mikuts" userId="3f680863f303c92b" providerId="LiveId" clId="{7ECA00DE-8CB5-4FFD-8DC5-57B39CF038BB}" dt="2025-06-06T13:48:54.491" v="1131" actId="1076"/>
+          <ac:spMkLst>
+            <pc:docMk/>
+            <pc:sldMk cId="1046302628" sldId="270"/>
+            <ac:spMk id="14" creationId="{969A0587-3715-40FD-A4D8-5B13A67E33D7}"/>
+          </ac:spMkLst>
+        </pc:spChg>
+        <pc:spChg chg="add del mod">
+          <ac:chgData name="Rihards Mikuts" userId="3f680863f303c92b" providerId="LiveId" clId="{7ECA00DE-8CB5-4FFD-8DC5-57B39CF038BB}" dt="2025-06-06T13:48:36.749" v="1126" actId="478"/>
+          <ac:spMkLst>
+            <pc:docMk/>
+            <pc:sldMk cId="1046302628" sldId="270"/>
+            <ac:spMk id="15" creationId="{6C5F82A3-11B4-4437-BBB8-8432384E9BE3}"/>
+          </ac:spMkLst>
+        </pc:spChg>
+        <pc:spChg chg="add mod">
+          <ac:chgData name="Rihards Mikuts" userId="3f680863f303c92b" providerId="LiveId" clId="{7ECA00DE-8CB5-4FFD-8DC5-57B39CF038BB}" dt="2025-06-06T13:48:46.164" v="1129"/>
+          <ac:spMkLst>
+            <pc:docMk/>
+            <pc:sldMk cId="1046302628" sldId="270"/>
+            <ac:spMk id="16" creationId="{E8636EBE-C8C6-4028-86DF-732A753A99AC}"/>
+          </ac:spMkLst>
+        </pc:spChg>
+        <pc:spChg chg="add mod">
+          <ac:chgData name="Rihards Mikuts" userId="3f680863f303c92b" providerId="LiveId" clId="{7ECA00DE-8CB5-4FFD-8DC5-57B39CF038BB}" dt="2025-06-06T13:50:39.312" v="1169" actId="1076"/>
+          <ac:spMkLst>
+            <pc:docMk/>
+            <pc:sldMk cId="1046302628" sldId="270"/>
+            <ac:spMk id="17" creationId="{2D336839-2B93-4E84-9A23-B1EED9F8038C}"/>
+          </ac:spMkLst>
+        </pc:spChg>
+        <pc:spChg chg="add mod">
+          <ac:chgData name="Rihards Mikuts" userId="3f680863f303c92b" providerId="LiveId" clId="{7ECA00DE-8CB5-4FFD-8DC5-57B39CF038BB}" dt="2025-06-06T13:51:06.474" v="1176" actId="20577"/>
+          <ac:spMkLst>
+            <pc:docMk/>
+            <pc:sldMk cId="1046302628" sldId="270"/>
+            <ac:spMk id="18" creationId="{76960569-1D59-4DB6-8432-7173CD895E9A}"/>
+          </ac:spMkLst>
+        </pc:spChg>
+        <pc:picChg chg="add mod">
+          <ac:chgData name="Rihards Mikuts" userId="3f680863f303c92b" providerId="LiveId" clId="{7ECA00DE-8CB5-4FFD-8DC5-57B39CF038BB}" dt="2025-06-06T13:48:15.465" v="1122" actId="1076"/>
+          <ac:picMkLst>
+            <pc:docMk/>
+            <pc:sldMk cId="1046302628" sldId="270"/>
+            <ac:picMk id="4" creationId="{1E4DF905-7E0D-4631-92C8-80BB8ACFD602}"/>
+          </ac:picMkLst>
+        </pc:picChg>
+        <pc:picChg chg="del">
+          <ac:chgData name="Rihards Mikuts" userId="3f680863f303c92b" providerId="LiveId" clId="{7ECA00DE-8CB5-4FFD-8DC5-57B39CF038BB}" dt="2025-06-06T13:44:42.016" v="1058" actId="478"/>
+          <ac:picMkLst>
+            <pc:docMk/>
+            <pc:sldMk cId="1046302628" sldId="270"/>
+            <ac:picMk id="6" creationId="{EA26F3C6-2861-4F60-9613-B5891D0AFEFA}"/>
+          </ac:picMkLst>
+        </pc:picChg>
+      </pc:sldChg>
+      <pc:sldChg chg="add del setBg">
+        <pc:chgData name="Rihards Mikuts" userId="3f680863f303c92b" providerId="LiveId" clId="{7ECA00DE-8CB5-4FFD-8DC5-57B39CF038BB}" dt="2025-06-06T13:34:10.481" v="781"/>
+        <pc:sldMkLst>
+          <pc:docMk/>
+          <pc:sldMk cId="2847428810" sldId="270"/>
+        </pc:sldMkLst>
       </pc:sldChg>
     </pc:docChg>
   </pc:docChgLst>
@@ -3415,55 +3676,81 @@
         </p:nvSpPr>
         <p:spPr/>
         <p:txBody>
-          <a:bodyPr/>
+          <a:bodyPr>
+            <a:normAutofit fontScale="90000"/>
+          </a:bodyPr>
           <a:lstStyle/>
           <a:p>
             <a:r>
-              <a:rPr lang="en-GB" dirty="0" err="1"/>
+              <a:rPr lang="en-GB" dirty="0" err="1">
+                <a:latin typeface="Arial Black" panose="020B0A04020102020204" pitchFamily="34" charset="0"/>
+              </a:rPr>
               <a:t>Darbs</a:t>
             </a:r>
             <a:r>
-              <a:rPr lang="en-GB" dirty="0"/>
+              <a:rPr lang="en-GB" dirty="0">
+                <a:latin typeface="Arial Black" panose="020B0A04020102020204" pitchFamily="34" charset="0"/>
+              </a:rPr>
               <a:t> </a:t>
             </a:r>
             <a:r>
-              <a:rPr lang="en-GB" dirty="0" err="1"/>
+              <a:rPr lang="en-GB" dirty="0" err="1">
+                <a:latin typeface="Arial Black" panose="020B0A04020102020204" pitchFamily="34" charset="0"/>
+              </a:rPr>
               <a:t>ar</a:t>
             </a:r>
             <a:r>
-              <a:rPr lang="en-GB" dirty="0"/>
+              <a:rPr lang="en-GB" dirty="0">
+                <a:latin typeface="Arial Black" panose="020B0A04020102020204" pitchFamily="34" charset="0"/>
+              </a:rPr>
               <a:t> </a:t>
             </a:r>
             <a:r>
-              <a:rPr lang="en-GB" dirty="0" err="1"/>
+              <a:rPr lang="en-GB" dirty="0" err="1">
+                <a:latin typeface="Arial Black" panose="020B0A04020102020204" pitchFamily="34" charset="0"/>
+              </a:rPr>
               <a:t>teksta</a:t>
             </a:r>
             <a:r>
-              <a:rPr lang="en-GB" dirty="0"/>
+              <a:rPr lang="en-GB" dirty="0">
+                <a:latin typeface="Arial Black" panose="020B0A04020102020204" pitchFamily="34" charset="0"/>
+              </a:rPr>
               <a:t> </a:t>
             </a:r>
             <a:r>
-              <a:rPr lang="en-GB" dirty="0" err="1"/>
+              <a:rPr lang="en-GB" dirty="0" err="1">
+                <a:latin typeface="Arial Black" panose="020B0A04020102020204" pitchFamily="34" charset="0"/>
+              </a:rPr>
               <a:t>datnēm</a:t>
             </a:r>
             <a:r>
-              <a:rPr lang="en-GB" dirty="0"/>
+              <a:rPr lang="en-GB" dirty="0">
+                <a:latin typeface="Arial Black" panose="020B0A04020102020204" pitchFamily="34" charset="0"/>
+              </a:rPr>
               <a:t> </a:t>
             </a:r>
             <a:r>
-              <a:rPr lang="en-GB" dirty="0" err="1"/>
+              <a:rPr lang="en-GB" dirty="0" err="1">
+                <a:latin typeface="Arial Black" panose="020B0A04020102020204" pitchFamily="34" charset="0"/>
+              </a:rPr>
               <a:t>programmēšanas</a:t>
             </a:r>
             <a:r>
-              <a:rPr lang="en-GB" dirty="0"/>
+              <a:rPr lang="en-GB" dirty="0">
+                <a:latin typeface="Arial Black" panose="020B0A04020102020204" pitchFamily="34" charset="0"/>
+              </a:rPr>
               <a:t> </a:t>
             </a:r>
             <a:r>
-              <a:rPr lang="en-GB" dirty="0" err="1"/>
+              <a:rPr lang="en-GB" dirty="0" err="1">
+                <a:latin typeface="Arial Black" panose="020B0A04020102020204" pitchFamily="34" charset="0"/>
+              </a:rPr>
               <a:t>valodā</a:t>
             </a:r>
             <a:r>
-              <a:rPr lang="en-GB" dirty="0"/>
+              <a:rPr lang="en-GB" dirty="0">
+                <a:latin typeface="Arial Black" panose="020B0A04020102020204" pitchFamily="34" charset="0"/>
+              </a:rPr>
               <a:t> Java</a:t>
             </a:r>
           </a:p>
@@ -4162,6 +4449,2469 @@
     <p:extLst>
       <p:ext uri="{BB962C8B-B14F-4D97-AF65-F5344CB8AC3E}">
         <p14:creationId xmlns:p14="http://schemas.microsoft.com/office/powerpoint/2010/main" val="1155189427"/>
+      </p:ext>
+    </p:extLst>
+  </p:cSld>
+  <p:clrMapOvr>
+    <a:masterClrMapping/>
+  </p:clrMapOvr>
+</p:sld>
+</file>
+
+<file path=ppt/slides/slide11.xml><?xml version="1.0" encoding="utf-8"?>
+<p:sld xmlns:a="http://schemas.openxmlformats.org/drawingml/2006/main" xmlns:r="http://schemas.openxmlformats.org/officeDocument/2006/relationships" xmlns:p="http://schemas.openxmlformats.org/presentationml/2006/main">
+  <p:cSld>
+    <p:bg>
+      <p:bgPr>
+        <a:solidFill>
+          <a:schemeClr val="accent6">
+            <a:lumMod val="20000"/>
+            <a:lumOff val="80000"/>
+          </a:schemeClr>
+        </a:solidFill>
+        <a:effectLst/>
+      </p:bgPr>
+    </p:bg>
+    <p:spTree>
+      <p:nvGrpSpPr>
+        <p:cNvPr id="1" name=""/>
+        <p:cNvGrpSpPr/>
+        <p:nvPr/>
+      </p:nvGrpSpPr>
+      <p:grpSpPr>
+        <a:xfrm>
+          <a:off x="0" y="0"/>
+          <a:ext cx="0" cy="0"/>
+          <a:chOff x="0" y="0"/>
+          <a:chExt cx="0" cy="0"/>
+        </a:xfrm>
+      </p:grpSpPr>
+      <p:sp>
+        <p:nvSpPr>
+          <p:cNvPr id="2" name="Title 1">
+            <a:extLst>
+              <a:ext uri="{FF2B5EF4-FFF2-40B4-BE49-F238E27FC236}">
+                <a16:creationId xmlns:a16="http://schemas.microsoft.com/office/drawing/2014/main" id="{DC598DD3-635B-4D67-ABB3-02B91E4A79B8}"/>
+              </a:ext>
+            </a:extLst>
+          </p:cNvPr>
+          <p:cNvSpPr>
+            <a:spLocks noGrp="1"/>
+          </p:cNvSpPr>
+          <p:nvPr>
+            <p:ph type="title"/>
+          </p:nvPr>
+        </p:nvSpPr>
+        <p:spPr/>
+        <p:txBody>
+          <a:bodyPr/>
+          <a:lstStyle/>
+          <a:p>
+            <a:r>
+              <a:rPr lang="en-GB" dirty="0">
+                <a:latin typeface="Arial Black" panose="020B0A04020102020204" pitchFamily="34" charset="0"/>
+              </a:rPr>
+              <a:t>File</a:t>
+            </a:r>
+            <a:r>
+              <a:rPr lang="lv-LV" dirty="0">
+                <a:latin typeface="Arial Black" panose="020B0A04020102020204" pitchFamily="34" charset="0"/>
+              </a:rPr>
+              <a:t>Reader</a:t>
+            </a:r>
+            <a:endParaRPr lang="en-GB" dirty="0">
+              <a:latin typeface="Arial Black" panose="020B0A04020102020204" pitchFamily="34" charset="0"/>
+            </a:endParaRPr>
+          </a:p>
+        </p:txBody>
+      </p:sp>
+      <p:sp>
+        <p:nvSpPr>
+          <p:cNvPr id="3" name="Content Placeholder 2">
+            <a:extLst>
+              <a:ext uri="{FF2B5EF4-FFF2-40B4-BE49-F238E27FC236}">
+                <a16:creationId xmlns:a16="http://schemas.microsoft.com/office/drawing/2014/main" id="{DD2D8840-CC0E-49E7-93B7-354209F90F28}"/>
+              </a:ext>
+            </a:extLst>
+          </p:cNvPr>
+          <p:cNvSpPr>
+            <a:spLocks noGrp="1"/>
+          </p:cNvSpPr>
+          <p:nvPr>
+            <p:ph idx="1"/>
+          </p:nvPr>
+        </p:nvSpPr>
+        <p:spPr/>
+        <p:txBody>
+          <a:bodyPr>
+            <a:normAutofit/>
+          </a:bodyPr>
+          <a:lstStyle/>
+          <a:p>
+            <a:pPr marL="0" indent="0">
+              <a:buNone/>
+            </a:pPr>
+            <a:r>
+              <a:rPr lang="lv-LV" dirty="0"/>
+              <a:t>FileReader programmā Java ir klase java.io pakotnē, ko var izmantot, lai nolasītu rakstzīmju plūsmu no failiem. Java IO FileReader klase dekodēšanai no baitiem uz rakstzīmēm izmanto vai nu norādīto rakstzīmju kopu, vai platformas noklusējuma rakstzīmju kopu.</a:t>
+            </a:r>
+          </a:p>
+          <a:p>
+            <a:pPr marL="0" indent="0">
+              <a:buNone/>
+            </a:pPr>
+            <a:r>
+              <a:rPr lang="lv-LV" dirty="0"/>
+              <a:t>Lai pievienot FileReader:</a:t>
+            </a:r>
+          </a:p>
+        </p:txBody>
+      </p:sp>
+      <p:pic>
+        <p:nvPicPr>
+          <p:cNvPr id="5" name="Picture 4">
+            <a:extLst>
+              <a:ext uri="{FF2B5EF4-FFF2-40B4-BE49-F238E27FC236}">
+                <a16:creationId xmlns:a16="http://schemas.microsoft.com/office/drawing/2014/main" id="{89259CD2-4039-4846-A768-5A7DCB68A5A2}"/>
+              </a:ext>
+            </a:extLst>
+          </p:cNvPr>
+          <p:cNvPicPr>
+            <a:picLocks noChangeAspect="1"/>
+          </p:cNvPicPr>
+          <p:nvPr/>
+        </p:nvPicPr>
+        <p:blipFill>
+          <a:blip r:embed="rId2"/>
+          <a:stretch>
+            <a:fillRect/>
+          </a:stretch>
+        </p:blipFill>
+        <p:spPr>
+          <a:xfrm>
+            <a:off x="2083451" y="5031320"/>
+            <a:ext cx="8355770" cy="501733"/>
+          </a:xfrm>
+          <a:prstGeom prst="rect">
+            <a:avLst/>
+          </a:prstGeom>
+        </p:spPr>
+      </p:pic>
+    </p:spTree>
+    <p:extLst>
+      <p:ext uri="{BB962C8B-B14F-4D97-AF65-F5344CB8AC3E}">
+        <p14:creationId xmlns:p14="http://schemas.microsoft.com/office/powerpoint/2010/main" val="2180219127"/>
+      </p:ext>
+    </p:extLst>
+  </p:cSld>
+  <p:clrMapOvr>
+    <a:masterClrMapping/>
+  </p:clrMapOvr>
+</p:sld>
+</file>
+
+<file path=ppt/slides/slide12.xml><?xml version="1.0" encoding="utf-8"?>
+<p:sld xmlns:a="http://schemas.openxmlformats.org/drawingml/2006/main" xmlns:r="http://schemas.openxmlformats.org/officeDocument/2006/relationships" xmlns:p="http://schemas.openxmlformats.org/presentationml/2006/main">
+  <p:cSld>
+    <p:bg>
+      <p:bgPr>
+        <a:solidFill>
+          <a:schemeClr val="accent6">
+            <a:lumMod val="20000"/>
+            <a:lumOff val="80000"/>
+          </a:schemeClr>
+        </a:solidFill>
+        <a:effectLst/>
+      </p:bgPr>
+    </p:bg>
+    <p:spTree>
+      <p:nvGrpSpPr>
+        <p:cNvPr id="1" name=""/>
+        <p:cNvGrpSpPr/>
+        <p:nvPr/>
+      </p:nvGrpSpPr>
+      <p:grpSpPr>
+        <a:xfrm>
+          <a:off x="0" y="0"/>
+          <a:ext cx="0" cy="0"/>
+          <a:chOff x="0" y="0"/>
+          <a:chExt cx="0" cy="0"/>
+        </a:xfrm>
+      </p:grpSpPr>
+      <p:sp>
+        <p:nvSpPr>
+          <p:cNvPr id="2" name="Title 1">
+            <a:extLst>
+              <a:ext uri="{FF2B5EF4-FFF2-40B4-BE49-F238E27FC236}">
+                <a16:creationId xmlns:a16="http://schemas.microsoft.com/office/drawing/2014/main" id="{DC598DD3-635B-4D67-ABB3-02B91E4A79B8}"/>
+              </a:ext>
+            </a:extLst>
+          </p:cNvPr>
+          <p:cNvSpPr>
+            <a:spLocks noGrp="1"/>
+          </p:cNvSpPr>
+          <p:nvPr>
+            <p:ph type="title"/>
+          </p:nvPr>
+        </p:nvSpPr>
+        <p:spPr/>
+        <p:txBody>
+          <a:bodyPr/>
+          <a:lstStyle/>
+          <a:p>
+            <a:r>
+              <a:rPr lang="en-GB" dirty="0">
+                <a:latin typeface="Arial Black" panose="020B0A04020102020204" pitchFamily="34" charset="0"/>
+              </a:rPr>
+              <a:t>File</a:t>
+            </a:r>
+            <a:r>
+              <a:rPr lang="lv-LV" dirty="0">
+                <a:latin typeface="Arial Black" panose="020B0A04020102020204" pitchFamily="34" charset="0"/>
+              </a:rPr>
+              <a:t>Reader</a:t>
+            </a:r>
+            <a:endParaRPr lang="en-GB" dirty="0">
+              <a:latin typeface="Arial Black" panose="020B0A04020102020204" pitchFamily="34" charset="0"/>
+            </a:endParaRPr>
+          </a:p>
+        </p:txBody>
+      </p:sp>
+      <p:pic>
+        <p:nvPicPr>
+          <p:cNvPr id="1026" name="Picture 2" descr="Hierarchical Flow of FileReader Class">
+            <a:extLst>
+              <a:ext uri="{FF2B5EF4-FFF2-40B4-BE49-F238E27FC236}">
+                <a16:creationId xmlns:a16="http://schemas.microsoft.com/office/drawing/2014/main" id="{7079237B-D366-48BF-8E9A-CF5CE7DB97F4}"/>
+              </a:ext>
+            </a:extLst>
+          </p:cNvPr>
+          <p:cNvPicPr>
+            <a:picLocks noChangeAspect="1" noChangeArrowheads="1"/>
+          </p:cNvPicPr>
+          <p:nvPr/>
+        </p:nvPicPr>
+        <p:blipFill>
+          <a:blip r:embed="rId2">
+            <a:extLst>
+              <a:ext uri="{28A0092B-C50C-407E-A947-70E740481C1C}">
+                <a14:useLocalDpi xmlns:a14="http://schemas.microsoft.com/office/drawing/2010/main" val="0"/>
+              </a:ext>
+            </a:extLst>
+          </a:blip>
+          <a:srcRect/>
+          <a:stretch>
+            <a:fillRect/>
+          </a:stretch>
+        </p:blipFill>
+        <p:spPr bwMode="auto">
+          <a:xfrm>
+            <a:off x="3999003" y="1821316"/>
+            <a:ext cx="4193993" cy="4308896"/>
+          </a:xfrm>
+          <a:prstGeom prst="rect">
+            <a:avLst/>
+          </a:prstGeom>
+          <a:noFill/>
+          <a:extLst>
+            <a:ext uri="{909E8E84-426E-40DD-AFC4-6F175D3DCCD1}">
+              <a14:hiddenFill xmlns:a14="http://schemas.microsoft.com/office/drawing/2010/main">
+                <a:solidFill>
+                  <a:srgbClr val="FFFFFF"/>
+                </a:solidFill>
+              </a14:hiddenFill>
+            </a:ext>
+          </a:extLst>
+        </p:spPr>
+      </p:pic>
+    </p:spTree>
+    <p:extLst>
+      <p:ext uri="{BB962C8B-B14F-4D97-AF65-F5344CB8AC3E}">
+        <p14:creationId xmlns:p14="http://schemas.microsoft.com/office/powerpoint/2010/main" val="442892207"/>
+      </p:ext>
+    </p:extLst>
+  </p:cSld>
+  <p:clrMapOvr>
+    <a:masterClrMapping/>
+  </p:clrMapOvr>
+</p:sld>
+</file>
+
+<file path=ppt/slides/slide13.xml><?xml version="1.0" encoding="utf-8"?>
+<p:sld xmlns:a="http://schemas.openxmlformats.org/drawingml/2006/main" xmlns:r="http://schemas.openxmlformats.org/officeDocument/2006/relationships" xmlns:p="http://schemas.openxmlformats.org/presentationml/2006/main">
+  <p:cSld>
+    <p:bg>
+      <p:bgPr>
+        <a:solidFill>
+          <a:schemeClr val="accent6">
+            <a:lumMod val="20000"/>
+            <a:lumOff val="80000"/>
+          </a:schemeClr>
+        </a:solidFill>
+        <a:effectLst/>
+      </p:bgPr>
+    </p:bg>
+    <p:spTree>
+      <p:nvGrpSpPr>
+        <p:cNvPr id="1" name=""/>
+        <p:cNvGrpSpPr/>
+        <p:nvPr/>
+      </p:nvGrpSpPr>
+      <p:grpSpPr>
+        <a:xfrm>
+          <a:off x="0" y="0"/>
+          <a:ext cx="0" cy="0"/>
+          <a:chOff x="0" y="0"/>
+          <a:chExt cx="0" cy="0"/>
+        </a:xfrm>
+      </p:grpSpPr>
+      <p:sp>
+        <p:nvSpPr>
+          <p:cNvPr id="2" name="Title 1">
+            <a:extLst>
+              <a:ext uri="{FF2B5EF4-FFF2-40B4-BE49-F238E27FC236}">
+                <a16:creationId xmlns:a16="http://schemas.microsoft.com/office/drawing/2014/main" id="{DC598DD3-635B-4D67-ABB3-02B91E4A79B8}"/>
+              </a:ext>
+            </a:extLst>
+          </p:cNvPr>
+          <p:cNvSpPr>
+            <a:spLocks noGrp="1"/>
+          </p:cNvSpPr>
+          <p:nvPr>
+            <p:ph type="title"/>
+          </p:nvPr>
+        </p:nvSpPr>
+        <p:spPr/>
+        <p:txBody>
+          <a:bodyPr/>
+          <a:lstStyle/>
+          <a:p>
+            <a:r>
+              <a:rPr lang="en-GB" dirty="0">
+                <a:latin typeface="Arial Black" panose="020B0A04020102020204" pitchFamily="34" charset="0"/>
+              </a:rPr>
+              <a:t>File</a:t>
+            </a:r>
+            <a:r>
+              <a:rPr lang="lv-LV" dirty="0">
+                <a:latin typeface="Arial Black" panose="020B0A04020102020204" pitchFamily="34" charset="0"/>
+              </a:rPr>
+              <a:t>Reader</a:t>
+            </a:r>
+            <a:endParaRPr lang="en-GB" dirty="0">
+              <a:latin typeface="Arial Black" panose="020B0A04020102020204" pitchFamily="34" charset="0"/>
+            </a:endParaRPr>
+          </a:p>
+        </p:txBody>
+      </p:sp>
+      <p:graphicFrame>
+        <p:nvGraphicFramePr>
+          <p:cNvPr id="3" name="Table 2">
+            <a:extLst>
+              <a:ext uri="{FF2B5EF4-FFF2-40B4-BE49-F238E27FC236}">
+                <a16:creationId xmlns:a16="http://schemas.microsoft.com/office/drawing/2014/main" id="{AFDE064D-AD54-4AA0-8B03-69897DA07933}"/>
+              </a:ext>
+            </a:extLst>
+          </p:cNvPr>
+          <p:cNvGraphicFramePr>
+            <a:graphicFrameLocks noGrp="1"/>
+          </p:cNvGraphicFramePr>
+          <p:nvPr>
+            <p:extLst>
+              <p:ext uri="{D42A27DB-BD31-4B8C-83A1-F6EECF244321}">
+                <p14:modId xmlns:p14="http://schemas.microsoft.com/office/powerpoint/2010/main" val="517551933"/>
+              </p:ext>
+            </p:extLst>
+          </p:nvPr>
+        </p:nvGraphicFramePr>
+        <p:xfrm>
+          <a:off x="698241" y="2016206"/>
+          <a:ext cx="10515600" cy="3048000"/>
+        </p:xfrm>
+        <a:graphic>
+          <a:graphicData uri="http://schemas.openxmlformats.org/drawingml/2006/table">
+            <a:tbl>
+              <a:tblPr/>
+              <a:tblGrid>
+                <a:gridCol w="5257800">
+                  <a:extLst>
+                    <a:ext uri="{9D8B030D-6E8A-4147-A177-3AD203B41FA5}">
+                      <a16:colId xmlns:a16="http://schemas.microsoft.com/office/drawing/2014/main" val="3532670282"/>
+                    </a:ext>
+                  </a:extLst>
+                </a:gridCol>
+                <a:gridCol w="5257800">
+                  <a:extLst>
+                    <a:ext uri="{9D8B030D-6E8A-4147-A177-3AD203B41FA5}">
+                      <a16:colId xmlns:a16="http://schemas.microsoft.com/office/drawing/2014/main" val="2785186321"/>
+                    </a:ext>
+                  </a:extLst>
+                </a:gridCol>
+              </a:tblGrid>
+              <a:tr h="0">
+                <a:tc>
+                  <a:txBody>
+                    <a:bodyPr/>
+                    <a:lstStyle/>
+                    <a:p>
+                      <a:pPr algn="ctr" fontAlgn="ctr"/>
+                      <a:r>
+                        <a:rPr lang="en-GB" sz="1250" b="1">
+                          <a:effectLst/>
+                        </a:rPr>
+                        <a:t>read()</a:t>
+                      </a:r>
+                    </a:p>
+                  </a:txBody>
+                  <a:tcPr marL="95250" marR="95250" marT="133350" marB="133350" anchor="ctr">
+                    <a:lnL w="12700" cap="flat" cmpd="sng" algn="ctr">
+                      <a:solidFill>
+                        <a:schemeClr val="tx1"/>
+                      </a:solidFill>
+                      <a:prstDash val="solid"/>
+                      <a:round/>
+                      <a:headEnd type="none" w="med" len="med"/>
+                      <a:tailEnd type="none" w="med" len="med"/>
+                    </a:lnL>
+                    <a:lnR w="12700" cap="flat" cmpd="sng" algn="ctr">
+                      <a:solidFill>
+                        <a:schemeClr val="tx1"/>
+                      </a:solidFill>
+                      <a:prstDash val="solid"/>
+                      <a:round/>
+                      <a:headEnd type="none" w="med" len="med"/>
+                      <a:tailEnd type="none" w="med" len="med"/>
+                    </a:lnR>
+                    <a:lnT w="12700" cap="flat" cmpd="sng" algn="ctr">
+                      <a:solidFill>
+                        <a:schemeClr val="tx1"/>
+                      </a:solidFill>
+                      <a:prstDash val="solid"/>
+                      <a:round/>
+                      <a:headEnd type="none" w="med" len="med"/>
+                      <a:tailEnd type="none" w="med" len="med"/>
+                    </a:lnT>
+                    <a:lnB w="12700" cap="flat" cmpd="sng" algn="ctr">
+                      <a:solidFill>
+                        <a:schemeClr val="tx1"/>
+                      </a:solidFill>
+                      <a:prstDash val="solid"/>
+                      <a:round/>
+                      <a:headEnd type="none" w="med" len="med"/>
+                      <a:tailEnd type="none" w="med" len="med"/>
+                    </a:lnB>
+                    <a:solidFill>
+                      <a:srgbClr val="FFFFFF"/>
+                    </a:solidFill>
+                  </a:tcPr>
+                </a:tc>
+                <a:tc>
+                  <a:txBody>
+                    <a:bodyPr/>
+                    <a:lstStyle/>
+                    <a:p>
+                      <a:pPr algn="ctr" fontAlgn="ctr"/>
+                      <a:r>
+                        <a:rPr lang="en-GB" sz="1250" b="0" dirty="0">
+                          <a:effectLst/>
+                        </a:rPr>
+                        <a:t>Read() </a:t>
+                      </a:r>
+                      <a:r>
+                        <a:rPr lang="en-GB" sz="1250" b="0" dirty="0" err="1">
+                          <a:effectLst/>
+                        </a:rPr>
+                        <a:t>metode</a:t>
+                      </a:r>
+                      <a:r>
+                        <a:rPr lang="en-GB" sz="1250" b="0" dirty="0">
+                          <a:effectLst/>
+                        </a:rPr>
+                        <a:t> </a:t>
+                      </a:r>
+                      <a:r>
+                        <a:rPr lang="en-GB" sz="1250" b="0" dirty="0" err="1">
+                          <a:effectLst/>
+                        </a:rPr>
+                        <a:t>nolasa</a:t>
+                      </a:r>
+                      <a:r>
+                        <a:rPr lang="en-GB" sz="1250" b="0" dirty="0">
+                          <a:effectLst/>
+                        </a:rPr>
+                        <a:t> un </a:t>
+                      </a:r>
+                      <a:r>
+                        <a:rPr lang="en-GB" sz="1250" b="0" dirty="0" err="1">
+                          <a:effectLst/>
+                        </a:rPr>
+                        <a:t>nodod</a:t>
+                      </a:r>
+                      <a:r>
+                        <a:rPr lang="en-GB" sz="1250" b="0" dirty="0">
+                          <a:effectLst/>
+                        </a:rPr>
+                        <a:t> </a:t>
+                      </a:r>
+                      <a:r>
+                        <a:rPr lang="en-GB" sz="1250" b="0" dirty="0" err="1">
+                          <a:effectLst/>
+                        </a:rPr>
+                        <a:t>vienu</a:t>
+                      </a:r>
+                      <a:r>
+                        <a:rPr lang="en-GB" sz="1250" b="0" dirty="0">
+                          <a:effectLst/>
+                        </a:rPr>
+                        <a:t> </a:t>
+                      </a:r>
+                      <a:r>
+                        <a:rPr lang="en-GB" sz="1250" b="0" dirty="0" err="1">
+                          <a:effectLst/>
+                        </a:rPr>
+                        <a:t>rakstzīmi</a:t>
+                      </a:r>
+                      <a:r>
+                        <a:rPr lang="en-GB" sz="1250" b="0" dirty="0">
+                          <a:effectLst/>
+                        </a:rPr>
+                        <a:t> </a:t>
+                      </a:r>
+                      <a:r>
+                        <a:rPr lang="en-GB" sz="1250" b="0" dirty="0" err="1">
+                          <a:effectLst/>
+                        </a:rPr>
+                        <a:t>vai</a:t>
+                      </a:r>
+                      <a:r>
+                        <a:rPr lang="en-GB" sz="1250" b="0" dirty="0">
+                          <a:effectLst/>
+                        </a:rPr>
+                        <a:t> -1, </a:t>
+                      </a:r>
+                      <a:r>
+                        <a:rPr lang="en-GB" sz="1250" b="0" dirty="0" err="1">
+                          <a:effectLst/>
+                        </a:rPr>
+                        <a:t>ja</a:t>
+                      </a:r>
+                      <a:r>
+                        <a:rPr lang="en-GB" sz="1250" b="0" dirty="0">
+                          <a:effectLst/>
+                        </a:rPr>
+                        <a:t> </a:t>
+                      </a:r>
+                      <a:r>
+                        <a:rPr lang="en-GB" sz="1250" b="0" dirty="0" err="1">
+                          <a:effectLst/>
+                        </a:rPr>
+                        <a:t>straume</a:t>
+                      </a:r>
+                      <a:r>
+                        <a:rPr lang="en-GB" sz="1250" b="0" dirty="0">
+                          <a:effectLst/>
+                        </a:rPr>
+                        <a:t> </a:t>
+                      </a:r>
+                      <a:r>
+                        <a:rPr lang="en-GB" sz="1250" b="0" dirty="0" err="1">
+                          <a:effectLst/>
+                        </a:rPr>
+                        <a:t>ir</a:t>
+                      </a:r>
+                      <a:r>
+                        <a:rPr lang="en-GB" sz="1250" b="0" dirty="0">
+                          <a:effectLst/>
+                        </a:rPr>
+                        <a:t> </a:t>
+                      </a:r>
+                      <a:r>
+                        <a:rPr lang="en-GB" sz="1250" b="0" dirty="0" err="1">
+                          <a:effectLst/>
+                        </a:rPr>
+                        <a:t>beigusies</a:t>
+                      </a:r>
+                      <a:r>
+                        <a:rPr lang="en-GB" sz="1250" b="0" dirty="0">
+                          <a:effectLst/>
+                        </a:rPr>
+                        <a:t>.</a:t>
+                      </a:r>
+                    </a:p>
+                  </a:txBody>
+                  <a:tcPr marL="95250" marR="95250" marT="133350" marB="133350" anchor="ctr">
+                    <a:lnL w="12700" cap="flat" cmpd="sng" algn="ctr">
+                      <a:solidFill>
+                        <a:schemeClr val="tx1"/>
+                      </a:solidFill>
+                      <a:prstDash val="solid"/>
+                      <a:round/>
+                      <a:headEnd type="none" w="med" len="med"/>
+                      <a:tailEnd type="none" w="med" len="med"/>
+                    </a:lnL>
+                    <a:lnR w="12700" cap="flat" cmpd="sng" algn="ctr">
+                      <a:solidFill>
+                        <a:schemeClr val="tx1"/>
+                      </a:solidFill>
+                      <a:prstDash val="solid"/>
+                      <a:round/>
+                      <a:headEnd type="none" w="med" len="med"/>
+                      <a:tailEnd type="none" w="med" len="med"/>
+                    </a:lnR>
+                    <a:lnT w="12700" cap="flat" cmpd="sng" algn="ctr">
+                      <a:solidFill>
+                        <a:schemeClr val="tx1"/>
+                      </a:solidFill>
+                      <a:prstDash val="solid"/>
+                      <a:round/>
+                      <a:headEnd type="none" w="med" len="med"/>
+                      <a:tailEnd type="none" w="med" len="med"/>
+                    </a:lnT>
+                    <a:lnB w="12700" cap="flat" cmpd="sng" algn="ctr">
+                      <a:solidFill>
+                        <a:schemeClr val="tx1"/>
+                      </a:solidFill>
+                      <a:prstDash val="solid"/>
+                      <a:round/>
+                      <a:headEnd type="none" w="med" len="med"/>
+                      <a:tailEnd type="none" w="med" len="med"/>
+                    </a:lnB>
+                    <a:solidFill>
+                      <a:srgbClr val="FFFFFF"/>
+                    </a:solidFill>
+                  </a:tcPr>
+                </a:tc>
+                <a:extLst>
+                  <a:ext uri="{0D108BD9-81ED-4DB2-BD59-A6C34878D82A}">
+                    <a16:rowId xmlns:a16="http://schemas.microsoft.com/office/drawing/2014/main" val="2386966306"/>
+                  </a:ext>
+                </a:extLst>
+              </a:tr>
+              <a:tr h="0">
+                <a:tc>
+                  <a:txBody>
+                    <a:bodyPr/>
+                    <a:lstStyle/>
+                    <a:p>
+                      <a:pPr algn="ctr" fontAlgn="ctr"/>
+                      <a:r>
+                        <a:rPr lang="en-GB" sz="1250" b="1" dirty="0">
+                          <a:effectLst/>
+                        </a:rPr>
+                        <a:t>read(char[] </a:t>
+                      </a:r>
+                      <a:r>
+                        <a:rPr lang="en-GB" sz="1250" b="1" dirty="0" err="1">
+                          <a:effectLst/>
+                        </a:rPr>
+                        <a:t>charBuffer</a:t>
+                      </a:r>
+                      <a:r>
+                        <a:rPr lang="en-GB" sz="1250" b="1" dirty="0">
+                          <a:effectLst/>
+                        </a:rPr>
+                        <a:t>, int offset, int length)</a:t>
+                      </a:r>
+                    </a:p>
+                  </a:txBody>
+                  <a:tcPr marL="95250" marR="95250" marT="133350" marB="133350" anchor="ctr">
+                    <a:lnL w="12700" cap="flat" cmpd="sng" algn="ctr">
+                      <a:solidFill>
+                        <a:schemeClr val="tx1"/>
+                      </a:solidFill>
+                      <a:prstDash val="solid"/>
+                      <a:round/>
+                      <a:headEnd type="none" w="med" len="med"/>
+                      <a:tailEnd type="none" w="med" len="med"/>
+                    </a:lnL>
+                    <a:lnR w="12700" cap="flat" cmpd="sng" algn="ctr">
+                      <a:solidFill>
+                        <a:schemeClr val="tx1"/>
+                      </a:solidFill>
+                      <a:prstDash val="solid"/>
+                      <a:round/>
+                      <a:headEnd type="none" w="med" len="med"/>
+                      <a:tailEnd type="none" w="med" len="med"/>
+                    </a:lnR>
+                    <a:lnT w="12700" cap="flat" cmpd="sng" algn="ctr">
+                      <a:solidFill>
+                        <a:schemeClr val="tx1"/>
+                      </a:solidFill>
+                      <a:prstDash val="solid"/>
+                      <a:round/>
+                      <a:headEnd type="none" w="med" len="med"/>
+                      <a:tailEnd type="none" w="med" len="med"/>
+                    </a:lnT>
+                    <a:lnB w="12700" cap="flat" cmpd="sng" algn="ctr">
+                      <a:solidFill>
+                        <a:schemeClr val="tx1"/>
+                      </a:solidFill>
+                      <a:prstDash val="solid"/>
+                      <a:round/>
+                      <a:headEnd type="none" w="med" len="med"/>
+                      <a:tailEnd type="none" w="med" len="med"/>
+                    </a:lnB>
+                    <a:solidFill>
+                      <a:srgbClr val="FFFFFF"/>
+                    </a:solidFill>
+                  </a:tcPr>
+                </a:tc>
+                <a:tc>
+                  <a:txBody>
+                    <a:bodyPr/>
+                    <a:lstStyle/>
+                    <a:p>
+                      <a:pPr algn="ctr" fontAlgn="ctr"/>
+                      <a:r>
+                        <a:rPr lang="en-GB" sz="1250" b="0" dirty="0">
+                          <a:effectLst/>
+                        </a:rPr>
+                        <a:t>Tas </a:t>
+                      </a:r>
+                      <a:r>
+                        <a:rPr lang="en-GB" sz="1250" b="0" dirty="0" err="1">
+                          <a:effectLst/>
+                        </a:rPr>
+                        <a:t>nolasa</a:t>
+                      </a:r>
+                      <a:r>
+                        <a:rPr lang="en-GB" sz="1250" b="0" dirty="0">
+                          <a:effectLst/>
+                        </a:rPr>
+                        <a:t> </a:t>
+                      </a:r>
+                      <a:r>
+                        <a:rPr lang="lv-LV" sz="1250" b="0" dirty="0">
+                          <a:effectLst/>
+                        </a:rPr>
+                        <a:t>«char»</a:t>
+                      </a:r>
+                      <a:r>
+                        <a:rPr lang="en-GB" sz="1250" b="0" dirty="0">
+                          <a:effectLst/>
+                        </a:rPr>
+                        <a:t> </a:t>
+                      </a:r>
+                      <a:r>
+                        <a:rPr lang="en-GB" sz="1250" b="0" dirty="0" err="1">
+                          <a:effectLst/>
+                        </a:rPr>
+                        <a:t>plūsmu</a:t>
+                      </a:r>
+                      <a:r>
+                        <a:rPr lang="en-GB" sz="1250" b="0" dirty="0">
+                          <a:effectLst/>
+                        </a:rPr>
+                        <a:t> un </a:t>
+                      </a:r>
+                      <a:r>
+                        <a:rPr lang="en-GB" sz="1250" b="0" dirty="0" err="1">
+                          <a:effectLst/>
+                        </a:rPr>
+                        <a:t>saglabā</a:t>
+                      </a:r>
+                      <a:r>
+                        <a:rPr lang="en-GB" sz="1250" b="0" dirty="0">
+                          <a:effectLst/>
+                        </a:rPr>
+                        <a:t> </a:t>
+                      </a:r>
+                      <a:r>
+                        <a:rPr lang="en-GB" sz="1250" b="0" dirty="0" err="1">
+                          <a:effectLst/>
+                        </a:rPr>
+                        <a:t>tās</a:t>
+                      </a:r>
+                      <a:r>
+                        <a:rPr lang="en-GB" sz="1250" b="0" dirty="0">
+                          <a:effectLst/>
+                        </a:rPr>
+                        <a:t> </a:t>
+                      </a:r>
+                      <a:r>
+                        <a:rPr lang="en-GB" sz="1250" b="0" dirty="0" err="1">
+                          <a:effectLst/>
+                        </a:rPr>
+                        <a:t>dotajā</a:t>
+                      </a:r>
+                      <a:r>
+                        <a:rPr lang="en-GB" sz="1250" b="0" dirty="0">
+                          <a:effectLst/>
+                        </a:rPr>
+                        <a:t> </a:t>
+                      </a:r>
+                      <a:r>
+                        <a:rPr lang="lv-LV" sz="1250" b="0" dirty="0">
+                          <a:effectLst/>
+                        </a:rPr>
+                        <a:t>«</a:t>
+                      </a:r>
+                      <a:r>
+                        <a:rPr lang="en-GB" sz="1250" b="0" dirty="0">
+                          <a:effectLst/>
+                        </a:rPr>
+                        <a:t>char</a:t>
+                      </a:r>
+                      <a:r>
+                        <a:rPr lang="lv-LV" sz="1250" b="0" dirty="0">
+                          <a:effectLst/>
+                        </a:rPr>
+                        <a:t> </a:t>
+                      </a:r>
+                      <a:r>
+                        <a:rPr lang="en-GB" sz="1250" b="0" dirty="0">
+                          <a:effectLst/>
+                        </a:rPr>
+                        <a:t>Buffer</a:t>
+                      </a:r>
+                      <a:r>
+                        <a:rPr lang="lv-LV" sz="1250" b="0" dirty="0">
+                          <a:effectLst/>
+                        </a:rPr>
+                        <a:t>»</a:t>
+                      </a:r>
+                      <a:r>
+                        <a:rPr lang="en-GB" sz="1250" b="0" dirty="0">
+                          <a:effectLst/>
+                        </a:rPr>
+                        <a:t>. </a:t>
+                      </a:r>
+                      <a:r>
+                        <a:rPr lang="lv-LV" sz="1250" b="0" dirty="0">
+                          <a:effectLst/>
+                        </a:rPr>
+                        <a:t>«offset»</a:t>
+                      </a:r>
+                      <a:r>
+                        <a:rPr lang="en-GB" sz="1250" b="0" dirty="0">
+                          <a:effectLst/>
+                        </a:rPr>
+                        <a:t> </a:t>
+                      </a:r>
+                      <a:r>
+                        <a:rPr lang="en-GB" sz="1250" b="0" dirty="0" err="1">
+                          <a:effectLst/>
+                        </a:rPr>
+                        <a:t>ir</a:t>
+                      </a:r>
+                      <a:r>
+                        <a:rPr lang="en-GB" sz="1250" b="0" dirty="0">
+                          <a:effectLst/>
+                        </a:rPr>
+                        <a:t> </a:t>
+                      </a:r>
+                      <a:r>
+                        <a:rPr lang="en-GB" sz="1250" b="0" dirty="0" err="1">
+                          <a:effectLst/>
+                        </a:rPr>
+                        <a:t>pozīcija</a:t>
+                      </a:r>
+                      <a:r>
+                        <a:rPr lang="en-GB" sz="1250" b="0" dirty="0">
+                          <a:effectLst/>
+                        </a:rPr>
+                        <a:t>, </a:t>
+                      </a:r>
+                      <a:r>
+                        <a:rPr lang="en-GB" sz="1250" b="0" dirty="0" err="1">
+                          <a:effectLst/>
+                        </a:rPr>
+                        <a:t>kurā</a:t>
+                      </a:r>
+                      <a:r>
+                        <a:rPr lang="en-GB" sz="1250" b="0" dirty="0">
+                          <a:effectLst/>
+                        </a:rPr>
+                        <a:t> </a:t>
+                      </a:r>
+                      <a:r>
+                        <a:rPr lang="en-GB" sz="1250" b="0" dirty="0" err="1">
+                          <a:effectLst/>
+                        </a:rPr>
+                        <a:t>tas</a:t>
+                      </a:r>
+                      <a:r>
+                        <a:rPr lang="en-GB" sz="1250" b="0" dirty="0">
+                          <a:effectLst/>
+                        </a:rPr>
+                        <a:t> </a:t>
+                      </a:r>
+                      <a:r>
+                        <a:rPr lang="en-GB" sz="1250" b="0" dirty="0" err="1">
+                          <a:effectLst/>
+                        </a:rPr>
+                        <a:t>sāk</a:t>
+                      </a:r>
+                      <a:r>
+                        <a:rPr lang="en-GB" sz="1250" b="0" dirty="0">
+                          <a:effectLst/>
+                        </a:rPr>
+                        <a:t> </a:t>
+                      </a:r>
+                      <a:r>
+                        <a:rPr lang="en-GB" sz="1250" b="0" dirty="0" err="1">
+                          <a:effectLst/>
+                        </a:rPr>
+                        <a:t>lasīšanu</a:t>
+                      </a:r>
+                      <a:r>
+                        <a:rPr lang="en-GB" sz="1250" b="0" dirty="0">
+                          <a:effectLst/>
+                        </a:rPr>
+                        <a:t>, un </a:t>
+                      </a:r>
+                      <a:r>
+                        <a:rPr lang="lv-LV" sz="1250" b="0" dirty="0">
+                          <a:effectLst/>
+                        </a:rPr>
+                        <a:t>«length»</a:t>
+                      </a:r>
+                      <a:r>
+                        <a:rPr lang="en-GB" sz="1250" b="0" dirty="0">
+                          <a:effectLst/>
+                        </a:rPr>
+                        <a:t> </a:t>
+                      </a:r>
+                      <a:r>
+                        <a:rPr lang="en-GB" sz="1250" b="0" dirty="0" err="1">
+                          <a:effectLst/>
+                        </a:rPr>
+                        <a:t>ir</a:t>
+                      </a:r>
+                      <a:r>
+                        <a:rPr lang="en-GB" sz="1250" b="0" dirty="0">
+                          <a:effectLst/>
+                        </a:rPr>
+                        <a:t> </a:t>
+                      </a:r>
+                      <a:r>
+                        <a:rPr lang="en-GB" sz="1250" b="0" dirty="0" err="1">
+                          <a:effectLst/>
+                        </a:rPr>
+                        <a:t>kopējais</a:t>
+                      </a:r>
+                      <a:r>
+                        <a:rPr lang="en-GB" sz="1250" b="0" dirty="0">
+                          <a:effectLst/>
+                        </a:rPr>
+                        <a:t> </a:t>
+                      </a:r>
+                      <a:r>
+                        <a:rPr lang="en-GB" sz="1250" b="0" dirty="0" err="1">
+                          <a:effectLst/>
+                        </a:rPr>
+                        <a:t>nolasāmo</a:t>
+                      </a:r>
+                      <a:r>
+                        <a:rPr lang="en-GB" sz="1250" b="0" dirty="0">
+                          <a:effectLst/>
+                        </a:rPr>
+                        <a:t> </a:t>
+                      </a:r>
+                      <a:r>
+                        <a:rPr lang="lv-LV" sz="1250" b="0" dirty="0">
+                          <a:effectLst/>
+                        </a:rPr>
+                        <a:t>«char»</a:t>
+                      </a:r>
+                      <a:r>
+                        <a:rPr lang="en-GB" sz="1250" b="0" dirty="0">
+                          <a:effectLst/>
+                        </a:rPr>
+                        <a:t> </a:t>
+                      </a:r>
+                      <a:r>
+                        <a:rPr lang="en-GB" sz="1250" b="0" dirty="0" err="1">
+                          <a:effectLst/>
+                        </a:rPr>
+                        <a:t>skaits</a:t>
+                      </a:r>
+                      <a:r>
+                        <a:rPr lang="en-GB" sz="1250" b="0" dirty="0">
+                          <a:effectLst/>
+                        </a:rPr>
+                        <a:t>. Tas </a:t>
+                      </a:r>
+                      <a:r>
+                        <a:rPr lang="en-GB" sz="1250" b="0" dirty="0" err="1">
+                          <a:effectLst/>
+                        </a:rPr>
+                        <a:t>nodod</a:t>
+                      </a:r>
+                      <a:r>
+                        <a:rPr lang="en-GB" sz="1250" b="0" dirty="0">
+                          <a:effectLst/>
+                        </a:rPr>
+                        <a:t> </a:t>
+                      </a:r>
+                      <a:r>
+                        <a:rPr lang="en-GB" sz="1250" b="0" dirty="0" err="1">
+                          <a:effectLst/>
+                        </a:rPr>
+                        <a:t>daudz</a:t>
+                      </a:r>
+                      <a:r>
+                        <a:rPr lang="en-GB" sz="1250" b="0" dirty="0">
+                          <a:effectLst/>
+                        </a:rPr>
+                        <a:t> </a:t>
+                      </a:r>
+                      <a:r>
+                        <a:rPr lang="en-GB" sz="1250" b="0" dirty="0" err="1">
+                          <a:effectLst/>
+                        </a:rPr>
+                        <a:t>nolasīto</a:t>
+                      </a:r>
+                      <a:r>
+                        <a:rPr lang="en-GB" sz="1250" b="0" dirty="0">
+                          <a:effectLst/>
+                        </a:rPr>
+                        <a:t> </a:t>
+                      </a:r>
+                      <a:r>
+                        <a:rPr lang="lv-LV" sz="1250" b="0" dirty="0">
+                          <a:effectLst/>
+                        </a:rPr>
+                        <a:t>«char»</a:t>
+                      </a:r>
+                      <a:r>
+                        <a:rPr lang="en-GB" sz="1250" b="0" dirty="0">
+                          <a:effectLst/>
+                        </a:rPr>
+                        <a:t> </a:t>
+                      </a:r>
+                      <a:r>
+                        <a:rPr lang="en-GB" sz="1250" b="0" dirty="0" err="1">
+                          <a:effectLst/>
+                        </a:rPr>
+                        <a:t>vai</a:t>
+                      </a:r>
+                      <a:r>
+                        <a:rPr lang="en-GB" sz="1250" b="0" dirty="0">
+                          <a:effectLst/>
+                        </a:rPr>
+                        <a:t> -1, </a:t>
+                      </a:r>
+                      <a:r>
+                        <a:rPr lang="en-GB" sz="1250" b="0" dirty="0" err="1">
+                          <a:effectLst/>
+                        </a:rPr>
+                        <a:t>ja</a:t>
+                      </a:r>
+                      <a:r>
+                        <a:rPr lang="en-GB" sz="1250" b="0" dirty="0">
+                          <a:effectLst/>
+                        </a:rPr>
+                        <a:t> </a:t>
+                      </a:r>
+                      <a:r>
+                        <a:rPr lang="en-GB" sz="1250" b="0" dirty="0" err="1">
+                          <a:effectLst/>
+                        </a:rPr>
+                        <a:t>plūsma</a:t>
+                      </a:r>
+                      <a:r>
+                        <a:rPr lang="en-GB" sz="1250" b="0" dirty="0">
+                          <a:effectLst/>
+                        </a:rPr>
+                        <a:t> </a:t>
+                      </a:r>
+                      <a:r>
+                        <a:rPr lang="en-GB" sz="1250" b="0" dirty="0" err="1">
+                          <a:effectLst/>
+                        </a:rPr>
+                        <a:t>ir</a:t>
+                      </a:r>
+                      <a:r>
+                        <a:rPr lang="en-GB" sz="1250" b="0" dirty="0">
+                          <a:effectLst/>
+                        </a:rPr>
+                        <a:t> </a:t>
+                      </a:r>
+                      <a:r>
+                        <a:rPr lang="en-GB" sz="1250" b="0" dirty="0" err="1">
+                          <a:effectLst/>
+                        </a:rPr>
+                        <a:t>beigusies</a:t>
+                      </a:r>
+                      <a:r>
+                        <a:rPr lang="en-GB" sz="1250" b="0" dirty="0">
+                          <a:effectLst/>
+                        </a:rPr>
+                        <a:t>.</a:t>
+                      </a:r>
+                    </a:p>
+                  </a:txBody>
+                  <a:tcPr marL="95250" marR="95250" marT="133350" marB="133350" anchor="ctr">
+                    <a:lnL w="12700" cap="flat" cmpd="sng" algn="ctr">
+                      <a:solidFill>
+                        <a:schemeClr val="tx1"/>
+                      </a:solidFill>
+                      <a:prstDash val="solid"/>
+                      <a:round/>
+                      <a:headEnd type="none" w="med" len="med"/>
+                      <a:tailEnd type="none" w="med" len="med"/>
+                    </a:lnL>
+                    <a:lnR w="12700" cap="flat" cmpd="sng" algn="ctr">
+                      <a:solidFill>
+                        <a:schemeClr val="tx1"/>
+                      </a:solidFill>
+                      <a:prstDash val="solid"/>
+                      <a:round/>
+                      <a:headEnd type="none" w="med" len="med"/>
+                      <a:tailEnd type="none" w="med" len="med"/>
+                    </a:lnR>
+                    <a:lnT w="12700" cap="flat" cmpd="sng" algn="ctr">
+                      <a:solidFill>
+                        <a:schemeClr val="tx1"/>
+                      </a:solidFill>
+                      <a:prstDash val="solid"/>
+                      <a:round/>
+                      <a:headEnd type="none" w="med" len="med"/>
+                      <a:tailEnd type="none" w="med" len="med"/>
+                    </a:lnT>
+                    <a:lnB w="12700" cap="flat" cmpd="sng" algn="ctr">
+                      <a:solidFill>
+                        <a:schemeClr val="tx1"/>
+                      </a:solidFill>
+                      <a:prstDash val="solid"/>
+                      <a:round/>
+                      <a:headEnd type="none" w="med" len="med"/>
+                      <a:tailEnd type="none" w="med" len="med"/>
+                    </a:lnB>
+                    <a:solidFill>
+                      <a:srgbClr val="FFFFFF"/>
+                    </a:solidFill>
+                  </a:tcPr>
+                </a:tc>
+                <a:extLst>
+                  <a:ext uri="{0D108BD9-81ED-4DB2-BD59-A6C34878D82A}">
+                    <a16:rowId xmlns:a16="http://schemas.microsoft.com/office/drawing/2014/main" val="1481521132"/>
+                  </a:ext>
+                </a:extLst>
+              </a:tr>
+              <a:tr h="0">
+                <a:tc>
+                  <a:txBody>
+                    <a:bodyPr/>
+                    <a:lstStyle/>
+                    <a:p>
+                      <a:pPr algn="ctr" fontAlgn="ctr"/>
+                      <a:r>
+                        <a:rPr lang="en-GB" sz="1250" b="1">
+                          <a:effectLst/>
+                        </a:rPr>
+                        <a:t>ready()</a:t>
+                      </a:r>
+                    </a:p>
+                  </a:txBody>
+                  <a:tcPr marL="95250" marR="95250" marT="133350" marB="133350" anchor="ctr">
+                    <a:lnL w="12700" cap="flat" cmpd="sng" algn="ctr">
+                      <a:solidFill>
+                        <a:schemeClr val="tx1"/>
+                      </a:solidFill>
+                      <a:prstDash val="solid"/>
+                      <a:round/>
+                      <a:headEnd type="none" w="med" len="med"/>
+                      <a:tailEnd type="none" w="med" len="med"/>
+                    </a:lnL>
+                    <a:lnR w="12700" cap="flat" cmpd="sng" algn="ctr">
+                      <a:solidFill>
+                        <a:schemeClr val="tx1"/>
+                      </a:solidFill>
+                      <a:prstDash val="solid"/>
+                      <a:round/>
+                      <a:headEnd type="none" w="med" len="med"/>
+                      <a:tailEnd type="none" w="med" len="med"/>
+                    </a:lnR>
+                    <a:lnT w="12700" cap="flat" cmpd="sng" algn="ctr">
+                      <a:solidFill>
+                        <a:schemeClr val="tx1"/>
+                      </a:solidFill>
+                      <a:prstDash val="solid"/>
+                      <a:round/>
+                      <a:headEnd type="none" w="med" len="med"/>
+                      <a:tailEnd type="none" w="med" len="med"/>
+                    </a:lnT>
+                    <a:lnB w="12700" cap="flat" cmpd="sng" algn="ctr">
+                      <a:solidFill>
+                        <a:schemeClr val="tx1"/>
+                      </a:solidFill>
+                      <a:prstDash val="solid"/>
+                      <a:round/>
+                      <a:headEnd type="none" w="med" len="med"/>
+                      <a:tailEnd type="none" w="med" len="med"/>
+                    </a:lnB>
+                    <a:solidFill>
+                      <a:srgbClr val="FFFFFF"/>
+                    </a:solidFill>
+                  </a:tcPr>
+                </a:tc>
+                <a:tc>
+                  <a:txBody>
+                    <a:bodyPr/>
+                    <a:lstStyle/>
+                    <a:p>
+                      <a:pPr algn="ctr" fontAlgn="ctr"/>
+                      <a:r>
+                        <a:rPr lang="en-GB" sz="1250" b="0" dirty="0">
+                          <a:effectLst/>
+                        </a:rPr>
+                        <a:t>Tas </a:t>
+                      </a:r>
+                      <a:r>
+                        <a:rPr lang="en-GB" sz="1250" b="0" dirty="0" err="1">
+                          <a:effectLst/>
+                        </a:rPr>
+                        <a:t>norāda</a:t>
+                      </a:r>
+                      <a:r>
+                        <a:rPr lang="en-GB" sz="1250" b="0" dirty="0">
+                          <a:effectLst/>
+                        </a:rPr>
+                        <a:t>, </a:t>
+                      </a:r>
+                      <a:r>
+                        <a:rPr lang="en-GB" sz="1250" b="0" dirty="0" err="1">
+                          <a:effectLst/>
+                        </a:rPr>
+                        <a:t>vai</a:t>
+                      </a:r>
+                      <a:r>
+                        <a:rPr lang="en-GB" sz="1250" b="0" dirty="0">
+                          <a:effectLst/>
+                        </a:rPr>
+                        <a:t> </a:t>
+                      </a:r>
+                      <a:r>
+                        <a:rPr lang="en-GB" sz="1250" b="0" dirty="0" err="1">
+                          <a:effectLst/>
+                        </a:rPr>
+                        <a:t>straume</a:t>
+                      </a:r>
+                      <a:r>
+                        <a:rPr lang="en-GB" sz="1250" b="0" dirty="0">
+                          <a:effectLst/>
+                        </a:rPr>
+                        <a:t> </a:t>
+                      </a:r>
+                      <a:r>
+                        <a:rPr lang="en-GB" sz="1250" b="0" dirty="0" err="1">
+                          <a:effectLst/>
+                        </a:rPr>
+                        <a:t>ir</a:t>
+                      </a:r>
+                      <a:r>
+                        <a:rPr lang="en-GB" sz="1250" b="0" dirty="0">
+                          <a:effectLst/>
+                        </a:rPr>
+                        <a:t> </a:t>
+                      </a:r>
+                      <a:r>
+                        <a:rPr lang="en-GB" sz="1250" b="0" dirty="0" err="1">
+                          <a:effectLst/>
+                        </a:rPr>
+                        <a:t>gatava</a:t>
+                      </a:r>
+                      <a:r>
+                        <a:rPr lang="en-GB" sz="1250" b="0" dirty="0">
+                          <a:effectLst/>
+                        </a:rPr>
+                        <a:t> </a:t>
+                      </a:r>
+                      <a:r>
+                        <a:rPr lang="en-GB" sz="1250" b="0" dirty="0" err="1">
+                          <a:effectLst/>
+                        </a:rPr>
+                        <a:t>lasīšanai</a:t>
+                      </a:r>
+                      <a:r>
+                        <a:rPr lang="en-GB" sz="1250" b="0" dirty="0">
+                          <a:effectLst/>
+                        </a:rPr>
+                        <a:t>. </a:t>
+                      </a:r>
+                      <a:r>
+                        <a:rPr lang="en-GB" sz="1250" b="0" dirty="0" err="1">
+                          <a:effectLst/>
+                        </a:rPr>
+                        <a:t>Straume</a:t>
+                      </a:r>
+                      <a:r>
+                        <a:rPr lang="en-GB" sz="1250" b="0" dirty="0">
+                          <a:effectLst/>
+                        </a:rPr>
+                        <a:t> </a:t>
+                      </a:r>
+                      <a:r>
+                        <a:rPr lang="en-GB" sz="1250" b="0" dirty="0" err="1">
+                          <a:effectLst/>
+                        </a:rPr>
+                        <a:t>tiek</a:t>
+                      </a:r>
+                      <a:r>
+                        <a:rPr lang="en-GB" sz="1250" b="0" dirty="0">
+                          <a:effectLst/>
+                        </a:rPr>
+                        <a:t> </a:t>
+                      </a:r>
+                      <a:r>
+                        <a:rPr lang="en-GB" sz="1250" b="0" dirty="0" err="1">
+                          <a:effectLst/>
+                        </a:rPr>
+                        <a:t>uzskatīta</a:t>
+                      </a:r>
+                      <a:r>
+                        <a:rPr lang="en-GB" sz="1250" b="0" dirty="0">
+                          <a:effectLst/>
+                        </a:rPr>
+                        <a:t> par </a:t>
+                      </a:r>
+                      <a:r>
+                        <a:rPr lang="en-GB" sz="1250" b="0" dirty="0" err="1">
+                          <a:effectLst/>
+                        </a:rPr>
+                        <a:t>gatavu</a:t>
+                      </a:r>
+                      <a:r>
+                        <a:rPr lang="en-GB" sz="1250" b="0" dirty="0">
+                          <a:effectLst/>
+                        </a:rPr>
+                        <a:t>, </a:t>
+                      </a:r>
+                      <a:r>
+                        <a:rPr lang="en-GB" sz="1250" b="0" dirty="0" err="1">
+                          <a:effectLst/>
+                        </a:rPr>
+                        <a:t>ja</a:t>
+                      </a:r>
+                      <a:r>
+                        <a:rPr lang="en-GB" sz="1250" b="0" dirty="0">
+                          <a:effectLst/>
+                        </a:rPr>
+                        <a:t> </a:t>
+                      </a:r>
+                      <a:r>
+                        <a:rPr lang="en-GB" sz="1250" b="0" dirty="0" err="1">
+                          <a:effectLst/>
+                        </a:rPr>
+                        <a:t>tās</a:t>
+                      </a:r>
+                      <a:r>
+                        <a:rPr lang="en-GB" sz="1250" b="0" dirty="0">
+                          <a:effectLst/>
+                        </a:rPr>
+                        <a:t> </a:t>
+                      </a:r>
+                      <a:r>
+                        <a:rPr lang="en-GB" sz="1250" b="0" dirty="0" err="1">
+                          <a:effectLst/>
+                        </a:rPr>
+                        <a:t>ievades</a:t>
+                      </a:r>
+                      <a:r>
+                        <a:rPr lang="en-GB" sz="1250" b="0" dirty="0">
+                          <a:effectLst/>
+                        </a:rPr>
+                        <a:t> </a:t>
+                      </a:r>
+                      <a:r>
+                        <a:rPr lang="en-GB" sz="1250" b="0" dirty="0" err="1">
+                          <a:effectLst/>
+                        </a:rPr>
+                        <a:t>buferis</a:t>
+                      </a:r>
+                      <a:r>
+                        <a:rPr lang="en-GB" sz="1250" b="0" dirty="0">
+                          <a:effectLst/>
+                        </a:rPr>
+                        <a:t> nav </a:t>
+                      </a:r>
+                      <a:r>
+                        <a:rPr lang="en-GB" sz="1250" b="0" dirty="0" err="1">
+                          <a:effectLst/>
+                        </a:rPr>
+                        <a:t>tukšs</a:t>
+                      </a:r>
+                      <a:r>
+                        <a:rPr lang="en-GB" sz="1250" b="0" dirty="0">
+                          <a:effectLst/>
+                        </a:rPr>
+                        <a:t>.</a:t>
+                      </a:r>
+                    </a:p>
+                  </a:txBody>
+                  <a:tcPr marL="95250" marR="95250" marT="133350" marB="133350" anchor="ctr">
+                    <a:lnL w="12700" cap="flat" cmpd="sng" algn="ctr">
+                      <a:solidFill>
+                        <a:schemeClr val="tx1"/>
+                      </a:solidFill>
+                      <a:prstDash val="solid"/>
+                      <a:round/>
+                      <a:headEnd type="none" w="med" len="med"/>
+                      <a:tailEnd type="none" w="med" len="med"/>
+                    </a:lnL>
+                    <a:lnR w="12700" cap="flat" cmpd="sng" algn="ctr">
+                      <a:solidFill>
+                        <a:schemeClr val="tx1"/>
+                      </a:solidFill>
+                      <a:prstDash val="solid"/>
+                      <a:round/>
+                      <a:headEnd type="none" w="med" len="med"/>
+                      <a:tailEnd type="none" w="med" len="med"/>
+                    </a:lnR>
+                    <a:lnT w="12700" cap="flat" cmpd="sng" algn="ctr">
+                      <a:solidFill>
+                        <a:schemeClr val="tx1"/>
+                      </a:solidFill>
+                      <a:prstDash val="solid"/>
+                      <a:round/>
+                      <a:headEnd type="none" w="med" len="med"/>
+                      <a:tailEnd type="none" w="med" len="med"/>
+                    </a:lnT>
+                    <a:lnB w="12700" cap="flat" cmpd="sng" algn="ctr">
+                      <a:solidFill>
+                        <a:schemeClr val="tx1"/>
+                      </a:solidFill>
+                      <a:prstDash val="solid"/>
+                      <a:round/>
+                      <a:headEnd type="none" w="med" len="med"/>
+                      <a:tailEnd type="none" w="med" len="med"/>
+                    </a:lnB>
+                    <a:solidFill>
+                      <a:srgbClr val="FFFFFF"/>
+                    </a:solidFill>
+                  </a:tcPr>
+                </a:tc>
+                <a:extLst>
+                  <a:ext uri="{0D108BD9-81ED-4DB2-BD59-A6C34878D82A}">
+                    <a16:rowId xmlns:a16="http://schemas.microsoft.com/office/drawing/2014/main" val="616391296"/>
+                  </a:ext>
+                </a:extLst>
+              </a:tr>
+              <a:tr h="0">
+                <a:tc>
+                  <a:txBody>
+                    <a:bodyPr/>
+                    <a:lstStyle/>
+                    <a:p>
+                      <a:pPr algn="ctr" fontAlgn="ctr"/>
+                      <a:r>
+                        <a:rPr lang="en-GB" sz="1250" b="1" dirty="0" err="1">
+                          <a:effectLst/>
+                        </a:rPr>
+                        <a:t>getEncoding</a:t>
+                      </a:r>
+                      <a:r>
+                        <a:rPr lang="en-GB" sz="1250" b="1" dirty="0">
+                          <a:effectLst/>
+                        </a:rPr>
+                        <a:t>()</a:t>
+                      </a:r>
+                    </a:p>
+                  </a:txBody>
+                  <a:tcPr marL="95250" marR="95250" marT="133350" marB="133350" anchor="ctr">
+                    <a:lnL w="12700" cap="flat" cmpd="sng" algn="ctr">
+                      <a:solidFill>
+                        <a:schemeClr val="tx1"/>
+                      </a:solidFill>
+                      <a:prstDash val="solid"/>
+                      <a:round/>
+                      <a:headEnd type="none" w="med" len="med"/>
+                      <a:tailEnd type="none" w="med" len="med"/>
+                    </a:lnL>
+                    <a:lnR w="12700" cap="flat" cmpd="sng" algn="ctr">
+                      <a:solidFill>
+                        <a:schemeClr val="tx1"/>
+                      </a:solidFill>
+                      <a:prstDash val="solid"/>
+                      <a:round/>
+                      <a:headEnd type="none" w="med" len="med"/>
+                      <a:tailEnd type="none" w="med" len="med"/>
+                    </a:lnR>
+                    <a:lnT w="12700" cap="flat" cmpd="sng" algn="ctr">
+                      <a:solidFill>
+                        <a:schemeClr val="tx1"/>
+                      </a:solidFill>
+                      <a:prstDash val="solid"/>
+                      <a:round/>
+                      <a:headEnd type="none" w="med" len="med"/>
+                      <a:tailEnd type="none" w="med" len="med"/>
+                    </a:lnT>
+                    <a:lnB w="12700" cap="flat" cmpd="sng" algn="ctr">
+                      <a:solidFill>
+                        <a:schemeClr val="tx1"/>
+                      </a:solidFill>
+                      <a:prstDash val="solid"/>
+                      <a:round/>
+                      <a:headEnd type="none" w="med" len="med"/>
+                      <a:tailEnd type="none" w="med" len="med"/>
+                    </a:lnB>
+                    <a:solidFill>
+                      <a:srgbClr val="FFFFFF"/>
+                    </a:solidFill>
+                  </a:tcPr>
+                </a:tc>
+                <a:tc>
+                  <a:txBody>
+                    <a:bodyPr/>
+                    <a:lstStyle/>
+                    <a:p>
+                      <a:pPr algn="ctr" fontAlgn="ctr"/>
+                      <a:r>
+                        <a:rPr lang="lv-LV" sz="1250" b="0" dirty="0">
+                          <a:effectLst/>
+                        </a:rPr>
+                        <a:t>«</a:t>
+                      </a:r>
+                      <a:r>
+                        <a:rPr lang="en-GB" sz="1250" b="0" dirty="0" err="1">
+                          <a:effectLst/>
+                        </a:rPr>
+                        <a:t>getEncoding</a:t>
+                      </a:r>
+                      <a:r>
+                        <a:rPr lang="en-GB" sz="1250" b="0" dirty="0">
+                          <a:effectLst/>
+                        </a:rPr>
+                        <a:t>()</a:t>
+                      </a:r>
+                      <a:r>
+                        <a:rPr lang="lv-LV" sz="1250" b="0" dirty="0">
+                          <a:effectLst/>
+                        </a:rPr>
+                        <a:t>»</a:t>
+                      </a:r>
+                      <a:r>
+                        <a:rPr lang="en-GB" sz="1250" b="0" dirty="0">
+                          <a:effectLst/>
+                        </a:rPr>
+                        <a:t> </a:t>
+                      </a:r>
+                      <a:r>
+                        <a:rPr lang="en-GB" sz="1250" b="0" dirty="0" err="1">
+                          <a:effectLst/>
+                        </a:rPr>
+                        <a:t>tiek</a:t>
+                      </a:r>
+                      <a:r>
+                        <a:rPr lang="en-GB" sz="1250" b="0" dirty="0">
+                          <a:effectLst/>
+                        </a:rPr>
+                        <a:t> </a:t>
+                      </a:r>
+                      <a:r>
+                        <a:rPr lang="en-GB" sz="1250" b="0" dirty="0" err="1">
+                          <a:effectLst/>
+                        </a:rPr>
+                        <a:t>izmantota</a:t>
+                      </a:r>
+                      <a:r>
+                        <a:rPr lang="en-GB" sz="1250" b="0" dirty="0">
+                          <a:effectLst/>
+                        </a:rPr>
+                        <a:t>, </a:t>
+                      </a:r>
+                      <a:r>
+                        <a:rPr lang="en-GB" sz="1250" b="0" dirty="0" err="1">
+                          <a:effectLst/>
+                        </a:rPr>
+                        <a:t>lai</a:t>
+                      </a:r>
+                      <a:r>
+                        <a:rPr lang="en-GB" sz="1250" b="0" dirty="0">
+                          <a:effectLst/>
+                        </a:rPr>
+                        <a:t> </a:t>
+                      </a:r>
+                      <a:r>
+                        <a:rPr lang="en-GB" sz="1250" b="0" dirty="0" err="1">
+                          <a:effectLst/>
+                        </a:rPr>
+                        <a:t>atgrieztu</a:t>
+                      </a:r>
+                      <a:r>
+                        <a:rPr lang="en-GB" sz="1250" b="0" dirty="0">
+                          <a:effectLst/>
+                        </a:rPr>
+                        <a:t> </a:t>
+                      </a:r>
+                      <a:r>
+                        <a:rPr lang="en-GB" sz="1250" b="0" dirty="0" err="1">
+                          <a:effectLst/>
+                        </a:rPr>
+                        <a:t>straumē</a:t>
+                      </a:r>
+                      <a:r>
+                        <a:rPr lang="en-GB" sz="1250" b="0" dirty="0">
+                          <a:effectLst/>
+                        </a:rPr>
+                        <a:t> </a:t>
+                      </a:r>
+                      <a:r>
+                        <a:rPr lang="en-GB" sz="1250" b="0" dirty="0" err="1">
+                          <a:effectLst/>
+                        </a:rPr>
+                        <a:t>izmantotā</a:t>
+                      </a:r>
+                      <a:r>
+                        <a:rPr lang="en-GB" sz="1250" b="0" dirty="0">
+                          <a:effectLst/>
+                        </a:rPr>
+                        <a:t> </a:t>
+                      </a:r>
+                      <a:r>
+                        <a:rPr lang="en-GB" sz="1250" b="0" dirty="0" err="1">
+                          <a:effectLst/>
+                        </a:rPr>
+                        <a:t>rakstzīmju</a:t>
+                      </a:r>
+                      <a:r>
+                        <a:rPr lang="en-GB" sz="1250" b="0" dirty="0">
+                          <a:effectLst/>
+                        </a:rPr>
+                        <a:t> </a:t>
+                      </a:r>
+                      <a:r>
+                        <a:rPr lang="en-GB" sz="1250" b="0" dirty="0" err="1">
+                          <a:effectLst/>
+                        </a:rPr>
+                        <a:t>kodējuma</a:t>
+                      </a:r>
+                      <a:r>
+                        <a:rPr lang="en-GB" sz="1250" b="0" dirty="0">
+                          <a:effectLst/>
+                        </a:rPr>
+                        <a:t> </a:t>
+                      </a:r>
+                      <a:r>
+                        <a:rPr lang="en-GB" sz="1250" b="0" dirty="0" err="1">
+                          <a:effectLst/>
+                        </a:rPr>
+                        <a:t>nosaukumu</a:t>
+                      </a:r>
+                      <a:r>
+                        <a:rPr lang="en-GB" sz="1250" b="0" dirty="0">
+                          <a:effectLst/>
+                        </a:rPr>
+                        <a:t>.</a:t>
+                      </a:r>
+                    </a:p>
+                  </a:txBody>
+                  <a:tcPr marL="95250" marR="95250" marT="133350" marB="133350" anchor="ctr">
+                    <a:lnL w="12700" cap="flat" cmpd="sng" algn="ctr">
+                      <a:solidFill>
+                        <a:schemeClr val="tx1"/>
+                      </a:solidFill>
+                      <a:prstDash val="solid"/>
+                      <a:round/>
+                      <a:headEnd type="none" w="med" len="med"/>
+                      <a:tailEnd type="none" w="med" len="med"/>
+                    </a:lnL>
+                    <a:lnR w="12700" cap="flat" cmpd="sng" algn="ctr">
+                      <a:solidFill>
+                        <a:schemeClr val="tx1"/>
+                      </a:solidFill>
+                      <a:prstDash val="solid"/>
+                      <a:round/>
+                      <a:headEnd type="none" w="med" len="med"/>
+                      <a:tailEnd type="none" w="med" len="med"/>
+                    </a:lnR>
+                    <a:lnT w="12700" cap="flat" cmpd="sng" algn="ctr">
+                      <a:solidFill>
+                        <a:schemeClr val="tx1"/>
+                      </a:solidFill>
+                      <a:prstDash val="solid"/>
+                      <a:round/>
+                      <a:headEnd type="none" w="med" len="med"/>
+                      <a:tailEnd type="none" w="med" len="med"/>
+                    </a:lnT>
+                    <a:lnB w="12700" cap="flat" cmpd="sng" algn="ctr">
+                      <a:solidFill>
+                        <a:schemeClr val="tx1"/>
+                      </a:solidFill>
+                      <a:prstDash val="solid"/>
+                      <a:round/>
+                      <a:headEnd type="none" w="med" len="med"/>
+                      <a:tailEnd type="none" w="med" len="med"/>
+                    </a:lnB>
+                    <a:solidFill>
+                      <a:srgbClr val="FFFFFF"/>
+                    </a:solidFill>
+                  </a:tcPr>
+                </a:tc>
+                <a:extLst>
+                  <a:ext uri="{0D108BD9-81ED-4DB2-BD59-A6C34878D82A}">
+                    <a16:rowId xmlns:a16="http://schemas.microsoft.com/office/drawing/2014/main" val="2846075356"/>
+                  </a:ext>
+                </a:extLst>
+              </a:tr>
+              <a:tr h="0">
+                <a:tc>
+                  <a:txBody>
+                    <a:bodyPr/>
+                    <a:lstStyle/>
+                    <a:p>
+                      <a:pPr algn="ctr" fontAlgn="ctr"/>
+                      <a:r>
+                        <a:rPr lang="en-GB" sz="1250" b="1" dirty="0">
+                          <a:effectLst/>
+                        </a:rPr>
+                        <a:t>close()</a:t>
+                      </a:r>
+                    </a:p>
+                  </a:txBody>
+                  <a:tcPr marL="95250" marR="95250" marT="133350" marB="133350" anchor="ctr">
+                    <a:lnL w="12700" cap="flat" cmpd="sng" algn="ctr">
+                      <a:solidFill>
+                        <a:schemeClr val="tx1"/>
+                      </a:solidFill>
+                      <a:prstDash val="solid"/>
+                      <a:round/>
+                      <a:headEnd type="none" w="med" len="med"/>
+                      <a:tailEnd type="none" w="med" len="med"/>
+                    </a:lnL>
+                    <a:lnR w="12700" cap="flat" cmpd="sng" algn="ctr">
+                      <a:solidFill>
+                        <a:schemeClr val="tx1"/>
+                      </a:solidFill>
+                      <a:prstDash val="solid"/>
+                      <a:round/>
+                      <a:headEnd type="none" w="med" len="med"/>
+                      <a:tailEnd type="none" w="med" len="med"/>
+                    </a:lnR>
+                    <a:lnT w="12700" cap="flat" cmpd="sng" algn="ctr">
+                      <a:solidFill>
+                        <a:schemeClr val="tx1"/>
+                      </a:solidFill>
+                      <a:prstDash val="solid"/>
+                      <a:round/>
+                      <a:headEnd type="none" w="med" len="med"/>
+                      <a:tailEnd type="none" w="med" len="med"/>
+                    </a:lnT>
+                    <a:lnB w="12700" cap="flat" cmpd="sng" algn="ctr">
+                      <a:solidFill>
+                        <a:schemeClr val="tx1"/>
+                      </a:solidFill>
+                      <a:prstDash val="solid"/>
+                      <a:round/>
+                      <a:headEnd type="none" w="med" len="med"/>
+                      <a:tailEnd type="none" w="med" len="med"/>
+                    </a:lnB>
+                    <a:solidFill>
+                      <a:srgbClr val="FFFFFF"/>
+                    </a:solidFill>
+                  </a:tcPr>
+                </a:tc>
+                <a:tc>
+                  <a:txBody>
+                    <a:bodyPr/>
+                    <a:lstStyle/>
+                    <a:p>
+                      <a:pPr algn="ctr" fontAlgn="ctr"/>
+                      <a:r>
+                        <a:rPr lang="en-GB" sz="1250" b="0" dirty="0">
+                          <a:effectLst/>
+                        </a:rPr>
+                        <a:t>Tas </a:t>
+                      </a:r>
+                      <a:r>
+                        <a:rPr lang="en-GB" sz="1250" b="0" dirty="0" err="1">
+                          <a:effectLst/>
+                        </a:rPr>
+                        <a:t>aizver</a:t>
+                      </a:r>
+                      <a:r>
+                        <a:rPr lang="en-GB" sz="1250" b="0" dirty="0">
+                          <a:effectLst/>
+                        </a:rPr>
+                        <a:t> </a:t>
+                      </a:r>
+                      <a:r>
+                        <a:rPr lang="en-GB" sz="1250" b="0" dirty="0" err="1">
+                          <a:effectLst/>
+                        </a:rPr>
+                        <a:t>plūsmu</a:t>
+                      </a:r>
+                      <a:r>
+                        <a:rPr lang="en-GB" sz="1250" b="0" dirty="0">
+                          <a:effectLst/>
+                        </a:rPr>
+                        <a:t> un </a:t>
+                      </a:r>
+                      <a:r>
+                        <a:rPr lang="en-GB" sz="1250" b="0" dirty="0" err="1">
+                          <a:effectLst/>
+                        </a:rPr>
+                        <a:t>atbrīvo</a:t>
+                      </a:r>
+                      <a:r>
+                        <a:rPr lang="en-GB" sz="1250" b="0" dirty="0">
+                          <a:effectLst/>
+                        </a:rPr>
+                        <a:t> </a:t>
+                      </a:r>
+                      <a:r>
+                        <a:rPr lang="en-GB" sz="1250" b="0" dirty="0" err="1">
+                          <a:effectLst/>
+                        </a:rPr>
+                        <a:t>ar</a:t>
+                      </a:r>
+                      <a:r>
+                        <a:rPr lang="en-GB" sz="1250" b="0" dirty="0">
+                          <a:effectLst/>
+                        </a:rPr>
+                        <a:t> to </a:t>
+                      </a:r>
+                      <a:r>
+                        <a:rPr lang="en-GB" sz="1250" b="0" dirty="0" err="1">
+                          <a:effectLst/>
+                        </a:rPr>
+                        <a:t>saistītos</a:t>
+                      </a:r>
+                      <a:r>
+                        <a:rPr lang="en-GB" sz="1250" b="0" dirty="0">
+                          <a:effectLst/>
+                        </a:rPr>
+                        <a:t> </a:t>
+                      </a:r>
+                      <a:r>
+                        <a:rPr lang="en-GB" sz="1250" b="0" dirty="0" err="1">
+                          <a:effectLst/>
+                        </a:rPr>
+                        <a:t>sistēmas</a:t>
+                      </a:r>
+                      <a:r>
+                        <a:rPr lang="en-GB" sz="1250" b="0" dirty="0">
+                          <a:effectLst/>
+                        </a:rPr>
+                        <a:t> </a:t>
+                      </a:r>
+                      <a:r>
+                        <a:rPr lang="en-GB" sz="1250" b="0" dirty="0" err="1">
+                          <a:effectLst/>
+                        </a:rPr>
+                        <a:t>resursus</a:t>
+                      </a:r>
+                      <a:r>
+                        <a:rPr lang="en-GB" sz="1250" b="0" dirty="0">
+                          <a:effectLst/>
+                        </a:rPr>
+                        <a:t>.</a:t>
+                      </a:r>
+                    </a:p>
+                  </a:txBody>
+                  <a:tcPr marL="95250" marR="95250" marT="133350" marB="133350" anchor="ctr">
+                    <a:lnL w="12700" cap="flat" cmpd="sng" algn="ctr">
+                      <a:solidFill>
+                        <a:schemeClr val="tx1"/>
+                      </a:solidFill>
+                      <a:prstDash val="solid"/>
+                      <a:round/>
+                      <a:headEnd type="none" w="med" len="med"/>
+                      <a:tailEnd type="none" w="med" len="med"/>
+                    </a:lnL>
+                    <a:lnR w="12700" cap="flat" cmpd="sng" algn="ctr">
+                      <a:solidFill>
+                        <a:schemeClr val="tx1"/>
+                      </a:solidFill>
+                      <a:prstDash val="solid"/>
+                      <a:round/>
+                      <a:headEnd type="none" w="med" len="med"/>
+                      <a:tailEnd type="none" w="med" len="med"/>
+                    </a:lnR>
+                    <a:lnT w="12700" cap="flat" cmpd="sng" algn="ctr">
+                      <a:solidFill>
+                        <a:schemeClr val="tx1"/>
+                      </a:solidFill>
+                      <a:prstDash val="solid"/>
+                      <a:round/>
+                      <a:headEnd type="none" w="med" len="med"/>
+                      <a:tailEnd type="none" w="med" len="med"/>
+                    </a:lnT>
+                    <a:lnB w="12700" cap="flat" cmpd="sng" algn="ctr">
+                      <a:solidFill>
+                        <a:schemeClr val="tx1"/>
+                      </a:solidFill>
+                      <a:prstDash val="solid"/>
+                      <a:round/>
+                      <a:headEnd type="none" w="med" len="med"/>
+                      <a:tailEnd type="none" w="med" len="med"/>
+                    </a:lnB>
+                    <a:solidFill>
+                      <a:srgbClr val="FFFFFF"/>
+                    </a:solidFill>
+                  </a:tcPr>
+                </a:tc>
+                <a:extLst>
+                  <a:ext uri="{0D108BD9-81ED-4DB2-BD59-A6C34878D82A}">
+                    <a16:rowId xmlns:a16="http://schemas.microsoft.com/office/drawing/2014/main" val="3135952797"/>
+                  </a:ext>
+                </a:extLst>
+              </a:tr>
+            </a:tbl>
+          </a:graphicData>
+        </a:graphic>
+      </p:graphicFrame>
+    </p:spTree>
+    <p:extLst>
+      <p:ext uri="{BB962C8B-B14F-4D97-AF65-F5344CB8AC3E}">
+        <p14:creationId xmlns:p14="http://schemas.microsoft.com/office/powerpoint/2010/main" val="2707643133"/>
+      </p:ext>
+    </p:extLst>
+  </p:cSld>
+  <p:clrMapOvr>
+    <a:masterClrMapping/>
+  </p:clrMapOvr>
+</p:sld>
+</file>
+
+<file path=ppt/slides/slide14.xml><?xml version="1.0" encoding="utf-8"?>
+<p:sld xmlns:a="http://schemas.openxmlformats.org/drawingml/2006/main" xmlns:r="http://schemas.openxmlformats.org/officeDocument/2006/relationships" xmlns:p="http://schemas.openxmlformats.org/presentationml/2006/main">
+  <p:cSld>
+    <p:bg>
+      <p:bgPr>
+        <a:solidFill>
+          <a:schemeClr val="accent6">
+            <a:lumMod val="20000"/>
+            <a:lumOff val="80000"/>
+          </a:schemeClr>
+        </a:solidFill>
+        <a:effectLst/>
+      </p:bgPr>
+    </p:bg>
+    <p:spTree>
+      <p:nvGrpSpPr>
+        <p:cNvPr id="1" name=""/>
+        <p:cNvGrpSpPr/>
+        <p:nvPr/>
+      </p:nvGrpSpPr>
+      <p:grpSpPr>
+        <a:xfrm>
+          <a:off x="0" y="0"/>
+          <a:ext cx="0" cy="0"/>
+          <a:chOff x="0" y="0"/>
+          <a:chExt cx="0" cy="0"/>
+        </a:xfrm>
+      </p:grpSpPr>
+      <p:sp>
+        <p:nvSpPr>
+          <p:cNvPr id="2" name="Title 1">
+            <a:extLst>
+              <a:ext uri="{FF2B5EF4-FFF2-40B4-BE49-F238E27FC236}">
+                <a16:creationId xmlns:a16="http://schemas.microsoft.com/office/drawing/2014/main" id="{DC598DD3-635B-4D67-ABB3-02B91E4A79B8}"/>
+              </a:ext>
+            </a:extLst>
+          </p:cNvPr>
+          <p:cNvSpPr>
+            <a:spLocks noGrp="1"/>
+          </p:cNvSpPr>
+          <p:nvPr>
+            <p:ph type="title"/>
+          </p:nvPr>
+        </p:nvSpPr>
+        <p:spPr>
+          <a:xfrm>
+            <a:off x="511628" y="2790182"/>
+            <a:ext cx="10515600" cy="1325563"/>
+          </a:xfrm>
+        </p:spPr>
+        <p:txBody>
+          <a:bodyPr/>
+          <a:lstStyle/>
+          <a:p>
+            <a:r>
+              <a:rPr lang="en-GB" dirty="0">
+                <a:latin typeface="Arial Black" panose="020B0A04020102020204" pitchFamily="34" charset="0"/>
+              </a:rPr>
+              <a:t>File</a:t>
+            </a:r>
+            <a:r>
+              <a:rPr lang="lv-LV" dirty="0">
+                <a:latin typeface="Arial Black" panose="020B0A04020102020204" pitchFamily="34" charset="0"/>
+              </a:rPr>
+              <a:t>Reader piemērs</a:t>
+            </a:r>
+            <a:endParaRPr lang="en-GB" dirty="0">
+              <a:latin typeface="Arial Black" panose="020B0A04020102020204" pitchFamily="34" charset="0"/>
+            </a:endParaRPr>
+          </a:p>
+        </p:txBody>
+      </p:sp>
+      <p:pic>
+        <p:nvPicPr>
+          <p:cNvPr id="4" name="Picture 3">
+            <a:extLst>
+              <a:ext uri="{FF2B5EF4-FFF2-40B4-BE49-F238E27FC236}">
+                <a16:creationId xmlns:a16="http://schemas.microsoft.com/office/drawing/2014/main" id="{1E4DF905-7E0D-4631-92C8-80BB8ACFD602}"/>
+              </a:ext>
+            </a:extLst>
+          </p:cNvPr>
+          <p:cNvPicPr>
+            <a:picLocks noChangeAspect="1"/>
+          </p:cNvPicPr>
+          <p:nvPr/>
+        </p:nvPicPr>
+        <p:blipFill>
+          <a:blip r:embed="rId2"/>
+          <a:stretch>
+            <a:fillRect/>
+          </a:stretch>
+        </p:blipFill>
+        <p:spPr>
+          <a:xfrm>
+            <a:off x="6703245" y="413054"/>
+            <a:ext cx="5393140" cy="6079821"/>
+          </a:xfrm>
+          <a:prstGeom prst="rect">
+            <a:avLst/>
+          </a:prstGeom>
+        </p:spPr>
+      </p:pic>
+      <p:sp>
+        <p:nvSpPr>
+          <p:cNvPr id="14" name="TextBox 13">
+            <a:extLst>
+              <a:ext uri="{FF2B5EF4-FFF2-40B4-BE49-F238E27FC236}">
+                <a16:creationId xmlns:a16="http://schemas.microsoft.com/office/drawing/2014/main" id="{969A0587-3715-40FD-A4D8-5B13A67E33D7}"/>
+              </a:ext>
+            </a:extLst>
+          </p:cNvPr>
+          <p:cNvSpPr txBox="1"/>
+          <p:nvPr/>
+        </p:nvSpPr>
+        <p:spPr>
+          <a:xfrm>
+            <a:off x="7626220" y="4115745"/>
+            <a:ext cx="4149014" cy="261610"/>
+          </a:xfrm>
+          <a:prstGeom prst="rect">
+            <a:avLst/>
+          </a:prstGeom>
+          <a:solidFill>
+            <a:srgbClr val="F9F9F9"/>
+          </a:solidFill>
+        </p:spPr>
+        <p:txBody>
+          <a:bodyPr wrap="square" rtlCol="0">
+            <a:spAutoFit/>
+          </a:bodyPr>
+          <a:lstStyle/>
+          <a:p>
+            <a:r>
+              <a:rPr lang="en-GB" sz="1100" i="1" dirty="0">
+                <a:solidFill>
+                  <a:schemeClr val="bg1">
+                    <a:lumMod val="50000"/>
+                  </a:schemeClr>
+                </a:solidFill>
+              </a:rPr>
+              <a:t>// </a:t>
+            </a:r>
+            <a:r>
+              <a:rPr lang="en-GB" sz="1100" i="1" dirty="0" err="1">
+                <a:solidFill>
+                  <a:schemeClr val="bg1">
+                    <a:lumMod val="50000"/>
+                  </a:schemeClr>
+                </a:solidFill>
+              </a:rPr>
+              <a:t>Izmanto</a:t>
+            </a:r>
+            <a:r>
+              <a:rPr lang="en-GB" sz="1100" i="1" dirty="0">
+                <a:solidFill>
+                  <a:schemeClr val="bg1">
+                    <a:lumMod val="50000"/>
+                  </a:schemeClr>
+                </a:solidFill>
+              </a:rPr>
+              <a:t> </a:t>
+            </a:r>
+            <a:r>
+              <a:rPr lang="en-GB" sz="1100" i="1" dirty="0" err="1">
+                <a:solidFill>
+                  <a:schemeClr val="bg1">
+                    <a:lumMod val="50000"/>
+                  </a:schemeClr>
+                </a:solidFill>
+              </a:rPr>
+              <a:t>lasīšanas</a:t>
+            </a:r>
+            <a:r>
+              <a:rPr lang="en-GB" sz="1100" i="1" dirty="0">
+                <a:solidFill>
+                  <a:schemeClr val="bg1">
+                    <a:lumMod val="50000"/>
+                  </a:schemeClr>
+                </a:solidFill>
+              </a:rPr>
+              <a:t> </a:t>
+            </a:r>
+            <a:r>
+              <a:rPr lang="en-GB" sz="1100" i="1" dirty="0" err="1">
+                <a:solidFill>
+                  <a:schemeClr val="bg1">
+                    <a:lumMod val="50000"/>
+                  </a:schemeClr>
+                </a:solidFill>
+              </a:rPr>
+              <a:t>metodi</a:t>
+            </a:r>
+            <a:r>
+              <a:rPr lang="en-GB" sz="1100" i="1" dirty="0">
+                <a:solidFill>
+                  <a:schemeClr val="bg1">
+                    <a:lumMod val="50000"/>
+                  </a:schemeClr>
+                </a:solidFill>
+              </a:rPr>
+              <a:t>, </a:t>
+            </a:r>
+            <a:r>
+              <a:rPr lang="en-GB" sz="1100" i="1" dirty="0" err="1">
+                <a:solidFill>
+                  <a:schemeClr val="bg1">
+                    <a:lumMod val="50000"/>
+                  </a:schemeClr>
+                </a:solidFill>
+              </a:rPr>
+              <a:t>lai</a:t>
+            </a:r>
+            <a:r>
+              <a:rPr lang="en-GB" sz="1100" i="1" dirty="0">
+                <a:solidFill>
+                  <a:schemeClr val="bg1">
+                    <a:lumMod val="50000"/>
+                  </a:schemeClr>
+                </a:solidFill>
+              </a:rPr>
+              <a:t> </a:t>
+            </a:r>
+            <a:r>
+              <a:rPr lang="en-GB" sz="1100" i="1" dirty="0" err="1">
+                <a:solidFill>
+                  <a:schemeClr val="bg1">
+                    <a:lumMod val="50000"/>
+                  </a:schemeClr>
+                </a:solidFill>
+              </a:rPr>
+              <a:t>iegūtu</a:t>
+            </a:r>
+            <a:r>
+              <a:rPr lang="lv-LV" sz="1100" i="1" dirty="0">
+                <a:solidFill>
+                  <a:schemeClr val="bg1">
+                    <a:lumMod val="50000"/>
+                  </a:schemeClr>
+                </a:solidFill>
+              </a:rPr>
+              <a:t> «charArray»</a:t>
+            </a:r>
+            <a:endParaRPr lang="en-GB" sz="1100" i="1" dirty="0">
+              <a:solidFill>
+                <a:schemeClr val="bg1">
+                  <a:lumMod val="50000"/>
+                </a:schemeClr>
+              </a:solidFill>
+            </a:endParaRPr>
+          </a:p>
+        </p:txBody>
+      </p:sp>
+      <p:sp>
+        <p:nvSpPr>
+          <p:cNvPr id="16" name="TextBox 15">
+            <a:extLst>
+              <a:ext uri="{FF2B5EF4-FFF2-40B4-BE49-F238E27FC236}">
+                <a16:creationId xmlns:a16="http://schemas.microsoft.com/office/drawing/2014/main" id="{E8636EBE-C8C6-4028-86DF-732A753A99AC}"/>
+              </a:ext>
+            </a:extLst>
+          </p:cNvPr>
+          <p:cNvSpPr txBox="1"/>
+          <p:nvPr/>
+        </p:nvSpPr>
+        <p:spPr>
+          <a:xfrm>
+            <a:off x="7626220" y="4781090"/>
+            <a:ext cx="4149014" cy="261610"/>
+          </a:xfrm>
+          <a:prstGeom prst="rect">
+            <a:avLst/>
+          </a:prstGeom>
+          <a:solidFill>
+            <a:srgbClr val="F9F9F9"/>
+          </a:solidFill>
+        </p:spPr>
+        <p:txBody>
+          <a:bodyPr wrap="square" rtlCol="0">
+            <a:spAutoFit/>
+          </a:bodyPr>
+          <a:lstStyle/>
+          <a:p>
+            <a:r>
+              <a:rPr lang="en-GB" sz="1100" i="1" dirty="0">
+                <a:solidFill>
+                  <a:schemeClr val="bg1">
+                    <a:lumMod val="50000"/>
+                  </a:schemeClr>
+                </a:solidFill>
+              </a:rPr>
+              <a:t>// </a:t>
+            </a:r>
+            <a:r>
+              <a:rPr lang="en-GB" sz="1100" i="1" dirty="0" err="1">
+                <a:solidFill>
+                  <a:schemeClr val="bg1">
+                    <a:lumMod val="50000"/>
+                  </a:schemeClr>
+                </a:solidFill>
+              </a:rPr>
+              <a:t>Izsaukta</a:t>
+            </a:r>
+            <a:r>
+              <a:rPr lang="en-GB" sz="1100" i="1" dirty="0">
+                <a:solidFill>
+                  <a:schemeClr val="bg1">
+                    <a:lumMod val="50000"/>
+                  </a:schemeClr>
+                </a:solidFill>
+              </a:rPr>
+              <a:t> </a:t>
+            </a:r>
+            <a:r>
+              <a:rPr lang="en-GB" sz="1100" i="1" dirty="0" err="1">
+                <a:solidFill>
+                  <a:schemeClr val="bg1">
+                    <a:lumMod val="50000"/>
+                  </a:schemeClr>
+                </a:solidFill>
+              </a:rPr>
+              <a:t>aizvēršanas</a:t>
+            </a:r>
+            <a:r>
+              <a:rPr lang="en-GB" sz="1100" i="1" dirty="0">
+                <a:solidFill>
+                  <a:schemeClr val="bg1">
+                    <a:lumMod val="50000"/>
+                  </a:schemeClr>
+                </a:solidFill>
+              </a:rPr>
+              <a:t> </a:t>
+            </a:r>
+            <a:r>
+              <a:rPr lang="en-GB" sz="1100" i="1" dirty="0" err="1">
+                <a:solidFill>
+                  <a:schemeClr val="bg1">
+                    <a:lumMod val="50000"/>
+                  </a:schemeClr>
+                </a:solidFill>
+              </a:rPr>
+              <a:t>metode</a:t>
+            </a:r>
+            <a:endParaRPr lang="en-GB" sz="1100" i="1" dirty="0">
+              <a:solidFill>
+                <a:schemeClr val="bg1">
+                  <a:lumMod val="50000"/>
+                </a:schemeClr>
+              </a:solidFill>
+            </a:endParaRPr>
+          </a:p>
+        </p:txBody>
+      </p:sp>
+      <p:sp>
+        <p:nvSpPr>
+          <p:cNvPr id="17" name="TextBox 16">
+            <a:extLst>
+              <a:ext uri="{FF2B5EF4-FFF2-40B4-BE49-F238E27FC236}">
+                <a16:creationId xmlns:a16="http://schemas.microsoft.com/office/drawing/2014/main" id="{2D336839-2B93-4E84-9A23-B1EED9F8038C}"/>
+              </a:ext>
+            </a:extLst>
+          </p:cNvPr>
+          <p:cNvSpPr txBox="1"/>
+          <p:nvPr/>
+        </p:nvSpPr>
+        <p:spPr>
+          <a:xfrm>
+            <a:off x="7626220" y="2733253"/>
+            <a:ext cx="4149014" cy="261610"/>
+          </a:xfrm>
+          <a:prstGeom prst="rect">
+            <a:avLst/>
+          </a:prstGeom>
+          <a:solidFill>
+            <a:srgbClr val="F9F9F9"/>
+          </a:solidFill>
+        </p:spPr>
+        <p:txBody>
+          <a:bodyPr wrap="square" rtlCol="0">
+            <a:spAutoFit/>
+          </a:bodyPr>
+          <a:lstStyle/>
+          <a:p>
+            <a:r>
+              <a:rPr lang="en-GB" sz="1100" i="1" dirty="0">
+                <a:solidFill>
+                  <a:schemeClr val="bg1">
+                    <a:lumMod val="50000"/>
+                  </a:schemeClr>
+                </a:solidFill>
+              </a:rPr>
+              <a:t>// </a:t>
+            </a:r>
+            <a:r>
+              <a:rPr lang="en-GB" sz="1100" i="1" dirty="0" err="1">
+                <a:solidFill>
+                  <a:schemeClr val="bg1">
+                    <a:lumMod val="50000"/>
+                  </a:schemeClr>
+                </a:solidFill>
+              </a:rPr>
+              <a:t>Izmantojot</a:t>
+            </a:r>
+            <a:r>
+              <a:rPr lang="en-GB" sz="1100" i="1" dirty="0">
+                <a:solidFill>
+                  <a:schemeClr val="bg1">
+                    <a:lumMod val="50000"/>
+                  </a:schemeClr>
+                </a:solidFill>
+              </a:rPr>
+              <a:t> </a:t>
+            </a:r>
+            <a:r>
+              <a:rPr lang="en-GB" sz="1100" i="1" dirty="0" err="1">
+                <a:solidFill>
+                  <a:schemeClr val="bg1">
+                    <a:lumMod val="50000"/>
+                  </a:schemeClr>
+                </a:solidFill>
+              </a:rPr>
+              <a:t>lasīšanas</a:t>
+            </a:r>
+            <a:r>
+              <a:rPr lang="en-GB" sz="1100" i="1" dirty="0">
+                <a:solidFill>
+                  <a:schemeClr val="bg1">
+                    <a:lumMod val="50000"/>
+                  </a:schemeClr>
+                </a:solidFill>
+              </a:rPr>
+              <a:t> </a:t>
+            </a:r>
+            <a:r>
+              <a:rPr lang="en-GB" sz="1100" i="1" dirty="0" err="1">
+                <a:solidFill>
+                  <a:schemeClr val="bg1">
+                    <a:lumMod val="50000"/>
+                  </a:schemeClr>
+                </a:solidFill>
+              </a:rPr>
+              <a:t>metodi</a:t>
+            </a:r>
+            <a:endParaRPr lang="en-GB" sz="1100" i="1" dirty="0">
+              <a:solidFill>
+                <a:schemeClr val="bg1">
+                  <a:lumMod val="50000"/>
+                </a:schemeClr>
+              </a:solidFill>
+            </a:endParaRPr>
+          </a:p>
+        </p:txBody>
+      </p:sp>
+      <p:sp>
+        <p:nvSpPr>
+          <p:cNvPr id="18" name="TextBox 17">
+            <a:extLst>
+              <a:ext uri="{FF2B5EF4-FFF2-40B4-BE49-F238E27FC236}">
+                <a16:creationId xmlns:a16="http://schemas.microsoft.com/office/drawing/2014/main" id="{76960569-1D59-4DB6-8432-7173CD895E9A}"/>
+              </a:ext>
+            </a:extLst>
+          </p:cNvPr>
+          <p:cNvSpPr txBox="1"/>
+          <p:nvPr/>
+        </p:nvSpPr>
+        <p:spPr>
+          <a:xfrm>
+            <a:off x="7859485" y="1715082"/>
+            <a:ext cx="4149014" cy="261610"/>
+          </a:xfrm>
+          <a:prstGeom prst="rect">
+            <a:avLst/>
+          </a:prstGeom>
+          <a:solidFill>
+            <a:srgbClr val="F9F9F9"/>
+          </a:solidFill>
+        </p:spPr>
+        <p:txBody>
+          <a:bodyPr wrap="square" rtlCol="0">
+            <a:spAutoFit/>
+          </a:bodyPr>
+          <a:lstStyle/>
+          <a:p>
+            <a:r>
+              <a:rPr lang="en-GB" sz="1100" i="1" dirty="0" err="1">
+                <a:solidFill>
+                  <a:schemeClr val="bg1">
+                    <a:lumMod val="50000"/>
+                  </a:schemeClr>
+                </a:solidFill>
+              </a:rPr>
+              <a:t>Izmantotā</a:t>
+            </a:r>
+            <a:r>
+              <a:rPr lang="en-GB" sz="1100" i="1" dirty="0">
+                <a:solidFill>
+                  <a:schemeClr val="bg1">
+                    <a:lumMod val="50000"/>
+                  </a:schemeClr>
+                </a:solidFill>
+              </a:rPr>
+              <a:t> </a:t>
+            </a:r>
+            <a:r>
+              <a:rPr lang="en-GB" sz="1100" i="1" dirty="0" err="1">
+                <a:solidFill>
+                  <a:schemeClr val="bg1">
+                    <a:lumMod val="50000"/>
+                  </a:schemeClr>
+                </a:solidFill>
+              </a:rPr>
+              <a:t>FileReader</a:t>
+            </a:r>
+            <a:r>
+              <a:rPr lang="en-GB" sz="1100" i="1" dirty="0">
+                <a:solidFill>
+                  <a:schemeClr val="bg1">
+                    <a:lumMod val="50000"/>
+                  </a:schemeClr>
+                </a:solidFill>
+              </a:rPr>
+              <a:t> </a:t>
+            </a:r>
+            <a:r>
+              <a:rPr lang="en-GB" sz="1100" i="1" dirty="0" err="1">
+                <a:solidFill>
+                  <a:schemeClr val="bg1">
+                    <a:lumMod val="50000"/>
+                  </a:schemeClr>
+                </a:solidFill>
+              </a:rPr>
+              <a:t>klase</a:t>
+            </a:r>
+            <a:endParaRPr lang="en-GB" sz="1100" i="1" dirty="0">
+              <a:solidFill>
+                <a:schemeClr val="bg1">
+                  <a:lumMod val="50000"/>
+                </a:schemeClr>
+              </a:solidFill>
+            </a:endParaRPr>
+          </a:p>
+        </p:txBody>
+      </p:sp>
+    </p:spTree>
+    <p:extLst>
+      <p:ext uri="{BB962C8B-B14F-4D97-AF65-F5344CB8AC3E}">
+        <p14:creationId xmlns:p14="http://schemas.microsoft.com/office/powerpoint/2010/main" val="1046302628"/>
       </p:ext>
     </p:extLst>
   </p:cSld>
@@ -4813,6 +7563,87 @@
               <a:rPr lang="en-GB" dirty="0"/>
               <a:t>.</a:t>
             </a:r>
+          </a:p>
+        </p:txBody>
+      </p:sp>
+      <p:pic>
+        <p:nvPicPr>
+          <p:cNvPr id="5" name="Picture 4">
+            <a:extLst>
+              <a:ext uri="{FF2B5EF4-FFF2-40B4-BE49-F238E27FC236}">
+                <a16:creationId xmlns:a16="http://schemas.microsoft.com/office/drawing/2014/main" id="{3AF2A5AC-D608-4F1A-920E-BCB39EF7A62E}"/>
+              </a:ext>
+            </a:extLst>
+          </p:cNvPr>
+          <p:cNvPicPr>
+            <a:picLocks noChangeAspect="1"/>
+          </p:cNvPicPr>
+          <p:nvPr/>
+        </p:nvPicPr>
+        <p:blipFill>
+          <a:blip r:embed="rId2"/>
+          <a:stretch>
+            <a:fillRect/>
+          </a:stretch>
+        </p:blipFill>
+        <p:spPr>
+          <a:xfrm>
+            <a:off x="2211356" y="3429000"/>
+            <a:ext cx="8187282" cy="3288474"/>
+          </a:xfrm>
+          <a:prstGeom prst="rect">
+            <a:avLst/>
+          </a:prstGeom>
+        </p:spPr>
+      </p:pic>
+      <p:sp>
+        <p:nvSpPr>
+          <p:cNvPr id="8" name="Multiplication Sign 7">
+            <a:extLst>
+              <a:ext uri="{FF2B5EF4-FFF2-40B4-BE49-F238E27FC236}">
+                <a16:creationId xmlns:a16="http://schemas.microsoft.com/office/drawing/2014/main" id="{2DF34273-B3C1-419F-B84A-FB0571C34C4B}"/>
+              </a:ext>
+            </a:extLst>
+          </p:cNvPr>
+          <p:cNvSpPr/>
+          <p:nvPr/>
+        </p:nvSpPr>
+        <p:spPr>
+          <a:xfrm>
+            <a:off x="3648269" y="4702629"/>
+            <a:ext cx="2090057" cy="2090057"/>
+          </a:xfrm>
+          <a:prstGeom prst="mathMultiply">
+            <a:avLst/>
+          </a:prstGeom>
+          <a:solidFill>
+            <a:srgbClr val="FF0000">
+              <a:alpha val="75000"/>
+            </a:srgbClr>
+          </a:solidFill>
+        </p:spPr>
+        <p:style>
+          <a:lnRef idx="2">
+            <a:schemeClr val="accent1">
+              <a:shade val="50000"/>
+            </a:schemeClr>
+          </a:lnRef>
+          <a:fillRef idx="1">
+            <a:schemeClr val="accent1"/>
+          </a:fillRef>
+          <a:effectRef idx="0">
+            <a:schemeClr val="accent1"/>
+          </a:effectRef>
+          <a:fontRef idx="minor">
+            <a:schemeClr val="lt1"/>
+          </a:fontRef>
+        </p:style>
+        <p:txBody>
+          <a:bodyPr rtlCol="0" anchor="ctr"/>
+          <a:lstStyle/>
+          <a:p>
+            <a:pPr algn="ctr"/>
+            <a:endParaRPr lang="en-GB"/>
           </a:p>
         </p:txBody>
       </p:sp>
@@ -5494,7 +8325,7 @@
           <p:nvPr>
             <p:extLst>
               <p:ext uri="{D42A27DB-BD31-4B8C-83A1-F6EECF244321}">
-                <p14:modId xmlns:p14="http://schemas.microsoft.com/office/powerpoint/2010/main" val="3334206858"/>
+                <p14:modId xmlns:p14="http://schemas.microsoft.com/office/powerpoint/2010/main" val="838976698"/>
               </p:ext>
             </p:extLst>
           </p:nvPr>
@@ -5730,7 +8561,7 @@
                         <a:rPr lang="lv-LV" sz="1200" b="0" dirty="0">
                           <a:effectLst/>
                         </a:rPr>
-                        <a:t>String</a:t>
+                        <a:t>«String»</a:t>
                       </a:r>
                       <a:r>
                         <a:rPr lang="en-GB" sz="1200" b="0" dirty="0">
@@ -5897,7 +8728,7 @@
                         <a:rPr lang="lv-LV" sz="1200" b="0" dirty="0">
                           <a:effectLst/>
                         </a:rPr>
-                        <a:t>char</a:t>
+                        <a:t>«char»</a:t>
                       </a:r>
                       <a:r>
                         <a:rPr lang="en-GB" sz="1200" b="0" dirty="0">
@@ -6052,7 +8883,7 @@
                         <a:rPr lang="lv-LV" sz="1200" b="0" dirty="0">
                           <a:effectLst/>
                         </a:rPr>
-                        <a:t>īt char </a:t>
+                        <a:t>tīt «char» </a:t>
                       </a:r>
                       <a:r>
                         <a:rPr lang="en-GB" sz="1200" b="0" dirty="0" err="1">
@@ -6207,7 +9038,7 @@
                         <a:rPr lang="lv-LV" sz="1200" b="0" dirty="0">
                           <a:effectLst/>
                         </a:rPr>
-                        <a:t>Ieraksta String daļu no pozīcijas pos līdz length char skaitam.</a:t>
+                        <a:t>Ieraksta «String» daļu no pozīcijas «pos» līdz  «length» rakstzīmju skaitam.</a:t>
                       </a:r>
                       <a:endParaRPr lang="en-GB" sz="1200" b="0" dirty="0">
                         <a:effectLst/>
@@ -6374,6 +9205,12 @@
                         <a:t> </a:t>
                       </a:r>
                       <a:r>
+                        <a:rPr lang="lv-LV" sz="1200" b="0" dirty="0">
+                          <a:effectLst/>
+                        </a:rPr>
+                        <a:t>«</a:t>
+                      </a:r>
+                      <a:r>
                         <a:rPr lang="en-GB" sz="1200" b="0" dirty="0" err="1">
                           <a:effectLst/>
                         </a:rPr>
@@ -6383,7 +9220,19 @@
                         <a:rPr lang="en-GB" sz="1200" b="0" dirty="0">
                           <a:effectLst/>
                         </a:rPr>
-                        <a:t>[] no </a:t>
+                        <a:t>[]</a:t>
+                      </a:r>
+                      <a:r>
+                        <a:rPr lang="lv-LV" sz="1200" b="0" dirty="0">
+                          <a:effectLst/>
+                        </a:rPr>
+                        <a:t>»</a:t>
+                      </a:r>
+                      <a:r>
+                        <a:rPr lang="en-GB" sz="1200" b="0" dirty="0">
+                          <a:effectLst/>
+                        </a:rPr>
+                        <a:t> no </a:t>
                       </a:r>
                       <a:r>
                         <a:rPr lang="en-GB" sz="1200" b="0" dirty="0" err="1">
@@ -6398,10 +9247,22 @@
                         <a:t> </a:t>
                       </a:r>
                       <a:r>
+                        <a:rPr lang="lv-LV" sz="1200" b="0" dirty="0">
+                          <a:effectLst/>
+                        </a:rPr>
+                        <a:t>«</a:t>
+                      </a:r>
+                      <a:r>
                         <a:rPr lang="en-GB" sz="1200" b="0" dirty="0" err="1">
                           <a:effectLst/>
                         </a:rPr>
                         <a:t>pos</a:t>
+                      </a:r>
+                      <a:r>
+                        <a:rPr lang="lv-LV" sz="1200" b="0" dirty="0">
+                          <a:effectLst/>
+                        </a:rPr>
+                        <a:t>»</a:t>
                       </a:r>
                       <a:r>
                         <a:rPr lang="en-GB" sz="1200" b="0" dirty="0">

</xml_diff>

<commit_message>
Pievienota informācija par bufferedReader
</commit_message>
<xml_diff>
--- a/MacibuMaterials.pptx
+++ b/MacibuMaterials.pptx
@@ -19,6 +19,12 @@
     <p:sldId id="268" r:id="rId13"/>
     <p:sldId id="269" r:id="rId14"/>
     <p:sldId id="270" r:id="rId15"/>
+    <p:sldId id="271" r:id="rId16"/>
+    <p:sldId id="272" r:id="rId17"/>
+    <p:sldId id="273" r:id="rId18"/>
+    <p:sldId id="274" r:id="rId19"/>
+    <p:sldId id="275" r:id="rId20"/>
+    <p:sldId id="276" r:id="rId21"/>
   </p:sldIdLst>
   <p:sldSz cx="12192000" cy="6858000"/>
   <p:notesSz cx="6858000" cy="9144000"/>
@@ -130,7 +136,7 @@
   <pc:docChgLst>
     <pc:chgData name="Rihards Mikuts" userId="3f680863f303c92b" providerId="LiveId" clId="{7ECA00DE-8CB5-4FFD-8DC5-57B39CF038BB}"/>
     <pc:docChg chg="undo custSel addSld delSld modSld">
-      <pc:chgData name="Rihards Mikuts" userId="3f680863f303c92b" providerId="LiveId" clId="{7ECA00DE-8CB5-4FFD-8DC5-57B39CF038BB}" dt="2025-06-06T13:53:50.926" v="1270" actId="27636"/>
+      <pc:chgData name="Rihards Mikuts" userId="3f680863f303c92b" providerId="LiveId" clId="{7ECA00DE-8CB5-4FFD-8DC5-57B39CF038BB}" dt="2025-06-06T19:32:24.871" v="1521" actId="2890"/>
       <pc:docMkLst>
         <pc:docMk/>
       </pc:docMkLst>
@@ -466,7 +472,7 @@
         </pc:graphicFrameChg>
       </pc:sldChg>
       <pc:sldChg chg="addSp delSp modSp add mod setBg">
-        <pc:chgData name="Rihards Mikuts" userId="3f680863f303c92b" providerId="LiveId" clId="{7ECA00DE-8CB5-4FFD-8DC5-57B39CF038BB}" dt="2025-06-06T10:29:59.722" v="647"/>
+        <pc:chgData name="Rihards Mikuts" userId="3f680863f303c92b" providerId="LiveId" clId="{7ECA00DE-8CB5-4FFD-8DC5-57B39CF038BB}" dt="2025-06-06T19:28:20.174" v="1454" actId="478"/>
         <pc:sldMkLst>
           <pc:docMk/>
           <pc:sldMk cId="1155189427" sldId="265"/>
@@ -495,8 +501,8 @@
             <ac:spMk id="4" creationId="{E10F9686-1A91-4415-8F88-9A7CD63139E5}"/>
           </ac:spMkLst>
         </pc:spChg>
-        <pc:spChg chg="add mod">
-          <ac:chgData name="Rihards Mikuts" userId="3f680863f303c92b" providerId="LiveId" clId="{7ECA00DE-8CB5-4FFD-8DC5-57B39CF038BB}" dt="2025-06-06T10:25:26.437" v="575" actId="114"/>
+        <pc:spChg chg="add del mod">
+          <ac:chgData name="Rihards Mikuts" userId="3f680863f303c92b" providerId="LiveId" clId="{7ECA00DE-8CB5-4FFD-8DC5-57B39CF038BB}" dt="2025-06-06T19:28:15.729" v="1449" actId="478"/>
           <ac:spMkLst>
             <pc:docMk/>
             <pc:sldMk cId="1155189427" sldId="265"/>
@@ -511,40 +517,40 @@
             <ac:spMk id="9" creationId="{390ECFFE-5A2A-42D0-AEA5-BB45C4B138A7}"/>
           </ac:spMkLst>
         </pc:spChg>
-        <pc:spChg chg="add mod">
-          <ac:chgData name="Rihards Mikuts" userId="3f680863f303c92b" providerId="LiveId" clId="{7ECA00DE-8CB5-4FFD-8DC5-57B39CF038BB}" dt="2025-06-06T10:25:57.491" v="582"/>
+        <pc:spChg chg="add del mod">
+          <ac:chgData name="Rihards Mikuts" userId="3f680863f303c92b" providerId="LiveId" clId="{7ECA00DE-8CB5-4FFD-8DC5-57B39CF038BB}" dt="2025-06-06T19:28:17.517" v="1451" actId="478"/>
           <ac:spMkLst>
             <pc:docMk/>
             <pc:sldMk cId="1155189427" sldId="265"/>
             <ac:spMk id="10" creationId="{5477F512-192B-4DCB-8050-E184E7CD47CE}"/>
           </ac:spMkLst>
         </pc:spChg>
-        <pc:spChg chg="add mod">
-          <ac:chgData name="Rihards Mikuts" userId="3f680863f303c92b" providerId="LiveId" clId="{7ECA00DE-8CB5-4FFD-8DC5-57B39CF038BB}" dt="2025-06-06T10:26:31.121" v="585"/>
+        <pc:spChg chg="add del mod">
+          <ac:chgData name="Rihards Mikuts" userId="3f680863f303c92b" providerId="LiveId" clId="{7ECA00DE-8CB5-4FFD-8DC5-57B39CF038BB}" dt="2025-06-06T19:28:16.648" v="1450" actId="478"/>
           <ac:spMkLst>
             <pc:docMk/>
             <pc:sldMk cId="1155189427" sldId="265"/>
             <ac:spMk id="11" creationId="{D5BEB802-8659-401E-A5FE-8FF0C326933B}"/>
           </ac:spMkLst>
         </pc:spChg>
-        <pc:spChg chg="add mod">
-          <ac:chgData name="Rihards Mikuts" userId="3f680863f303c92b" providerId="LiveId" clId="{7ECA00DE-8CB5-4FFD-8DC5-57B39CF038BB}" dt="2025-06-06T10:29:02.172" v="640"/>
+        <pc:spChg chg="add del mod">
+          <ac:chgData name="Rihards Mikuts" userId="3f680863f303c92b" providerId="LiveId" clId="{7ECA00DE-8CB5-4FFD-8DC5-57B39CF038BB}" dt="2025-06-06T19:28:18.445" v="1452" actId="478"/>
           <ac:spMkLst>
             <pc:docMk/>
             <pc:sldMk cId="1155189427" sldId="265"/>
             <ac:spMk id="12" creationId="{6688717F-41EB-40BE-882D-F2D77669D1E7}"/>
           </ac:spMkLst>
         </pc:spChg>
-        <pc:spChg chg="add mod">
-          <ac:chgData name="Rihards Mikuts" userId="3f680863f303c92b" providerId="LiveId" clId="{7ECA00DE-8CB5-4FFD-8DC5-57B39CF038BB}" dt="2025-06-06T10:29:49.636" v="646" actId="1076"/>
+        <pc:spChg chg="add del mod">
+          <ac:chgData name="Rihards Mikuts" userId="3f680863f303c92b" providerId="LiveId" clId="{7ECA00DE-8CB5-4FFD-8DC5-57B39CF038BB}" dt="2025-06-06T19:28:19.268" v="1453" actId="478"/>
           <ac:spMkLst>
             <pc:docMk/>
             <pc:sldMk cId="1155189427" sldId="265"/>
             <ac:spMk id="13" creationId="{CA4D9355-EF21-462A-8252-3E98D9F10781}"/>
           </ac:spMkLst>
         </pc:spChg>
-        <pc:spChg chg="add mod">
-          <ac:chgData name="Rihards Mikuts" userId="3f680863f303c92b" providerId="LiveId" clId="{7ECA00DE-8CB5-4FFD-8DC5-57B39CF038BB}" dt="2025-06-06T10:29:59.722" v="647"/>
+        <pc:spChg chg="add del mod">
+          <ac:chgData name="Rihards Mikuts" userId="3f680863f303c92b" providerId="LiveId" clId="{7ECA00DE-8CB5-4FFD-8DC5-57B39CF038BB}" dt="2025-06-06T19:28:20.174" v="1454" actId="478"/>
           <ac:spMkLst>
             <pc:docMk/>
             <pc:sldMk cId="1155189427" sldId="265"/>
@@ -660,7 +666,7 @@
         </pc:picChg>
       </pc:sldChg>
       <pc:sldChg chg="addSp delSp modSp add mod setBg">
-        <pc:chgData name="Rihards Mikuts" userId="3f680863f303c92b" providerId="LiveId" clId="{7ECA00DE-8CB5-4FFD-8DC5-57B39CF038BB}" dt="2025-06-06T13:51:06.474" v="1176" actId="20577"/>
+        <pc:chgData name="Rihards Mikuts" userId="3f680863f303c92b" providerId="LiveId" clId="{7ECA00DE-8CB5-4FFD-8DC5-57B39CF038BB}" dt="2025-06-06T19:28:41.399" v="1456" actId="1076"/>
         <pc:sldMkLst>
           <pc:docMk/>
           <pc:sldMk cId="1046302628" sldId="270"/>
@@ -721,8 +727,8 @@
             <ac:spMk id="13" creationId="{CA4D9355-EF21-462A-8252-3E98D9F10781}"/>
           </ac:spMkLst>
         </pc:spChg>
-        <pc:spChg chg="mod ord">
-          <ac:chgData name="Rihards Mikuts" userId="3f680863f303c92b" providerId="LiveId" clId="{7ECA00DE-8CB5-4FFD-8DC5-57B39CF038BB}" dt="2025-06-06T13:48:54.491" v="1131" actId="1076"/>
+        <pc:spChg chg="del mod ord">
+          <ac:chgData name="Rihards Mikuts" userId="3f680863f303c92b" providerId="LiveId" clId="{7ECA00DE-8CB5-4FFD-8DC5-57B39CF038BB}" dt="2025-06-06T19:28:11.397" v="1446" actId="478"/>
           <ac:spMkLst>
             <pc:docMk/>
             <pc:sldMk cId="1046302628" sldId="270"/>
@@ -737,24 +743,24 @@
             <ac:spMk id="15" creationId="{6C5F82A3-11B4-4437-BBB8-8432384E9BE3}"/>
           </ac:spMkLst>
         </pc:spChg>
-        <pc:spChg chg="add mod">
-          <ac:chgData name="Rihards Mikuts" userId="3f680863f303c92b" providerId="LiveId" clId="{7ECA00DE-8CB5-4FFD-8DC5-57B39CF038BB}" dt="2025-06-06T13:48:46.164" v="1129"/>
+        <pc:spChg chg="add del mod">
+          <ac:chgData name="Rihards Mikuts" userId="3f680863f303c92b" providerId="LiveId" clId="{7ECA00DE-8CB5-4FFD-8DC5-57B39CF038BB}" dt="2025-06-06T19:28:12.461" v="1447" actId="478"/>
           <ac:spMkLst>
             <pc:docMk/>
             <pc:sldMk cId="1046302628" sldId="270"/>
             <ac:spMk id="16" creationId="{E8636EBE-C8C6-4028-86DF-732A753A99AC}"/>
           </ac:spMkLst>
         </pc:spChg>
-        <pc:spChg chg="add mod">
-          <ac:chgData name="Rihards Mikuts" userId="3f680863f303c92b" providerId="LiveId" clId="{7ECA00DE-8CB5-4FFD-8DC5-57B39CF038BB}" dt="2025-06-06T13:50:39.312" v="1169" actId="1076"/>
+        <pc:spChg chg="add del mod">
+          <ac:chgData name="Rihards Mikuts" userId="3f680863f303c92b" providerId="LiveId" clId="{7ECA00DE-8CB5-4FFD-8DC5-57B39CF038BB}" dt="2025-06-06T19:28:10.315" v="1445" actId="478"/>
           <ac:spMkLst>
             <pc:docMk/>
             <pc:sldMk cId="1046302628" sldId="270"/>
             <ac:spMk id="17" creationId="{2D336839-2B93-4E84-9A23-B1EED9F8038C}"/>
           </ac:spMkLst>
         </pc:spChg>
-        <pc:spChg chg="add mod">
-          <ac:chgData name="Rihards Mikuts" userId="3f680863f303c92b" providerId="LiveId" clId="{7ECA00DE-8CB5-4FFD-8DC5-57B39CF038BB}" dt="2025-06-06T13:51:06.474" v="1176" actId="20577"/>
+        <pc:spChg chg="add del mod">
+          <ac:chgData name="Rihards Mikuts" userId="3f680863f303c92b" providerId="LiveId" clId="{7ECA00DE-8CB5-4FFD-8DC5-57B39CF038BB}" dt="2025-06-06T19:28:09.150" v="1444" actId="478"/>
           <ac:spMkLst>
             <pc:docMk/>
             <pc:sldMk cId="1046302628" sldId="270"/>
@@ -777,12 +783,297 @@
             <ac:picMk id="6" creationId="{EA26F3C6-2861-4F60-9613-B5891D0AFEFA}"/>
           </ac:picMkLst>
         </pc:picChg>
+        <pc:picChg chg="add mod">
+          <ac:chgData name="Rihards Mikuts" userId="3f680863f303c92b" providerId="LiveId" clId="{7ECA00DE-8CB5-4FFD-8DC5-57B39CF038BB}" dt="2025-06-06T19:28:41.399" v="1456" actId="1076"/>
+          <ac:picMkLst>
+            <pc:docMk/>
+            <pc:sldMk cId="1046302628" sldId="270"/>
+            <ac:picMk id="9" creationId="{93B09F07-A4E7-4E05-BA2B-90858F192555}"/>
+          </ac:picMkLst>
+        </pc:picChg>
       </pc:sldChg>
       <pc:sldChg chg="add del setBg">
         <pc:chgData name="Rihards Mikuts" userId="3f680863f303c92b" providerId="LiveId" clId="{7ECA00DE-8CB5-4FFD-8DC5-57B39CF038BB}" dt="2025-06-06T13:34:10.481" v="781"/>
         <pc:sldMkLst>
           <pc:docMk/>
           <pc:sldMk cId="2847428810" sldId="270"/>
+        </pc:sldMkLst>
+      </pc:sldChg>
+      <pc:sldChg chg="addSp modSp add mod setBg">
+        <pc:chgData name="Rihards Mikuts" userId="3f680863f303c92b" providerId="LiveId" clId="{7ECA00DE-8CB5-4FFD-8DC5-57B39CF038BB}" dt="2025-06-06T19:12:46.508" v="1307" actId="1076"/>
+        <pc:sldMkLst>
+          <pc:docMk/>
+          <pc:sldMk cId="2289805255" sldId="271"/>
+        </pc:sldMkLst>
+        <pc:spChg chg="mod">
+          <ac:chgData name="Rihards Mikuts" userId="3f680863f303c92b" providerId="LiveId" clId="{7ECA00DE-8CB5-4FFD-8DC5-57B39CF038BB}" dt="2025-06-06T19:10:08.319" v="1291" actId="20577"/>
+          <ac:spMkLst>
+            <pc:docMk/>
+            <pc:sldMk cId="2289805255" sldId="271"/>
+            <ac:spMk id="2" creationId="{DC598DD3-635B-4D67-ABB3-02B91E4A79B8}"/>
+          </ac:spMkLst>
+        </pc:spChg>
+        <pc:spChg chg="mod">
+          <ac:chgData name="Rihards Mikuts" userId="3f680863f303c92b" providerId="LiveId" clId="{7ECA00DE-8CB5-4FFD-8DC5-57B39CF038BB}" dt="2025-06-06T19:12:30.817" v="1303"/>
+          <ac:spMkLst>
+            <pc:docMk/>
+            <pc:sldMk cId="2289805255" sldId="271"/>
+            <ac:spMk id="3" creationId="{DD2D8840-CC0E-49E7-93B7-354209F90F28}"/>
+          </ac:spMkLst>
+        </pc:spChg>
+        <pc:picChg chg="add mod">
+          <ac:chgData name="Rihards Mikuts" userId="3f680863f303c92b" providerId="LiveId" clId="{7ECA00DE-8CB5-4FFD-8DC5-57B39CF038BB}" dt="2025-06-06T19:12:46.508" v="1307" actId="1076"/>
+          <ac:picMkLst>
+            <pc:docMk/>
+            <pc:sldMk cId="2289805255" sldId="271"/>
+            <ac:picMk id="5" creationId="{7CD25618-1E76-4ACA-8378-FA6F4FBC1F47}"/>
+          </ac:picMkLst>
+        </pc:picChg>
+      </pc:sldChg>
+      <pc:sldChg chg="delSp modSp add mod setBg">
+        <pc:chgData name="Rihards Mikuts" userId="3f680863f303c92b" providerId="LiveId" clId="{7ECA00DE-8CB5-4FFD-8DC5-57B39CF038BB}" dt="2025-06-06T19:18:49.867" v="1355" actId="20577"/>
+        <pc:sldMkLst>
+          <pc:docMk/>
+          <pc:sldMk cId="944926470" sldId="272"/>
+        </pc:sldMkLst>
+        <pc:spChg chg="mod">
+          <ac:chgData name="Rihards Mikuts" userId="3f680863f303c92b" providerId="LiveId" clId="{7ECA00DE-8CB5-4FFD-8DC5-57B39CF038BB}" dt="2025-06-06T19:18:49.867" v="1355" actId="20577"/>
+          <ac:spMkLst>
+            <pc:docMk/>
+            <pc:sldMk cId="944926470" sldId="272"/>
+            <ac:spMk id="3" creationId="{DD2D8840-CC0E-49E7-93B7-354209F90F28}"/>
+          </ac:spMkLst>
+        </pc:spChg>
+        <pc:picChg chg="del">
+          <ac:chgData name="Rihards Mikuts" userId="3f680863f303c92b" providerId="LiveId" clId="{7ECA00DE-8CB5-4FFD-8DC5-57B39CF038BB}" dt="2025-06-06T19:18:15.203" v="1312" actId="478"/>
+          <ac:picMkLst>
+            <pc:docMk/>
+            <pc:sldMk cId="944926470" sldId="272"/>
+            <ac:picMk id="5" creationId="{7CD25618-1E76-4ACA-8378-FA6F4FBC1F47}"/>
+          </ac:picMkLst>
+        </pc:picChg>
+      </pc:sldChg>
+      <pc:sldChg chg="add del">
+        <pc:chgData name="Rihards Mikuts" userId="3f680863f303c92b" providerId="LiveId" clId="{7ECA00DE-8CB5-4FFD-8DC5-57B39CF038BB}" dt="2025-06-06T19:18:12.836" v="1311" actId="2890"/>
+        <pc:sldMkLst>
+          <pc:docMk/>
+          <pc:sldMk cId="1709898399" sldId="273"/>
+        </pc:sldMkLst>
+      </pc:sldChg>
+      <pc:sldChg chg="addSp delSp modSp add mod setBg">
+        <pc:chgData name="Rihards Mikuts" userId="3f680863f303c92b" providerId="LiveId" clId="{7ECA00DE-8CB5-4FFD-8DC5-57B39CF038BB}" dt="2025-06-06T19:22:36.830" v="1377" actId="1076"/>
+        <pc:sldMkLst>
+          <pc:docMk/>
+          <pc:sldMk cId="4280623153" sldId="273"/>
+        </pc:sldMkLst>
+        <pc:spChg chg="mod">
+          <ac:chgData name="Rihards Mikuts" userId="3f680863f303c92b" providerId="LiveId" clId="{7ECA00DE-8CB5-4FFD-8DC5-57B39CF038BB}" dt="2025-06-06T19:22:30.209" v="1371" actId="20577"/>
+          <ac:spMkLst>
+            <pc:docMk/>
+            <pc:sldMk cId="4280623153" sldId="273"/>
+            <ac:spMk id="3" creationId="{DD2D8840-CC0E-49E7-93B7-354209F90F28}"/>
+          </ac:spMkLst>
+        </pc:spChg>
+        <pc:picChg chg="add del mod">
+          <ac:chgData name="Rihards Mikuts" userId="3f680863f303c92b" providerId="LiveId" clId="{7ECA00DE-8CB5-4FFD-8DC5-57B39CF038BB}" dt="2025-06-06T19:20:14.599" v="1362" actId="22"/>
+          <ac:picMkLst>
+            <pc:docMk/>
+            <pc:sldMk cId="4280623153" sldId="273"/>
+            <ac:picMk id="5" creationId="{2E4CA350-433D-4796-B66C-55BDE4A688F5}"/>
+          </ac:picMkLst>
+        </pc:picChg>
+        <pc:picChg chg="add mod">
+          <ac:chgData name="Rihards Mikuts" userId="3f680863f303c92b" providerId="LiveId" clId="{7ECA00DE-8CB5-4FFD-8DC5-57B39CF038BB}" dt="2025-06-06T19:22:36.830" v="1377" actId="1076"/>
+          <ac:picMkLst>
+            <pc:docMk/>
+            <pc:sldMk cId="4280623153" sldId="273"/>
+            <ac:picMk id="7" creationId="{CBCD785D-5B37-4BE1-A39A-2A0CA1644EED}"/>
+          </ac:picMkLst>
+        </pc:picChg>
+      </pc:sldChg>
+      <pc:sldChg chg="addSp modSp add mod setBg">
+        <pc:chgData name="Rihards Mikuts" userId="3f680863f303c92b" providerId="LiveId" clId="{7ECA00DE-8CB5-4FFD-8DC5-57B39CF038BB}" dt="2025-06-06T19:25:01.061" v="1410"/>
+        <pc:sldMkLst>
+          <pc:docMk/>
+          <pc:sldMk cId="2794882297" sldId="274"/>
+        </pc:sldMkLst>
+        <pc:spChg chg="mod">
+          <ac:chgData name="Rihards Mikuts" userId="3f680863f303c92b" providerId="LiveId" clId="{7ECA00DE-8CB5-4FFD-8DC5-57B39CF038BB}" dt="2025-06-06T19:25:01.061" v="1410"/>
+          <ac:spMkLst>
+            <pc:docMk/>
+            <pc:sldMk cId="2794882297" sldId="274"/>
+            <ac:spMk id="3" creationId="{DD2D8840-CC0E-49E7-93B7-354209F90F28}"/>
+          </ac:spMkLst>
+        </pc:spChg>
+        <pc:picChg chg="add mod">
+          <ac:chgData name="Rihards Mikuts" userId="3f680863f303c92b" providerId="LiveId" clId="{7ECA00DE-8CB5-4FFD-8DC5-57B39CF038BB}" dt="2025-06-06T19:24:24.631" v="1399" actId="1076"/>
+          <ac:picMkLst>
+            <pc:docMk/>
+            <pc:sldMk cId="2794882297" sldId="274"/>
+            <ac:picMk id="5" creationId="{85A5D922-252B-46E6-85D7-B1B5C3F980F1}"/>
+          </ac:picMkLst>
+        </pc:picChg>
+        <pc:picChg chg="mod">
+          <ac:chgData name="Rihards Mikuts" userId="3f680863f303c92b" providerId="LiveId" clId="{7ECA00DE-8CB5-4FFD-8DC5-57B39CF038BB}" dt="2025-06-06T19:24:20.546" v="1397" actId="1076"/>
+          <ac:picMkLst>
+            <pc:docMk/>
+            <pc:sldMk cId="2794882297" sldId="274"/>
+            <ac:picMk id="7" creationId="{CBCD785D-5B37-4BE1-A39A-2A0CA1644EED}"/>
+          </ac:picMkLst>
+        </pc:picChg>
+      </pc:sldChg>
+      <pc:sldChg chg="addSp delSp modSp add mod setBg">
+        <pc:chgData name="Rihards Mikuts" userId="3f680863f303c92b" providerId="LiveId" clId="{7ECA00DE-8CB5-4FFD-8DC5-57B39CF038BB}" dt="2025-06-06T19:29:54.186" v="1473" actId="478"/>
+        <pc:sldMkLst>
+          <pc:docMk/>
+          <pc:sldMk cId="108174543" sldId="275"/>
+        </pc:sldMkLst>
+        <pc:spChg chg="mod">
+          <ac:chgData name="Rihards Mikuts" userId="3f680863f303c92b" providerId="LiveId" clId="{7ECA00DE-8CB5-4FFD-8DC5-57B39CF038BB}" dt="2025-06-06T19:29:14.351" v="1469" actId="1076"/>
+          <ac:spMkLst>
+            <pc:docMk/>
+            <pc:sldMk cId="108174543" sldId="275"/>
+            <ac:spMk id="2" creationId="{DC598DD3-635B-4D67-ABB3-02B91E4A79B8}"/>
+          </ac:spMkLst>
+        </pc:spChg>
+        <pc:spChg chg="del mod">
+          <ac:chgData name="Rihards Mikuts" userId="3f680863f303c92b" providerId="LiveId" clId="{7ECA00DE-8CB5-4FFD-8DC5-57B39CF038BB}" dt="2025-06-06T19:29:52.472" v="1472" actId="478"/>
+          <ac:spMkLst>
+            <pc:docMk/>
+            <pc:sldMk cId="108174543" sldId="275"/>
+            <ac:spMk id="3" creationId="{DD2D8840-CC0E-49E7-93B7-354209F90F28}"/>
+          </ac:spMkLst>
+        </pc:spChg>
+        <pc:spChg chg="add del mod">
+          <ac:chgData name="Rihards Mikuts" userId="3f680863f303c92b" providerId="LiveId" clId="{7ECA00DE-8CB5-4FFD-8DC5-57B39CF038BB}" dt="2025-06-06T19:29:54.186" v="1473" actId="478"/>
+          <ac:spMkLst>
+            <pc:docMk/>
+            <pc:sldMk cId="108174543" sldId="275"/>
+            <ac:spMk id="10" creationId="{8863A2F8-6051-460F-9AFE-138BFBA0D78B}"/>
+          </ac:spMkLst>
+        </pc:spChg>
+        <pc:picChg chg="add mod">
+          <ac:chgData name="Rihards Mikuts" userId="3f680863f303c92b" providerId="LiveId" clId="{7ECA00DE-8CB5-4FFD-8DC5-57B39CF038BB}" dt="2025-06-06T19:28:01.064" v="1443" actId="1076"/>
+          <ac:picMkLst>
+            <pc:docMk/>
+            <pc:sldMk cId="108174543" sldId="275"/>
+            <ac:picMk id="5" creationId="{6592AF58-9A02-4B9E-A4D2-277E64EF8493}"/>
+          </ac:picMkLst>
+        </pc:picChg>
+        <pc:picChg chg="add del">
+          <ac:chgData name="Rihards Mikuts" userId="3f680863f303c92b" providerId="LiveId" clId="{7ECA00DE-8CB5-4FFD-8DC5-57B39CF038BB}" dt="2025-06-06T19:27:53.131" v="1438" actId="478"/>
+          <ac:picMkLst>
+            <pc:docMk/>
+            <pc:sldMk cId="108174543" sldId="275"/>
+            <ac:picMk id="7" creationId="{CBCD785D-5B37-4BE1-A39A-2A0CA1644EED}"/>
+          </ac:picMkLst>
+        </pc:picChg>
+        <pc:picChg chg="add mod">
+          <ac:chgData name="Rihards Mikuts" userId="3f680863f303c92b" providerId="LiveId" clId="{7ECA00DE-8CB5-4FFD-8DC5-57B39CF038BB}" dt="2025-06-06T19:29:10.770" v="1465" actId="1076"/>
+          <ac:picMkLst>
+            <pc:docMk/>
+            <pc:sldMk cId="108174543" sldId="275"/>
+            <ac:picMk id="8" creationId="{F9017623-D6FC-4892-91E5-08F85523B4A7}"/>
+          </ac:picMkLst>
+        </pc:picChg>
+      </pc:sldChg>
+      <pc:sldChg chg="add del">
+        <pc:chgData name="Rihards Mikuts" userId="3f680863f303c92b" providerId="LiveId" clId="{7ECA00DE-8CB5-4FFD-8DC5-57B39CF038BB}" dt="2025-06-06T19:25:12.261" v="1412" actId="2890"/>
+        <pc:sldMkLst>
+          <pc:docMk/>
+          <pc:sldMk cId="3093885785" sldId="275"/>
+        </pc:sldMkLst>
+      </pc:sldChg>
+      <pc:sldChg chg="addSp delSp modSp add mod setBg">
+        <pc:chgData name="Rihards Mikuts" userId="3f680863f303c92b" providerId="LiveId" clId="{7ECA00DE-8CB5-4FFD-8DC5-57B39CF038BB}" dt="2025-06-06T19:32:13.345" v="1515" actId="1076"/>
+        <pc:sldMkLst>
+          <pc:docMk/>
+          <pc:sldMk cId="1294808629" sldId="276"/>
+        </pc:sldMkLst>
+        <pc:spChg chg="mod">
+          <ac:chgData name="Rihards Mikuts" userId="3f680863f303c92b" providerId="LiveId" clId="{7ECA00DE-8CB5-4FFD-8DC5-57B39CF038BB}" dt="2025-06-06T19:30:13.578" v="1479" actId="20577"/>
+          <ac:spMkLst>
+            <pc:docMk/>
+            <pc:sldMk cId="1294808629" sldId="276"/>
+            <ac:spMk id="2" creationId="{DC598DD3-635B-4D67-ABB3-02B91E4A79B8}"/>
+          </ac:spMkLst>
+        </pc:spChg>
+        <pc:spChg chg="del">
+          <ac:chgData name="Rihards Mikuts" userId="3f680863f303c92b" providerId="LiveId" clId="{7ECA00DE-8CB5-4FFD-8DC5-57B39CF038BB}" dt="2025-06-06T19:30:00.821" v="1474" actId="478"/>
+          <ac:spMkLst>
+            <pc:docMk/>
+            <pc:sldMk cId="1294808629" sldId="276"/>
+            <ac:spMk id="3" creationId="{DD2D8840-CC0E-49E7-93B7-354209F90F28}"/>
+          </ac:spMkLst>
+        </pc:spChg>
+        <pc:spChg chg="add del mod">
+          <ac:chgData name="Rihards Mikuts" userId="3f680863f303c92b" providerId="LiveId" clId="{7ECA00DE-8CB5-4FFD-8DC5-57B39CF038BB}" dt="2025-06-06T19:30:01.943" v="1475" actId="478"/>
+          <ac:spMkLst>
+            <pc:docMk/>
+            <pc:sldMk cId="1294808629" sldId="276"/>
+            <ac:spMk id="6" creationId="{1ADC5F8A-1E9B-438D-8D09-EC99E1A742AE}"/>
+          </ac:spMkLst>
+        </pc:spChg>
+        <pc:spChg chg="add mod">
+          <ac:chgData name="Rihards Mikuts" userId="3f680863f303c92b" providerId="LiveId" clId="{7ECA00DE-8CB5-4FFD-8DC5-57B39CF038BB}" dt="2025-06-06T19:32:13.345" v="1515" actId="1076"/>
+          <ac:spMkLst>
+            <pc:docMk/>
+            <pc:sldMk cId="1294808629" sldId="276"/>
+            <ac:spMk id="13" creationId="{A108EA3A-62AE-4C29-8246-BF2566188019}"/>
+          </ac:spMkLst>
+        </pc:spChg>
+        <pc:picChg chg="del">
+          <ac:chgData name="Rihards Mikuts" userId="3f680863f303c92b" providerId="LiveId" clId="{7ECA00DE-8CB5-4FFD-8DC5-57B39CF038BB}" dt="2025-06-06T19:30:42.095" v="1480" actId="478"/>
+          <ac:picMkLst>
+            <pc:docMk/>
+            <pc:sldMk cId="1294808629" sldId="276"/>
+            <ac:picMk id="5" creationId="{6592AF58-9A02-4B9E-A4D2-277E64EF8493}"/>
+          </ac:picMkLst>
+        </pc:picChg>
+        <pc:picChg chg="del">
+          <ac:chgData name="Rihards Mikuts" userId="3f680863f303c92b" providerId="LiveId" clId="{7ECA00DE-8CB5-4FFD-8DC5-57B39CF038BB}" dt="2025-06-06T19:30:53.402" v="1485" actId="478"/>
+          <ac:picMkLst>
+            <pc:docMk/>
+            <pc:sldMk cId="1294808629" sldId="276"/>
+            <ac:picMk id="8" creationId="{F9017623-D6FC-4892-91E5-08F85523B4A7}"/>
+          </ac:picMkLst>
+        </pc:picChg>
+        <pc:picChg chg="add mod">
+          <ac:chgData name="Rihards Mikuts" userId="3f680863f303c92b" providerId="LiveId" clId="{7ECA00DE-8CB5-4FFD-8DC5-57B39CF038BB}" dt="2025-06-06T19:31:46.193" v="1491" actId="1076"/>
+          <ac:picMkLst>
+            <pc:docMk/>
+            <pc:sldMk cId="1294808629" sldId="276"/>
+            <ac:picMk id="9" creationId="{E9BE8CF7-3113-4E1E-9593-F22C9EE22F96}"/>
+          </ac:picMkLst>
+        </pc:picChg>
+        <pc:picChg chg="add mod">
+          <ac:chgData name="Rihards Mikuts" userId="3f680863f303c92b" providerId="LiveId" clId="{7ECA00DE-8CB5-4FFD-8DC5-57B39CF038BB}" dt="2025-06-06T19:30:57.052" v="1489" actId="1076"/>
+          <ac:picMkLst>
+            <pc:docMk/>
+            <pc:sldMk cId="1294808629" sldId="276"/>
+            <ac:picMk id="11" creationId="{B25C9192-A0D2-48F6-B472-5F098A15670D}"/>
+          </ac:picMkLst>
+        </pc:picChg>
+      </pc:sldChg>
+      <pc:sldChg chg="add del">
+        <pc:chgData name="Rihards Mikuts" userId="3f680863f303c92b" providerId="LiveId" clId="{7ECA00DE-8CB5-4FFD-8DC5-57B39CF038BB}" dt="2025-06-06T19:32:22.539" v="1519" actId="2890"/>
+        <pc:sldMkLst>
+          <pc:docMk/>
+          <pc:sldMk cId="530454763" sldId="277"/>
+        </pc:sldMkLst>
+      </pc:sldChg>
+      <pc:sldChg chg="add del">
+        <pc:chgData name="Rihards Mikuts" userId="3f680863f303c92b" providerId="LiveId" clId="{7ECA00DE-8CB5-4FFD-8DC5-57B39CF038BB}" dt="2025-06-06T19:32:24.871" v="1521" actId="2890"/>
+        <pc:sldMkLst>
+          <pc:docMk/>
+          <pc:sldMk cId="674640034" sldId="277"/>
+        </pc:sldMkLst>
+      </pc:sldChg>
+      <pc:sldChg chg="add del">
+        <pc:chgData name="Rihards Mikuts" userId="3f680863f303c92b" providerId="LiveId" clId="{7ECA00DE-8CB5-4FFD-8DC5-57B39CF038BB}" dt="2025-06-06T19:32:20.887" v="1517" actId="2890"/>
+        <pc:sldMkLst>
+          <pc:docMk/>
+          <pc:sldMk cId="1577873944" sldId="277"/>
         </pc:sldMkLst>
       </pc:sldChg>
     </pc:docChg>
@@ -3895,556 +4186,6 @@
           </a:prstGeom>
         </p:spPr>
       </p:pic>
-      <p:sp>
-        <p:nvSpPr>
-          <p:cNvPr id="7" name="TextBox 6">
-            <a:extLst>
-              <a:ext uri="{FF2B5EF4-FFF2-40B4-BE49-F238E27FC236}">
-                <a16:creationId xmlns:a16="http://schemas.microsoft.com/office/drawing/2014/main" id="{C2F71542-39DB-45F2-96DC-8578AC061E2C}"/>
-              </a:ext>
-            </a:extLst>
-          </p:cNvPr>
-          <p:cNvSpPr txBox="1"/>
-          <p:nvPr/>
-        </p:nvSpPr>
-        <p:spPr>
-          <a:xfrm>
-            <a:off x="2087763" y="1381748"/>
-            <a:ext cx="5358066" cy="338554"/>
-          </a:xfrm>
-          <a:prstGeom prst="rect">
-            <a:avLst/>
-          </a:prstGeom>
-          <a:solidFill>
-            <a:srgbClr val="F9F9F9"/>
-          </a:solidFill>
-        </p:spPr>
-        <p:txBody>
-          <a:bodyPr wrap="square" rtlCol="0">
-            <a:spAutoFit/>
-          </a:bodyPr>
-          <a:lstStyle/>
-          <a:p>
-            <a:r>
-              <a:rPr lang="en-GB" sz="1600" i="1" dirty="0">
-                <a:solidFill>
-                  <a:schemeClr val="bg1">
-                    <a:lumMod val="50000"/>
-                  </a:schemeClr>
-                </a:solidFill>
-              </a:rPr>
-              <a:t>// </a:t>
-            </a:r>
-            <a:r>
-              <a:rPr lang="en-GB" sz="1600" i="1" dirty="0" err="1">
-                <a:solidFill>
-                  <a:schemeClr val="bg1">
-                    <a:lumMod val="50000"/>
-                  </a:schemeClr>
-                </a:solidFill>
-              </a:rPr>
-              <a:t>Teksta</a:t>
-            </a:r>
-            <a:r>
-              <a:rPr lang="en-GB" sz="1600" i="1" dirty="0">
-                <a:solidFill>
-                  <a:schemeClr val="bg1">
-                    <a:lumMod val="50000"/>
-                  </a:schemeClr>
-                </a:solidFill>
-              </a:rPr>
-              <a:t> </a:t>
-            </a:r>
-            <a:r>
-              <a:rPr lang="en-GB" sz="1600" i="1" dirty="0" err="1">
-                <a:solidFill>
-                  <a:schemeClr val="bg1">
-                    <a:lumMod val="50000"/>
-                  </a:schemeClr>
-                </a:solidFill>
-              </a:rPr>
-              <a:t>faila</a:t>
-            </a:r>
-            <a:r>
-              <a:rPr lang="en-GB" sz="1600" i="1" dirty="0">
-                <a:solidFill>
-                  <a:schemeClr val="bg1">
-                    <a:lumMod val="50000"/>
-                  </a:schemeClr>
-                </a:solidFill>
-              </a:rPr>
-              <a:t> </a:t>
-            </a:r>
-            <a:r>
-              <a:rPr lang="en-GB" sz="1600" i="1" dirty="0" err="1">
-                <a:solidFill>
-                  <a:schemeClr val="bg1">
-                    <a:lumMod val="50000"/>
-                  </a:schemeClr>
-                </a:solidFill>
-              </a:rPr>
-              <a:t>izveide</a:t>
-            </a:r>
-            <a:r>
-              <a:rPr lang="en-GB" sz="1600" i="1" dirty="0">
-                <a:solidFill>
-                  <a:schemeClr val="bg1">
-                    <a:lumMod val="50000"/>
-                  </a:schemeClr>
-                </a:solidFill>
-              </a:rPr>
-              <a:t>, </a:t>
-            </a:r>
-            <a:r>
-              <a:rPr lang="en-GB" sz="1600" i="1" dirty="0" err="1">
-                <a:solidFill>
-                  <a:schemeClr val="bg1">
-                    <a:lumMod val="50000"/>
-                  </a:schemeClr>
-                </a:solidFill>
-              </a:rPr>
-              <a:t>izmantojot</a:t>
-            </a:r>
-            <a:r>
-              <a:rPr lang="en-GB" sz="1600" i="1" dirty="0">
-                <a:solidFill>
-                  <a:schemeClr val="bg1">
-                    <a:lumMod val="50000"/>
-                  </a:schemeClr>
-                </a:solidFill>
-              </a:rPr>
-              <a:t> </a:t>
-            </a:r>
-            <a:r>
-              <a:rPr lang="en-GB" sz="1600" i="1" dirty="0" err="1">
-                <a:solidFill>
-                  <a:schemeClr val="bg1">
-                    <a:lumMod val="50000"/>
-                  </a:schemeClr>
-                </a:solidFill>
-              </a:rPr>
-              <a:t>FileWriter</a:t>
-            </a:r>
-            <a:endParaRPr lang="en-GB" sz="1600" i="1" dirty="0">
-              <a:solidFill>
-                <a:schemeClr val="bg1">
-                  <a:lumMod val="50000"/>
-                </a:schemeClr>
-              </a:solidFill>
-            </a:endParaRPr>
-          </a:p>
-        </p:txBody>
-      </p:sp>
-      <p:sp>
-        <p:nvSpPr>
-          <p:cNvPr id="10" name="TextBox 9">
-            <a:extLst>
-              <a:ext uri="{FF2B5EF4-FFF2-40B4-BE49-F238E27FC236}">
-                <a16:creationId xmlns:a16="http://schemas.microsoft.com/office/drawing/2014/main" id="{5477F512-192B-4DCB-8050-E184E7CD47CE}"/>
-              </a:ext>
-            </a:extLst>
-          </p:cNvPr>
-          <p:cNvSpPr txBox="1"/>
-          <p:nvPr/>
-        </p:nvSpPr>
-        <p:spPr>
-          <a:xfrm>
-            <a:off x="2706694" y="2849764"/>
-            <a:ext cx="5358066" cy="338554"/>
-          </a:xfrm>
-          <a:prstGeom prst="rect">
-            <a:avLst/>
-          </a:prstGeom>
-          <a:solidFill>
-            <a:srgbClr val="F9F9F9"/>
-          </a:solidFill>
-        </p:spPr>
-        <p:txBody>
-          <a:bodyPr wrap="square" rtlCol="0">
-            <a:spAutoFit/>
-          </a:bodyPr>
-          <a:lstStyle/>
-          <a:p>
-            <a:r>
-              <a:rPr lang="lv-LV" sz="1600" i="1" dirty="0">
-                <a:solidFill>
-                  <a:schemeClr val="bg1">
-                    <a:lumMod val="50000"/>
-                  </a:schemeClr>
-                </a:solidFill>
-              </a:rPr>
-              <a:t>// Pieņemt virkni</a:t>
-            </a:r>
-            <a:endParaRPr lang="en-GB" sz="1600" i="1" dirty="0">
-              <a:solidFill>
-                <a:schemeClr val="bg1">
-                  <a:lumMod val="50000"/>
-                </a:schemeClr>
-              </a:solidFill>
-            </a:endParaRPr>
-          </a:p>
-        </p:txBody>
-      </p:sp>
-      <p:sp>
-        <p:nvSpPr>
-          <p:cNvPr id="11" name="TextBox 10">
-            <a:extLst>
-              <a:ext uri="{FF2B5EF4-FFF2-40B4-BE49-F238E27FC236}">
-                <a16:creationId xmlns:a16="http://schemas.microsoft.com/office/drawing/2014/main" id="{D5BEB802-8659-401E-A5FE-8FF0C326933B}"/>
-              </a:ext>
-            </a:extLst>
-          </p:cNvPr>
-          <p:cNvSpPr txBox="1"/>
-          <p:nvPr/>
-        </p:nvSpPr>
-        <p:spPr>
-          <a:xfrm>
-            <a:off x="2800000" y="3671826"/>
-            <a:ext cx="5358066" cy="338554"/>
-          </a:xfrm>
-          <a:prstGeom prst="rect">
-            <a:avLst/>
-          </a:prstGeom>
-          <a:solidFill>
-            <a:srgbClr val="F9F9F9"/>
-          </a:solidFill>
-        </p:spPr>
-        <p:txBody>
-          <a:bodyPr wrap="square" rtlCol="0">
-            <a:spAutoFit/>
-          </a:bodyPr>
-          <a:lstStyle/>
-          <a:p>
-            <a:r>
-              <a:rPr lang="en-GB" sz="1600" i="1" dirty="0">
-                <a:solidFill>
-                  <a:schemeClr val="bg1">
-                    <a:lumMod val="50000"/>
-                  </a:schemeClr>
-                </a:solidFill>
-              </a:rPr>
-              <a:t>// </a:t>
-            </a:r>
-            <a:r>
-              <a:rPr lang="en-GB" sz="1600" i="1" dirty="0" err="1">
-                <a:solidFill>
-                  <a:schemeClr val="bg1">
-                    <a:lumMod val="50000"/>
-                  </a:schemeClr>
-                </a:solidFill>
-              </a:rPr>
-              <a:t>pievienot</a:t>
-            </a:r>
-            <a:r>
-              <a:rPr lang="en-GB" sz="1600" i="1" dirty="0">
-                <a:solidFill>
-                  <a:schemeClr val="bg1">
-                    <a:lumMod val="50000"/>
-                  </a:schemeClr>
-                </a:solidFill>
-              </a:rPr>
-              <a:t> </a:t>
-            </a:r>
-            <a:r>
-              <a:rPr lang="en-GB" sz="1600" i="1" dirty="0" err="1">
-                <a:solidFill>
-                  <a:schemeClr val="bg1">
-                    <a:lumMod val="50000"/>
-                  </a:schemeClr>
-                </a:solidFill>
-              </a:rPr>
-              <a:t>failu</a:t>
-            </a:r>
-            <a:r>
-              <a:rPr lang="en-GB" sz="1600" i="1" dirty="0">
-                <a:solidFill>
-                  <a:schemeClr val="bg1">
-                    <a:lumMod val="50000"/>
-                  </a:schemeClr>
-                </a:solidFill>
-              </a:rPr>
-              <a:t> </a:t>
-            </a:r>
-            <a:r>
-              <a:rPr lang="en-GB" sz="1600" i="1" dirty="0" err="1">
-                <a:solidFill>
-                  <a:schemeClr val="bg1">
-                    <a:lumMod val="50000"/>
-                  </a:schemeClr>
-                </a:solidFill>
-              </a:rPr>
-              <a:t>FileWriter</a:t>
-            </a:r>
-            <a:endParaRPr lang="en-GB" sz="1600" i="1" dirty="0">
-              <a:solidFill>
-                <a:schemeClr val="bg1">
-                  <a:lumMod val="50000"/>
-                </a:schemeClr>
-              </a:solidFill>
-            </a:endParaRPr>
-          </a:p>
-        </p:txBody>
-      </p:sp>
-      <p:sp>
-        <p:nvSpPr>
-          <p:cNvPr id="12" name="TextBox 11">
-            <a:extLst>
-              <a:ext uri="{FF2B5EF4-FFF2-40B4-BE49-F238E27FC236}">
-                <a16:creationId xmlns:a16="http://schemas.microsoft.com/office/drawing/2014/main" id="{6688717F-41EB-40BE-882D-F2D77669D1E7}"/>
-              </a:ext>
-            </a:extLst>
-          </p:cNvPr>
-          <p:cNvSpPr txBox="1"/>
-          <p:nvPr/>
-        </p:nvSpPr>
-        <p:spPr>
-          <a:xfrm>
-            <a:off x="2893307" y="4277346"/>
-            <a:ext cx="5358066" cy="338554"/>
-          </a:xfrm>
-          <a:prstGeom prst="rect">
-            <a:avLst/>
-          </a:prstGeom>
-          <a:solidFill>
-            <a:srgbClr val="F9F9F9"/>
-          </a:solidFill>
-        </p:spPr>
-        <p:txBody>
-          <a:bodyPr wrap="square" rtlCol="0">
-            <a:spAutoFit/>
-          </a:bodyPr>
-          <a:lstStyle/>
-          <a:p>
-            <a:r>
-              <a:rPr lang="en-GB" sz="1600" i="1" dirty="0">
-                <a:solidFill>
-                  <a:schemeClr val="bg1">
-                    <a:lumMod val="50000"/>
-                  </a:schemeClr>
-                </a:solidFill>
-              </a:rPr>
-              <a:t>// </a:t>
-            </a:r>
-            <a:r>
-              <a:rPr lang="en-GB" sz="1600" i="1" dirty="0" err="1">
-                <a:solidFill>
-                  <a:schemeClr val="bg1">
-                    <a:lumMod val="50000"/>
-                  </a:schemeClr>
-                </a:solidFill>
-              </a:rPr>
-              <a:t>nolasīt</a:t>
-            </a:r>
-            <a:r>
-              <a:rPr lang="en-GB" sz="1600" i="1" dirty="0">
-                <a:solidFill>
-                  <a:schemeClr val="bg1">
-                    <a:lumMod val="50000"/>
-                  </a:schemeClr>
-                </a:solidFill>
-              </a:rPr>
-              <a:t> pa </a:t>
-            </a:r>
-            <a:r>
-              <a:rPr lang="en-GB" sz="1600" i="1" dirty="0" err="1">
-                <a:solidFill>
-                  <a:schemeClr val="bg1">
-                    <a:lumMod val="50000"/>
-                  </a:schemeClr>
-                </a:solidFill>
-              </a:rPr>
-              <a:t>rakstzīmēm</a:t>
-            </a:r>
-            <a:r>
-              <a:rPr lang="en-GB" sz="1600" i="1" dirty="0">
-                <a:solidFill>
-                  <a:schemeClr val="bg1">
-                    <a:lumMod val="50000"/>
-                  </a:schemeClr>
-                </a:solidFill>
-              </a:rPr>
-              <a:t> no </a:t>
-            </a:r>
-            <a:r>
-              <a:rPr lang="en-GB" sz="1600" i="1" dirty="0" err="1">
-                <a:solidFill>
-                  <a:schemeClr val="bg1">
-                    <a:lumMod val="50000"/>
-                  </a:schemeClr>
-                </a:solidFill>
-              </a:rPr>
-              <a:t>virknes</a:t>
-            </a:r>
-            <a:r>
-              <a:rPr lang="en-GB" sz="1600" i="1" dirty="0">
-                <a:solidFill>
-                  <a:schemeClr val="bg1">
-                    <a:lumMod val="50000"/>
-                  </a:schemeClr>
-                </a:solidFill>
-              </a:rPr>
-              <a:t> un </a:t>
-            </a:r>
-            <a:r>
-              <a:rPr lang="en-GB" sz="1600" i="1" dirty="0" err="1">
-                <a:solidFill>
-                  <a:schemeClr val="bg1">
-                    <a:lumMod val="50000"/>
-                  </a:schemeClr>
-                </a:solidFill>
-              </a:rPr>
-              <a:t>ierakstīt</a:t>
-            </a:r>
-            <a:endParaRPr lang="en-GB" sz="1600" i="1" dirty="0">
-              <a:solidFill>
-                <a:schemeClr val="bg1">
-                  <a:lumMod val="50000"/>
-                </a:schemeClr>
-              </a:solidFill>
-            </a:endParaRPr>
-          </a:p>
-        </p:txBody>
-      </p:sp>
-      <p:sp>
-        <p:nvSpPr>
-          <p:cNvPr id="13" name="TextBox 12">
-            <a:extLst>
-              <a:ext uri="{FF2B5EF4-FFF2-40B4-BE49-F238E27FC236}">
-                <a16:creationId xmlns:a16="http://schemas.microsoft.com/office/drawing/2014/main" id="{CA4D9355-EF21-462A-8252-3E98D9F10781}"/>
-              </a:ext>
-            </a:extLst>
-          </p:cNvPr>
-          <p:cNvSpPr txBox="1"/>
-          <p:nvPr/>
-        </p:nvSpPr>
-        <p:spPr>
-          <a:xfrm>
-            <a:off x="3145233" y="4544312"/>
-            <a:ext cx="5358066" cy="338554"/>
-          </a:xfrm>
-          <a:prstGeom prst="rect">
-            <a:avLst/>
-          </a:prstGeom>
-          <a:solidFill>
-            <a:srgbClr val="F9F9F9"/>
-          </a:solidFill>
-        </p:spPr>
-        <p:txBody>
-          <a:bodyPr wrap="square" rtlCol="0">
-            <a:spAutoFit/>
-          </a:bodyPr>
-          <a:lstStyle/>
-          <a:p>
-            <a:r>
-              <a:rPr lang="en-GB" sz="1600" i="1" dirty="0">
-                <a:solidFill>
-                  <a:schemeClr val="bg1">
-                    <a:lumMod val="50000"/>
-                  </a:schemeClr>
-                </a:solidFill>
-              </a:rPr>
-              <a:t> </a:t>
-            </a:r>
-            <a:r>
-              <a:rPr lang="en-GB" sz="1400" i="1" dirty="0" err="1">
-                <a:solidFill>
-                  <a:schemeClr val="bg1">
-                    <a:lumMod val="50000"/>
-                  </a:schemeClr>
-                </a:solidFill>
-              </a:rPr>
-              <a:t>FileWriter</a:t>
-            </a:r>
-            <a:endParaRPr lang="en-GB" sz="1600" i="1" dirty="0">
-              <a:solidFill>
-                <a:schemeClr val="bg1">
-                  <a:lumMod val="50000"/>
-                </a:schemeClr>
-              </a:solidFill>
-            </a:endParaRPr>
-          </a:p>
-        </p:txBody>
-      </p:sp>
-      <p:sp>
-        <p:nvSpPr>
-          <p:cNvPr id="14" name="TextBox 13">
-            <a:extLst>
-              <a:ext uri="{FF2B5EF4-FFF2-40B4-BE49-F238E27FC236}">
-                <a16:creationId xmlns:a16="http://schemas.microsoft.com/office/drawing/2014/main" id="{969A0587-3715-40FD-A4D8-5B13A67E33D7}"/>
-              </a:ext>
-            </a:extLst>
-          </p:cNvPr>
-          <p:cNvSpPr txBox="1"/>
-          <p:nvPr/>
-        </p:nvSpPr>
-        <p:spPr>
-          <a:xfrm>
-            <a:off x="2800000" y="5634871"/>
-            <a:ext cx="5358066" cy="276999"/>
-          </a:xfrm>
-          <a:prstGeom prst="rect">
-            <a:avLst/>
-          </a:prstGeom>
-          <a:solidFill>
-            <a:srgbClr val="F9F9F9"/>
-          </a:solidFill>
-        </p:spPr>
-        <p:txBody>
-          <a:bodyPr wrap="square" rtlCol="0">
-            <a:spAutoFit/>
-          </a:bodyPr>
-          <a:lstStyle/>
-          <a:p>
-            <a:r>
-              <a:rPr lang="en-GB" sz="1200" i="1" dirty="0">
-                <a:solidFill>
-                  <a:schemeClr val="bg1">
-                    <a:lumMod val="50000"/>
-                  </a:schemeClr>
-                </a:solidFill>
-              </a:rPr>
-              <a:t>//</a:t>
-            </a:r>
-            <a:r>
-              <a:rPr lang="en-GB" sz="1200" i="1" dirty="0" err="1">
-                <a:solidFill>
-                  <a:schemeClr val="bg1">
-                    <a:lumMod val="50000"/>
-                  </a:schemeClr>
-                </a:solidFill>
-              </a:rPr>
-              <a:t>aizvērt</a:t>
-            </a:r>
-            <a:r>
-              <a:rPr lang="en-GB" sz="1200" i="1" dirty="0">
-                <a:solidFill>
-                  <a:schemeClr val="bg1">
-                    <a:lumMod val="50000"/>
-                  </a:schemeClr>
-                </a:solidFill>
-              </a:rPr>
-              <a:t> </a:t>
-            </a:r>
-            <a:r>
-              <a:rPr lang="en-GB" sz="1200" i="1" dirty="0" err="1">
-                <a:solidFill>
-                  <a:schemeClr val="bg1">
-                    <a:lumMod val="50000"/>
-                  </a:schemeClr>
-                </a:solidFill>
-              </a:rPr>
-              <a:t>failu</a:t>
-            </a:r>
-            <a:endParaRPr lang="en-GB" sz="1200" i="1" dirty="0">
-              <a:solidFill>
-                <a:schemeClr val="bg1">
-                  <a:lumMod val="50000"/>
-                </a:schemeClr>
-              </a:solidFill>
-            </a:endParaRPr>
-          </a:p>
-        </p:txBody>
-      </p:sp>
     </p:spTree>
     <p:extLst>
       <p:ext uri="{BB962C8B-B14F-4D97-AF65-F5344CB8AC3E}">
@@ -6468,450 +6209,1217 @@
           </a:prstGeom>
         </p:spPr>
       </p:pic>
-      <p:sp>
-        <p:nvSpPr>
-          <p:cNvPr id="14" name="TextBox 13">
+      <p:pic>
+        <p:nvPicPr>
+          <p:cNvPr id="9" name="Picture 8">
             <a:extLst>
               <a:ext uri="{FF2B5EF4-FFF2-40B4-BE49-F238E27FC236}">
-                <a16:creationId xmlns:a16="http://schemas.microsoft.com/office/drawing/2014/main" id="{969A0587-3715-40FD-A4D8-5B13A67E33D7}"/>
+                <a16:creationId xmlns:a16="http://schemas.microsoft.com/office/drawing/2014/main" id="{93B09F07-A4E7-4E05-BA2B-90858F192555}"/>
               </a:ext>
             </a:extLst>
           </p:cNvPr>
-          <p:cNvSpPr txBox="1"/>
+          <p:cNvPicPr>
+            <a:picLocks noChangeAspect="1"/>
+          </p:cNvPicPr>
           <p:nvPr/>
-        </p:nvSpPr>
+        </p:nvPicPr>
+        <p:blipFill>
+          <a:blip r:embed="rId3"/>
+          <a:stretch>
+            <a:fillRect/>
+          </a:stretch>
+        </p:blipFill>
         <p:spPr>
           <a:xfrm>
-            <a:off x="7626220" y="4115745"/>
-            <a:ext cx="4149014" cy="261610"/>
+            <a:off x="3387387" y="4115745"/>
+            <a:ext cx="2991267" cy="2333951"/>
           </a:xfrm>
           <a:prstGeom prst="rect">
             <a:avLst/>
           </a:prstGeom>
-          <a:solidFill>
-            <a:srgbClr val="F9F9F9"/>
-          </a:solidFill>
         </p:spPr>
+      </p:pic>
+    </p:spTree>
+    <p:extLst>
+      <p:ext uri="{BB962C8B-B14F-4D97-AF65-F5344CB8AC3E}">
+        <p14:creationId xmlns:p14="http://schemas.microsoft.com/office/powerpoint/2010/main" val="1046302628"/>
+      </p:ext>
+    </p:extLst>
+  </p:cSld>
+  <p:clrMapOvr>
+    <a:masterClrMapping/>
+  </p:clrMapOvr>
+</p:sld>
+</file>
+
+<file path=ppt/slides/slide15.xml><?xml version="1.0" encoding="utf-8"?>
+<p:sld xmlns:a="http://schemas.openxmlformats.org/drawingml/2006/main" xmlns:r="http://schemas.openxmlformats.org/officeDocument/2006/relationships" xmlns:p="http://schemas.openxmlformats.org/presentationml/2006/main">
+  <p:cSld>
+    <p:bg>
+      <p:bgPr>
+        <a:solidFill>
+          <a:schemeClr val="accent6">
+            <a:lumMod val="20000"/>
+            <a:lumOff val="80000"/>
+          </a:schemeClr>
+        </a:solidFill>
+        <a:effectLst/>
+      </p:bgPr>
+    </p:bg>
+    <p:spTree>
+      <p:nvGrpSpPr>
+        <p:cNvPr id="1" name=""/>
+        <p:cNvGrpSpPr/>
+        <p:nvPr/>
+      </p:nvGrpSpPr>
+      <p:grpSpPr>
+        <a:xfrm>
+          <a:off x="0" y="0"/>
+          <a:ext cx="0" cy="0"/>
+          <a:chOff x="0" y="0"/>
+          <a:chExt cx="0" cy="0"/>
+        </a:xfrm>
+      </p:grpSpPr>
+      <p:sp>
+        <p:nvSpPr>
+          <p:cNvPr id="2" name="Title 1">
+            <a:extLst>
+              <a:ext uri="{FF2B5EF4-FFF2-40B4-BE49-F238E27FC236}">
+                <a16:creationId xmlns:a16="http://schemas.microsoft.com/office/drawing/2014/main" id="{DC598DD3-635B-4D67-ABB3-02B91E4A79B8}"/>
+              </a:ext>
+            </a:extLst>
+          </p:cNvPr>
+          <p:cNvSpPr>
+            <a:spLocks noGrp="1"/>
+          </p:cNvSpPr>
+          <p:nvPr>
+            <p:ph type="title"/>
+          </p:nvPr>
+        </p:nvSpPr>
+        <p:spPr/>
         <p:txBody>
-          <a:bodyPr wrap="square" rtlCol="0">
-            <a:spAutoFit/>
-          </a:bodyPr>
+          <a:bodyPr/>
           <a:lstStyle/>
           <a:p>
             <a:r>
-              <a:rPr lang="en-GB" sz="1100" i="1" dirty="0">
-                <a:solidFill>
-                  <a:schemeClr val="bg1">
-                    <a:lumMod val="50000"/>
-                  </a:schemeClr>
-                </a:solidFill>
+              <a:rPr lang="lv-LV" dirty="0">
+                <a:latin typeface="Arial Black" panose="020B0A04020102020204" pitchFamily="34" charset="0"/>
               </a:rPr>
-              <a:t>// </a:t>
-            </a:r>
-            <a:r>
-              <a:rPr lang="en-GB" sz="1100" i="1" dirty="0" err="1">
-                <a:solidFill>
-                  <a:schemeClr val="bg1">
-                    <a:lumMod val="50000"/>
-                  </a:schemeClr>
-                </a:solidFill>
-              </a:rPr>
-              <a:t>Izmanto</a:t>
-            </a:r>
-            <a:r>
-              <a:rPr lang="en-GB" sz="1100" i="1" dirty="0">
-                <a:solidFill>
-                  <a:schemeClr val="bg1">
-                    <a:lumMod val="50000"/>
-                  </a:schemeClr>
-                </a:solidFill>
-              </a:rPr>
-              <a:t> </a:t>
-            </a:r>
-            <a:r>
-              <a:rPr lang="en-GB" sz="1100" i="1" dirty="0" err="1">
-                <a:solidFill>
-                  <a:schemeClr val="bg1">
-                    <a:lumMod val="50000"/>
-                  </a:schemeClr>
-                </a:solidFill>
-              </a:rPr>
-              <a:t>lasīšanas</a:t>
-            </a:r>
-            <a:r>
-              <a:rPr lang="en-GB" sz="1100" i="1" dirty="0">
-                <a:solidFill>
-                  <a:schemeClr val="bg1">
-                    <a:lumMod val="50000"/>
-                  </a:schemeClr>
-                </a:solidFill>
-              </a:rPr>
-              <a:t> </a:t>
-            </a:r>
-            <a:r>
-              <a:rPr lang="en-GB" sz="1100" i="1" dirty="0" err="1">
-                <a:solidFill>
-                  <a:schemeClr val="bg1">
-                    <a:lumMod val="50000"/>
-                  </a:schemeClr>
-                </a:solidFill>
-              </a:rPr>
-              <a:t>metodi</a:t>
-            </a:r>
-            <a:r>
-              <a:rPr lang="en-GB" sz="1100" i="1" dirty="0">
-                <a:solidFill>
-                  <a:schemeClr val="bg1">
-                    <a:lumMod val="50000"/>
-                  </a:schemeClr>
-                </a:solidFill>
-              </a:rPr>
-              <a:t>, </a:t>
-            </a:r>
-            <a:r>
-              <a:rPr lang="en-GB" sz="1100" i="1" dirty="0" err="1">
-                <a:solidFill>
-                  <a:schemeClr val="bg1">
-                    <a:lumMod val="50000"/>
-                  </a:schemeClr>
-                </a:solidFill>
-              </a:rPr>
-              <a:t>lai</a:t>
-            </a:r>
-            <a:r>
-              <a:rPr lang="en-GB" sz="1100" i="1" dirty="0">
-                <a:solidFill>
-                  <a:schemeClr val="bg1">
-                    <a:lumMod val="50000"/>
-                  </a:schemeClr>
-                </a:solidFill>
-              </a:rPr>
-              <a:t> </a:t>
-            </a:r>
-            <a:r>
-              <a:rPr lang="en-GB" sz="1100" i="1" dirty="0" err="1">
-                <a:solidFill>
-                  <a:schemeClr val="bg1">
-                    <a:lumMod val="50000"/>
-                  </a:schemeClr>
-                </a:solidFill>
-              </a:rPr>
-              <a:t>iegūtu</a:t>
-            </a:r>
-            <a:r>
-              <a:rPr lang="lv-LV" sz="1100" i="1" dirty="0">
-                <a:solidFill>
-                  <a:schemeClr val="bg1">
-                    <a:lumMod val="50000"/>
-                  </a:schemeClr>
-                </a:solidFill>
-              </a:rPr>
-              <a:t> «charArray»</a:t>
-            </a:r>
-            <a:endParaRPr lang="en-GB" sz="1100" i="1" dirty="0">
-              <a:solidFill>
-                <a:schemeClr val="bg1">
-                  <a:lumMod val="50000"/>
-                </a:schemeClr>
-              </a:solidFill>
+              <a:t>BufferedReader</a:t>
+            </a:r>
+            <a:endParaRPr lang="en-GB" dirty="0">
+              <a:latin typeface="Arial Black" panose="020B0A04020102020204" pitchFamily="34" charset="0"/>
             </a:endParaRPr>
           </a:p>
         </p:txBody>
       </p:sp>
       <p:sp>
         <p:nvSpPr>
-          <p:cNvPr id="16" name="TextBox 15">
+          <p:cNvPr id="3" name="Content Placeholder 2">
             <a:extLst>
               <a:ext uri="{FF2B5EF4-FFF2-40B4-BE49-F238E27FC236}">
-                <a16:creationId xmlns:a16="http://schemas.microsoft.com/office/drawing/2014/main" id="{E8636EBE-C8C6-4028-86DF-732A753A99AC}"/>
+                <a16:creationId xmlns:a16="http://schemas.microsoft.com/office/drawing/2014/main" id="{DD2D8840-CC0E-49E7-93B7-354209F90F28}"/>
               </a:ext>
             </a:extLst>
           </p:cNvPr>
-          <p:cNvSpPr txBox="1"/>
+          <p:cNvSpPr>
+            <a:spLocks noGrp="1"/>
+          </p:cNvSpPr>
+          <p:nvPr>
+            <p:ph idx="1"/>
+          </p:nvPr>
+        </p:nvSpPr>
+        <p:spPr/>
+        <p:txBody>
+          <a:bodyPr>
+            <a:normAutofit/>
+          </a:bodyPr>
+          <a:lstStyle/>
+          <a:p>
+            <a:pPr marL="0" indent="0">
+              <a:buNone/>
+            </a:pPr>
+            <a:r>
+              <a:rPr lang="en-GB" b="0" i="0" dirty="0">
+                <a:solidFill>
+                  <a:srgbClr val="273239"/>
+                </a:solidFill>
+                <a:effectLst/>
+                <a:latin typeface="Nunito" pitchFamily="2" charset="0"/>
+              </a:rPr>
+              <a:t>Java.io </a:t>
+            </a:r>
+            <a:r>
+              <a:rPr lang="en-GB" b="0" i="0" dirty="0" err="1">
+                <a:solidFill>
+                  <a:srgbClr val="273239"/>
+                </a:solidFill>
+                <a:effectLst/>
+                <a:latin typeface="Nunito" pitchFamily="2" charset="0"/>
+              </a:rPr>
+              <a:t>pakotnes</a:t>
+            </a:r>
+            <a:r>
+              <a:rPr lang="en-GB" b="0" i="0" dirty="0">
+                <a:solidFill>
+                  <a:srgbClr val="273239"/>
+                </a:solidFill>
+                <a:effectLst/>
+                <a:latin typeface="Nunito" pitchFamily="2" charset="0"/>
+              </a:rPr>
+              <a:t> </a:t>
+            </a:r>
+            <a:r>
+              <a:rPr lang="en-GB" b="0" i="0" dirty="0" err="1">
+                <a:solidFill>
+                  <a:srgbClr val="273239"/>
+                </a:solidFill>
+                <a:effectLst/>
+                <a:latin typeface="Nunito" pitchFamily="2" charset="0"/>
+              </a:rPr>
+              <a:t>BufferedReader</a:t>
+            </a:r>
+            <a:r>
+              <a:rPr lang="en-GB" b="0" i="0" dirty="0">
+                <a:solidFill>
+                  <a:srgbClr val="273239"/>
+                </a:solidFill>
+                <a:effectLst/>
+                <a:latin typeface="Nunito" pitchFamily="2" charset="0"/>
+              </a:rPr>
+              <a:t> </a:t>
+            </a:r>
+            <a:r>
+              <a:rPr lang="en-GB" b="0" i="0" dirty="0" err="1">
+                <a:solidFill>
+                  <a:srgbClr val="273239"/>
+                </a:solidFill>
+                <a:effectLst/>
+                <a:latin typeface="Nunito" pitchFamily="2" charset="0"/>
+              </a:rPr>
+              <a:t>klasi</a:t>
+            </a:r>
+            <a:r>
+              <a:rPr lang="en-GB" b="0" i="0" dirty="0">
+                <a:solidFill>
+                  <a:srgbClr val="273239"/>
+                </a:solidFill>
+                <a:effectLst/>
+                <a:latin typeface="Nunito" pitchFamily="2" charset="0"/>
+              </a:rPr>
+              <a:t> var </a:t>
+            </a:r>
+            <a:r>
+              <a:rPr lang="en-GB" b="0" i="0" dirty="0" err="1">
+                <a:solidFill>
+                  <a:srgbClr val="273239"/>
+                </a:solidFill>
+                <a:effectLst/>
+                <a:latin typeface="Nunito" pitchFamily="2" charset="0"/>
+              </a:rPr>
+              <a:t>izmantot</a:t>
+            </a:r>
+            <a:r>
+              <a:rPr lang="en-GB" b="0" i="0" dirty="0">
+                <a:solidFill>
+                  <a:srgbClr val="273239"/>
+                </a:solidFill>
+                <a:effectLst/>
+                <a:latin typeface="Nunito" pitchFamily="2" charset="0"/>
+              </a:rPr>
+              <a:t> </a:t>
+            </a:r>
+            <a:r>
+              <a:rPr lang="en-GB" b="0" i="0" dirty="0" err="1">
+                <a:solidFill>
+                  <a:srgbClr val="273239"/>
+                </a:solidFill>
+                <a:effectLst/>
+                <a:latin typeface="Nunito" pitchFamily="2" charset="0"/>
+              </a:rPr>
+              <a:t>kopā</a:t>
+            </a:r>
+            <a:r>
+              <a:rPr lang="en-GB" b="0" i="0" dirty="0">
+                <a:solidFill>
+                  <a:srgbClr val="273239"/>
+                </a:solidFill>
+                <a:effectLst/>
+                <a:latin typeface="Nunito" pitchFamily="2" charset="0"/>
+              </a:rPr>
+              <a:t> </a:t>
+            </a:r>
+            <a:r>
+              <a:rPr lang="en-GB" b="0" i="0" dirty="0" err="1">
+                <a:solidFill>
+                  <a:srgbClr val="273239"/>
+                </a:solidFill>
+                <a:effectLst/>
+                <a:latin typeface="Nunito" pitchFamily="2" charset="0"/>
+              </a:rPr>
+              <a:t>ar</a:t>
+            </a:r>
+            <a:r>
+              <a:rPr lang="en-GB" b="0" i="0" dirty="0">
+                <a:solidFill>
+                  <a:srgbClr val="273239"/>
+                </a:solidFill>
+                <a:effectLst/>
+                <a:latin typeface="Nunito" pitchFamily="2" charset="0"/>
+              </a:rPr>
+              <a:t> </a:t>
+            </a:r>
+            <a:r>
+              <a:rPr lang="en-GB" b="0" i="0" dirty="0" err="1">
+                <a:solidFill>
+                  <a:srgbClr val="273239"/>
+                </a:solidFill>
+                <a:effectLst/>
+                <a:latin typeface="Nunito" pitchFamily="2" charset="0"/>
+              </a:rPr>
+              <a:t>citiem</a:t>
+            </a:r>
+            <a:r>
+              <a:rPr lang="en-GB" b="0" i="0" dirty="0">
+                <a:solidFill>
+                  <a:srgbClr val="273239"/>
+                </a:solidFill>
+                <a:effectLst/>
+                <a:latin typeface="Nunito" pitchFamily="2" charset="0"/>
+              </a:rPr>
+              <a:t> </a:t>
+            </a:r>
+            <a:r>
+              <a:rPr lang="en-GB" b="0" i="0" dirty="0" err="1">
+                <a:solidFill>
+                  <a:srgbClr val="273239"/>
+                </a:solidFill>
+                <a:effectLst/>
+                <a:latin typeface="Nunito" pitchFamily="2" charset="0"/>
+              </a:rPr>
+              <a:t>lasītājiem</a:t>
+            </a:r>
+            <a:r>
+              <a:rPr lang="en-GB" b="0" i="0" dirty="0">
+                <a:solidFill>
+                  <a:srgbClr val="273239"/>
+                </a:solidFill>
+                <a:effectLst/>
+                <a:latin typeface="Nunito" pitchFamily="2" charset="0"/>
+              </a:rPr>
+              <a:t>, </a:t>
+            </a:r>
+            <a:r>
+              <a:rPr lang="en-GB" b="0" i="0" dirty="0" err="1">
+                <a:solidFill>
+                  <a:srgbClr val="273239"/>
+                </a:solidFill>
+                <a:effectLst/>
+                <a:latin typeface="Nunito" pitchFamily="2" charset="0"/>
+              </a:rPr>
+              <a:t>lai</a:t>
+            </a:r>
+            <a:r>
+              <a:rPr lang="en-GB" b="0" i="0" dirty="0">
+                <a:solidFill>
+                  <a:srgbClr val="273239"/>
+                </a:solidFill>
+                <a:effectLst/>
+                <a:latin typeface="Nunito" pitchFamily="2" charset="0"/>
+              </a:rPr>
+              <a:t> </a:t>
+            </a:r>
+            <a:r>
+              <a:rPr lang="en-GB" b="0" i="0" dirty="0" err="1">
+                <a:solidFill>
+                  <a:srgbClr val="273239"/>
+                </a:solidFill>
+                <a:effectLst/>
+                <a:latin typeface="Nunito" pitchFamily="2" charset="0"/>
+              </a:rPr>
+              <a:t>efektīvāk</a:t>
+            </a:r>
+            <a:r>
+              <a:rPr lang="en-GB" b="0" i="0" dirty="0">
+                <a:solidFill>
+                  <a:srgbClr val="273239"/>
+                </a:solidFill>
+                <a:effectLst/>
+                <a:latin typeface="Nunito" pitchFamily="2" charset="0"/>
+              </a:rPr>
+              <a:t> </a:t>
+            </a:r>
+            <a:r>
+              <a:rPr lang="en-GB" b="0" i="0" dirty="0" err="1">
+                <a:solidFill>
+                  <a:srgbClr val="273239"/>
+                </a:solidFill>
+                <a:effectLst/>
+                <a:latin typeface="Nunito" pitchFamily="2" charset="0"/>
+              </a:rPr>
+              <a:t>lasītu</a:t>
+            </a:r>
+            <a:r>
+              <a:rPr lang="en-GB" b="0" i="0" dirty="0">
+                <a:solidFill>
+                  <a:srgbClr val="273239"/>
+                </a:solidFill>
+                <a:effectLst/>
+                <a:latin typeface="Nunito" pitchFamily="2" charset="0"/>
+              </a:rPr>
+              <a:t> </a:t>
+            </a:r>
+            <a:r>
+              <a:rPr lang="en-GB" b="0" i="0" dirty="0" err="1">
+                <a:solidFill>
+                  <a:srgbClr val="273239"/>
+                </a:solidFill>
+                <a:effectLst/>
+                <a:latin typeface="Nunito" pitchFamily="2" charset="0"/>
+              </a:rPr>
+              <a:t>datu</a:t>
+            </a:r>
+            <a:r>
+              <a:rPr lang="lv-LV" b="0" i="0" dirty="0">
+                <a:solidFill>
+                  <a:srgbClr val="273239"/>
+                </a:solidFill>
+                <a:effectLst/>
+                <a:latin typeface="Nunito" pitchFamily="2" charset="0"/>
+              </a:rPr>
+              <a:t>s</a:t>
+            </a:r>
+            <a:r>
+              <a:rPr lang="en-GB" b="0" i="0" dirty="0">
+                <a:solidFill>
+                  <a:srgbClr val="273239"/>
+                </a:solidFill>
+                <a:effectLst/>
+                <a:latin typeface="Nunito" pitchFamily="2" charset="0"/>
+              </a:rPr>
+              <a:t>.</a:t>
+            </a:r>
+            <a:endParaRPr lang="lv-LV" b="0" i="0" dirty="0">
+              <a:solidFill>
+                <a:srgbClr val="273239"/>
+              </a:solidFill>
+              <a:effectLst/>
+              <a:latin typeface="Nunito" pitchFamily="2" charset="0"/>
+            </a:endParaRPr>
+          </a:p>
+          <a:p>
+            <a:pPr marL="0" indent="0">
+              <a:buNone/>
+            </a:pPr>
+            <a:r>
+              <a:rPr lang="en-GB" b="0" i="0" dirty="0" err="1">
+                <a:solidFill>
+                  <a:srgbClr val="273239"/>
+                </a:solidFill>
+                <a:effectLst/>
+                <a:latin typeface="Nunito" pitchFamily="2" charset="0"/>
+              </a:rPr>
+              <a:t>Tā</a:t>
+            </a:r>
+            <a:r>
+              <a:rPr lang="en-GB" b="0" i="0" dirty="0">
+                <a:solidFill>
+                  <a:srgbClr val="273239"/>
+                </a:solidFill>
+                <a:effectLst/>
+                <a:latin typeface="Nunito" pitchFamily="2" charset="0"/>
+              </a:rPr>
+              <a:t> </a:t>
+            </a:r>
+            <a:r>
+              <a:rPr lang="en-GB" b="0" i="0" dirty="0" err="1">
+                <a:solidFill>
+                  <a:srgbClr val="273239"/>
+                </a:solidFill>
+                <a:effectLst/>
+                <a:latin typeface="Nunito" pitchFamily="2" charset="0"/>
+              </a:rPr>
+              <a:t>paplašina</a:t>
+            </a:r>
+            <a:r>
+              <a:rPr lang="en-GB" b="0" i="0" dirty="0">
+                <a:solidFill>
+                  <a:srgbClr val="273239"/>
+                </a:solidFill>
+                <a:effectLst/>
+                <a:latin typeface="Nunito" pitchFamily="2" charset="0"/>
+              </a:rPr>
+              <a:t> </a:t>
+            </a:r>
+            <a:r>
+              <a:rPr lang="en-GB" b="0" i="0" dirty="0" err="1">
+                <a:solidFill>
+                  <a:srgbClr val="273239"/>
+                </a:solidFill>
+                <a:effectLst/>
+                <a:latin typeface="Nunito" pitchFamily="2" charset="0"/>
+              </a:rPr>
+              <a:t>abstrakto</a:t>
+            </a:r>
+            <a:r>
+              <a:rPr lang="en-GB" b="0" i="0" dirty="0">
+                <a:solidFill>
+                  <a:srgbClr val="273239"/>
+                </a:solidFill>
+                <a:effectLst/>
+                <a:latin typeface="Nunito" pitchFamily="2" charset="0"/>
+              </a:rPr>
+              <a:t> </a:t>
+            </a:r>
+            <a:r>
+              <a:rPr lang="en-GB" b="0" i="0" dirty="0" err="1">
+                <a:solidFill>
+                  <a:srgbClr val="273239"/>
+                </a:solidFill>
+                <a:effectLst/>
+                <a:latin typeface="Nunito" pitchFamily="2" charset="0"/>
+              </a:rPr>
+              <a:t>klasi</a:t>
+            </a:r>
+            <a:r>
+              <a:rPr lang="en-GB" b="0" i="0" dirty="0">
+                <a:solidFill>
+                  <a:srgbClr val="273239"/>
+                </a:solidFill>
+                <a:effectLst/>
+                <a:latin typeface="Nunito" pitchFamily="2" charset="0"/>
+              </a:rPr>
+              <a:t> Reader.</a:t>
+            </a:r>
+            <a:endParaRPr lang="lv-LV" dirty="0"/>
+          </a:p>
+        </p:txBody>
+      </p:sp>
+      <p:pic>
+        <p:nvPicPr>
+          <p:cNvPr id="5" name="Picture 4">
+            <a:extLst>
+              <a:ext uri="{FF2B5EF4-FFF2-40B4-BE49-F238E27FC236}">
+                <a16:creationId xmlns:a16="http://schemas.microsoft.com/office/drawing/2014/main" id="{7CD25618-1E76-4ACA-8378-FA6F4FBC1F47}"/>
+              </a:ext>
+            </a:extLst>
+          </p:cNvPr>
+          <p:cNvPicPr>
+            <a:picLocks noChangeAspect="1"/>
+          </p:cNvPicPr>
           <p:nvPr/>
-        </p:nvSpPr>
+        </p:nvPicPr>
+        <p:blipFill>
+          <a:blip r:embed="rId2">
+            <a:extLst>
+              <a:ext uri="{28A0092B-C50C-407E-A947-70E740481C1C}">
+                <a14:useLocalDpi xmlns:a14="http://schemas.microsoft.com/office/drawing/2010/main" val="0"/>
+              </a:ext>
+            </a:extLst>
+          </a:blip>
+          <a:stretch>
+            <a:fillRect/>
+          </a:stretch>
+        </p:blipFill>
         <p:spPr>
           <a:xfrm>
-            <a:off x="7626220" y="4781090"/>
-            <a:ext cx="4149014" cy="261610"/>
+            <a:off x="3985305" y="2892452"/>
+            <a:ext cx="4221390" cy="3965548"/>
           </a:xfrm>
           <a:prstGeom prst="rect">
             <a:avLst/>
           </a:prstGeom>
-          <a:solidFill>
-            <a:srgbClr val="F9F9F9"/>
-          </a:solidFill>
         </p:spPr>
+      </p:pic>
+    </p:spTree>
+    <p:extLst>
+      <p:ext uri="{BB962C8B-B14F-4D97-AF65-F5344CB8AC3E}">
+        <p14:creationId xmlns:p14="http://schemas.microsoft.com/office/powerpoint/2010/main" val="2289805255"/>
+      </p:ext>
+    </p:extLst>
+  </p:cSld>
+  <p:clrMapOvr>
+    <a:masterClrMapping/>
+  </p:clrMapOvr>
+</p:sld>
+</file>
+
+<file path=ppt/slides/slide16.xml><?xml version="1.0" encoding="utf-8"?>
+<p:sld xmlns:a="http://schemas.openxmlformats.org/drawingml/2006/main" xmlns:r="http://schemas.openxmlformats.org/officeDocument/2006/relationships" xmlns:p="http://schemas.openxmlformats.org/presentationml/2006/main">
+  <p:cSld>
+    <p:bg>
+      <p:bgPr>
+        <a:solidFill>
+          <a:schemeClr val="accent6">
+            <a:lumMod val="20000"/>
+            <a:lumOff val="80000"/>
+          </a:schemeClr>
+        </a:solidFill>
+        <a:effectLst/>
+      </p:bgPr>
+    </p:bg>
+    <p:spTree>
+      <p:nvGrpSpPr>
+        <p:cNvPr id="1" name=""/>
+        <p:cNvGrpSpPr/>
+        <p:nvPr/>
+      </p:nvGrpSpPr>
+      <p:grpSpPr>
+        <a:xfrm>
+          <a:off x="0" y="0"/>
+          <a:ext cx="0" cy="0"/>
+          <a:chOff x="0" y="0"/>
+          <a:chExt cx="0" cy="0"/>
+        </a:xfrm>
+      </p:grpSpPr>
+      <p:sp>
+        <p:nvSpPr>
+          <p:cNvPr id="2" name="Title 1">
+            <a:extLst>
+              <a:ext uri="{FF2B5EF4-FFF2-40B4-BE49-F238E27FC236}">
+                <a16:creationId xmlns:a16="http://schemas.microsoft.com/office/drawing/2014/main" id="{DC598DD3-635B-4D67-ABB3-02B91E4A79B8}"/>
+              </a:ext>
+            </a:extLst>
+          </p:cNvPr>
+          <p:cNvSpPr>
+            <a:spLocks noGrp="1"/>
+          </p:cNvSpPr>
+          <p:nvPr>
+            <p:ph type="title"/>
+          </p:nvPr>
+        </p:nvSpPr>
+        <p:spPr/>
         <p:txBody>
-          <a:bodyPr wrap="square" rtlCol="0">
-            <a:spAutoFit/>
-          </a:bodyPr>
+          <a:bodyPr/>
           <a:lstStyle/>
           <a:p>
             <a:r>
-              <a:rPr lang="en-GB" sz="1100" i="1" dirty="0">
-                <a:solidFill>
-                  <a:schemeClr val="bg1">
-                    <a:lumMod val="50000"/>
-                  </a:schemeClr>
-                </a:solidFill>
+              <a:rPr lang="lv-LV" dirty="0">
+                <a:latin typeface="Arial Black" panose="020B0A04020102020204" pitchFamily="34" charset="0"/>
               </a:rPr>
-              <a:t>// </a:t>
-            </a:r>
-            <a:r>
-              <a:rPr lang="en-GB" sz="1100" i="1" dirty="0" err="1">
-                <a:solidFill>
-                  <a:schemeClr val="bg1">
-                    <a:lumMod val="50000"/>
-                  </a:schemeClr>
-                </a:solidFill>
-              </a:rPr>
-              <a:t>Izsaukta</a:t>
-            </a:r>
-            <a:r>
-              <a:rPr lang="en-GB" sz="1100" i="1" dirty="0">
-                <a:solidFill>
-                  <a:schemeClr val="bg1">
-                    <a:lumMod val="50000"/>
-                  </a:schemeClr>
-                </a:solidFill>
-              </a:rPr>
-              <a:t> </a:t>
-            </a:r>
-            <a:r>
-              <a:rPr lang="en-GB" sz="1100" i="1" dirty="0" err="1">
-                <a:solidFill>
-                  <a:schemeClr val="bg1">
-                    <a:lumMod val="50000"/>
-                  </a:schemeClr>
-                </a:solidFill>
-              </a:rPr>
-              <a:t>aizvēršanas</a:t>
-            </a:r>
-            <a:r>
-              <a:rPr lang="en-GB" sz="1100" i="1" dirty="0">
-                <a:solidFill>
-                  <a:schemeClr val="bg1">
-                    <a:lumMod val="50000"/>
-                  </a:schemeClr>
-                </a:solidFill>
-              </a:rPr>
-              <a:t> </a:t>
-            </a:r>
-            <a:r>
-              <a:rPr lang="en-GB" sz="1100" i="1" dirty="0" err="1">
-                <a:solidFill>
-                  <a:schemeClr val="bg1">
-                    <a:lumMod val="50000"/>
-                  </a:schemeClr>
-                </a:solidFill>
-              </a:rPr>
-              <a:t>metode</a:t>
-            </a:r>
-            <a:endParaRPr lang="en-GB" sz="1100" i="1" dirty="0">
-              <a:solidFill>
-                <a:schemeClr val="bg1">
-                  <a:lumMod val="50000"/>
-                </a:schemeClr>
-              </a:solidFill>
+              <a:t>BufferedReader</a:t>
+            </a:r>
+            <a:endParaRPr lang="en-GB" dirty="0">
+              <a:latin typeface="Arial Black" panose="020B0A04020102020204" pitchFamily="34" charset="0"/>
             </a:endParaRPr>
           </a:p>
         </p:txBody>
       </p:sp>
       <p:sp>
         <p:nvSpPr>
-          <p:cNvPr id="17" name="TextBox 16">
+          <p:cNvPr id="3" name="Content Placeholder 2">
             <a:extLst>
               <a:ext uri="{FF2B5EF4-FFF2-40B4-BE49-F238E27FC236}">
-                <a16:creationId xmlns:a16="http://schemas.microsoft.com/office/drawing/2014/main" id="{2D336839-2B93-4E84-9A23-B1EED9F8038C}"/>
+                <a16:creationId xmlns:a16="http://schemas.microsoft.com/office/drawing/2014/main" id="{DD2D8840-CC0E-49E7-93B7-354209F90F28}"/>
               </a:ext>
             </a:extLst>
           </p:cNvPr>
-          <p:cNvSpPr txBox="1"/>
-          <p:nvPr/>
+          <p:cNvSpPr>
+            <a:spLocks noGrp="1"/>
+          </p:cNvSpPr>
+          <p:nvPr>
+            <p:ph idx="1"/>
+          </p:nvPr>
         </p:nvSpPr>
-        <p:spPr>
-          <a:xfrm>
-            <a:off x="7626220" y="2733253"/>
-            <a:ext cx="4149014" cy="261610"/>
-          </a:xfrm>
-          <a:prstGeom prst="rect">
-            <a:avLst/>
-          </a:prstGeom>
-          <a:solidFill>
-            <a:srgbClr val="F9F9F9"/>
-          </a:solidFill>
-        </p:spPr>
+        <p:spPr/>
         <p:txBody>
-          <a:bodyPr wrap="square" rtlCol="0">
-            <a:spAutoFit/>
+          <a:bodyPr>
+            <a:normAutofit/>
           </a:bodyPr>
           <a:lstStyle/>
           <a:p>
-            <a:r>
-              <a:rPr lang="en-GB" sz="1100" i="1" dirty="0">
+            <a:pPr marL="0" indent="0">
+              <a:buNone/>
+            </a:pPr>
+            <a:r>
+              <a:rPr lang="lv-LV" b="0" i="0" dirty="0">
                 <a:solidFill>
-                  <a:schemeClr val="bg1">
-                    <a:lumMod val="50000"/>
-                  </a:schemeClr>
+                  <a:srgbClr val="273239"/>
                 </a:solidFill>
+                <a:effectLst/>
+                <a:latin typeface="Nunito" pitchFamily="2" charset="0"/>
               </a:rPr>
-              <a:t>// </a:t>
-            </a:r>
-            <a:r>
-              <a:rPr lang="en-GB" sz="1100" i="1" dirty="0" err="1">
-                <a:solidFill>
-                  <a:schemeClr val="bg1">
-                    <a:lumMod val="50000"/>
-                  </a:schemeClr>
-                </a:solidFill>
-              </a:rPr>
-              <a:t>Izmantojot</a:t>
-            </a:r>
-            <a:r>
-              <a:rPr lang="en-GB" sz="1100" i="1" dirty="0">
-                <a:solidFill>
-                  <a:schemeClr val="bg1">
-                    <a:lumMod val="50000"/>
-                  </a:schemeClr>
-                </a:solidFill>
-              </a:rPr>
-              <a:t> </a:t>
-            </a:r>
-            <a:r>
-              <a:rPr lang="en-GB" sz="1100" i="1" dirty="0" err="1">
-                <a:solidFill>
-                  <a:schemeClr val="bg1">
-                    <a:lumMod val="50000"/>
-                  </a:schemeClr>
-                </a:solidFill>
-              </a:rPr>
-              <a:t>lasīšanas</a:t>
-            </a:r>
-            <a:r>
-              <a:rPr lang="en-GB" sz="1100" i="1" dirty="0">
-                <a:solidFill>
-                  <a:schemeClr val="bg1">
-                    <a:lumMod val="50000"/>
-                  </a:schemeClr>
-                </a:solidFill>
-              </a:rPr>
-              <a:t> </a:t>
-            </a:r>
-            <a:r>
-              <a:rPr lang="en-GB" sz="1100" i="1" dirty="0" err="1">
-                <a:solidFill>
-                  <a:schemeClr val="bg1">
-                    <a:lumMod val="50000"/>
-                  </a:schemeClr>
-                </a:solidFill>
-              </a:rPr>
-              <a:t>metodi</a:t>
-            </a:r>
-            <a:endParaRPr lang="en-GB" sz="1100" i="1" dirty="0">
-              <a:solidFill>
-                <a:schemeClr val="bg1">
-                  <a:lumMod val="50000"/>
-                </a:schemeClr>
-              </a:solidFill>
-            </a:endParaRPr>
-          </a:p>
-        </p:txBody>
-      </p:sp>
-      <p:sp>
-        <p:nvSpPr>
-          <p:cNvPr id="18" name="TextBox 17">
-            <a:extLst>
-              <a:ext uri="{FF2B5EF4-FFF2-40B4-BE49-F238E27FC236}">
-                <a16:creationId xmlns:a16="http://schemas.microsoft.com/office/drawing/2014/main" id="{76960569-1D59-4DB6-8432-7173CD895E9A}"/>
-              </a:ext>
-            </a:extLst>
-          </p:cNvPr>
-          <p:cNvSpPr txBox="1"/>
-          <p:nvPr/>
-        </p:nvSpPr>
-        <p:spPr>
-          <a:xfrm>
-            <a:off x="7859485" y="1715082"/>
-            <a:ext cx="4149014" cy="261610"/>
-          </a:xfrm>
-          <a:prstGeom prst="rect">
-            <a:avLst/>
-          </a:prstGeom>
-          <a:solidFill>
-            <a:srgbClr val="F9F9F9"/>
-          </a:solidFill>
-        </p:spPr>
-        <p:txBody>
-          <a:bodyPr wrap="square" rtlCol="0">
-            <a:spAutoFit/>
-          </a:bodyPr>
-          <a:lstStyle/>
-          <a:p>
-            <a:r>
-              <a:rPr lang="en-GB" sz="1100" i="1" dirty="0" err="1">
-                <a:solidFill>
-                  <a:schemeClr val="bg1">
-                    <a:lumMod val="50000"/>
-                  </a:schemeClr>
-                </a:solidFill>
-              </a:rPr>
-              <a:t>Izmantotā</a:t>
-            </a:r>
-            <a:r>
-              <a:rPr lang="en-GB" sz="1100" i="1" dirty="0">
-                <a:solidFill>
-                  <a:schemeClr val="bg1">
-                    <a:lumMod val="50000"/>
-                  </a:schemeClr>
-                </a:solidFill>
-              </a:rPr>
-              <a:t> </a:t>
-            </a:r>
-            <a:r>
-              <a:rPr lang="en-GB" sz="1100" i="1" dirty="0" err="1">
-                <a:solidFill>
-                  <a:schemeClr val="bg1">
-                    <a:lumMod val="50000"/>
-                  </a:schemeClr>
-                </a:solidFill>
-              </a:rPr>
-              <a:t>FileReader</a:t>
-            </a:r>
-            <a:r>
-              <a:rPr lang="en-GB" sz="1100" i="1" dirty="0">
-                <a:solidFill>
-                  <a:schemeClr val="bg1">
-                    <a:lumMod val="50000"/>
-                  </a:schemeClr>
-                </a:solidFill>
-              </a:rPr>
-              <a:t> </a:t>
-            </a:r>
-            <a:r>
-              <a:rPr lang="en-GB" sz="1100" i="1" dirty="0" err="1">
-                <a:solidFill>
-                  <a:schemeClr val="bg1">
-                    <a:lumMod val="50000"/>
-                  </a:schemeClr>
-                </a:solidFill>
-              </a:rPr>
-              <a:t>klase</a:t>
-            </a:r>
-            <a:endParaRPr lang="en-GB" sz="1100" i="1" dirty="0">
-              <a:solidFill>
-                <a:schemeClr val="bg1">
-                  <a:lumMod val="50000"/>
-                </a:schemeClr>
-              </a:solidFill>
-            </a:endParaRPr>
+              <a:t>BufferedReader uztur iekšējo buferi ar 8192 rakstzīmēm. BufferedReader lasīšanas operācijas laikā no diska tiek nolasīts rakstzīmju fragments un saglabāts iekšējā buferī. Un no iekšējā bufera rakstzīmes tiek lasītas atsevišķi.Tādējādi saziņas skaits ar disku tiek samazināts. Tāpēc rakstzīmju lasīšana, izmantojot BufferedReader, ir ātrāka un efektīvāka par parasto FileReader.</a:t>
+            </a:r>
+            <a:endParaRPr lang="lv-LV" dirty="0"/>
           </a:p>
         </p:txBody>
       </p:sp>
     </p:spTree>
     <p:extLst>
       <p:ext uri="{BB962C8B-B14F-4D97-AF65-F5344CB8AC3E}">
-        <p14:creationId xmlns:p14="http://schemas.microsoft.com/office/powerpoint/2010/main" val="1046302628"/>
+        <p14:creationId xmlns:p14="http://schemas.microsoft.com/office/powerpoint/2010/main" val="944926470"/>
+      </p:ext>
+    </p:extLst>
+  </p:cSld>
+  <p:clrMapOvr>
+    <a:masterClrMapping/>
+  </p:clrMapOvr>
+</p:sld>
+</file>
+
+<file path=ppt/slides/slide17.xml><?xml version="1.0" encoding="utf-8"?>
+<p:sld xmlns:a="http://schemas.openxmlformats.org/drawingml/2006/main" xmlns:r="http://schemas.openxmlformats.org/officeDocument/2006/relationships" xmlns:p="http://schemas.openxmlformats.org/presentationml/2006/main">
+  <p:cSld>
+    <p:bg>
+      <p:bgPr>
+        <a:solidFill>
+          <a:schemeClr val="accent6">
+            <a:lumMod val="20000"/>
+            <a:lumOff val="80000"/>
+          </a:schemeClr>
+        </a:solidFill>
+        <a:effectLst/>
+      </p:bgPr>
+    </p:bg>
+    <p:spTree>
+      <p:nvGrpSpPr>
+        <p:cNvPr id="1" name=""/>
+        <p:cNvGrpSpPr/>
+        <p:nvPr/>
+      </p:nvGrpSpPr>
+      <p:grpSpPr>
+        <a:xfrm>
+          <a:off x="0" y="0"/>
+          <a:ext cx="0" cy="0"/>
+          <a:chOff x="0" y="0"/>
+          <a:chExt cx="0" cy="0"/>
+        </a:xfrm>
+      </p:grpSpPr>
+      <p:sp>
+        <p:nvSpPr>
+          <p:cNvPr id="2" name="Title 1">
+            <a:extLst>
+              <a:ext uri="{FF2B5EF4-FFF2-40B4-BE49-F238E27FC236}">
+                <a16:creationId xmlns:a16="http://schemas.microsoft.com/office/drawing/2014/main" id="{DC598DD3-635B-4D67-ABB3-02B91E4A79B8}"/>
+              </a:ext>
+            </a:extLst>
+          </p:cNvPr>
+          <p:cNvSpPr>
+            <a:spLocks noGrp="1"/>
+          </p:cNvSpPr>
+          <p:nvPr>
+            <p:ph type="title"/>
+          </p:nvPr>
+        </p:nvSpPr>
+        <p:spPr/>
+        <p:txBody>
+          <a:bodyPr/>
+          <a:lstStyle/>
+          <a:p>
+            <a:r>
+              <a:rPr lang="lv-LV" dirty="0">
+                <a:latin typeface="Arial Black" panose="020B0A04020102020204" pitchFamily="34" charset="0"/>
+              </a:rPr>
+              <a:t>BufferedReader</a:t>
+            </a:r>
+            <a:endParaRPr lang="en-GB" dirty="0">
+              <a:latin typeface="Arial Black" panose="020B0A04020102020204" pitchFamily="34" charset="0"/>
+            </a:endParaRPr>
+          </a:p>
+        </p:txBody>
+      </p:sp>
+      <p:sp>
+        <p:nvSpPr>
+          <p:cNvPr id="3" name="Content Placeholder 2">
+            <a:extLst>
+              <a:ext uri="{FF2B5EF4-FFF2-40B4-BE49-F238E27FC236}">
+                <a16:creationId xmlns:a16="http://schemas.microsoft.com/office/drawing/2014/main" id="{DD2D8840-CC0E-49E7-93B7-354209F90F28}"/>
+              </a:ext>
+            </a:extLst>
+          </p:cNvPr>
+          <p:cNvSpPr>
+            <a:spLocks noGrp="1"/>
+          </p:cNvSpPr>
+          <p:nvPr>
+            <p:ph idx="1"/>
+          </p:nvPr>
+        </p:nvSpPr>
+        <p:spPr/>
+        <p:txBody>
+          <a:bodyPr>
+            <a:normAutofit/>
+          </a:bodyPr>
+          <a:lstStyle/>
+          <a:p>
+            <a:pPr marL="0" indent="0">
+              <a:buNone/>
+            </a:pPr>
+            <a:r>
+              <a:rPr lang="lv-LV" b="0" i="0" dirty="0">
+                <a:solidFill>
+                  <a:srgbClr val="273239"/>
+                </a:solidFill>
+                <a:effectLst/>
+                <a:latin typeface="Nunito" pitchFamily="2" charset="0"/>
+              </a:rPr>
+              <a:t>Lai izveidotu BufferedReader, vispirms ir jāimportē java.io.BufferedReader pakotne. Kad pakotne ir importēta, lūk, kā mēs varam izveidot lasītāju.</a:t>
+            </a:r>
+          </a:p>
+          <a:p>
+            <a:pPr marL="0" indent="0">
+              <a:buNone/>
+            </a:pPr>
+            <a:endParaRPr lang="lv-LV" dirty="0">
+              <a:solidFill>
+                <a:srgbClr val="273239"/>
+              </a:solidFill>
+              <a:latin typeface="Nunito" pitchFamily="2" charset="0"/>
+            </a:endParaRPr>
+          </a:p>
+          <a:p>
+            <a:pPr marL="0" indent="0">
+              <a:buNone/>
+            </a:pPr>
+            <a:endParaRPr lang="lv-LV" dirty="0">
+              <a:solidFill>
+                <a:srgbClr val="273239"/>
+              </a:solidFill>
+              <a:latin typeface="Nunito" pitchFamily="2" charset="0"/>
+            </a:endParaRPr>
+          </a:p>
+          <a:p>
+            <a:pPr marL="0" indent="0">
+              <a:buNone/>
+            </a:pPr>
+            <a:endParaRPr lang="lv-LV" dirty="0">
+              <a:solidFill>
+                <a:srgbClr val="273239"/>
+              </a:solidFill>
+              <a:latin typeface="Nunito" pitchFamily="2" charset="0"/>
+            </a:endParaRPr>
+          </a:p>
+        </p:txBody>
+      </p:sp>
+      <p:pic>
+        <p:nvPicPr>
+          <p:cNvPr id="7" name="Picture 6">
+            <a:extLst>
+              <a:ext uri="{FF2B5EF4-FFF2-40B4-BE49-F238E27FC236}">
+                <a16:creationId xmlns:a16="http://schemas.microsoft.com/office/drawing/2014/main" id="{CBCD785D-5B37-4BE1-A39A-2A0CA1644EED}"/>
+              </a:ext>
+            </a:extLst>
+          </p:cNvPr>
+          <p:cNvPicPr>
+            <a:picLocks noChangeAspect="1"/>
+          </p:cNvPicPr>
+          <p:nvPr/>
+        </p:nvPicPr>
+        <p:blipFill>
+          <a:blip r:embed="rId2"/>
+          <a:stretch>
+            <a:fillRect/>
+          </a:stretch>
+        </p:blipFill>
+        <p:spPr>
+          <a:xfrm>
+            <a:off x="3003006" y="3528832"/>
+            <a:ext cx="6466918" cy="1873593"/>
+          </a:xfrm>
+          <a:prstGeom prst="rect">
+            <a:avLst/>
+          </a:prstGeom>
+        </p:spPr>
+      </p:pic>
+    </p:spTree>
+    <p:extLst>
+      <p:ext uri="{BB962C8B-B14F-4D97-AF65-F5344CB8AC3E}">
+        <p14:creationId xmlns:p14="http://schemas.microsoft.com/office/powerpoint/2010/main" val="4280623153"/>
+      </p:ext>
+    </p:extLst>
+  </p:cSld>
+  <p:clrMapOvr>
+    <a:masterClrMapping/>
+  </p:clrMapOvr>
+</p:sld>
+</file>
+
+<file path=ppt/slides/slide18.xml><?xml version="1.0" encoding="utf-8"?>
+<p:sld xmlns:a="http://schemas.openxmlformats.org/drawingml/2006/main" xmlns:r="http://schemas.openxmlformats.org/officeDocument/2006/relationships" xmlns:p="http://schemas.openxmlformats.org/presentationml/2006/main">
+  <p:cSld>
+    <p:bg>
+      <p:bgPr>
+        <a:solidFill>
+          <a:schemeClr val="accent6">
+            <a:lumMod val="20000"/>
+            <a:lumOff val="80000"/>
+          </a:schemeClr>
+        </a:solidFill>
+        <a:effectLst/>
+      </p:bgPr>
+    </p:bg>
+    <p:spTree>
+      <p:nvGrpSpPr>
+        <p:cNvPr id="1" name=""/>
+        <p:cNvGrpSpPr/>
+        <p:nvPr/>
+      </p:nvGrpSpPr>
+      <p:grpSpPr>
+        <a:xfrm>
+          <a:off x="0" y="0"/>
+          <a:ext cx="0" cy="0"/>
+          <a:chOff x="0" y="0"/>
+          <a:chExt cx="0" cy="0"/>
+        </a:xfrm>
+      </p:grpSpPr>
+      <p:sp>
+        <p:nvSpPr>
+          <p:cNvPr id="2" name="Title 1">
+            <a:extLst>
+              <a:ext uri="{FF2B5EF4-FFF2-40B4-BE49-F238E27FC236}">
+                <a16:creationId xmlns:a16="http://schemas.microsoft.com/office/drawing/2014/main" id="{DC598DD3-635B-4D67-ABB3-02B91E4A79B8}"/>
+              </a:ext>
+            </a:extLst>
+          </p:cNvPr>
+          <p:cNvSpPr>
+            <a:spLocks noGrp="1"/>
+          </p:cNvSpPr>
+          <p:nvPr>
+            <p:ph type="title"/>
+          </p:nvPr>
+        </p:nvSpPr>
+        <p:spPr/>
+        <p:txBody>
+          <a:bodyPr/>
+          <a:lstStyle/>
+          <a:p>
+            <a:r>
+              <a:rPr lang="lv-LV" dirty="0">
+                <a:latin typeface="Arial Black" panose="020B0A04020102020204" pitchFamily="34" charset="0"/>
+              </a:rPr>
+              <a:t>BufferedReader</a:t>
+            </a:r>
+            <a:endParaRPr lang="en-GB" dirty="0">
+              <a:latin typeface="Arial Black" panose="020B0A04020102020204" pitchFamily="34" charset="0"/>
+            </a:endParaRPr>
+          </a:p>
+        </p:txBody>
+      </p:sp>
+      <p:sp>
+        <p:nvSpPr>
+          <p:cNvPr id="3" name="Content Placeholder 2">
+            <a:extLst>
+              <a:ext uri="{FF2B5EF4-FFF2-40B4-BE49-F238E27FC236}">
+                <a16:creationId xmlns:a16="http://schemas.microsoft.com/office/drawing/2014/main" id="{DD2D8840-CC0E-49E7-93B7-354209F90F28}"/>
+              </a:ext>
+            </a:extLst>
+          </p:cNvPr>
+          <p:cNvSpPr>
+            <a:spLocks noGrp="1"/>
+          </p:cNvSpPr>
+          <p:nvPr>
+            <p:ph idx="1"/>
+          </p:nvPr>
+        </p:nvSpPr>
+        <p:spPr>
+          <a:xfrm>
+            <a:off x="968934" y="1405746"/>
+            <a:ext cx="10515600" cy="5452253"/>
+          </a:xfrm>
+        </p:spPr>
+        <p:txBody>
+          <a:bodyPr>
+            <a:normAutofit/>
+          </a:bodyPr>
+          <a:lstStyle/>
+          <a:p>
+            <a:pPr marL="0" indent="0">
+              <a:buNone/>
+            </a:pPr>
+            <a:r>
+              <a:rPr lang="lv-LV" b="0" i="0" dirty="0">
+                <a:solidFill>
+                  <a:srgbClr val="273239"/>
+                </a:solidFill>
+                <a:effectLst/>
+                <a:latin typeface="Nunito" pitchFamily="2" charset="0"/>
+              </a:rPr>
+              <a:t>Lai izveidotu BufferedReader, vispirms ir jāimportē java.io.BufferedReader pakotne. Kad pakotne ir importēta, lūk, kā mēs varam izveidot lasītāju.</a:t>
+            </a:r>
+          </a:p>
+          <a:p>
+            <a:pPr marL="0" indent="0">
+              <a:buNone/>
+            </a:pPr>
+            <a:endParaRPr lang="lv-LV" dirty="0">
+              <a:solidFill>
+                <a:srgbClr val="273239"/>
+              </a:solidFill>
+              <a:latin typeface="Nunito" pitchFamily="2" charset="0"/>
+            </a:endParaRPr>
+          </a:p>
+          <a:p>
+            <a:pPr marL="0" indent="0">
+              <a:buNone/>
+            </a:pPr>
+            <a:endParaRPr lang="lv-LV" dirty="0">
+              <a:solidFill>
+                <a:srgbClr val="273239"/>
+              </a:solidFill>
+              <a:latin typeface="Nunito" pitchFamily="2" charset="0"/>
+            </a:endParaRPr>
+          </a:p>
+          <a:p>
+            <a:pPr marL="0" indent="0">
+              <a:buNone/>
+            </a:pPr>
+            <a:endParaRPr lang="lv-LV" dirty="0">
+              <a:solidFill>
+                <a:srgbClr val="273239"/>
+              </a:solidFill>
+              <a:latin typeface="Nunito" pitchFamily="2" charset="0"/>
+            </a:endParaRPr>
+          </a:p>
+          <a:p>
+            <a:pPr marL="0" indent="0">
+              <a:buNone/>
+            </a:pPr>
+            <a:r>
+              <a:rPr lang="lv-LV" dirty="0">
+                <a:solidFill>
+                  <a:srgbClr val="273239"/>
+                </a:solidFill>
+                <a:latin typeface="Nunito" pitchFamily="2" charset="0"/>
+              </a:rPr>
+              <a:t>Šeit BufferedReader iekšējā bufera noklusējuma lielums ir 8192 rakstzīmes. Tomēr mēs varam norādīt arī iekšējā bufera lielumu.</a:t>
+            </a:r>
+          </a:p>
+          <a:p>
+            <a:pPr marL="0" indent="0">
+              <a:buNone/>
+            </a:pPr>
+            <a:endParaRPr lang="lv-LV" dirty="0">
+              <a:solidFill>
+                <a:srgbClr val="273239"/>
+              </a:solidFill>
+              <a:latin typeface="Nunito" pitchFamily="2" charset="0"/>
+            </a:endParaRPr>
+          </a:p>
+          <a:p>
+            <a:pPr marL="0" indent="0">
+              <a:buNone/>
+            </a:pPr>
+            <a:endParaRPr lang="lv-LV" dirty="0">
+              <a:solidFill>
+                <a:srgbClr val="273239"/>
+              </a:solidFill>
+              <a:latin typeface="Nunito" pitchFamily="2" charset="0"/>
+            </a:endParaRPr>
+          </a:p>
+          <a:p>
+            <a:pPr marL="0" indent="0">
+              <a:buNone/>
+            </a:pPr>
+            <a:r>
+              <a:rPr lang="lv-LV" dirty="0">
+                <a:solidFill>
+                  <a:srgbClr val="273239"/>
+                </a:solidFill>
+                <a:latin typeface="Nunito" pitchFamily="2" charset="0"/>
+              </a:rPr>
+              <a:t>Buferis palīdzēs ātrāk nolasīt rakstzīmes no failiem.</a:t>
+            </a:r>
+          </a:p>
+        </p:txBody>
+      </p:sp>
+      <p:pic>
+        <p:nvPicPr>
+          <p:cNvPr id="7" name="Picture 6">
+            <a:extLst>
+              <a:ext uri="{FF2B5EF4-FFF2-40B4-BE49-F238E27FC236}">
+                <a16:creationId xmlns:a16="http://schemas.microsoft.com/office/drawing/2014/main" id="{CBCD785D-5B37-4BE1-A39A-2A0CA1644EED}"/>
+              </a:ext>
+            </a:extLst>
+          </p:cNvPr>
+          <p:cNvPicPr>
+            <a:picLocks noChangeAspect="1"/>
+          </p:cNvPicPr>
+          <p:nvPr/>
+        </p:nvPicPr>
+        <p:blipFill>
+          <a:blip r:embed="rId2"/>
+          <a:stretch>
+            <a:fillRect/>
+          </a:stretch>
+        </p:blipFill>
+        <p:spPr>
+          <a:xfrm>
+            <a:off x="1174451" y="2706644"/>
+            <a:ext cx="4575329" cy="1325563"/>
+          </a:xfrm>
+          <a:prstGeom prst="rect">
+            <a:avLst/>
+          </a:prstGeom>
+        </p:spPr>
+      </p:pic>
+      <p:pic>
+        <p:nvPicPr>
+          <p:cNvPr id="5" name="Picture 4">
+            <a:extLst>
+              <a:ext uri="{FF2B5EF4-FFF2-40B4-BE49-F238E27FC236}">
+                <a16:creationId xmlns:a16="http://schemas.microsoft.com/office/drawing/2014/main" id="{85A5D922-252B-46E6-85D7-B1B5C3F980F1}"/>
+              </a:ext>
+            </a:extLst>
+          </p:cNvPr>
+          <p:cNvPicPr>
+            <a:picLocks noChangeAspect="1"/>
+          </p:cNvPicPr>
+          <p:nvPr/>
+        </p:nvPicPr>
+        <p:blipFill>
+          <a:blip r:embed="rId3"/>
+          <a:stretch>
+            <a:fillRect/>
+          </a:stretch>
+        </p:blipFill>
+        <p:spPr>
+          <a:xfrm>
+            <a:off x="1174451" y="5129646"/>
+            <a:ext cx="5692456" cy="645214"/>
+          </a:xfrm>
+          <a:prstGeom prst="rect">
+            <a:avLst/>
+          </a:prstGeom>
+        </p:spPr>
+      </p:pic>
+    </p:spTree>
+    <p:extLst>
+      <p:ext uri="{BB962C8B-B14F-4D97-AF65-F5344CB8AC3E}">
+        <p14:creationId xmlns:p14="http://schemas.microsoft.com/office/powerpoint/2010/main" val="2794882297"/>
+      </p:ext>
+    </p:extLst>
+  </p:cSld>
+  <p:clrMapOvr>
+    <a:masterClrMapping/>
+  </p:clrMapOvr>
+</p:sld>
+</file>
+
+<file path=ppt/slides/slide19.xml><?xml version="1.0" encoding="utf-8"?>
+<p:sld xmlns:a="http://schemas.openxmlformats.org/drawingml/2006/main" xmlns:r="http://schemas.openxmlformats.org/officeDocument/2006/relationships" xmlns:p="http://schemas.openxmlformats.org/presentationml/2006/main">
+  <p:cSld>
+    <p:bg>
+      <p:bgPr>
+        <a:solidFill>
+          <a:schemeClr val="accent6">
+            <a:lumMod val="20000"/>
+            <a:lumOff val="80000"/>
+          </a:schemeClr>
+        </a:solidFill>
+        <a:effectLst/>
+      </p:bgPr>
+    </p:bg>
+    <p:spTree>
+      <p:nvGrpSpPr>
+        <p:cNvPr id="1" name=""/>
+        <p:cNvGrpSpPr/>
+        <p:nvPr/>
+      </p:nvGrpSpPr>
+      <p:grpSpPr>
+        <a:xfrm>
+          <a:off x="0" y="0"/>
+          <a:ext cx="0" cy="0"/>
+          <a:chOff x="0" y="0"/>
+          <a:chExt cx="0" cy="0"/>
+        </a:xfrm>
+      </p:grpSpPr>
+      <p:sp>
+        <p:nvSpPr>
+          <p:cNvPr id="2" name="Title 1">
+            <a:extLst>
+              <a:ext uri="{FF2B5EF4-FFF2-40B4-BE49-F238E27FC236}">
+                <a16:creationId xmlns:a16="http://schemas.microsoft.com/office/drawing/2014/main" id="{DC598DD3-635B-4D67-ABB3-02B91E4A79B8}"/>
+              </a:ext>
+            </a:extLst>
+          </p:cNvPr>
+          <p:cNvSpPr>
+            <a:spLocks noGrp="1"/>
+          </p:cNvSpPr>
+          <p:nvPr>
+            <p:ph type="title"/>
+          </p:nvPr>
+        </p:nvSpPr>
+        <p:spPr/>
+        <p:txBody>
+          <a:bodyPr/>
+          <a:lstStyle/>
+          <a:p>
+            <a:r>
+              <a:rPr lang="lv-LV" dirty="0">
+                <a:latin typeface="Arial Black" panose="020B0A04020102020204" pitchFamily="34" charset="0"/>
+              </a:rPr>
+              <a:t>BufferedReader – read() metode</a:t>
+            </a:r>
+            <a:endParaRPr lang="en-GB" dirty="0">
+              <a:latin typeface="Arial Black" panose="020B0A04020102020204" pitchFamily="34" charset="0"/>
+            </a:endParaRPr>
+          </a:p>
+        </p:txBody>
+      </p:sp>
+      <p:pic>
+        <p:nvPicPr>
+          <p:cNvPr id="5" name="Picture 4">
+            <a:extLst>
+              <a:ext uri="{FF2B5EF4-FFF2-40B4-BE49-F238E27FC236}">
+                <a16:creationId xmlns:a16="http://schemas.microsoft.com/office/drawing/2014/main" id="{6592AF58-9A02-4B9E-A4D2-277E64EF8493}"/>
+              </a:ext>
+            </a:extLst>
+          </p:cNvPr>
+          <p:cNvPicPr>
+            <a:picLocks noChangeAspect="1"/>
+          </p:cNvPicPr>
+          <p:nvPr/>
+        </p:nvPicPr>
+        <p:blipFill>
+          <a:blip r:embed="rId2"/>
+          <a:stretch>
+            <a:fillRect/>
+          </a:stretch>
+        </p:blipFill>
+        <p:spPr>
+          <a:xfrm>
+            <a:off x="838200" y="1405239"/>
+            <a:ext cx="6372133" cy="5192109"/>
+          </a:xfrm>
+          <a:prstGeom prst="rect">
+            <a:avLst/>
+          </a:prstGeom>
+        </p:spPr>
+      </p:pic>
+      <p:pic>
+        <p:nvPicPr>
+          <p:cNvPr id="8" name="Picture 7">
+            <a:extLst>
+              <a:ext uri="{FF2B5EF4-FFF2-40B4-BE49-F238E27FC236}">
+                <a16:creationId xmlns:a16="http://schemas.microsoft.com/office/drawing/2014/main" id="{F9017623-D6FC-4892-91E5-08F85523B4A7}"/>
+              </a:ext>
+            </a:extLst>
+          </p:cNvPr>
+          <p:cNvPicPr>
+            <a:picLocks noChangeAspect="1"/>
+          </p:cNvPicPr>
+          <p:nvPr/>
+        </p:nvPicPr>
+        <p:blipFill>
+          <a:blip r:embed="rId3"/>
+          <a:stretch>
+            <a:fillRect/>
+          </a:stretch>
+        </p:blipFill>
+        <p:spPr>
+          <a:xfrm>
+            <a:off x="7450388" y="3326099"/>
+            <a:ext cx="4576771" cy="812814"/>
+          </a:xfrm>
+          <a:prstGeom prst="rect">
+            <a:avLst/>
+          </a:prstGeom>
+        </p:spPr>
+      </p:pic>
+    </p:spTree>
+    <p:extLst>
+      <p:ext uri="{BB962C8B-B14F-4D97-AF65-F5344CB8AC3E}">
+        <p14:creationId xmlns:p14="http://schemas.microsoft.com/office/powerpoint/2010/main" val="108174543"/>
       </p:ext>
     </p:extLst>
   </p:cSld>
@@ -7073,6 +7581,299 @@
     <p:extLst>
       <p:ext uri="{BB962C8B-B14F-4D97-AF65-F5344CB8AC3E}">
         <p14:creationId xmlns:p14="http://schemas.microsoft.com/office/powerpoint/2010/main" val="743291785"/>
+      </p:ext>
+    </p:extLst>
+  </p:cSld>
+  <p:clrMapOvr>
+    <a:masterClrMapping/>
+  </p:clrMapOvr>
+</p:sld>
+</file>
+
+<file path=ppt/slides/slide20.xml><?xml version="1.0" encoding="utf-8"?>
+<p:sld xmlns:a="http://schemas.openxmlformats.org/drawingml/2006/main" xmlns:r="http://schemas.openxmlformats.org/officeDocument/2006/relationships" xmlns:p="http://schemas.openxmlformats.org/presentationml/2006/main">
+  <p:cSld>
+    <p:bg>
+      <p:bgPr>
+        <a:solidFill>
+          <a:schemeClr val="accent6">
+            <a:lumMod val="20000"/>
+            <a:lumOff val="80000"/>
+          </a:schemeClr>
+        </a:solidFill>
+        <a:effectLst/>
+      </p:bgPr>
+    </p:bg>
+    <p:spTree>
+      <p:nvGrpSpPr>
+        <p:cNvPr id="1" name=""/>
+        <p:cNvGrpSpPr/>
+        <p:nvPr/>
+      </p:nvGrpSpPr>
+      <p:grpSpPr>
+        <a:xfrm>
+          <a:off x="0" y="0"/>
+          <a:ext cx="0" cy="0"/>
+          <a:chOff x="0" y="0"/>
+          <a:chExt cx="0" cy="0"/>
+        </a:xfrm>
+      </p:grpSpPr>
+      <p:sp>
+        <p:nvSpPr>
+          <p:cNvPr id="2" name="Title 1">
+            <a:extLst>
+              <a:ext uri="{FF2B5EF4-FFF2-40B4-BE49-F238E27FC236}">
+                <a16:creationId xmlns:a16="http://schemas.microsoft.com/office/drawing/2014/main" id="{DC598DD3-635B-4D67-ABB3-02B91E4A79B8}"/>
+              </a:ext>
+            </a:extLst>
+          </p:cNvPr>
+          <p:cNvSpPr>
+            <a:spLocks noGrp="1"/>
+          </p:cNvSpPr>
+          <p:nvPr>
+            <p:ph type="title"/>
+          </p:nvPr>
+        </p:nvSpPr>
+        <p:spPr/>
+        <p:txBody>
+          <a:bodyPr/>
+          <a:lstStyle/>
+          <a:p>
+            <a:r>
+              <a:rPr lang="lv-LV" dirty="0">
+                <a:latin typeface="Arial Black" panose="020B0A04020102020204" pitchFamily="34" charset="0"/>
+              </a:rPr>
+              <a:t>BufferedReader – skip() metode</a:t>
+            </a:r>
+            <a:endParaRPr lang="en-GB" dirty="0">
+              <a:latin typeface="Arial Black" panose="020B0A04020102020204" pitchFamily="34" charset="0"/>
+            </a:endParaRPr>
+          </a:p>
+        </p:txBody>
+      </p:sp>
+      <p:pic>
+        <p:nvPicPr>
+          <p:cNvPr id="9" name="Picture 8">
+            <a:extLst>
+              <a:ext uri="{FF2B5EF4-FFF2-40B4-BE49-F238E27FC236}">
+                <a16:creationId xmlns:a16="http://schemas.microsoft.com/office/drawing/2014/main" id="{E9BE8CF7-3113-4E1E-9593-F22C9EE22F96}"/>
+              </a:ext>
+            </a:extLst>
+          </p:cNvPr>
+          <p:cNvPicPr>
+            <a:picLocks noChangeAspect="1"/>
+          </p:cNvPicPr>
+          <p:nvPr/>
+        </p:nvPicPr>
+        <p:blipFill>
+          <a:blip r:embed="rId2"/>
+          <a:stretch>
+            <a:fillRect/>
+          </a:stretch>
+        </p:blipFill>
+        <p:spPr>
+          <a:xfrm>
+            <a:off x="838200" y="2459973"/>
+            <a:ext cx="4817283" cy="4178762"/>
+          </a:xfrm>
+          <a:prstGeom prst="rect">
+            <a:avLst/>
+          </a:prstGeom>
+        </p:spPr>
+      </p:pic>
+      <p:pic>
+        <p:nvPicPr>
+          <p:cNvPr id="11" name="Picture 10">
+            <a:extLst>
+              <a:ext uri="{FF2B5EF4-FFF2-40B4-BE49-F238E27FC236}">
+                <a16:creationId xmlns:a16="http://schemas.microsoft.com/office/drawing/2014/main" id="{B25C9192-A0D2-48F6-B472-5F098A15670D}"/>
+              </a:ext>
+            </a:extLst>
+          </p:cNvPr>
+          <p:cNvPicPr>
+            <a:picLocks noChangeAspect="1"/>
+          </p:cNvPicPr>
+          <p:nvPr/>
+        </p:nvPicPr>
+        <p:blipFill>
+          <a:blip r:embed="rId3"/>
+          <a:stretch>
+            <a:fillRect/>
+          </a:stretch>
+        </p:blipFill>
+        <p:spPr>
+          <a:xfrm>
+            <a:off x="7267550" y="3278601"/>
+            <a:ext cx="4596829" cy="826868"/>
+          </a:xfrm>
+          <a:prstGeom prst="rect">
+            <a:avLst/>
+          </a:prstGeom>
+        </p:spPr>
+      </p:pic>
+      <p:sp>
+        <p:nvSpPr>
+          <p:cNvPr id="13" name="TextBox 12">
+            <a:extLst>
+              <a:ext uri="{FF2B5EF4-FFF2-40B4-BE49-F238E27FC236}">
+                <a16:creationId xmlns:a16="http://schemas.microsoft.com/office/drawing/2014/main" id="{A108EA3A-62AE-4C29-8246-BF2566188019}"/>
+              </a:ext>
+            </a:extLst>
+          </p:cNvPr>
+          <p:cNvSpPr txBox="1"/>
+          <p:nvPr/>
+        </p:nvSpPr>
+        <p:spPr>
+          <a:xfrm>
+            <a:off x="734787" y="1427784"/>
+            <a:ext cx="6097554" cy="923330"/>
+          </a:xfrm>
+          <a:prstGeom prst="rect">
+            <a:avLst/>
+          </a:prstGeom>
+          <a:noFill/>
+        </p:spPr>
+        <p:txBody>
+          <a:bodyPr wrap="square">
+            <a:spAutoFit/>
+          </a:bodyPr>
+          <a:lstStyle/>
+          <a:p>
+            <a:r>
+              <a:rPr lang="lv-LV" dirty="0"/>
+              <a:t>P</a:t>
+            </a:r>
+            <a:r>
+              <a:rPr lang="en-GB" dirty="0" err="1"/>
+              <a:t>iemērā</a:t>
+            </a:r>
+            <a:r>
+              <a:rPr lang="en-GB" dirty="0"/>
+              <a:t> </a:t>
+            </a:r>
+            <a:r>
+              <a:rPr lang="lv-LV" dirty="0"/>
+              <a:t>tika izmantots </a:t>
+            </a:r>
+            <a:r>
+              <a:rPr lang="en-GB" dirty="0"/>
+              <a:t>skip() </a:t>
+            </a:r>
+            <a:r>
+              <a:rPr lang="en-GB" dirty="0" err="1"/>
+              <a:t>metod</a:t>
+            </a:r>
+            <a:r>
+              <a:rPr lang="lv-LV" dirty="0"/>
+              <a:t>e</a:t>
+            </a:r>
+            <a:r>
+              <a:rPr lang="en-GB" dirty="0"/>
+              <a:t>, </a:t>
+            </a:r>
+            <a:r>
+              <a:rPr lang="en-GB" dirty="0" err="1"/>
+              <a:t>lai</a:t>
+            </a:r>
+            <a:r>
+              <a:rPr lang="en-GB" dirty="0"/>
+              <a:t> </a:t>
+            </a:r>
+            <a:r>
+              <a:rPr lang="en-GB" dirty="0" err="1"/>
+              <a:t>izlaistu</a:t>
+            </a:r>
+            <a:r>
+              <a:rPr lang="en-GB" dirty="0"/>
+              <a:t> 5 </a:t>
+            </a:r>
+            <a:r>
+              <a:rPr lang="en-GB" dirty="0" err="1"/>
+              <a:t>rakstzīmes</a:t>
+            </a:r>
+            <a:r>
+              <a:rPr lang="en-GB" dirty="0"/>
+              <a:t> no </a:t>
+            </a:r>
+            <a:r>
+              <a:rPr lang="en-GB" dirty="0" err="1"/>
+              <a:t>failu</a:t>
+            </a:r>
+            <a:r>
+              <a:rPr lang="en-GB" dirty="0"/>
+              <a:t> </a:t>
+            </a:r>
+            <a:r>
+              <a:rPr lang="en-GB" dirty="0" err="1"/>
+              <a:t>lasītāja</a:t>
+            </a:r>
+            <a:r>
+              <a:rPr lang="en-GB" dirty="0"/>
+              <a:t>. </a:t>
+            </a:r>
+            <a:r>
+              <a:rPr lang="en-GB" dirty="0" err="1"/>
+              <a:t>Tādējādi</a:t>
+            </a:r>
+            <a:r>
+              <a:rPr lang="en-GB" dirty="0"/>
+              <a:t> </a:t>
+            </a:r>
+            <a:r>
+              <a:rPr lang="en-GB" dirty="0" err="1"/>
+              <a:t>rakstzīmes</a:t>
+            </a:r>
+            <a:r>
+              <a:rPr lang="en-GB" dirty="0"/>
+              <a:t> 'T', 'h', '</a:t>
+            </a:r>
+            <a:r>
+              <a:rPr lang="en-GB" dirty="0" err="1"/>
+              <a:t>i</a:t>
+            </a:r>
+            <a:r>
+              <a:rPr lang="en-GB" dirty="0"/>
+              <a:t>', 's' un ' ' </a:t>
+            </a:r>
+            <a:r>
+              <a:rPr lang="en-GB" dirty="0" err="1"/>
+              <a:t>tiek</a:t>
+            </a:r>
+            <a:r>
+              <a:rPr lang="en-GB" dirty="0"/>
+              <a:t> </a:t>
+            </a:r>
+            <a:r>
+              <a:rPr lang="en-GB" dirty="0" err="1"/>
+              <a:t>izlaistas</a:t>
+            </a:r>
+            <a:r>
+              <a:rPr lang="en-GB" dirty="0"/>
+              <a:t> no </a:t>
+            </a:r>
+            <a:r>
+              <a:rPr lang="en-GB" dirty="0" err="1"/>
+              <a:t>sākotnējā</a:t>
+            </a:r>
+            <a:r>
+              <a:rPr lang="en-GB" dirty="0"/>
+              <a:t> </a:t>
+            </a:r>
+            <a:r>
+              <a:rPr lang="en-GB" dirty="0" err="1"/>
+              <a:t>faila</a:t>
+            </a:r>
+            <a:r>
+              <a:rPr lang="en-GB" dirty="0"/>
+              <a:t>.</a:t>
+            </a:r>
+          </a:p>
+        </p:txBody>
+      </p:sp>
+    </p:spTree>
+    <p:extLst>
+      <p:ext uri="{BB962C8B-B14F-4D97-AF65-F5344CB8AC3E}">
+        <p14:creationId xmlns:p14="http://schemas.microsoft.com/office/powerpoint/2010/main" val="1294808629"/>
       </p:ext>
     </p:extLst>
   </p:cSld>

</xml_diff>

<commit_message>
Pievienota informācija par BufferedWriter
</commit_message>
<xml_diff>
--- a/MacibuMaterials.pptx
+++ b/MacibuMaterials.pptx
@@ -15,16 +15,20 @@
     <p:sldId id="263" r:id="rId9"/>
     <p:sldId id="264" r:id="rId10"/>
     <p:sldId id="265" r:id="rId11"/>
-    <p:sldId id="266" r:id="rId12"/>
-    <p:sldId id="268" r:id="rId13"/>
-    <p:sldId id="269" r:id="rId14"/>
-    <p:sldId id="270" r:id="rId15"/>
-    <p:sldId id="271" r:id="rId16"/>
-    <p:sldId id="272" r:id="rId17"/>
-    <p:sldId id="273" r:id="rId18"/>
-    <p:sldId id="274" r:id="rId19"/>
-    <p:sldId id="275" r:id="rId20"/>
-    <p:sldId id="276" r:id="rId21"/>
+    <p:sldId id="277" r:id="rId12"/>
+    <p:sldId id="278" r:id="rId13"/>
+    <p:sldId id="280" r:id="rId14"/>
+    <p:sldId id="281" r:id="rId15"/>
+    <p:sldId id="282" r:id="rId16"/>
+    <p:sldId id="266" r:id="rId17"/>
+    <p:sldId id="268" r:id="rId18"/>
+    <p:sldId id="269" r:id="rId19"/>
+    <p:sldId id="270" r:id="rId20"/>
+    <p:sldId id="271" r:id="rId21"/>
+    <p:sldId id="272" r:id="rId22"/>
+    <p:sldId id="274" r:id="rId23"/>
+    <p:sldId id="275" r:id="rId24"/>
+    <p:sldId id="276" r:id="rId25"/>
   </p:sldIdLst>
   <p:sldSz cx="12192000" cy="6858000"/>
   <p:notesSz cx="6858000" cy="9144000"/>
@@ -136,7 +140,7 @@
   <pc:docChgLst>
     <pc:chgData name="Rihards Mikuts" userId="3f680863f303c92b" providerId="LiveId" clId="{7ECA00DE-8CB5-4FFD-8DC5-57B39CF038BB}"/>
     <pc:docChg chg="undo custSel addSld delSld modSld">
-      <pc:chgData name="Rihards Mikuts" userId="3f680863f303c92b" providerId="LiveId" clId="{7ECA00DE-8CB5-4FFD-8DC5-57B39CF038BB}" dt="2025-06-06T19:32:24.871" v="1521" actId="2890"/>
+      <pc:chgData name="Rihards Mikuts" userId="3f680863f303c92b" providerId="LiveId" clId="{7ECA00DE-8CB5-4FFD-8DC5-57B39CF038BB}" dt="2025-06-07T09:04:54.336" v="1684" actId="1076"/>
       <pc:docMkLst>
         <pc:docMk/>
       </pc:docMkLst>
@@ -860,14 +864,14 @@
           <pc:sldMk cId="1709898399" sldId="273"/>
         </pc:sldMkLst>
       </pc:sldChg>
-      <pc:sldChg chg="addSp delSp modSp add mod setBg">
-        <pc:chgData name="Rihards Mikuts" userId="3f680863f303c92b" providerId="LiveId" clId="{7ECA00DE-8CB5-4FFD-8DC5-57B39CF038BB}" dt="2025-06-06T19:22:36.830" v="1377" actId="1076"/>
+      <pc:sldChg chg="addSp delSp modSp add del mod setBg">
+        <pc:chgData name="Rihards Mikuts" userId="3f680863f303c92b" providerId="LiveId" clId="{7ECA00DE-8CB5-4FFD-8DC5-57B39CF038BB}" dt="2025-06-07T08:57:40.617" v="1614" actId="47"/>
         <pc:sldMkLst>
           <pc:docMk/>
           <pc:sldMk cId="4280623153" sldId="273"/>
         </pc:sldMkLst>
         <pc:spChg chg="mod">
-          <ac:chgData name="Rihards Mikuts" userId="3f680863f303c92b" providerId="LiveId" clId="{7ECA00DE-8CB5-4FFD-8DC5-57B39CF038BB}" dt="2025-06-06T19:22:30.209" v="1371" actId="20577"/>
+          <ac:chgData name="Rihards Mikuts" userId="3f680863f303c92b" providerId="LiveId" clId="{7ECA00DE-8CB5-4FFD-8DC5-57B39CF038BB}" dt="2025-06-07T08:51:00.999" v="1590" actId="20577"/>
           <ac:spMkLst>
             <pc:docMk/>
             <pc:sldMk cId="4280623153" sldId="273"/>
@@ -1076,6 +1080,322 @@
           <pc:sldMk cId="1577873944" sldId="277"/>
         </pc:sldMkLst>
       </pc:sldChg>
+      <pc:sldChg chg="addSp modSp add mod setBg">
+        <pc:chgData name="Rihards Mikuts" userId="3f680863f303c92b" providerId="LiveId" clId="{7ECA00DE-8CB5-4FFD-8DC5-57B39CF038BB}" dt="2025-06-07T08:42:47.275" v="1541" actId="1076"/>
+        <pc:sldMkLst>
+          <pc:docMk/>
+          <pc:sldMk cId="3228937941" sldId="277"/>
+        </pc:sldMkLst>
+        <pc:spChg chg="mod">
+          <ac:chgData name="Rihards Mikuts" userId="3f680863f303c92b" providerId="LiveId" clId="{7ECA00DE-8CB5-4FFD-8DC5-57B39CF038BB}" dt="2025-06-07T08:40:27.901" v="1525"/>
+          <ac:spMkLst>
+            <pc:docMk/>
+            <pc:sldMk cId="3228937941" sldId="277"/>
+            <ac:spMk id="2" creationId="{DC598DD3-635B-4D67-ABB3-02B91E4A79B8}"/>
+          </ac:spMkLst>
+        </pc:spChg>
+        <pc:spChg chg="mod">
+          <ac:chgData name="Rihards Mikuts" userId="3f680863f303c92b" providerId="LiveId" clId="{7ECA00DE-8CB5-4FFD-8DC5-57B39CF038BB}" dt="2025-06-07T08:42:00.527" v="1537" actId="5793"/>
+          <ac:spMkLst>
+            <pc:docMk/>
+            <pc:sldMk cId="3228937941" sldId="277"/>
+            <ac:spMk id="3" creationId="{DD2D8840-CC0E-49E7-93B7-354209F90F28}"/>
+          </ac:spMkLst>
+        </pc:spChg>
+        <pc:picChg chg="add mod">
+          <ac:chgData name="Rihards Mikuts" userId="3f680863f303c92b" providerId="LiveId" clId="{7ECA00DE-8CB5-4FFD-8DC5-57B39CF038BB}" dt="2025-06-07T08:42:47.275" v="1541" actId="1076"/>
+          <ac:picMkLst>
+            <pc:docMk/>
+            <pc:sldMk cId="3228937941" sldId="277"/>
+            <ac:picMk id="5" creationId="{BCAC283A-EF5D-48CA-9957-498506F2C068}"/>
+          </ac:picMkLst>
+        </pc:picChg>
+      </pc:sldChg>
+      <pc:sldChg chg="add del">
+        <pc:chgData name="Rihards Mikuts" userId="3f680863f303c92b" providerId="LiveId" clId="{7ECA00DE-8CB5-4FFD-8DC5-57B39CF038BB}" dt="2025-06-07T08:43:20.978" v="1545" actId="2890"/>
+        <pc:sldMkLst>
+          <pc:docMk/>
+          <pc:sldMk cId="34186685" sldId="278"/>
+        </pc:sldMkLst>
+      </pc:sldChg>
+      <pc:sldChg chg="add del setBg">
+        <pc:chgData name="Rihards Mikuts" userId="3f680863f303c92b" providerId="LiveId" clId="{7ECA00DE-8CB5-4FFD-8DC5-57B39CF038BB}" dt="2025-06-07T08:43:18.426" v="1543"/>
+        <pc:sldMkLst>
+          <pc:docMk/>
+          <pc:sldMk cId="867292628" sldId="278"/>
+        </pc:sldMkLst>
+      </pc:sldChg>
+      <pc:sldChg chg="add del">
+        <pc:chgData name="Rihards Mikuts" userId="3f680863f303c92b" providerId="LiveId" clId="{7ECA00DE-8CB5-4FFD-8DC5-57B39CF038BB}" dt="2025-06-07T08:43:31.291" v="1549" actId="2890"/>
+        <pc:sldMkLst>
+          <pc:docMk/>
+          <pc:sldMk cId="2320348513" sldId="278"/>
+        </pc:sldMkLst>
+      </pc:sldChg>
+      <pc:sldChg chg="add del">
+        <pc:chgData name="Rihards Mikuts" userId="3f680863f303c92b" providerId="LiveId" clId="{7ECA00DE-8CB5-4FFD-8DC5-57B39CF038BB}" dt="2025-06-07T08:43:22.855" v="1547" actId="2890"/>
+        <pc:sldMkLst>
+          <pc:docMk/>
+          <pc:sldMk cId="3719985659" sldId="278"/>
+        </pc:sldMkLst>
+      </pc:sldChg>
+      <pc:sldChg chg="delSp modSp add mod">
+        <pc:chgData name="Rihards Mikuts" userId="3f680863f303c92b" providerId="LiveId" clId="{7ECA00DE-8CB5-4FFD-8DC5-57B39CF038BB}" dt="2025-06-07T08:49:25.663" v="1581" actId="20577"/>
+        <pc:sldMkLst>
+          <pc:docMk/>
+          <pc:sldMk cId="3753383533" sldId="278"/>
+        </pc:sldMkLst>
+        <pc:spChg chg="mod">
+          <ac:chgData name="Rihards Mikuts" userId="3f680863f303c92b" providerId="LiveId" clId="{7ECA00DE-8CB5-4FFD-8DC5-57B39CF038BB}" dt="2025-06-07T08:49:25.663" v="1581" actId="20577"/>
+          <ac:spMkLst>
+            <pc:docMk/>
+            <pc:sldMk cId="3753383533" sldId="278"/>
+            <ac:spMk id="3" creationId="{DD2D8840-CC0E-49E7-93B7-354209F90F28}"/>
+          </ac:spMkLst>
+        </pc:spChg>
+        <pc:picChg chg="del">
+          <ac:chgData name="Rihards Mikuts" userId="3f680863f303c92b" providerId="LiveId" clId="{7ECA00DE-8CB5-4FFD-8DC5-57B39CF038BB}" dt="2025-06-07T08:48:53.460" v="1551" actId="478"/>
+          <ac:picMkLst>
+            <pc:docMk/>
+            <pc:sldMk cId="3753383533" sldId="278"/>
+            <ac:picMk id="5" creationId="{BCAC283A-EF5D-48CA-9957-498506F2C068}"/>
+          </ac:picMkLst>
+        </pc:picChg>
+      </pc:sldChg>
+      <pc:sldChg chg="addSp delSp modSp add del mod setBg">
+        <pc:chgData name="Rihards Mikuts" userId="3f680863f303c92b" providerId="LiveId" clId="{7ECA00DE-8CB5-4FFD-8DC5-57B39CF038BB}" dt="2025-06-07T08:58:16.683" v="1625" actId="47"/>
+        <pc:sldMkLst>
+          <pc:docMk/>
+          <pc:sldMk cId="870779597" sldId="279"/>
+        </pc:sldMkLst>
+        <pc:spChg chg="mod">
+          <ac:chgData name="Rihards Mikuts" userId="3f680863f303c92b" providerId="LiveId" clId="{7ECA00DE-8CB5-4FFD-8DC5-57B39CF038BB}" dt="2025-06-07T08:50:12.622" v="1589" actId="20577"/>
+          <ac:spMkLst>
+            <pc:docMk/>
+            <pc:sldMk cId="870779597" sldId="279"/>
+            <ac:spMk id="2" creationId="{DC598DD3-635B-4D67-ABB3-02B91E4A79B8}"/>
+          </ac:spMkLst>
+        </pc:spChg>
+        <pc:spChg chg="mod">
+          <ac:chgData name="Rihards Mikuts" userId="3f680863f303c92b" providerId="LiveId" clId="{7ECA00DE-8CB5-4FFD-8DC5-57B39CF038BB}" dt="2025-06-07T08:51:17.510" v="1592" actId="20577"/>
+          <ac:spMkLst>
+            <pc:docMk/>
+            <pc:sldMk cId="870779597" sldId="279"/>
+            <ac:spMk id="3" creationId="{DD2D8840-CC0E-49E7-93B7-354209F90F28}"/>
+          </ac:spMkLst>
+        </pc:spChg>
+        <pc:picChg chg="add del">
+          <ac:chgData name="Rihards Mikuts" userId="3f680863f303c92b" providerId="LiveId" clId="{7ECA00DE-8CB5-4FFD-8DC5-57B39CF038BB}" dt="2025-06-07T08:54:19.444" v="1594" actId="22"/>
+          <ac:picMkLst>
+            <pc:docMk/>
+            <pc:sldMk cId="870779597" sldId="279"/>
+            <ac:picMk id="5" creationId="{441755D3-AAF3-40A9-AE40-483A40E41E33}"/>
+          </ac:picMkLst>
+        </pc:picChg>
+        <pc:picChg chg="del">
+          <ac:chgData name="Rihards Mikuts" userId="3f680863f303c92b" providerId="LiveId" clId="{7ECA00DE-8CB5-4FFD-8DC5-57B39CF038BB}" dt="2025-06-07T08:54:31.296" v="1600" actId="478"/>
+          <ac:picMkLst>
+            <pc:docMk/>
+            <pc:sldMk cId="870779597" sldId="279"/>
+            <ac:picMk id="7" creationId="{CBCD785D-5B37-4BE1-A39A-2A0CA1644EED}"/>
+          </ac:picMkLst>
+        </pc:picChg>
+        <pc:picChg chg="add mod">
+          <ac:chgData name="Rihards Mikuts" userId="3f680863f303c92b" providerId="LiveId" clId="{7ECA00DE-8CB5-4FFD-8DC5-57B39CF038BB}" dt="2025-06-07T08:54:33.556" v="1601" actId="1076"/>
+          <ac:picMkLst>
+            <pc:docMk/>
+            <pc:sldMk cId="870779597" sldId="279"/>
+            <ac:picMk id="8" creationId="{5255A930-B041-4B1A-A298-3E4E58A04564}"/>
+          </ac:picMkLst>
+        </pc:picChg>
+      </pc:sldChg>
+      <pc:sldChg chg="addSp delSp modSp add mod setBg">
+        <pc:chgData name="Rihards Mikuts" userId="3f680863f303c92b" providerId="LiveId" clId="{7ECA00DE-8CB5-4FFD-8DC5-57B39CF038BB}" dt="2025-06-07T08:59:39.978" v="1637"/>
+        <pc:sldMkLst>
+          <pc:docMk/>
+          <pc:sldMk cId="3740846888" sldId="280"/>
+        </pc:sldMkLst>
+        <pc:spChg chg="mod">
+          <ac:chgData name="Rihards Mikuts" userId="3f680863f303c92b" providerId="LiveId" clId="{7ECA00DE-8CB5-4FFD-8DC5-57B39CF038BB}" dt="2025-06-07T08:56:41.349" v="1611" actId="20577"/>
+          <ac:spMkLst>
+            <pc:docMk/>
+            <pc:sldMk cId="3740846888" sldId="280"/>
+            <ac:spMk id="2" creationId="{DC598DD3-635B-4D67-ABB3-02B91E4A79B8}"/>
+          </ac:spMkLst>
+        </pc:spChg>
+        <pc:spChg chg="mod">
+          <ac:chgData name="Rihards Mikuts" userId="3f680863f303c92b" providerId="LiveId" clId="{7ECA00DE-8CB5-4FFD-8DC5-57B39CF038BB}" dt="2025-06-07T08:59:39.978" v="1637"/>
+          <ac:spMkLst>
+            <pc:docMk/>
+            <pc:sldMk cId="3740846888" sldId="280"/>
+            <ac:spMk id="3" creationId="{DD2D8840-CC0E-49E7-93B7-354209F90F28}"/>
+          </ac:spMkLst>
+        </pc:spChg>
+        <pc:picChg chg="del">
+          <ac:chgData name="Rihards Mikuts" userId="3f680863f303c92b" providerId="LiveId" clId="{7ECA00DE-8CB5-4FFD-8DC5-57B39CF038BB}" dt="2025-06-07T08:59:10.062" v="1628" actId="478"/>
+          <ac:picMkLst>
+            <pc:docMk/>
+            <pc:sldMk cId="3740846888" sldId="280"/>
+            <ac:picMk id="5" creationId="{85A5D922-252B-46E6-85D7-B1B5C3F980F1}"/>
+          </ac:picMkLst>
+        </pc:picChg>
+        <pc:picChg chg="add mod">
+          <ac:chgData name="Rihards Mikuts" userId="3f680863f303c92b" providerId="LiveId" clId="{7ECA00DE-8CB5-4FFD-8DC5-57B39CF038BB}" dt="2025-06-07T08:58:14.466" v="1624" actId="1076"/>
+          <ac:picMkLst>
+            <pc:docMk/>
+            <pc:sldMk cId="3740846888" sldId="280"/>
+            <ac:picMk id="6" creationId="{5A42D773-9329-4C77-BC57-0F36BE5AEC92}"/>
+          </ac:picMkLst>
+        </pc:picChg>
+        <pc:picChg chg="del">
+          <ac:chgData name="Rihards Mikuts" userId="3f680863f303c92b" providerId="LiveId" clId="{7ECA00DE-8CB5-4FFD-8DC5-57B39CF038BB}" dt="2025-06-07T08:58:08.754" v="1620" actId="478"/>
+          <ac:picMkLst>
+            <pc:docMk/>
+            <pc:sldMk cId="3740846888" sldId="280"/>
+            <ac:picMk id="7" creationId="{CBCD785D-5B37-4BE1-A39A-2A0CA1644EED}"/>
+          </ac:picMkLst>
+        </pc:picChg>
+        <pc:picChg chg="add mod">
+          <ac:chgData name="Rihards Mikuts" userId="3f680863f303c92b" providerId="LiveId" clId="{7ECA00DE-8CB5-4FFD-8DC5-57B39CF038BB}" dt="2025-06-07T08:59:20.010" v="1632" actId="1076"/>
+          <ac:picMkLst>
+            <pc:docMk/>
+            <pc:sldMk cId="3740846888" sldId="280"/>
+            <ac:picMk id="8" creationId="{A44F431F-86F0-4FAB-BDAF-122221E5E5D3}"/>
+          </ac:picMkLst>
+        </pc:picChg>
+      </pc:sldChg>
+      <pc:sldChg chg="addSp delSp modSp add mod setBg">
+        <pc:chgData name="Rihards Mikuts" userId="3f680863f303c92b" providerId="LiveId" clId="{7ECA00DE-8CB5-4FFD-8DC5-57B39CF038BB}" dt="2025-06-07T09:03:25.657" v="1660" actId="22"/>
+        <pc:sldMkLst>
+          <pc:docMk/>
+          <pc:sldMk cId="3402589891" sldId="281"/>
+        </pc:sldMkLst>
+        <pc:spChg chg="mod">
+          <ac:chgData name="Rihards Mikuts" userId="3f680863f303c92b" providerId="LiveId" clId="{7ECA00DE-8CB5-4FFD-8DC5-57B39CF038BB}" dt="2025-06-07T09:03:18.545" v="1656" actId="20577"/>
+          <ac:spMkLst>
+            <pc:docMk/>
+            <pc:sldMk cId="3402589891" sldId="281"/>
+            <ac:spMk id="2" creationId="{DC598DD3-635B-4D67-ABB3-02B91E4A79B8}"/>
+          </ac:spMkLst>
+        </pc:spChg>
+        <pc:picChg chg="add mod">
+          <ac:chgData name="Rihards Mikuts" userId="3f680863f303c92b" providerId="LiveId" clId="{7ECA00DE-8CB5-4FFD-8DC5-57B39CF038BB}" dt="2025-06-07T09:03:03.208" v="1647" actId="1076"/>
+          <ac:picMkLst>
+            <pc:docMk/>
+            <pc:sldMk cId="3402589891" sldId="281"/>
+            <ac:picMk id="4" creationId="{C60B40F4-2271-4C46-B713-25FD2D19F61B}"/>
+          </ac:picMkLst>
+        </pc:picChg>
+        <pc:picChg chg="del">
+          <ac:chgData name="Rihards Mikuts" userId="3f680863f303c92b" providerId="LiveId" clId="{7ECA00DE-8CB5-4FFD-8DC5-57B39CF038BB}" dt="2025-06-07T09:03:00.181" v="1645" actId="478"/>
+          <ac:picMkLst>
+            <pc:docMk/>
+            <pc:sldMk cId="3402589891" sldId="281"/>
+            <ac:picMk id="5" creationId="{6592AF58-9A02-4B9E-A4D2-277E64EF8493}"/>
+          </ac:picMkLst>
+        </pc:picChg>
+        <pc:picChg chg="add mod">
+          <ac:chgData name="Rihards Mikuts" userId="3f680863f303c92b" providerId="LiveId" clId="{7ECA00DE-8CB5-4FFD-8DC5-57B39CF038BB}" dt="2025-06-07T09:03:12.018" v="1650" actId="1076"/>
+          <ac:picMkLst>
+            <pc:docMk/>
+            <pc:sldMk cId="3402589891" sldId="281"/>
+            <ac:picMk id="7" creationId="{99E7B004-B065-4D65-8738-4F3D46297F86}"/>
+          </ac:picMkLst>
+        </pc:picChg>
+        <pc:picChg chg="del">
+          <ac:chgData name="Rihards Mikuts" userId="3f680863f303c92b" providerId="LiveId" clId="{7ECA00DE-8CB5-4FFD-8DC5-57B39CF038BB}" dt="2025-06-07T09:03:04.405" v="1648" actId="478"/>
+          <ac:picMkLst>
+            <pc:docMk/>
+            <pc:sldMk cId="3402589891" sldId="281"/>
+            <ac:picMk id="8" creationId="{F9017623-D6FC-4892-91E5-08F85523B4A7}"/>
+          </ac:picMkLst>
+        </pc:picChg>
+        <pc:picChg chg="add del">
+          <ac:chgData name="Rihards Mikuts" userId="3f680863f303c92b" providerId="LiveId" clId="{7ECA00DE-8CB5-4FFD-8DC5-57B39CF038BB}" dt="2025-06-07T09:03:23.493" v="1658" actId="22"/>
+          <ac:picMkLst>
+            <pc:docMk/>
+            <pc:sldMk cId="3402589891" sldId="281"/>
+            <ac:picMk id="10" creationId="{18DD7368-03A5-4A9F-B9E2-AD28730D36AB}"/>
+          </ac:picMkLst>
+        </pc:picChg>
+        <pc:picChg chg="add del">
+          <ac:chgData name="Rihards Mikuts" userId="3f680863f303c92b" providerId="LiveId" clId="{7ECA00DE-8CB5-4FFD-8DC5-57B39CF038BB}" dt="2025-06-07T09:03:25.657" v="1660" actId="22"/>
+          <ac:picMkLst>
+            <pc:docMk/>
+            <pc:sldMk cId="3402589891" sldId="281"/>
+            <ac:picMk id="12" creationId="{21126D3F-C515-4E86-8AFD-34FE851FC944}"/>
+          </ac:picMkLst>
+        </pc:picChg>
+      </pc:sldChg>
+      <pc:sldChg chg="add del setBg">
+        <pc:chgData name="Rihards Mikuts" userId="3f680863f303c92b" providerId="LiveId" clId="{7ECA00DE-8CB5-4FFD-8DC5-57B39CF038BB}" dt="2025-06-07T09:03:28.071" v="1662"/>
+        <pc:sldMkLst>
+          <pc:docMk/>
+          <pc:sldMk cId="660085963" sldId="282"/>
+        </pc:sldMkLst>
+      </pc:sldChg>
+      <pc:sldChg chg="add del setBg">
+        <pc:chgData name="Rihards Mikuts" userId="3f680863f303c92b" providerId="LiveId" clId="{7ECA00DE-8CB5-4FFD-8DC5-57B39CF038BB}" dt="2025-06-07T09:03:30.681" v="1664"/>
+        <pc:sldMkLst>
+          <pc:docMk/>
+          <pc:sldMk cId="1786097315" sldId="282"/>
+        </pc:sldMkLst>
+      </pc:sldChg>
+      <pc:sldChg chg="addSp delSp modSp add mod setBg">
+        <pc:chgData name="Rihards Mikuts" userId="3f680863f303c92b" providerId="LiveId" clId="{7ECA00DE-8CB5-4FFD-8DC5-57B39CF038BB}" dt="2025-06-07T09:04:54.336" v="1684" actId="1076"/>
+        <pc:sldMkLst>
+          <pc:docMk/>
+          <pc:sldMk cId="3372485756" sldId="282"/>
+        </pc:sldMkLst>
+        <pc:spChg chg="mod">
+          <ac:chgData name="Rihards Mikuts" userId="3f680863f303c92b" providerId="LiveId" clId="{7ECA00DE-8CB5-4FFD-8DC5-57B39CF038BB}" dt="2025-06-07T09:04:48.669" v="1682" actId="20577"/>
+          <ac:spMkLst>
+            <pc:docMk/>
+            <pc:sldMk cId="3372485756" sldId="282"/>
+            <ac:spMk id="2" creationId="{DC598DD3-635B-4D67-ABB3-02B91E4A79B8}"/>
+          </ac:spMkLst>
+        </pc:spChg>
+        <pc:spChg chg="add mod">
+          <ac:chgData name="Rihards Mikuts" userId="3f680863f303c92b" providerId="LiveId" clId="{7ECA00DE-8CB5-4FFD-8DC5-57B39CF038BB}" dt="2025-06-07T09:04:17.035" v="1669" actId="1076"/>
+          <ac:spMkLst>
+            <pc:docMk/>
+            <pc:sldMk cId="3372485756" sldId="282"/>
+            <ac:spMk id="6" creationId="{B1E53182-4721-448D-9652-11EB1B46EA3A}"/>
+          </ac:spMkLst>
+        </pc:spChg>
+        <pc:picChg chg="del">
+          <ac:chgData name="Rihards Mikuts" userId="3f680863f303c92b" providerId="LiveId" clId="{7ECA00DE-8CB5-4FFD-8DC5-57B39CF038BB}" dt="2025-06-07T09:04:13.785" v="1667" actId="478"/>
+          <ac:picMkLst>
+            <pc:docMk/>
+            <pc:sldMk cId="3372485756" sldId="282"/>
+            <ac:picMk id="4" creationId="{C60B40F4-2271-4C46-B713-25FD2D19F61B}"/>
+          </ac:picMkLst>
+        </pc:picChg>
+        <pc:picChg chg="del">
+          <ac:chgData name="Rihards Mikuts" userId="3f680863f303c92b" providerId="LiveId" clId="{7ECA00DE-8CB5-4FFD-8DC5-57B39CF038BB}" dt="2025-06-07T09:04:18.110" v="1670" actId="478"/>
+          <ac:picMkLst>
+            <pc:docMk/>
+            <pc:sldMk cId="3372485756" sldId="282"/>
+            <ac:picMk id="7" creationId="{99E7B004-B065-4D65-8738-4F3D46297F86}"/>
+          </ac:picMkLst>
+        </pc:picChg>
+        <pc:picChg chg="add mod">
+          <ac:chgData name="Rihards Mikuts" userId="3f680863f303c92b" providerId="LiveId" clId="{7ECA00DE-8CB5-4FFD-8DC5-57B39CF038BB}" dt="2025-06-07T09:04:34.622" v="1675" actId="14100"/>
+          <ac:picMkLst>
+            <pc:docMk/>
+            <pc:sldMk cId="3372485756" sldId="282"/>
+            <ac:picMk id="8" creationId="{D4FC5953-A0E4-43B4-A626-5DD9E7BDF9C4}"/>
+          </ac:picMkLst>
+        </pc:picChg>
+        <pc:picChg chg="add mod">
+          <ac:chgData name="Rihards Mikuts" userId="3f680863f303c92b" providerId="LiveId" clId="{7ECA00DE-8CB5-4FFD-8DC5-57B39CF038BB}" dt="2025-06-07T09:04:54.336" v="1684" actId="1076"/>
+          <ac:picMkLst>
+            <pc:docMk/>
+            <pc:sldMk cId="3372485756" sldId="282"/>
+            <ac:picMk id="10" creationId="{F60983E8-B9DD-4273-8790-78C5F63CD9E6}"/>
+          </ac:picMkLst>
+        </pc:picChg>
+      </pc:sldChg>
     </pc:docChg>
   </pc:docChgLst>
 </pc:chgInfo>
@@ -1212,7 +1532,7 @@
           <a:p>
             <a:fld id="{B8977C40-4C13-4C59-8229-5B4DC279FD29}" type="datetimeFigureOut">
               <a:rPr lang="en-GB" smtClean="0"/>
-              <a:t>06/06/2025</a:t>
+              <a:t>07/06/2025</a:t>
             </a:fld>
             <a:endParaRPr lang="en-GB" dirty="0"/>
           </a:p>
@@ -1382,7 +1702,7 @@
           <a:p>
             <a:fld id="{B8977C40-4C13-4C59-8229-5B4DC279FD29}" type="datetimeFigureOut">
               <a:rPr lang="en-GB" smtClean="0"/>
-              <a:t>06/06/2025</a:t>
+              <a:t>07/06/2025</a:t>
             </a:fld>
             <a:endParaRPr lang="en-GB" dirty="0"/>
           </a:p>
@@ -1562,7 +1882,7 @@
           <a:p>
             <a:fld id="{B8977C40-4C13-4C59-8229-5B4DC279FD29}" type="datetimeFigureOut">
               <a:rPr lang="en-GB" smtClean="0"/>
-              <a:t>06/06/2025</a:t>
+              <a:t>07/06/2025</a:t>
             </a:fld>
             <a:endParaRPr lang="en-GB" dirty="0"/>
           </a:p>
@@ -1732,7 +2052,7 @@
           <a:p>
             <a:fld id="{B8977C40-4C13-4C59-8229-5B4DC279FD29}" type="datetimeFigureOut">
               <a:rPr lang="en-GB" smtClean="0"/>
-              <a:t>06/06/2025</a:t>
+              <a:t>07/06/2025</a:t>
             </a:fld>
             <a:endParaRPr lang="en-GB" dirty="0"/>
           </a:p>
@@ -1978,7 +2298,7 @@
           <a:p>
             <a:fld id="{B8977C40-4C13-4C59-8229-5B4DC279FD29}" type="datetimeFigureOut">
               <a:rPr lang="en-GB" smtClean="0"/>
-              <a:t>06/06/2025</a:t>
+              <a:t>07/06/2025</a:t>
             </a:fld>
             <a:endParaRPr lang="en-GB" dirty="0"/>
           </a:p>
@@ -2210,7 +2530,7 @@
           <a:p>
             <a:fld id="{B8977C40-4C13-4C59-8229-5B4DC279FD29}" type="datetimeFigureOut">
               <a:rPr lang="en-GB" smtClean="0"/>
-              <a:t>06/06/2025</a:t>
+              <a:t>07/06/2025</a:t>
             </a:fld>
             <a:endParaRPr lang="en-GB" dirty="0"/>
           </a:p>
@@ -2577,7 +2897,7 @@
           <a:p>
             <a:fld id="{B8977C40-4C13-4C59-8229-5B4DC279FD29}" type="datetimeFigureOut">
               <a:rPr lang="en-GB" smtClean="0"/>
-              <a:t>06/06/2025</a:t>
+              <a:t>07/06/2025</a:t>
             </a:fld>
             <a:endParaRPr lang="en-GB" dirty="0"/>
           </a:p>
@@ -2695,7 +3015,7 @@
           <a:p>
             <a:fld id="{B8977C40-4C13-4C59-8229-5B4DC279FD29}" type="datetimeFigureOut">
               <a:rPr lang="en-GB" smtClean="0"/>
-              <a:t>06/06/2025</a:t>
+              <a:t>07/06/2025</a:t>
             </a:fld>
             <a:endParaRPr lang="en-GB" dirty="0"/>
           </a:p>
@@ -2790,7 +3110,7 @@
           <a:p>
             <a:fld id="{B8977C40-4C13-4C59-8229-5B4DC279FD29}" type="datetimeFigureOut">
               <a:rPr lang="en-GB" smtClean="0"/>
-              <a:t>06/06/2025</a:t>
+              <a:t>07/06/2025</a:t>
             </a:fld>
             <a:endParaRPr lang="en-GB" dirty="0"/>
           </a:p>
@@ -3067,7 +3387,7 @@
           <a:p>
             <a:fld id="{B8977C40-4C13-4C59-8229-5B4DC279FD29}" type="datetimeFigureOut">
               <a:rPr lang="en-GB" smtClean="0"/>
-              <a:t>06/06/2025</a:t>
+              <a:t>07/06/2025</a:t>
             </a:fld>
             <a:endParaRPr lang="en-GB" dirty="0"/>
           </a:p>
@@ -3323,7 +3643,7 @@
           <a:p>
             <a:fld id="{B8977C40-4C13-4C59-8229-5B4DC279FD29}" type="datetimeFigureOut">
               <a:rPr lang="en-GB" smtClean="0"/>
-              <a:t>06/06/2025</a:t>
+              <a:t>07/06/2025</a:t>
             </a:fld>
             <a:endParaRPr lang="en-GB" dirty="0"/>
           </a:p>
@@ -3536,7 +3856,7 @@
           <a:p>
             <a:fld id="{B8977C40-4C13-4C59-8229-5B4DC279FD29}" type="datetimeFigureOut">
               <a:rPr lang="en-GB" smtClean="0"/>
-              <a:t>06/06/2025</a:t>
+              <a:t>07/06/2025</a:t>
             </a:fld>
             <a:endParaRPr lang="en-GB" dirty="0"/>
           </a:p>
@@ -4249,6 +4569,965 @@
           <a:lstStyle/>
           <a:p>
             <a:r>
+              <a:rPr lang="en-GB" dirty="0" err="1">
+                <a:latin typeface="Arial Black" panose="020B0A04020102020204" pitchFamily="34" charset="0"/>
+              </a:rPr>
+              <a:t>BufferedWriter</a:t>
+            </a:r>
+            <a:endParaRPr lang="en-GB" dirty="0">
+              <a:latin typeface="Arial Black" panose="020B0A04020102020204" pitchFamily="34" charset="0"/>
+            </a:endParaRPr>
+          </a:p>
+        </p:txBody>
+      </p:sp>
+      <p:sp>
+        <p:nvSpPr>
+          <p:cNvPr id="3" name="Content Placeholder 2">
+            <a:extLst>
+              <a:ext uri="{FF2B5EF4-FFF2-40B4-BE49-F238E27FC236}">
+                <a16:creationId xmlns:a16="http://schemas.microsoft.com/office/drawing/2014/main" id="{DD2D8840-CC0E-49E7-93B7-354209F90F28}"/>
+              </a:ext>
+            </a:extLst>
+          </p:cNvPr>
+          <p:cNvSpPr>
+            <a:spLocks noGrp="1"/>
+          </p:cNvSpPr>
+          <p:nvPr>
+            <p:ph idx="1"/>
+          </p:nvPr>
+        </p:nvSpPr>
+        <p:spPr/>
+        <p:txBody>
+          <a:bodyPr>
+            <a:normAutofit/>
+          </a:bodyPr>
+          <a:lstStyle/>
+          <a:p>
+            <a:pPr marL="0" indent="0">
+              <a:buNone/>
+            </a:pPr>
+            <a:r>
+              <a:rPr lang="lv-LV" dirty="0"/>
+              <a:t>Java.io pakotnes BufferedWriter klasi var izmantot kopā ar citiem rakstīšanas rīkiem, lai efektīvāk ierakstītu datus.</a:t>
+            </a:r>
+          </a:p>
+          <a:p>
+            <a:pPr marL="0" indent="0">
+              <a:buNone/>
+            </a:pPr>
+            <a:r>
+              <a:rPr lang="lv-LV" dirty="0"/>
+              <a:t>Tā paplašina abstrakto klasi Writer.</a:t>
+            </a:r>
+          </a:p>
+        </p:txBody>
+      </p:sp>
+      <p:pic>
+        <p:nvPicPr>
+          <p:cNvPr id="5" name="Picture 4">
+            <a:extLst>
+              <a:ext uri="{FF2B5EF4-FFF2-40B4-BE49-F238E27FC236}">
+                <a16:creationId xmlns:a16="http://schemas.microsoft.com/office/drawing/2014/main" id="{BCAC283A-EF5D-48CA-9957-498506F2C068}"/>
+              </a:ext>
+            </a:extLst>
+          </p:cNvPr>
+          <p:cNvPicPr>
+            <a:picLocks noChangeAspect="1"/>
+          </p:cNvPicPr>
+          <p:nvPr/>
+        </p:nvPicPr>
+        <p:blipFill>
+          <a:blip r:embed="rId2"/>
+          <a:stretch>
+            <a:fillRect/>
+          </a:stretch>
+        </p:blipFill>
+        <p:spPr>
+          <a:xfrm>
+            <a:off x="3134027" y="3686540"/>
+            <a:ext cx="6308552" cy="2013841"/>
+          </a:xfrm>
+          <a:prstGeom prst="rect">
+            <a:avLst/>
+          </a:prstGeom>
+        </p:spPr>
+      </p:pic>
+    </p:spTree>
+    <p:extLst>
+      <p:ext uri="{BB962C8B-B14F-4D97-AF65-F5344CB8AC3E}">
+        <p14:creationId xmlns:p14="http://schemas.microsoft.com/office/powerpoint/2010/main" val="3228937941"/>
+      </p:ext>
+    </p:extLst>
+  </p:cSld>
+  <p:clrMapOvr>
+    <a:masterClrMapping/>
+  </p:clrMapOvr>
+</p:sld>
+</file>
+
+<file path=ppt/slides/slide12.xml><?xml version="1.0" encoding="utf-8"?>
+<p:sld xmlns:a="http://schemas.openxmlformats.org/drawingml/2006/main" xmlns:r="http://schemas.openxmlformats.org/officeDocument/2006/relationships" xmlns:p="http://schemas.openxmlformats.org/presentationml/2006/main">
+  <p:cSld>
+    <p:bg>
+      <p:bgPr>
+        <a:solidFill>
+          <a:schemeClr val="accent6">
+            <a:lumMod val="20000"/>
+            <a:lumOff val="80000"/>
+          </a:schemeClr>
+        </a:solidFill>
+        <a:effectLst/>
+      </p:bgPr>
+    </p:bg>
+    <p:spTree>
+      <p:nvGrpSpPr>
+        <p:cNvPr id="1" name=""/>
+        <p:cNvGrpSpPr/>
+        <p:nvPr/>
+      </p:nvGrpSpPr>
+      <p:grpSpPr>
+        <a:xfrm>
+          <a:off x="0" y="0"/>
+          <a:ext cx="0" cy="0"/>
+          <a:chOff x="0" y="0"/>
+          <a:chExt cx="0" cy="0"/>
+        </a:xfrm>
+      </p:grpSpPr>
+      <p:sp>
+        <p:nvSpPr>
+          <p:cNvPr id="2" name="Title 1">
+            <a:extLst>
+              <a:ext uri="{FF2B5EF4-FFF2-40B4-BE49-F238E27FC236}">
+                <a16:creationId xmlns:a16="http://schemas.microsoft.com/office/drawing/2014/main" id="{DC598DD3-635B-4D67-ABB3-02B91E4A79B8}"/>
+              </a:ext>
+            </a:extLst>
+          </p:cNvPr>
+          <p:cNvSpPr>
+            <a:spLocks noGrp="1"/>
+          </p:cNvSpPr>
+          <p:nvPr>
+            <p:ph type="title"/>
+          </p:nvPr>
+        </p:nvSpPr>
+        <p:spPr/>
+        <p:txBody>
+          <a:bodyPr/>
+          <a:lstStyle/>
+          <a:p>
+            <a:r>
+              <a:rPr lang="en-GB" dirty="0" err="1">
+                <a:latin typeface="Arial Black" panose="020B0A04020102020204" pitchFamily="34" charset="0"/>
+              </a:rPr>
+              <a:t>BufferedWriter</a:t>
+            </a:r>
+            <a:endParaRPr lang="en-GB" dirty="0">
+              <a:latin typeface="Arial Black" panose="020B0A04020102020204" pitchFamily="34" charset="0"/>
+            </a:endParaRPr>
+          </a:p>
+        </p:txBody>
+      </p:sp>
+      <p:sp>
+        <p:nvSpPr>
+          <p:cNvPr id="3" name="Content Placeholder 2">
+            <a:extLst>
+              <a:ext uri="{FF2B5EF4-FFF2-40B4-BE49-F238E27FC236}">
+                <a16:creationId xmlns:a16="http://schemas.microsoft.com/office/drawing/2014/main" id="{DD2D8840-CC0E-49E7-93B7-354209F90F28}"/>
+              </a:ext>
+            </a:extLst>
+          </p:cNvPr>
+          <p:cNvSpPr>
+            <a:spLocks noGrp="1"/>
+          </p:cNvSpPr>
+          <p:nvPr>
+            <p:ph idx="1"/>
+          </p:nvPr>
+        </p:nvSpPr>
+        <p:spPr/>
+        <p:txBody>
+          <a:bodyPr>
+            <a:normAutofit/>
+          </a:bodyPr>
+          <a:lstStyle/>
+          <a:p>
+            <a:pPr marL="0" indent="0">
+              <a:buNone/>
+            </a:pPr>
+            <a:r>
+              <a:rPr lang="lv-LV" dirty="0"/>
+              <a:t>BufferedWriter uztur iekšējo buferi ar 8192 rakstzīmēm.Rakstīšanas operācijas laikā rakstzīmes tiek ierakstītas iekšējā buferī, nevis diskā. Kad buferis ir pilns vai rakstītājs ir aizvērts, visas buferī esošās rakstzīmes tiek ierakstītas diskā.Tādējādi saziņas reižu skaits ar disku tiek samazināts. Tāpēc rakstzīmju rakstīšana, izmantojot BufferedWriter, ir ātrāka un efektīvāka par FileWriter.</a:t>
+            </a:r>
+          </a:p>
+        </p:txBody>
+      </p:sp>
+    </p:spTree>
+    <p:extLst>
+      <p:ext uri="{BB962C8B-B14F-4D97-AF65-F5344CB8AC3E}">
+        <p14:creationId xmlns:p14="http://schemas.microsoft.com/office/powerpoint/2010/main" val="3753383533"/>
+      </p:ext>
+    </p:extLst>
+  </p:cSld>
+  <p:clrMapOvr>
+    <a:masterClrMapping/>
+  </p:clrMapOvr>
+</p:sld>
+</file>
+
+<file path=ppt/slides/slide13.xml><?xml version="1.0" encoding="utf-8"?>
+<p:sld xmlns:a="http://schemas.openxmlformats.org/drawingml/2006/main" xmlns:r="http://schemas.openxmlformats.org/officeDocument/2006/relationships" xmlns:p="http://schemas.openxmlformats.org/presentationml/2006/main">
+  <p:cSld>
+    <p:bg>
+      <p:bgPr>
+        <a:solidFill>
+          <a:schemeClr val="accent6">
+            <a:lumMod val="20000"/>
+            <a:lumOff val="80000"/>
+          </a:schemeClr>
+        </a:solidFill>
+        <a:effectLst/>
+      </p:bgPr>
+    </p:bg>
+    <p:spTree>
+      <p:nvGrpSpPr>
+        <p:cNvPr id="1" name=""/>
+        <p:cNvGrpSpPr/>
+        <p:nvPr/>
+      </p:nvGrpSpPr>
+      <p:grpSpPr>
+        <a:xfrm>
+          <a:off x="0" y="0"/>
+          <a:ext cx="0" cy="0"/>
+          <a:chOff x="0" y="0"/>
+          <a:chExt cx="0" cy="0"/>
+        </a:xfrm>
+      </p:grpSpPr>
+      <p:sp>
+        <p:nvSpPr>
+          <p:cNvPr id="2" name="Title 1">
+            <a:extLst>
+              <a:ext uri="{FF2B5EF4-FFF2-40B4-BE49-F238E27FC236}">
+                <a16:creationId xmlns:a16="http://schemas.microsoft.com/office/drawing/2014/main" id="{DC598DD3-635B-4D67-ABB3-02B91E4A79B8}"/>
+              </a:ext>
+            </a:extLst>
+          </p:cNvPr>
+          <p:cNvSpPr>
+            <a:spLocks noGrp="1"/>
+          </p:cNvSpPr>
+          <p:nvPr>
+            <p:ph type="title"/>
+          </p:nvPr>
+        </p:nvSpPr>
+        <p:spPr/>
+        <p:txBody>
+          <a:bodyPr/>
+          <a:lstStyle/>
+          <a:p>
+            <a:r>
+              <a:rPr lang="lv-LV" dirty="0">
+                <a:latin typeface="Arial Black" panose="020B0A04020102020204" pitchFamily="34" charset="0"/>
+              </a:rPr>
+              <a:t>BufferedWriter</a:t>
+            </a:r>
+            <a:endParaRPr lang="en-GB" dirty="0">
+              <a:latin typeface="Arial Black" panose="020B0A04020102020204" pitchFamily="34" charset="0"/>
+            </a:endParaRPr>
+          </a:p>
+        </p:txBody>
+      </p:sp>
+      <p:sp>
+        <p:nvSpPr>
+          <p:cNvPr id="3" name="Content Placeholder 2">
+            <a:extLst>
+              <a:ext uri="{FF2B5EF4-FFF2-40B4-BE49-F238E27FC236}">
+                <a16:creationId xmlns:a16="http://schemas.microsoft.com/office/drawing/2014/main" id="{DD2D8840-CC0E-49E7-93B7-354209F90F28}"/>
+              </a:ext>
+            </a:extLst>
+          </p:cNvPr>
+          <p:cNvSpPr>
+            <a:spLocks noGrp="1"/>
+          </p:cNvSpPr>
+          <p:nvPr>
+            <p:ph idx="1"/>
+          </p:nvPr>
+        </p:nvSpPr>
+        <p:spPr>
+          <a:xfrm>
+            <a:off x="968934" y="1405746"/>
+            <a:ext cx="10515600" cy="5452253"/>
+          </a:xfrm>
+        </p:spPr>
+        <p:txBody>
+          <a:bodyPr>
+            <a:normAutofit/>
+          </a:bodyPr>
+          <a:lstStyle/>
+          <a:p>
+            <a:pPr marL="0" indent="0">
+              <a:buNone/>
+            </a:pPr>
+            <a:r>
+              <a:rPr lang="lv-LV" b="0" i="0" dirty="0">
+                <a:solidFill>
+                  <a:srgbClr val="273239"/>
+                </a:solidFill>
+                <a:effectLst/>
+                <a:latin typeface="Nunito" pitchFamily="2" charset="0"/>
+              </a:rPr>
+              <a:t>Lai izveidotu BufferedWriter, vispirms ir jāimportē java.io.BufferedWriter pakotne. Kad pakotne ir importēta, lūk, kā varam izveidot buferēto rakstītāju.</a:t>
+            </a:r>
+            <a:endParaRPr lang="lv-LV" dirty="0">
+              <a:solidFill>
+                <a:srgbClr val="273239"/>
+              </a:solidFill>
+              <a:latin typeface="Nunito" pitchFamily="2" charset="0"/>
+            </a:endParaRPr>
+          </a:p>
+          <a:p>
+            <a:pPr marL="0" indent="0">
+              <a:buNone/>
+            </a:pPr>
+            <a:endParaRPr lang="lv-LV" dirty="0">
+              <a:solidFill>
+                <a:srgbClr val="273239"/>
+              </a:solidFill>
+              <a:latin typeface="Nunito" pitchFamily="2" charset="0"/>
+            </a:endParaRPr>
+          </a:p>
+          <a:p>
+            <a:pPr marL="0" indent="0">
+              <a:buNone/>
+            </a:pPr>
+            <a:endParaRPr lang="lv-LV" dirty="0">
+              <a:solidFill>
+                <a:srgbClr val="273239"/>
+              </a:solidFill>
+              <a:latin typeface="Nunito" pitchFamily="2" charset="0"/>
+            </a:endParaRPr>
+          </a:p>
+          <a:p>
+            <a:pPr marL="0" indent="0">
+              <a:buNone/>
+            </a:pPr>
+            <a:endParaRPr lang="lv-LV" dirty="0">
+              <a:solidFill>
+                <a:srgbClr val="273239"/>
+              </a:solidFill>
+              <a:latin typeface="Nunito" pitchFamily="2" charset="0"/>
+            </a:endParaRPr>
+          </a:p>
+          <a:p>
+            <a:pPr marL="0" indent="0">
+              <a:buNone/>
+            </a:pPr>
+            <a:r>
+              <a:rPr lang="lv-LV" dirty="0">
+                <a:solidFill>
+                  <a:srgbClr val="273239"/>
+                </a:solidFill>
+                <a:latin typeface="Nunito" pitchFamily="2" charset="0"/>
+              </a:rPr>
+              <a:t>Šeit BufferedWriter iekšējā bufera noklusējuma lielums ir 8192 rakstzīmes. Tomēr mēs varam norādīt arī iekšējā bufera lielumu.</a:t>
+            </a:r>
+          </a:p>
+          <a:p>
+            <a:pPr marL="0" indent="0">
+              <a:buNone/>
+            </a:pPr>
+            <a:endParaRPr lang="lv-LV" dirty="0">
+              <a:solidFill>
+                <a:srgbClr val="273239"/>
+              </a:solidFill>
+              <a:latin typeface="Nunito" pitchFamily="2" charset="0"/>
+            </a:endParaRPr>
+          </a:p>
+          <a:p>
+            <a:pPr marL="0" indent="0">
+              <a:buNone/>
+            </a:pPr>
+            <a:endParaRPr lang="lv-LV" dirty="0">
+              <a:solidFill>
+                <a:srgbClr val="273239"/>
+              </a:solidFill>
+              <a:latin typeface="Nunito" pitchFamily="2" charset="0"/>
+            </a:endParaRPr>
+          </a:p>
+          <a:p>
+            <a:pPr marL="0" indent="0">
+              <a:buNone/>
+            </a:pPr>
+            <a:r>
+              <a:rPr lang="lv-LV" dirty="0">
+                <a:solidFill>
+                  <a:srgbClr val="273239"/>
+                </a:solidFill>
+                <a:latin typeface="Nunito" pitchFamily="2" charset="0"/>
+              </a:rPr>
+              <a:t>Buferis palīdzēs efektīvāk ierakstīt rakstzīmes failos.</a:t>
+            </a:r>
+          </a:p>
+        </p:txBody>
+      </p:sp>
+      <p:pic>
+        <p:nvPicPr>
+          <p:cNvPr id="6" name="Picture 5">
+            <a:extLst>
+              <a:ext uri="{FF2B5EF4-FFF2-40B4-BE49-F238E27FC236}">
+                <a16:creationId xmlns:a16="http://schemas.microsoft.com/office/drawing/2014/main" id="{5A42D773-9329-4C77-BC57-0F36BE5AEC92}"/>
+              </a:ext>
+            </a:extLst>
+          </p:cNvPr>
+          <p:cNvPicPr>
+            <a:picLocks noChangeAspect="1"/>
+          </p:cNvPicPr>
+          <p:nvPr/>
+        </p:nvPicPr>
+        <p:blipFill>
+          <a:blip r:embed="rId2"/>
+          <a:stretch>
+            <a:fillRect/>
+          </a:stretch>
+        </p:blipFill>
+        <p:spPr>
+          <a:xfrm>
+            <a:off x="1109137" y="2569085"/>
+            <a:ext cx="5851500" cy="1568307"/>
+          </a:xfrm>
+          <a:prstGeom prst="rect">
+            <a:avLst/>
+          </a:prstGeom>
+        </p:spPr>
+      </p:pic>
+      <p:pic>
+        <p:nvPicPr>
+          <p:cNvPr id="8" name="Picture 7">
+            <a:extLst>
+              <a:ext uri="{FF2B5EF4-FFF2-40B4-BE49-F238E27FC236}">
+                <a16:creationId xmlns:a16="http://schemas.microsoft.com/office/drawing/2014/main" id="{A44F431F-86F0-4FAB-BDAF-122221E5E5D3}"/>
+              </a:ext>
+            </a:extLst>
+          </p:cNvPr>
+          <p:cNvPicPr>
+            <a:picLocks noChangeAspect="1"/>
+          </p:cNvPicPr>
+          <p:nvPr/>
+        </p:nvPicPr>
+        <p:blipFill>
+          <a:blip r:embed="rId3"/>
+          <a:stretch>
+            <a:fillRect/>
+          </a:stretch>
+        </p:blipFill>
+        <p:spPr>
+          <a:xfrm>
+            <a:off x="1109137" y="5078110"/>
+            <a:ext cx="7902190" cy="839171"/>
+          </a:xfrm>
+          <a:prstGeom prst="rect">
+            <a:avLst/>
+          </a:prstGeom>
+        </p:spPr>
+      </p:pic>
+    </p:spTree>
+    <p:extLst>
+      <p:ext uri="{BB962C8B-B14F-4D97-AF65-F5344CB8AC3E}">
+        <p14:creationId xmlns:p14="http://schemas.microsoft.com/office/powerpoint/2010/main" val="3740846888"/>
+      </p:ext>
+    </p:extLst>
+  </p:cSld>
+  <p:clrMapOvr>
+    <a:masterClrMapping/>
+  </p:clrMapOvr>
+</p:sld>
+</file>
+
+<file path=ppt/slides/slide14.xml><?xml version="1.0" encoding="utf-8"?>
+<p:sld xmlns:a="http://schemas.openxmlformats.org/drawingml/2006/main" xmlns:r="http://schemas.openxmlformats.org/officeDocument/2006/relationships" xmlns:p="http://schemas.openxmlformats.org/presentationml/2006/main">
+  <p:cSld>
+    <p:bg>
+      <p:bgPr>
+        <a:solidFill>
+          <a:schemeClr val="accent6">
+            <a:lumMod val="20000"/>
+            <a:lumOff val="80000"/>
+          </a:schemeClr>
+        </a:solidFill>
+        <a:effectLst/>
+      </p:bgPr>
+    </p:bg>
+    <p:spTree>
+      <p:nvGrpSpPr>
+        <p:cNvPr id="1" name=""/>
+        <p:cNvGrpSpPr/>
+        <p:nvPr/>
+      </p:nvGrpSpPr>
+      <p:grpSpPr>
+        <a:xfrm>
+          <a:off x="0" y="0"/>
+          <a:ext cx="0" cy="0"/>
+          <a:chOff x="0" y="0"/>
+          <a:chExt cx="0" cy="0"/>
+        </a:xfrm>
+      </p:grpSpPr>
+      <p:sp>
+        <p:nvSpPr>
+          <p:cNvPr id="2" name="Title 1">
+            <a:extLst>
+              <a:ext uri="{FF2B5EF4-FFF2-40B4-BE49-F238E27FC236}">
+                <a16:creationId xmlns:a16="http://schemas.microsoft.com/office/drawing/2014/main" id="{DC598DD3-635B-4D67-ABB3-02B91E4A79B8}"/>
+              </a:ext>
+            </a:extLst>
+          </p:cNvPr>
+          <p:cNvSpPr>
+            <a:spLocks noGrp="1"/>
+          </p:cNvSpPr>
+          <p:nvPr>
+            <p:ph type="title"/>
+          </p:nvPr>
+        </p:nvSpPr>
+        <p:spPr/>
+        <p:txBody>
+          <a:bodyPr/>
+          <a:lstStyle/>
+          <a:p>
+            <a:r>
+              <a:rPr lang="lv-LV" dirty="0">
+                <a:latin typeface="Arial Black" panose="020B0A04020102020204" pitchFamily="34" charset="0"/>
+              </a:rPr>
+              <a:t>BufferedWriter – write() metode</a:t>
+            </a:r>
+            <a:endParaRPr lang="en-GB" dirty="0">
+              <a:latin typeface="Arial Black" panose="020B0A04020102020204" pitchFamily="34" charset="0"/>
+            </a:endParaRPr>
+          </a:p>
+        </p:txBody>
+      </p:sp>
+      <p:pic>
+        <p:nvPicPr>
+          <p:cNvPr id="4" name="Picture 3">
+            <a:extLst>
+              <a:ext uri="{FF2B5EF4-FFF2-40B4-BE49-F238E27FC236}">
+                <a16:creationId xmlns:a16="http://schemas.microsoft.com/office/drawing/2014/main" id="{C60B40F4-2271-4C46-B713-25FD2D19F61B}"/>
+              </a:ext>
+            </a:extLst>
+          </p:cNvPr>
+          <p:cNvPicPr>
+            <a:picLocks noChangeAspect="1"/>
+          </p:cNvPicPr>
+          <p:nvPr/>
+        </p:nvPicPr>
+        <p:blipFill>
+          <a:blip r:embed="rId2"/>
+          <a:stretch>
+            <a:fillRect/>
+          </a:stretch>
+        </p:blipFill>
+        <p:spPr>
+          <a:xfrm>
+            <a:off x="1231170" y="1221242"/>
+            <a:ext cx="5344271" cy="5553850"/>
+          </a:xfrm>
+          <a:prstGeom prst="rect">
+            <a:avLst/>
+          </a:prstGeom>
+        </p:spPr>
+      </p:pic>
+      <p:pic>
+        <p:nvPicPr>
+          <p:cNvPr id="7" name="Picture 6">
+            <a:extLst>
+              <a:ext uri="{FF2B5EF4-FFF2-40B4-BE49-F238E27FC236}">
+                <a16:creationId xmlns:a16="http://schemas.microsoft.com/office/drawing/2014/main" id="{99E7B004-B065-4D65-8738-4F3D46297F86}"/>
+              </a:ext>
+            </a:extLst>
+          </p:cNvPr>
+          <p:cNvPicPr>
+            <a:picLocks noChangeAspect="1"/>
+          </p:cNvPicPr>
+          <p:nvPr/>
+        </p:nvPicPr>
+        <p:blipFill>
+          <a:blip r:embed="rId3"/>
+          <a:stretch>
+            <a:fillRect/>
+          </a:stretch>
+        </p:blipFill>
+        <p:spPr>
+          <a:xfrm>
+            <a:off x="7133636" y="3255373"/>
+            <a:ext cx="4220164" cy="552527"/>
+          </a:xfrm>
+          <a:prstGeom prst="rect">
+            <a:avLst/>
+          </a:prstGeom>
+        </p:spPr>
+      </p:pic>
+    </p:spTree>
+    <p:extLst>
+      <p:ext uri="{BB962C8B-B14F-4D97-AF65-F5344CB8AC3E}">
+        <p14:creationId xmlns:p14="http://schemas.microsoft.com/office/powerpoint/2010/main" val="3402589891"/>
+      </p:ext>
+    </p:extLst>
+  </p:cSld>
+  <p:clrMapOvr>
+    <a:masterClrMapping/>
+  </p:clrMapOvr>
+</p:sld>
+</file>
+
+<file path=ppt/slides/slide15.xml><?xml version="1.0" encoding="utf-8"?>
+<p:sld xmlns:a="http://schemas.openxmlformats.org/drawingml/2006/main" xmlns:r="http://schemas.openxmlformats.org/officeDocument/2006/relationships" xmlns:p="http://schemas.openxmlformats.org/presentationml/2006/main">
+  <p:cSld>
+    <p:bg>
+      <p:bgPr>
+        <a:solidFill>
+          <a:schemeClr val="accent6">
+            <a:lumMod val="20000"/>
+            <a:lumOff val="80000"/>
+          </a:schemeClr>
+        </a:solidFill>
+        <a:effectLst/>
+      </p:bgPr>
+    </p:bg>
+    <p:spTree>
+      <p:nvGrpSpPr>
+        <p:cNvPr id="1" name=""/>
+        <p:cNvGrpSpPr/>
+        <p:nvPr/>
+      </p:nvGrpSpPr>
+      <p:grpSpPr>
+        <a:xfrm>
+          <a:off x="0" y="0"/>
+          <a:ext cx="0" cy="0"/>
+          <a:chOff x="0" y="0"/>
+          <a:chExt cx="0" cy="0"/>
+        </a:xfrm>
+      </p:grpSpPr>
+      <p:sp>
+        <p:nvSpPr>
+          <p:cNvPr id="2" name="Title 1">
+            <a:extLst>
+              <a:ext uri="{FF2B5EF4-FFF2-40B4-BE49-F238E27FC236}">
+                <a16:creationId xmlns:a16="http://schemas.microsoft.com/office/drawing/2014/main" id="{DC598DD3-635B-4D67-ABB3-02B91E4A79B8}"/>
+              </a:ext>
+            </a:extLst>
+          </p:cNvPr>
+          <p:cNvSpPr>
+            <a:spLocks noGrp="1"/>
+          </p:cNvSpPr>
+          <p:nvPr>
+            <p:ph type="title"/>
+          </p:nvPr>
+        </p:nvSpPr>
+        <p:spPr/>
+        <p:txBody>
+          <a:bodyPr/>
+          <a:lstStyle/>
+          <a:p>
+            <a:r>
+              <a:rPr lang="lv-LV" dirty="0">
+                <a:latin typeface="Arial Black" panose="020B0A04020102020204" pitchFamily="34" charset="0"/>
+              </a:rPr>
+              <a:t>BufferedWriter – flush() metode</a:t>
+            </a:r>
+            <a:endParaRPr lang="en-GB" dirty="0">
+              <a:latin typeface="Arial Black" panose="020B0A04020102020204" pitchFamily="34" charset="0"/>
+            </a:endParaRPr>
+          </a:p>
+        </p:txBody>
+      </p:sp>
+      <p:sp>
+        <p:nvSpPr>
+          <p:cNvPr id="6" name="TextBox 5">
+            <a:extLst>
+              <a:ext uri="{FF2B5EF4-FFF2-40B4-BE49-F238E27FC236}">
+                <a16:creationId xmlns:a16="http://schemas.microsoft.com/office/drawing/2014/main" id="{B1E53182-4721-448D-9652-11EB1B46EA3A}"/>
+              </a:ext>
+            </a:extLst>
+          </p:cNvPr>
+          <p:cNvSpPr txBox="1"/>
+          <p:nvPr/>
+        </p:nvSpPr>
+        <p:spPr>
+          <a:xfrm>
+            <a:off x="949391" y="1325148"/>
+            <a:ext cx="6097554" cy="923330"/>
+          </a:xfrm>
+          <a:prstGeom prst="rect">
+            <a:avLst/>
+          </a:prstGeom>
+          <a:noFill/>
+        </p:spPr>
+        <p:txBody>
+          <a:bodyPr wrap="square">
+            <a:spAutoFit/>
+          </a:bodyPr>
+          <a:lstStyle/>
+          <a:p>
+            <a:r>
+              <a:rPr lang="en-GB" dirty="0"/>
+              <a:t>Lai </a:t>
+            </a:r>
+            <a:r>
+              <a:rPr lang="en-GB" dirty="0" err="1"/>
+              <a:t>notīrītu</a:t>
+            </a:r>
+            <a:r>
+              <a:rPr lang="en-GB" dirty="0"/>
+              <a:t> </a:t>
+            </a:r>
+            <a:r>
+              <a:rPr lang="en-GB" dirty="0" err="1"/>
+              <a:t>iekšējo</a:t>
+            </a:r>
+            <a:r>
+              <a:rPr lang="en-GB" dirty="0"/>
+              <a:t> </a:t>
+            </a:r>
+            <a:r>
+              <a:rPr lang="en-GB" dirty="0" err="1"/>
+              <a:t>buferi</a:t>
+            </a:r>
+            <a:r>
+              <a:rPr lang="en-GB" dirty="0"/>
+              <a:t>, </a:t>
+            </a:r>
+            <a:r>
+              <a:rPr lang="en-GB" dirty="0" err="1"/>
+              <a:t>varam</a:t>
+            </a:r>
+            <a:r>
+              <a:rPr lang="en-GB" dirty="0"/>
+              <a:t> </a:t>
+            </a:r>
+            <a:r>
+              <a:rPr lang="en-GB" dirty="0" err="1"/>
+              <a:t>izmantot</a:t>
+            </a:r>
+            <a:r>
+              <a:rPr lang="en-GB" dirty="0"/>
+              <a:t> </a:t>
+            </a:r>
+            <a:r>
+              <a:rPr lang="en-GB" dirty="0" err="1"/>
+              <a:t>metodi</a:t>
+            </a:r>
+            <a:r>
+              <a:rPr lang="en-GB" dirty="0"/>
+              <a:t> flush(). </a:t>
+            </a:r>
+            <a:r>
+              <a:rPr lang="en-GB" dirty="0" err="1"/>
+              <a:t>Šī</a:t>
+            </a:r>
+            <a:r>
+              <a:rPr lang="en-GB" dirty="0"/>
+              <a:t> </a:t>
+            </a:r>
+            <a:r>
+              <a:rPr lang="en-GB" dirty="0" err="1"/>
+              <a:t>metode</a:t>
+            </a:r>
+            <a:r>
+              <a:rPr lang="en-GB" dirty="0"/>
+              <a:t> </a:t>
+            </a:r>
+            <a:r>
+              <a:rPr lang="en-GB" dirty="0" err="1"/>
+              <a:t>piespiež</a:t>
+            </a:r>
+            <a:r>
+              <a:rPr lang="en-GB" dirty="0"/>
+              <a:t> </a:t>
+            </a:r>
+            <a:r>
+              <a:rPr lang="en-GB" dirty="0" err="1"/>
+              <a:t>rakstītāju</a:t>
+            </a:r>
+            <a:r>
+              <a:rPr lang="en-GB" dirty="0"/>
+              <a:t> </a:t>
+            </a:r>
+            <a:r>
+              <a:rPr lang="en-GB" dirty="0" err="1"/>
+              <a:t>ierakstīt</a:t>
+            </a:r>
+            <a:r>
+              <a:rPr lang="en-GB" dirty="0"/>
+              <a:t> </a:t>
+            </a:r>
+            <a:r>
+              <a:rPr lang="en-GB" dirty="0" err="1"/>
+              <a:t>visus</a:t>
+            </a:r>
+            <a:r>
+              <a:rPr lang="en-GB" dirty="0"/>
+              <a:t> </a:t>
+            </a:r>
+            <a:r>
+              <a:rPr lang="en-GB" dirty="0" err="1"/>
+              <a:t>buferī</a:t>
+            </a:r>
+            <a:r>
+              <a:rPr lang="en-GB" dirty="0"/>
+              <a:t> </a:t>
+            </a:r>
+            <a:r>
+              <a:rPr lang="en-GB" dirty="0" err="1"/>
+              <a:t>esošos</a:t>
+            </a:r>
+            <a:r>
+              <a:rPr lang="en-GB" dirty="0"/>
+              <a:t> </a:t>
+            </a:r>
+            <a:r>
+              <a:rPr lang="en-GB" dirty="0" err="1"/>
+              <a:t>datus</a:t>
+            </a:r>
+            <a:r>
+              <a:rPr lang="en-GB" dirty="0"/>
+              <a:t> </a:t>
+            </a:r>
+            <a:r>
+              <a:rPr lang="en-GB" dirty="0" err="1"/>
+              <a:t>mērķa</a:t>
+            </a:r>
+            <a:r>
+              <a:rPr lang="en-GB" dirty="0"/>
+              <a:t> </a:t>
+            </a:r>
+            <a:r>
+              <a:rPr lang="en-GB" dirty="0" err="1"/>
+              <a:t>failā</a:t>
+            </a:r>
+            <a:r>
+              <a:rPr lang="en-GB" dirty="0"/>
+              <a:t>.</a:t>
+            </a:r>
+          </a:p>
+        </p:txBody>
+      </p:sp>
+      <p:pic>
+        <p:nvPicPr>
+          <p:cNvPr id="8" name="Picture 7">
+            <a:extLst>
+              <a:ext uri="{FF2B5EF4-FFF2-40B4-BE49-F238E27FC236}">
+                <a16:creationId xmlns:a16="http://schemas.microsoft.com/office/drawing/2014/main" id="{D4FC5953-A0E4-43B4-A626-5DD9E7BDF9C4}"/>
+              </a:ext>
+            </a:extLst>
+          </p:cNvPr>
+          <p:cNvPicPr>
+            <a:picLocks noChangeAspect="1"/>
+          </p:cNvPicPr>
+          <p:nvPr/>
+        </p:nvPicPr>
+        <p:blipFill>
+          <a:blip r:embed="rId2"/>
+          <a:stretch>
+            <a:fillRect/>
+          </a:stretch>
+        </p:blipFill>
+        <p:spPr>
+          <a:xfrm>
+            <a:off x="2266905" y="1951885"/>
+            <a:ext cx="4572434" cy="4785106"/>
+          </a:xfrm>
+          <a:prstGeom prst="rect">
+            <a:avLst/>
+          </a:prstGeom>
+        </p:spPr>
+      </p:pic>
+      <p:pic>
+        <p:nvPicPr>
+          <p:cNvPr id="10" name="Picture 9">
+            <a:extLst>
+              <a:ext uri="{FF2B5EF4-FFF2-40B4-BE49-F238E27FC236}">
+                <a16:creationId xmlns:a16="http://schemas.microsoft.com/office/drawing/2014/main" id="{F60983E8-B9DD-4273-8790-78C5F63CD9E6}"/>
+              </a:ext>
+            </a:extLst>
+          </p:cNvPr>
+          <p:cNvPicPr>
+            <a:picLocks noChangeAspect="1"/>
+          </p:cNvPicPr>
+          <p:nvPr/>
+        </p:nvPicPr>
+        <p:blipFill>
+          <a:blip r:embed="rId3"/>
+          <a:stretch>
+            <a:fillRect/>
+          </a:stretch>
+        </p:blipFill>
+        <p:spPr>
+          <a:xfrm>
+            <a:off x="7420755" y="3504297"/>
+            <a:ext cx="4222855" cy="601171"/>
+          </a:xfrm>
+          <a:prstGeom prst="rect">
+            <a:avLst/>
+          </a:prstGeom>
+        </p:spPr>
+      </p:pic>
+    </p:spTree>
+    <p:extLst>
+      <p:ext uri="{BB962C8B-B14F-4D97-AF65-F5344CB8AC3E}">
+        <p14:creationId xmlns:p14="http://schemas.microsoft.com/office/powerpoint/2010/main" val="3372485756"/>
+      </p:ext>
+    </p:extLst>
+  </p:cSld>
+  <p:clrMapOvr>
+    <a:masterClrMapping/>
+  </p:clrMapOvr>
+</p:sld>
+</file>
+
+<file path=ppt/slides/slide16.xml><?xml version="1.0" encoding="utf-8"?>
+<p:sld xmlns:a="http://schemas.openxmlformats.org/drawingml/2006/main" xmlns:r="http://schemas.openxmlformats.org/officeDocument/2006/relationships" xmlns:p="http://schemas.openxmlformats.org/presentationml/2006/main">
+  <p:cSld>
+    <p:bg>
+      <p:bgPr>
+        <a:solidFill>
+          <a:schemeClr val="accent6">
+            <a:lumMod val="20000"/>
+            <a:lumOff val="80000"/>
+          </a:schemeClr>
+        </a:solidFill>
+        <a:effectLst/>
+      </p:bgPr>
+    </p:bg>
+    <p:spTree>
+      <p:nvGrpSpPr>
+        <p:cNvPr id="1" name=""/>
+        <p:cNvGrpSpPr/>
+        <p:nvPr/>
+      </p:nvGrpSpPr>
+      <p:grpSpPr>
+        <a:xfrm>
+          <a:off x="0" y="0"/>
+          <a:ext cx="0" cy="0"/>
+          <a:chOff x="0" y="0"/>
+          <a:chExt cx="0" cy="0"/>
+        </a:xfrm>
+      </p:grpSpPr>
+      <p:sp>
+        <p:nvSpPr>
+          <p:cNvPr id="2" name="Title 1">
+            <a:extLst>
+              <a:ext uri="{FF2B5EF4-FFF2-40B4-BE49-F238E27FC236}">
+                <a16:creationId xmlns:a16="http://schemas.microsoft.com/office/drawing/2014/main" id="{DC598DD3-635B-4D67-ABB3-02B91E4A79B8}"/>
+              </a:ext>
+            </a:extLst>
+          </p:cNvPr>
+          <p:cNvSpPr>
+            <a:spLocks noGrp="1"/>
+          </p:cNvSpPr>
+          <p:nvPr>
+            <p:ph type="title"/>
+          </p:nvPr>
+        </p:nvSpPr>
+        <p:spPr/>
+        <p:txBody>
+          <a:bodyPr/>
+          <a:lstStyle/>
+          <a:p>
+            <a:r>
               <a:rPr lang="en-GB" dirty="0">
                 <a:latin typeface="Arial Black" panose="020B0A04020102020204" pitchFamily="34" charset="0"/>
               </a:rPr>
@@ -4351,7 +5630,7 @@
 </p:sld>
 </file>
 
-<file path=ppt/slides/slide12.xml><?xml version="1.0" encoding="utf-8"?>
+<file path=ppt/slides/slide17.xml><?xml version="1.0" encoding="utf-8"?>
 <p:sld xmlns:a="http://schemas.openxmlformats.org/drawingml/2006/main" xmlns:r="http://schemas.openxmlformats.org/officeDocument/2006/relationships" xmlns:p="http://schemas.openxmlformats.org/presentationml/2006/main">
   <p:cSld>
     <p:bg>
@@ -4478,7 +5757,7 @@
 </p:sld>
 </file>
 
-<file path=ppt/slides/slide13.xml><?xml version="1.0" encoding="utf-8"?>
+<file path=ppt/slides/slide18.xml><?xml version="1.0" encoding="utf-8"?>
 <p:sld xmlns:a="http://schemas.openxmlformats.org/drawingml/2006/main" xmlns:r="http://schemas.openxmlformats.org/officeDocument/2006/relationships" xmlns:p="http://schemas.openxmlformats.org/presentationml/2006/main">
   <p:cSld>
     <p:bg>
@@ -6107,7 +7386,7 @@
 </p:sld>
 </file>
 
-<file path=ppt/slides/slide14.xml><?xml version="1.0" encoding="utf-8"?>
+<file path=ppt/slides/slide19.xml><?xml version="1.0" encoding="utf-8"?>
 <p:sld xmlns:a="http://schemas.openxmlformats.org/drawingml/2006/main" xmlns:r="http://schemas.openxmlformats.org/officeDocument/2006/relationships" xmlns:p="http://schemas.openxmlformats.org/presentationml/2006/main">
   <p:cSld>
     <p:bg>
@@ -6252,7 +7531,168 @@
 </p:sld>
 </file>
 
-<file path=ppt/slides/slide15.xml><?xml version="1.0" encoding="utf-8"?>
+<file path=ppt/slides/slide2.xml><?xml version="1.0" encoding="utf-8"?>
+<p:sld xmlns:a="http://schemas.openxmlformats.org/drawingml/2006/main" xmlns:r="http://schemas.openxmlformats.org/officeDocument/2006/relationships" xmlns:p="http://schemas.openxmlformats.org/presentationml/2006/main">
+  <p:cSld>
+    <p:bg>
+      <p:bgPr>
+        <a:solidFill>
+          <a:schemeClr val="accent6">
+            <a:lumMod val="20000"/>
+            <a:lumOff val="80000"/>
+          </a:schemeClr>
+        </a:solidFill>
+        <a:effectLst/>
+      </p:bgPr>
+    </p:bg>
+    <p:spTree>
+      <p:nvGrpSpPr>
+        <p:cNvPr id="1" name=""/>
+        <p:cNvGrpSpPr/>
+        <p:nvPr/>
+      </p:nvGrpSpPr>
+      <p:grpSpPr>
+        <a:xfrm>
+          <a:off x="0" y="0"/>
+          <a:ext cx="0" cy="0"/>
+          <a:chOff x="0" y="0"/>
+          <a:chExt cx="0" cy="0"/>
+        </a:xfrm>
+      </p:grpSpPr>
+      <p:sp>
+        <p:nvSpPr>
+          <p:cNvPr id="2" name="Title 1">
+            <a:extLst>
+              <a:ext uri="{FF2B5EF4-FFF2-40B4-BE49-F238E27FC236}">
+                <a16:creationId xmlns:a16="http://schemas.microsoft.com/office/drawing/2014/main" id="{77FD5A51-1ACD-4171-9E62-A65089091B40}"/>
+              </a:ext>
+            </a:extLst>
+          </p:cNvPr>
+          <p:cNvSpPr>
+            <a:spLocks noGrp="1"/>
+          </p:cNvSpPr>
+          <p:nvPr>
+            <p:ph type="title"/>
+          </p:nvPr>
+        </p:nvSpPr>
+        <p:spPr>
+          <a:xfrm>
+            <a:off x="838200" y="365125"/>
+            <a:ext cx="10515600" cy="483961"/>
+          </a:xfrm>
+        </p:spPr>
+        <p:txBody>
+          <a:bodyPr>
+            <a:normAutofit fontScale="90000"/>
+          </a:bodyPr>
+          <a:lstStyle/>
+          <a:p>
+            <a:pPr algn="ctr"/>
+            <a:r>
+              <a:rPr lang="lv-LV" dirty="0">
+                <a:latin typeface="Arial Black" panose="020B0A04020102020204" pitchFamily="34" charset="0"/>
+              </a:rPr>
+              <a:t>Kas ir teksta datnes?</a:t>
+            </a:r>
+            <a:endParaRPr lang="en-GB" dirty="0">
+              <a:latin typeface="Arial Black" panose="020B0A04020102020204" pitchFamily="34" charset="0"/>
+            </a:endParaRPr>
+          </a:p>
+        </p:txBody>
+      </p:sp>
+      <p:sp>
+        <p:nvSpPr>
+          <p:cNvPr id="3" name="Content Placeholder 2">
+            <a:extLst>
+              <a:ext uri="{FF2B5EF4-FFF2-40B4-BE49-F238E27FC236}">
+                <a16:creationId xmlns:a16="http://schemas.microsoft.com/office/drawing/2014/main" id="{BCD45001-2C21-45FC-9796-119A3DDD95F5}"/>
+              </a:ext>
+            </a:extLst>
+          </p:cNvPr>
+          <p:cNvSpPr>
+            <a:spLocks noGrp="1"/>
+          </p:cNvSpPr>
+          <p:nvPr>
+            <p:ph idx="1"/>
+          </p:nvPr>
+        </p:nvSpPr>
+        <p:spPr>
+          <a:xfrm>
+            <a:off x="660918" y="1079175"/>
+            <a:ext cx="11095653" cy="4351338"/>
+          </a:xfrm>
+        </p:spPr>
+        <p:txBody>
+          <a:bodyPr/>
+          <a:lstStyle/>
+          <a:p>
+            <a:pPr marL="0" indent="0">
+              <a:buNone/>
+            </a:pPr>
+            <a:r>
+              <a:rPr lang="lv-LV" dirty="0"/>
+              <a:t>Programmētāji Java valodā izmanto teksta datnes, strādājot ar Java lietojumprogrammām, kurām nepieciešama failu lasīšana un rakstīšana. Teksta datnes ir universāli veidi, kā glabāt informāciju, kodu vai citus datus.</a:t>
+            </a:r>
+            <a:br>
+              <a:rPr lang="lv-LV" dirty="0"/>
+            </a:br>
+            <a:r>
+              <a:rPr lang="lv-LV" dirty="0"/>
+              <a:t>Viens piemērs būtu, ka tiek saglabāti picas pasūtījums, ko lietotājs ir pasūtījis.</a:t>
+            </a:r>
+          </a:p>
+          <a:p>
+            <a:pPr marL="0" indent="0">
+              <a:buNone/>
+            </a:pPr>
+            <a:endParaRPr lang="en-GB" dirty="0"/>
+          </a:p>
+        </p:txBody>
+      </p:sp>
+      <p:pic>
+        <p:nvPicPr>
+          <p:cNvPr id="7" name="Picture 6">
+            <a:extLst>
+              <a:ext uri="{FF2B5EF4-FFF2-40B4-BE49-F238E27FC236}">
+                <a16:creationId xmlns:a16="http://schemas.microsoft.com/office/drawing/2014/main" id="{1A614D5F-2379-4A1A-9543-D2524BE2BAD0}"/>
+              </a:ext>
+            </a:extLst>
+          </p:cNvPr>
+          <p:cNvPicPr>
+            <a:picLocks noChangeAspect="1"/>
+          </p:cNvPicPr>
+          <p:nvPr/>
+        </p:nvPicPr>
+        <p:blipFill>
+          <a:blip r:embed="rId2"/>
+          <a:stretch>
+            <a:fillRect/>
+          </a:stretch>
+        </p:blipFill>
+        <p:spPr>
+          <a:xfrm>
+            <a:off x="3892025" y="3014004"/>
+            <a:ext cx="4277322" cy="3562847"/>
+          </a:xfrm>
+          <a:prstGeom prst="rect">
+            <a:avLst/>
+          </a:prstGeom>
+        </p:spPr>
+      </p:pic>
+    </p:spTree>
+    <p:extLst>
+      <p:ext uri="{BB962C8B-B14F-4D97-AF65-F5344CB8AC3E}">
+        <p14:creationId xmlns:p14="http://schemas.microsoft.com/office/powerpoint/2010/main" val="743291785"/>
+      </p:ext>
+    </p:extLst>
+  </p:cSld>
+  <p:clrMapOvr>
+    <a:masterClrMapping/>
+  </p:clrMapOvr>
+</p:sld>
+</file>
+
+<file path=ppt/slides/slide20.xml><?xml version="1.0" encoding="utf-8"?>
 <p:sld xmlns:a="http://schemas.openxmlformats.org/drawingml/2006/main" xmlns:r="http://schemas.openxmlformats.org/officeDocument/2006/relationships" xmlns:p="http://schemas.openxmlformats.org/presentationml/2006/main">
   <p:cSld>
     <p:bg>
@@ -6744,7 +8184,7 @@
 </p:sld>
 </file>
 
-<file path=ppt/slides/slide16.xml><?xml version="1.0" encoding="utf-8"?>
+<file path=ppt/slides/slide21.xml><?xml version="1.0" encoding="utf-8"?>
 <p:sld xmlns:a="http://schemas.openxmlformats.org/drawingml/2006/main" xmlns:r="http://schemas.openxmlformats.org/officeDocument/2006/relationships" xmlns:p="http://schemas.openxmlformats.org/presentationml/2006/main">
   <p:cSld>
     <p:bg>
@@ -6858,183 +8298,7 @@
 </p:sld>
 </file>
 
-<file path=ppt/slides/slide17.xml><?xml version="1.0" encoding="utf-8"?>
-<p:sld xmlns:a="http://schemas.openxmlformats.org/drawingml/2006/main" xmlns:r="http://schemas.openxmlformats.org/officeDocument/2006/relationships" xmlns:p="http://schemas.openxmlformats.org/presentationml/2006/main">
-  <p:cSld>
-    <p:bg>
-      <p:bgPr>
-        <a:solidFill>
-          <a:schemeClr val="accent6">
-            <a:lumMod val="20000"/>
-            <a:lumOff val="80000"/>
-          </a:schemeClr>
-        </a:solidFill>
-        <a:effectLst/>
-      </p:bgPr>
-    </p:bg>
-    <p:spTree>
-      <p:nvGrpSpPr>
-        <p:cNvPr id="1" name=""/>
-        <p:cNvGrpSpPr/>
-        <p:nvPr/>
-      </p:nvGrpSpPr>
-      <p:grpSpPr>
-        <a:xfrm>
-          <a:off x="0" y="0"/>
-          <a:ext cx="0" cy="0"/>
-          <a:chOff x="0" y="0"/>
-          <a:chExt cx="0" cy="0"/>
-        </a:xfrm>
-      </p:grpSpPr>
-      <p:sp>
-        <p:nvSpPr>
-          <p:cNvPr id="2" name="Title 1">
-            <a:extLst>
-              <a:ext uri="{FF2B5EF4-FFF2-40B4-BE49-F238E27FC236}">
-                <a16:creationId xmlns:a16="http://schemas.microsoft.com/office/drawing/2014/main" id="{DC598DD3-635B-4D67-ABB3-02B91E4A79B8}"/>
-              </a:ext>
-            </a:extLst>
-          </p:cNvPr>
-          <p:cNvSpPr>
-            <a:spLocks noGrp="1"/>
-          </p:cNvSpPr>
-          <p:nvPr>
-            <p:ph type="title"/>
-          </p:nvPr>
-        </p:nvSpPr>
-        <p:spPr/>
-        <p:txBody>
-          <a:bodyPr/>
-          <a:lstStyle/>
-          <a:p>
-            <a:r>
-              <a:rPr lang="lv-LV" dirty="0">
-                <a:latin typeface="Arial Black" panose="020B0A04020102020204" pitchFamily="34" charset="0"/>
-              </a:rPr>
-              <a:t>BufferedReader</a:t>
-            </a:r>
-            <a:endParaRPr lang="en-GB" dirty="0">
-              <a:latin typeface="Arial Black" panose="020B0A04020102020204" pitchFamily="34" charset="0"/>
-            </a:endParaRPr>
-          </a:p>
-        </p:txBody>
-      </p:sp>
-      <p:sp>
-        <p:nvSpPr>
-          <p:cNvPr id="3" name="Content Placeholder 2">
-            <a:extLst>
-              <a:ext uri="{FF2B5EF4-FFF2-40B4-BE49-F238E27FC236}">
-                <a16:creationId xmlns:a16="http://schemas.microsoft.com/office/drawing/2014/main" id="{DD2D8840-CC0E-49E7-93B7-354209F90F28}"/>
-              </a:ext>
-            </a:extLst>
-          </p:cNvPr>
-          <p:cNvSpPr>
-            <a:spLocks noGrp="1"/>
-          </p:cNvSpPr>
-          <p:nvPr>
-            <p:ph idx="1"/>
-          </p:nvPr>
-        </p:nvSpPr>
-        <p:spPr/>
-        <p:txBody>
-          <a:bodyPr>
-            <a:normAutofit/>
-          </a:bodyPr>
-          <a:lstStyle/>
-          <a:p>
-            <a:pPr marL="0" indent="0">
-              <a:buNone/>
-            </a:pPr>
-            <a:r>
-              <a:rPr lang="lv-LV" b="0" i="0" dirty="0">
-                <a:solidFill>
-                  <a:srgbClr val="273239"/>
-                </a:solidFill>
-                <a:effectLst/>
-                <a:latin typeface="Nunito" pitchFamily="2" charset="0"/>
-              </a:rPr>
-              <a:t>Lai izveidotu BufferedReader, vispirms ir jāimportē java.io.BufferedReader pakotne. Kad pakotne ir importēta, lūk, kā mēs varam izveidot lasītāju.</a:t>
-            </a:r>
-          </a:p>
-          <a:p>
-            <a:pPr marL="0" indent="0">
-              <a:buNone/>
-            </a:pPr>
-            <a:endParaRPr lang="lv-LV" dirty="0">
-              <a:solidFill>
-                <a:srgbClr val="273239"/>
-              </a:solidFill>
-              <a:latin typeface="Nunito" pitchFamily="2" charset="0"/>
-            </a:endParaRPr>
-          </a:p>
-          <a:p>
-            <a:pPr marL="0" indent="0">
-              <a:buNone/>
-            </a:pPr>
-            <a:endParaRPr lang="lv-LV" dirty="0">
-              <a:solidFill>
-                <a:srgbClr val="273239"/>
-              </a:solidFill>
-              <a:latin typeface="Nunito" pitchFamily="2" charset="0"/>
-            </a:endParaRPr>
-          </a:p>
-          <a:p>
-            <a:pPr marL="0" indent="0">
-              <a:buNone/>
-            </a:pPr>
-            <a:endParaRPr lang="lv-LV" dirty="0">
-              <a:solidFill>
-                <a:srgbClr val="273239"/>
-              </a:solidFill>
-              <a:latin typeface="Nunito" pitchFamily="2" charset="0"/>
-            </a:endParaRPr>
-          </a:p>
-        </p:txBody>
-      </p:sp>
-      <p:pic>
-        <p:nvPicPr>
-          <p:cNvPr id="7" name="Picture 6">
-            <a:extLst>
-              <a:ext uri="{FF2B5EF4-FFF2-40B4-BE49-F238E27FC236}">
-                <a16:creationId xmlns:a16="http://schemas.microsoft.com/office/drawing/2014/main" id="{CBCD785D-5B37-4BE1-A39A-2A0CA1644EED}"/>
-              </a:ext>
-            </a:extLst>
-          </p:cNvPr>
-          <p:cNvPicPr>
-            <a:picLocks noChangeAspect="1"/>
-          </p:cNvPicPr>
-          <p:nvPr/>
-        </p:nvPicPr>
-        <p:blipFill>
-          <a:blip r:embed="rId2"/>
-          <a:stretch>
-            <a:fillRect/>
-          </a:stretch>
-        </p:blipFill>
-        <p:spPr>
-          <a:xfrm>
-            <a:off x="3003006" y="3528832"/>
-            <a:ext cx="6466918" cy="1873593"/>
-          </a:xfrm>
-          <a:prstGeom prst="rect">
-            <a:avLst/>
-          </a:prstGeom>
-        </p:spPr>
-      </p:pic>
-    </p:spTree>
-    <p:extLst>
-      <p:ext uri="{BB962C8B-B14F-4D97-AF65-F5344CB8AC3E}">
-        <p14:creationId xmlns:p14="http://schemas.microsoft.com/office/powerpoint/2010/main" val="4280623153"/>
-      </p:ext>
-    </p:extLst>
-  </p:cSld>
-  <p:clrMapOvr>
-    <a:masterClrMapping/>
-  </p:clrMapOvr>
-</p:sld>
-</file>
-
-<file path=ppt/slides/slide18.xml><?xml version="1.0" encoding="utf-8"?>
+<file path=ppt/slides/slide22.xml><?xml version="1.0" encoding="utf-8"?>
 <p:sld xmlns:a="http://schemas.openxmlformats.org/drawingml/2006/main" xmlns:r="http://schemas.openxmlformats.org/officeDocument/2006/relationships" xmlns:p="http://schemas.openxmlformats.org/presentationml/2006/main">
   <p:cSld>
     <p:bg>
@@ -7295,7 +8559,7 @@
 </p:sld>
 </file>
 
-<file path=ppt/slides/slide19.xml><?xml version="1.0" encoding="utf-8"?>
+<file path=ppt/slides/slide23.xml><?xml version="1.0" encoding="utf-8"?>
 <p:sld xmlns:a="http://schemas.openxmlformats.org/drawingml/2006/main" xmlns:r="http://schemas.openxmlformats.org/officeDocument/2006/relationships" xmlns:p="http://schemas.openxmlformats.org/presentationml/2006/main">
   <p:cSld>
     <p:bg>
@@ -7429,168 +8693,7 @@
 </p:sld>
 </file>
 
-<file path=ppt/slides/slide2.xml><?xml version="1.0" encoding="utf-8"?>
-<p:sld xmlns:a="http://schemas.openxmlformats.org/drawingml/2006/main" xmlns:r="http://schemas.openxmlformats.org/officeDocument/2006/relationships" xmlns:p="http://schemas.openxmlformats.org/presentationml/2006/main">
-  <p:cSld>
-    <p:bg>
-      <p:bgPr>
-        <a:solidFill>
-          <a:schemeClr val="accent6">
-            <a:lumMod val="20000"/>
-            <a:lumOff val="80000"/>
-          </a:schemeClr>
-        </a:solidFill>
-        <a:effectLst/>
-      </p:bgPr>
-    </p:bg>
-    <p:spTree>
-      <p:nvGrpSpPr>
-        <p:cNvPr id="1" name=""/>
-        <p:cNvGrpSpPr/>
-        <p:nvPr/>
-      </p:nvGrpSpPr>
-      <p:grpSpPr>
-        <a:xfrm>
-          <a:off x="0" y="0"/>
-          <a:ext cx="0" cy="0"/>
-          <a:chOff x="0" y="0"/>
-          <a:chExt cx="0" cy="0"/>
-        </a:xfrm>
-      </p:grpSpPr>
-      <p:sp>
-        <p:nvSpPr>
-          <p:cNvPr id="2" name="Title 1">
-            <a:extLst>
-              <a:ext uri="{FF2B5EF4-FFF2-40B4-BE49-F238E27FC236}">
-                <a16:creationId xmlns:a16="http://schemas.microsoft.com/office/drawing/2014/main" id="{77FD5A51-1ACD-4171-9E62-A65089091B40}"/>
-              </a:ext>
-            </a:extLst>
-          </p:cNvPr>
-          <p:cNvSpPr>
-            <a:spLocks noGrp="1"/>
-          </p:cNvSpPr>
-          <p:nvPr>
-            <p:ph type="title"/>
-          </p:nvPr>
-        </p:nvSpPr>
-        <p:spPr>
-          <a:xfrm>
-            <a:off x="838200" y="365125"/>
-            <a:ext cx="10515600" cy="483961"/>
-          </a:xfrm>
-        </p:spPr>
-        <p:txBody>
-          <a:bodyPr>
-            <a:normAutofit fontScale="90000"/>
-          </a:bodyPr>
-          <a:lstStyle/>
-          <a:p>
-            <a:pPr algn="ctr"/>
-            <a:r>
-              <a:rPr lang="lv-LV" dirty="0">
-                <a:latin typeface="Arial Black" panose="020B0A04020102020204" pitchFamily="34" charset="0"/>
-              </a:rPr>
-              <a:t>Kas ir teksta datnes?</a:t>
-            </a:r>
-            <a:endParaRPr lang="en-GB" dirty="0">
-              <a:latin typeface="Arial Black" panose="020B0A04020102020204" pitchFamily="34" charset="0"/>
-            </a:endParaRPr>
-          </a:p>
-        </p:txBody>
-      </p:sp>
-      <p:sp>
-        <p:nvSpPr>
-          <p:cNvPr id="3" name="Content Placeholder 2">
-            <a:extLst>
-              <a:ext uri="{FF2B5EF4-FFF2-40B4-BE49-F238E27FC236}">
-                <a16:creationId xmlns:a16="http://schemas.microsoft.com/office/drawing/2014/main" id="{BCD45001-2C21-45FC-9796-119A3DDD95F5}"/>
-              </a:ext>
-            </a:extLst>
-          </p:cNvPr>
-          <p:cNvSpPr>
-            <a:spLocks noGrp="1"/>
-          </p:cNvSpPr>
-          <p:nvPr>
-            <p:ph idx="1"/>
-          </p:nvPr>
-        </p:nvSpPr>
-        <p:spPr>
-          <a:xfrm>
-            <a:off x="660918" y="1079175"/>
-            <a:ext cx="11095653" cy="4351338"/>
-          </a:xfrm>
-        </p:spPr>
-        <p:txBody>
-          <a:bodyPr/>
-          <a:lstStyle/>
-          <a:p>
-            <a:pPr marL="0" indent="0">
-              <a:buNone/>
-            </a:pPr>
-            <a:r>
-              <a:rPr lang="lv-LV" dirty="0"/>
-              <a:t>Programmētāji Java valodā izmanto teksta datnes, strādājot ar Java lietojumprogrammām, kurām nepieciešama failu lasīšana un rakstīšana. Teksta datnes ir universāli veidi, kā glabāt informāciju, kodu vai citus datus.</a:t>
-            </a:r>
-            <a:br>
-              <a:rPr lang="lv-LV" dirty="0"/>
-            </a:br>
-            <a:r>
-              <a:rPr lang="lv-LV" dirty="0"/>
-              <a:t>Viens piemērs būtu, ka tiek saglabāti picas pasūtījums, ko lietotājs ir pasūtījis.</a:t>
-            </a:r>
-          </a:p>
-          <a:p>
-            <a:pPr marL="0" indent="0">
-              <a:buNone/>
-            </a:pPr>
-            <a:endParaRPr lang="en-GB" dirty="0"/>
-          </a:p>
-        </p:txBody>
-      </p:sp>
-      <p:pic>
-        <p:nvPicPr>
-          <p:cNvPr id="7" name="Picture 6">
-            <a:extLst>
-              <a:ext uri="{FF2B5EF4-FFF2-40B4-BE49-F238E27FC236}">
-                <a16:creationId xmlns:a16="http://schemas.microsoft.com/office/drawing/2014/main" id="{1A614D5F-2379-4A1A-9543-D2524BE2BAD0}"/>
-              </a:ext>
-            </a:extLst>
-          </p:cNvPr>
-          <p:cNvPicPr>
-            <a:picLocks noChangeAspect="1"/>
-          </p:cNvPicPr>
-          <p:nvPr/>
-        </p:nvPicPr>
-        <p:blipFill>
-          <a:blip r:embed="rId2"/>
-          <a:stretch>
-            <a:fillRect/>
-          </a:stretch>
-        </p:blipFill>
-        <p:spPr>
-          <a:xfrm>
-            <a:off x="3892025" y="3014004"/>
-            <a:ext cx="4277322" cy="3562847"/>
-          </a:xfrm>
-          <a:prstGeom prst="rect">
-            <a:avLst/>
-          </a:prstGeom>
-        </p:spPr>
-      </p:pic>
-    </p:spTree>
-    <p:extLst>
-      <p:ext uri="{BB962C8B-B14F-4D97-AF65-F5344CB8AC3E}">
-        <p14:creationId xmlns:p14="http://schemas.microsoft.com/office/powerpoint/2010/main" val="743291785"/>
-      </p:ext>
-    </p:extLst>
-  </p:cSld>
-  <p:clrMapOvr>
-    <a:masterClrMapping/>
-  </p:clrMapOvr>
-</p:sld>
-</file>
-
-<file path=ppt/slides/slide20.xml><?xml version="1.0" encoding="utf-8"?>
+<file path=ppt/slides/slide24.xml><?xml version="1.0" encoding="utf-8"?>
 <p:sld xmlns:a="http://schemas.openxmlformats.org/drawingml/2006/main" xmlns:r="http://schemas.openxmlformats.org/officeDocument/2006/relationships" xmlns:p="http://schemas.openxmlformats.org/presentationml/2006/main">
   <p:cSld>
     <p:bg>

</xml_diff>

<commit_message>
Pievienoti 3 uzdevumi un atsauces
</commit_message>
<xml_diff>
--- a/MacibuMaterials.pptx
+++ b/MacibuMaterials.pptx
@@ -38,6 +38,13 @@
     <p:sldId id="274" r:id="rId32"/>
     <p:sldId id="275" r:id="rId33"/>
     <p:sldId id="276" r:id="rId34"/>
+    <p:sldId id="292" r:id="rId35"/>
+    <p:sldId id="295" r:id="rId36"/>
+    <p:sldId id="296" r:id="rId37"/>
+    <p:sldId id="293" r:id="rId38"/>
+    <p:sldId id="294" r:id="rId39"/>
+    <p:sldId id="297" r:id="rId40"/>
+    <p:sldId id="298" r:id="rId41"/>
   </p:sldIdLst>
   <p:sldSz cx="12192000" cy="6858000"/>
   <p:notesSz cx="6858000" cy="9144000"/>
@@ -11056,6 +11063,1283 @@
 </p:sld>
 </file>
 
+<file path=ppt/slides/slide34.xml><?xml version="1.0" encoding="utf-8"?>
+<p:sld xmlns:a="http://schemas.openxmlformats.org/drawingml/2006/main" xmlns:r="http://schemas.openxmlformats.org/officeDocument/2006/relationships" xmlns:p="http://schemas.openxmlformats.org/presentationml/2006/main">
+  <p:cSld>
+    <p:bg>
+      <p:bgPr>
+        <a:solidFill>
+          <a:schemeClr val="accent6">
+            <a:lumMod val="20000"/>
+            <a:lumOff val="80000"/>
+          </a:schemeClr>
+        </a:solidFill>
+        <a:effectLst/>
+      </p:bgPr>
+    </p:bg>
+    <p:spTree>
+      <p:nvGrpSpPr>
+        <p:cNvPr id="1" name=""/>
+        <p:cNvGrpSpPr/>
+        <p:nvPr/>
+      </p:nvGrpSpPr>
+      <p:grpSpPr>
+        <a:xfrm>
+          <a:off x="0" y="0"/>
+          <a:ext cx="0" cy="0"/>
+          <a:chOff x="0" y="0"/>
+          <a:chExt cx="0" cy="0"/>
+        </a:xfrm>
+      </p:grpSpPr>
+      <p:sp>
+        <p:nvSpPr>
+          <p:cNvPr id="2" name="Title 1">
+            <a:extLst>
+              <a:ext uri="{FF2B5EF4-FFF2-40B4-BE49-F238E27FC236}">
+                <a16:creationId xmlns:a16="http://schemas.microsoft.com/office/drawing/2014/main" id="{DC598DD3-635B-4D67-ABB3-02B91E4A79B8}"/>
+              </a:ext>
+            </a:extLst>
+          </p:cNvPr>
+          <p:cNvSpPr>
+            <a:spLocks noGrp="1"/>
+          </p:cNvSpPr>
+          <p:nvPr>
+            <p:ph type="title"/>
+          </p:nvPr>
+        </p:nvSpPr>
+        <p:spPr/>
+        <p:txBody>
+          <a:bodyPr/>
+          <a:lstStyle/>
+          <a:p>
+            <a:r>
+              <a:rPr lang="lv-LV" dirty="0">
+                <a:latin typeface="Arial Black" panose="020B0A04020102020204" pitchFamily="34" charset="0"/>
+              </a:rPr>
+              <a:t>1. uzdevums</a:t>
+            </a:r>
+            <a:endParaRPr lang="en-GB" dirty="0">
+              <a:latin typeface="Arial Black" panose="020B0A04020102020204" pitchFamily="34" charset="0"/>
+            </a:endParaRPr>
+          </a:p>
+        </p:txBody>
+      </p:sp>
+      <p:sp>
+        <p:nvSpPr>
+          <p:cNvPr id="3" name="Content Placeholder 2">
+            <a:extLst>
+              <a:ext uri="{FF2B5EF4-FFF2-40B4-BE49-F238E27FC236}">
+                <a16:creationId xmlns:a16="http://schemas.microsoft.com/office/drawing/2014/main" id="{DD2D8840-CC0E-49E7-93B7-354209F90F28}"/>
+              </a:ext>
+            </a:extLst>
+          </p:cNvPr>
+          <p:cNvSpPr>
+            <a:spLocks noGrp="1"/>
+          </p:cNvSpPr>
+          <p:nvPr>
+            <p:ph idx="1"/>
+          </p:nvPr>
+        </p:nvSpPr>
+        <p:spPr/>
+        <p:txBody>
+          <a:bodyPr>
+            <a:normAutofit/>
+          </a:bodyPr>
+          <a:lstStyle/>
+          <a:p>
+            <a:pPr marL="0" indent="0">
+              <a:buNone/>
+            </a:pPr>
+            <a:r>
+              <a:rPr lang="en-GB" dirty="0" err="1"/>
+              <a:t>Izveidojiet</a:t>
+            </a:r>
+            <a:r>
+              <a:rPr lang="en-GB" dirty="0"/>
+              <a:t> </a:t>
+            </a:r>
+            <a:r>
+              <a:rPr lang="en-GB" dirty="0" err="1"/>
+              <a:t>programmu</a:t>
+            </a:r>
+            <a:r>
+              <a:rPr lang="en-GB" dirty="0"/>
+              <a:t>, kas </a:t>
+            </a:r>
+            <a:r>
+              <a:rPr lang="en-GB" dirty="0" err="1"/>
+              <a:t>izveido</a:t>
+            </a:r>
+            <a:r>
+              <a:rPr lang="en-GB" dirty="0"/>
+              <a:t> </a:t>
+            </a:r>
+            <a:r>
+              <a:rPr lang="en-GB" dirty="0" err="1"/>
+              <a:t>jaunu</a:t>
+            </a:r>
+            <a:r>
+              <a:rPr lang="en-GB" dirty="0"/>
+              <a:t> </a:t>
+            </a:r>
+            <a:r>
+              <a:rPr lang="en-GB" dirty="0" err="1"/>
+              <a:t>teksta</a:t>
+            </a:r>
+            <a:r>
+              <a:rPr lang="en-GB" dirty="0"/>
+              <a:t> </a:t>
+            </a:r>
+            <a:r>
+              <a:rPr lang="en-GB" dirty="0" err="1"/>
+              <a:t>failu</a:t>
+            </a:r>
+            <a:r>
+              <a:rPr lang="en-GB" dirty="0"/>
+              <a:t> </a:t>
+            </a:r>
+            <a:r>
+              <a:rPr lang="en-GB" dirty="0" err="1"/>
+              <a:t>ar</a:t>
+            </a:r>
+            <a:r>
+              <a:rPr lang="en-GB" dirty="0"/>
+              <a:t> </a:t>
+            </a:r>
+            <a:r>
+              <a:rPr lang="en-GB" dirty="0" err="1"/>
+              <a:t>nosaukumu</a:t>
+            </a:r>
+            <a:r>
+              <a:rPr lang="en-GB" dirty="0"/>
+              <a:t> </a:t>
+            </a:r>
+            <a:r>
+              <a:rPr lang="lv-LV" dirty="0"/>
+              <a:t>«Velet.txt» </a:t>
+            </a:r>
+            <a:r>
+              <a:rPr lang="en-GB" dirty="0"/>
+              <a:t>un </a:t>
+            </a:r>
+            <a:r>
+              <a:rPr lang="en-GB" dirty="0" err="1"/>
+              <a:t>ieraksta</a:t>
+            </a:r>
+            <a:r>
+              <a:rPr lang="en-GB" dirty="0"/>
+              <a:t> </a:t>
+            </a:r>
+            <a:r>
+              <a:rPr lang="en-GB" dirty="0" err="1"/>
+              <a:t>tajā</a:t>
+            </a:r>
+            <a:r>
+              <a:rPr lang="en-GB" dirty="0"/>
+              <a:t> </a:t>
+            </a:r>
+            <a:r>
+              <a:rPr lang="en-GB" dirty="0" err="1"/>
+              <a:t>tekstu</a:t>
+            </a:r>
+            <a:r>
+              <a:rPr lang="en-GB" dirty="0"/>
+              <a:t> «</a:t>
+            </a:r>
+            <a:r>
+              <a:rPr lang="lv-LV" dirty="0"/>
+              <a:t>Ejiet vēlēt, tagad!». Arī aizvērt to failu.</a:t>
+            </a:r>
+          </a:p>
+        </p:txBody>
+      </p:sp>
+    </p:spTree>
+    <p:extLst>
+      <p:ext uri="{BB962C8B-B14F-4D97-AF65-F5344CB8AC3E}">
+        <p14:creationId xmlns:p14="http://schemas.microsoft.com/office/powerpoint/2010/main" val="3483418222"/>
+      </p:ext>
+    </p:extLst>
+  </p:cSld>
+  <p:clrMapOvr>
+    <a:masterClrMapping/>
+  </p:clrMapOvr>
+</p:sld>
+</file>
+
+<file path=ppt/slides/slide35.xml><?xml version="1.0" encoding="utf-8"?>
+<p:sld xmlns:a="http://schemas.openxmlformats.org/drawingml/2006/main" xmlns:r="http://schemas.openxmlformats.org/officeDocument/2006/relationships" xmlns:p="http://schemas.openxmlformats.org/presentationml/2006/main">
+  <p:cSld>
+    <p:bg>
+      <p:bgPr>
+        <a:solidFill>
+          <a:schemeClr val="accent6">
+            <a:lumMod val="20000"/>
+            <a:lumOff val="80000"/>
+          </a:schemeClr>
+        </a:solidFill>
+        <a:effectLst/>
+      </p:bgPr>
+    </p:bg>
+    <p:spTree>
+      <p:nvGrpSpPr>
+        <p:cNvPr id="1" name=""/>
+        <p:cNvGrpSpPr/>
+        <p:nvPr/>
+      </p:nvGrpSpPr>
+      <p:grpSpPr>
+        <a:xfrm>
+          <a:off x="0" y="0"/>
+          <a:ext cx="0" cy="0"/>
+          <a:chOff x="0" y="0"/>
+          <a:chExt cx="0" cy="0"/>
+        </a:xfrm>
+      </p:grpSpPr>
+      <p:sp>
+        <p:nvSpPr>
+          <p:cNvPr id="2" name="Title 1">
+            <a:extLst>
+              <a:ext uri="{FF2B5EF4-FFF2-40B4-BE49-F238E27FC236}">
+                <a16:creationId xmlns:a16="http://schemas.microsoft.com/office/drawing/2014/main" id="{DC598DD3-635B-4D67-ABB3-02B91E4A79B8}"/>
+              </a:ext>
+            </a:extLst>
+          </p:cNvPr>
+          <p:cNvSpPr>
+            <a:spLocks noGrp="1"/>
+          </p:cNvSpPr>
+          <p:nvPr>
+            <p:ph type="title"/>
+          </p:nvPr>
+        </p:nvSpPr>
+        <p:spPr/>
+        <p:txBody>
+          <a:bodyPr/>
+          <a:lstStyle/>
+          <a:p>
+            <a:r>
+              <a:rPr lang="lv-LV" dirty="0">
+                <a:latin typeface="Arial Black" panose="020B0A04020102020204" pitchFamily="34" charset="0"/>
+              </a:rPr>
+              <a:t>1. Uzdevumam atbilde</a:t>
+            </a:r>
+            <a:endParaRPr lang="en-GB" dirty="0">
+              <a:latin typeface="Arial Black" panose="020B0A04020102020204" pitchFamily="34" charset="0"/>
+            </a:endParaRPr>
+          </a:p>
+        </p:txBody>
+      </p:sp>
+      <p:pic>
+        <p:nvPicPr>
+          <p:cNvPr id="11" name="Picture 10">
+            <a:extLst>
+              <a:ext uri="{FF2B5EF4-FFF2-40B4-BE49-F238E27FC236}">
+                <a16:creationId xmlns:a16="http://schemas.microsoft.com/office/drawing/2014/main" id="{5827B77C-682A-49A3-BC3E-1DEBA9D5FD83}"/>
+              </a:ext>
+            </a:extLst>
+          </p:cNvPr>
+          <p:cNvPicPr>
+            <a:picLocks noChangeAspect="1"/>
+          </p:cNvPicPr>
+          <p:nvPr/>
+        </p:nvPicPr>
+        <p:blipFill>
+          <a:blip r:embed="rId2"/>
+          <a:stretch>
+            <a:fillRect/>
+          </a:stretch>
+        </p:blipFill>
+        <p:spPr>
+          <a:xfrm>
+            <a:off x="8191059" y="2433888"/>
+            <a:ext cx="3162741" cy="590632"/>
+          </a:xfrm>
+          <a:prstGeom prst="rect">
+            <a:avLst/>
+          </a:prstGeom>
+        </p:spPr>
+      </p:pic>
+      <p:pic>
+        <p:nvPicPr>
+          <p:cNvPr id="13" name="Picture 12">
+            <a:extLst>
+              <a:ext uri="{FF2B5EF4-FFF2-40B4-BE49-F238E27FC236}">
+                <a16:creationId xmlns:a16="http://schemas.microsoft.com/office/drawing/2014/main" id="{477FE758-CEB7-4AA3-BB97-52C9E6DF287B}"/>
+              </a:ext>
+            </a:extLst>
+          </p:cNvPr>
+          <p:cNvPicPr>
+            <a:picLocks noChangeAspect="1"/>
+          </p:cNvPicPr>
+          <p:nvPr/>
+        </p:nvPicPr>
+        <p:blipFill>
+          <a:blip r:embed="rId3"/>
+          <a:stretch>
+            <a:fillRect/>
+          </a:stretch>
+        </p:blipFill>
+        <p:spPr>
+          <a:xfrm>
+            <a:off x="8332936" y="4441926"/>
+            <a:ext cx="2505425" cy="400106"/>
+          </a:xfrm>
+          <a:prstGeom prst="rect">
+            <a:avLst/>
+          </a:prstGeom>
+        </p:spPr>
+      </p:pic>
+      <p:sp>
+        <p:nvSpPr>
+          <p:cNvPr id="17" name="TextBox 16">
+            <a:extLst>
+              <a:ext uri="{FF2B5EF4-FFF2-40B4-BE49-F238E27FC236}">
+                <a16:creationId xmlns:a16="http://schemas.microsoft.com/office/drawing/2014/main" id="{1E0ABF8B-A594-4E42-9B86-54348A524FEF}"/>
+              </a:ext>
+            </a:extLst>
+          </p:cNvPr>
+          <p:cNvSpPr txBox="1"/>
+          <p:nvPr/>
+        </p:nvSpPr>
+        <p:spPr>
+          <a:xfrm>
+            <a:off x="9135010" y="2030059"/>
+            <a:ext cx="986809" cy="369332"/>
+          </a:xfrm>
+          <a:prstGeom prst="rect">
+            <a:avLst/>
+          </a:prstGeom>
+          <a:noFill/>
+        </p:spPr>
+        <p:txBody>
+          <a:bodyPr wrap="none" rtlCol="0">
+            <a:spAutoFit/>
+          </a:bodyPr>
+          <a:lstStyle/>
+          <a:p>
+            <a:r>
+              <a:rPr lang="lv-LV" dirty="0"/>
+              <a:t>Konsolē:</a:t>
+            </a:r>
+            <a:endParaRPr lang="en-GB" dirty="0"/>
+          </a:p>
+        </p:txBody>
+      </p:sp>
+      <p:sp>
+        <p:nvSpPr>
+          <p:cNvPr id="18" name="TextBox 17">
+            <a:extLst>
+              <a:ext uri="{FF2B5EF4-FFF2-40B4-BE49-F238E27FC236}">
+                <a16:creationId xmlns:a16="http://schemas.microsoft.com/office/drawing/2014/main" id="{397B80F8-BBFC-4A6B-A818-2C0E35D0AD26}"/>
+              </a:ext>
+            </a:extLst>
+          </p:cNvPr>
+          <p:cNvSpPr txBox="1"/>
+          <p:nvPr/>
+        </p:nvSpPr>
+        <p:spPr>
+          <a:xfrm>
+            <a:off x="8948518" y="4070182"/>
+            <a:ext cx="1274260" cy="369332"/>
+          </a:xfrm>
+          <a:prstGeom prst="rect">
+            <a:avLst/>
+          </a:prstGeom>
+          <a:noFill/>
+        </p:spPr>
+        <p:txBody>
+          <a:bodyPr wrap="none" rtlCol="0">
+            <a:spAutoFit/>
+          </a:bodyPr>
+          <a:lstStyle/>
+          <a:p>
+            <a:r>
+              <a:rPr lang="lv-LV" dirty="0"/>
+              <a:t>Teksta failā:</a:t>
+            </a:r>
+            <a:endParaRPr lang="en-GB" dirty="0"/>
+          </a:p>
+        </p:txBody>
+      </p:sp>
+      <p:pic>
+        <p:nvPicPr>
+          <p:cNvPr id="20" name="Picture 19">
+            <a:extLst>
+              <a:ext uri="{FF2B5EF4-FFF2-40B4-BE49-F238E27FC236}">
+                <a16:creationId xmlns:a16="http://schemas.microsoft.com/office/drawing/2014/main" id="{3526448F-66E6-4C93-8916-F5D2DF851B4D}"/>
+              </a:ext>
+            </a:extLst>
+          </p:cNvPr>
+          <p:cNvPicPr>
+            <a:picLocks noChangeAspect="1"/>
+          </p:cNvPicPr>
+          <p:nvPr/>
+        </p:nvPicPr>
+        <p:blipFill>
+          <a:blip r:embed="rId4"/>
+          <a:stretch>
+            <a:fillRect/>
+          </a:stretch>
+        </p:blipFill>
+        <p:spPr>
+          <a:xfrm>
+            <a:off x="374585" y="1690688"/>
+            <a:ext cx="7640411" cy="4906060"/>
+          </a:xfrm>
+          <a:prstGeom prst="rect">
+            <a:avLst/>
+          </a:prstGeom>
+        </p:spPr>
+      </p:pic>
+    </p:spTree>
+    <p:extLst>
+      <p:ext uri="{BB962C8B-B14F-4D97-AF65-F5344CB8AC3E}">
+        <p14:creationId xmlns:p14="http://schemas.microsoft.com/office/powerpoint/2010/main" val="4188781781"/>
+      </p:ext>
+    </p:extLst>
+  </p:cSld>
+  <p:clrMapOvr>
+    <a:masterClrMapping/>
+  </p:clrMapOvr>
+</p:sld>
+</file>
+
+<file path=ppt/slides/slide36.xml><?xml version="1.0" encoding="utf-8"?>
+<p:sld xmlns:a="http://schemas.openxmlformats.org/drawingml/2006/main" xmlns:r="http://schemas.openxmlformats.org/officeDocument/2006/relationships" xmlns:p="http://schemas.openxmlformats.org/presentationml/2006/main">
+  <p:cSld>
+    <p:bg>
+      <p:bgPr>
+        <a:solidFill>
+          <a:schemeClr val="accent6">
+            <a:lumMod val="20000"/>
+            <a:lumOff val="80000"/>
+          </a:schemeClr>
+        </a:solidFill>
+        <a:effectLst/>
+      </p:bgPr>
+    </p:bg>
+    <p:spTree>
+      <p:nvGrpSpPr>
+        <p:cNvPr id="1" name=""/>
+        <p:cNvGrpSpPr/>
+        <p:nvPr/>
+      </p:nvGrpSpPr>
+      <p:grpSpPr>
+        <a:xfrm>
+          <a:off x="0" y="0"/>
+          <a:ext cx="0" cy="0"/>
+          <a:chOff x="0" y="0"/>
+          <a:chExt cx="0" cy="0"/>
+        </a:xfrm>
+      </p:grpSpPr>
+      <p:sp>
+        <p:nvSpPr>
+          <p:cNvPr id="2" name="Title 1">
+            <a:extLst>
+              <a:ext uri="{FF2B5EF4-FFF2-40B4-BE49-F238E27FC236}">
+                <a16:creationId xmlns:a16="http://schemas.microsoft.com/office/drawing/2014/main" id="{DC598DD3-635B-4D67-ABB3-02B91E4A79B8}"/>
+              </a:ext>
+            </a:extLst>
+          </p:cNvPr>
+          <p:cNvSpPr>
+            <a:spLocks noGrp="1"/>
+          </p:cNvSpPr>
+          <p:nvPr>
+            <p:ph type="title"/>
+          </p:nvPr>
+        </p:nvSpPr>
+        <p:spPr/>
+        <p:txBody>
+          <a:bodyPr/>
+          <a:lstStyle/>
+          <a:p>
+            <a:r>
+              <a:rPr lang="lv-LV" dirty="0">
+                <a:latin typeface="Arial Black" panose="020B0A04020102020204" pitchFamily="34" charset="0"/>
+              </a:rPr>
+              <a:t>2.uzdevums</a:t>
+            </a:r>
+            <a:endParaRPr lang="en-GB" dirty="0">
+              <a:latin typeface="Arial Black" panose="020B0A04020102020204" pitchFamily="34" charset="0"/>
+            </a:endParaRPr>
+          </a:p>
+        </p:txBody>
+      </p:sp>
+      <p:sp>
+        <p:nvSpPr>
+          <p:cNvPr id="3" name="Content Placeholder 2">
+            <a:extLst>
+              <a:ext uri="{FF2B5EF4-FFF2-40B4-BE49-F238E27FC236}">
+                <a16:creationId xmlns:a16="http://schemas.microsoft.com/office/drawing/2014/main" id="{DD2D8840-CC0E-49E7-93B7-354209F90F28}"/>
+              </a:ext>
+            </a:extLst>
+          </p:cNvPr>
+          <p:cNvSpPr>
+            <a:spLocks noGrp="1"/>
+          </p:cNvSpPr>
+          <p:nvPr>
+            <p:ph idx="1"/>
+          </p:nvPr>
+        </p:nvSpPr>
+        <p:spPr/>
+        <p:txBody>
+          <a:bodyPr>
+            <a:normAutofit/>
+          </a:bodyPr>
+          <a:lstStyle/>
+          <a:p>
+            <a:pPr marL="0" indent="0">
+              <a:buNone/>
+            </a:pPr>
+            <a:r>
+              <a:rPr lang="lv-LV" dirty="0"/>
+              <a:t>Izveidojiet programmu, kas pārbauda, vai pastāv mape ar nosaukumu «ManaMape» un fails «fails.txt» šajā direktorijā. Ja direktorijs neeksistē, tas jāizveido. Ja fails neeksistē, tas arī jāizveido. Programmai jāizvada konsolē atbilstoši paziņojumi.</a:t>
+            </a:r>
+          </a:p>
+        </p:txBody>
+      </p:sp>
+    </p:spTree>
+    <p:extLst>
+      <p:ext uri="{BB962C8B-B14F-4D97-AF65-F5344CB8AC3E}">
+        <p14:creationId xmlns:p14="http://schemas.microsoft.com/office/powerpoint/2010/main" val="1593016649"/>
+      </p:ext>
+    </p:extLst>
+  </p:cSld>
+  <p:clrMapOvr>
+    <a:masterClrMapping/>
+  </p:clrMapOvr>
+</p:sld>
+</file>
+
+<file path=ppt/slides/slide37.xml><?xml version="1.0" encoding="utf-8"?>
+<p:sld xmlns:a="http://schemas.openxmlformats.org/drawingml/2006/main" xmlns:r="http://schemas.openxmlformats.org/officeDocument/2006/relationships" xmlns:p="http://schemas.openxmlformats.org/presentationml/2006/main">
+  <p:cSld>
+    <p:bg>
+      <p:bgPr>
+        <a:solidFill>
+          <a:schemeClr val="accent6">
+            <a:lumMod val="20000"/>
+            <a:lumOff val="80000"/>
+          </a:schemeClr>
+        </a:solidFill>
+        <a:effectLst/>
+      </p:bgPr>
+    </p:bg>
+    <p:spTree>
+      <p:nvGrpSpPr>
+        <p:cNvPr id="1" name=""/>
+        <p:cNvGrpSpPr/>
+        <p:nvPr/>
+      </p:nvGrpSpPr>
+      <p:grpSpPr>
+        <a:xfrm>
+          <a:off x="0" y="0"/>
+          <a:ext cx="0" cy="0"/>
+          <a:chOff x="0" y="0"/>
+          <a:chExt cx="0" cy="0"/>
+        </a:xfrm>
+      </p:grpSpPr>
+      <p:sp>
+        <p:nvSpPr>
+          <p:cNvPr id="2" name="Title 1">
+            <a:extLst>
+              <a:ext uri="{FF2B5EF4-FFF2-40B4-BE49-F238E27FC236}">
+                <a16:creationId xmlns:a16="http://schemas.microsoft.com/office/drawing/2014/main" id="{DC598DD3-635B-4D67-ABB3-02B91E4A79B8}"/>
+              </a:ext>
+            </a:extLst>
+          </p:cNvPr>
+          <p:cNvSpPr>
+            <a:spLocks noGrp="1"/>
+          </p:cNvSpPr>
+          <p:nvPr>
+            <p:ph type="title"/>
+          </p:nvPr>
+        </p:nvSpPr>
+        <p:spPr/>
+        <p:txBody>
+          <a:bodyPr/>
+          <a:lstStyle/>
+          <a:p>
+            <a:r>
+              <a:rPr lang="lv-LV" dirty="0">
+                <a:latin typeface="Arial Black" panose="020B0A04020102020204" pitchFamily="34" charset="0"/>
+              </a:rPr>
+              <a:t>2. Uzdevumam atbilde</a:t>
+            </a:r>
+            <a:endParaRPr lang="en-GB" dirty="0">
+              <a:latin typeface="Arial Black" panose="020B0A04020102020204" pitchFamily="34" charset="0"/>
+            </a:endParaRPr>
+          </a:p>
+        </p:txBody>
+      </p:sp>
+      <p:pic>
+        <p:nvPicPr>
+          <p:cNvPr id="5" name="Picture 4">
+            <a:extLst>
+              <a:ext uri="{FF2B5EF4-FFF2-40B4-BE49-F238E27FC236}">
+                <a16:creationId xmlns:a16="http://schemas.microsoft.com/office/drawing/2014/main" id="{857571A7-CD3C-4927-8474-3ABD51C45920}"/>
+              </a:ext>
+            </a:extLst>
+          </p:cNvPr>
+          <p:cNvPicPr>
+            <a:picLocks noChangeAspect="1"/>
+          </p:cNvPicPr>
+          <p:nvPr/>
+        </p:nvPicPr>
+        <p:blipFill>
+          <a:blip r:embed="rId2"/>
+          <a:stretch>
+            <a:fillRect/>
+          </a:stretch>
+        </p:blipFill>
+        <p:spPr>
+          <a:xfrm>
+            <a:off x="209970" y="1763485"/>
+            <a:ext cx="7306544" cy="4348066"/>
+          </a:xfrm>
+          <a:prstGeom prst="rect">
+            <a:avLst/>
+          </a:prstGeom>
+        </p:spPr>
+      </p:pic>
+      <p:pic>
+        <p:nvPicPr>
+          <p:cNvPr id="7" name="Picture 6">
+            <a:extLst>
+              <a:ext uri="{FF2B5EF4-FFF2-40B4-BE49-F238E27FC236}">
+                <a16:creationId xmlns:a16="http://schemas.microsoft.com/office/drawing/2014/main" id="{14A70CF7-575D-45AF-8C69-3AB8D4551082}"/>
+              </a:ext>
+            </a:extLst>
+          </p:cNvPr>
+          <p:cNvPicPr>
+            <a:picLocks noChangeAspect="1"/>
+          </p:cNvPicPr>
+          <p:nvPr/>
+        </p:nvPicPr>
+        <p:blipFill>
+          <a:blip r:embed="rId3"/>
+          <a:stretch>
+            <a:fillRect/>
+          </a:stretch>
+        </p:blipFill>
+        <p:spPr>
+          <a:xfrm>
+            <a:off x="7716416" y="2751325"/>
+            <a:ext cx="4357396" cy="571580"/>
+          </a:xfrm>
+          <a:prstGeom prst="rect">
+            <a:avLst/>
+          </a:prstGeom>
+        </p:spPr>
+      </p:pic>
+      <p:pic>
+        <p:nvPicPr>
+          <p:cNvPr id="9" name="Picture 8">
+            <a:extLst>
+              <a:ext uri="{FF2B5EF4-FFF2-40B4-BE49-F238E27FC236}">
+                <a16:creationId xmlns:a16="http://schemas.microsoft.com/office/drawing/2014/main" id="{A17944EF-8D41-43D5-B331-FF3FCC9CAF05}"/>
+              </a:ext>
+            </a:extLst>
+          </p:cNvPr>
+          <p:cNvPicPr>
+            <a:picLocks noChangeAspect="1"/>
+          </p:cNvPicPr>
+          <p:nvPr/>
+        </p:nvPicPr>
+        <p:blipFill>
+          <a:blip r:embed="rId4"/>
+          <a:stretch>
+            <a:fillRect/>
+          </a:stretch>
+        </p:blipFill>
+        <p:spPr>
+          <a:xfrm>
+            <a:off x="8947244" y="4767324"/>
+            <a:ext cx="1895740" cy="514422"/>
+          </a:xfrm>
+          <a:prstGeom prst="rect">
+            <a:avLst/>
+          </a:prstGeom>
+        </p:spPr>
+      </p:pic>
+      <p:sp>
+        <p:nvSpPr>
+          <p:cNvPr id="10" name="TextBox 9">
+            <a:extLst>
+              <a:ext uri="{FF2B5EF4-FFF2-40B4-BE49-F238E27FC236}">
+                <a16:creationId xmlns:a16="http://schemas.microsoft.com/office/drawing/2014/main" id="{448C851B-2166-43E1-B072-1738CA415131}"/>
+              </a:ext>
+            </a:extLst>
+          </p:cNvPr>
+          <p:cNvSpPr txBox="1"/>
+          <p:nvPr/>
+        </p:nvSpPr>
+        <p:spPr>
+          <a:xfrm>
+            <a:off x="9190994" y="2228231"/>
+            <a:ext cx="986809" cy="369332"/>
+          </a:xfrm>
+          <a:prstGeom prst="rect">
+            <a:avLst/>
+          </a:prstGeom>
+          <a:noFill/>
+        </p:spPr>
+        <p:txBody>
+          <a:bodyPr wrap="none" rtlCol="0">
+            <a:spAutoFit/>
+          </a:bodyPr>
+          <a:lstStyle/>
+          <a:p>
+            <a:r>
+              <a:rPr lang="lv-LV" dirty="0"/>
+              <a:t>Konsolē:</a:t>
+            </a:r>
+            <a:endParaRPr lang="en-GB" dirty="0"/>
+          </a:p>
+        </p:txBody>
+      </p:sp>
+      <p:sp>
+        <p:nvSpPr>
+          <p:cNvPr id="11" name="TextBox 10">
+            <a:extLst>
+              <a:ext uri="{FF2B5EF4-FFF2-40B4-BE49-F238E27FC236}">
+                <a16:creationId xmlns:a16="http://schemas.microsoft.com/office/drawing/2014/main" id="{F2EA6AA2-0FC2-4C9B-9B82-7A719812ED2C}"/>
+              </a:ext>
+            </a:extLst>
+          </p:cNvPr>
+          <p:cNvSpPr txBox="1"/>
+          <p:nvPr/>
+        </p:nvSpPr>
+        <p:spPr>
+          <a:xfrm>
+            <a:off x="8697702" y="4275456"/>
+            <a:ext cx="2394823" cy="369332"/>
+          </a:xfrm>
+          <a:prstGeom prst="rect">
+            <a:avLst/>
+          </a:prstGeom>
+          <a:noFill/>
+        </p:spPr>
+        <p:txBody>
+          <a:bodyPr wrap="none" rtlCol="0">
+            <a:spAutoFit/>
+          </a:bodyPr>
+          <a:lstStyle/>
+          <a:p>
+            <a:r>
+              <a:rPr lang="lv-LV" dirty="0"/>
+              <a:t>Izveidotā mape un fails.</a:t>
+            </a:r>
+            <a:endParaRPr lang="en-GB" dirty="0"/>
+          </a:p>
+        </p:txBody>
+      </p:sp>
+    </p:spTree>
+    <p:extLst>
+      <p:ext uri="{BB962C8B-B14F-4D97-AF65-F5344CB8AC3E}">
+        <p14:creationId xmlns:p14="http://schemas.microsoft.com/office/powerpoint/2010/main" val="2536498625"/>
+      </p:ext>
+    </p:extLst>
+  </p:cSld>
+  <p:clrMapOvr>
+    <a:masterClrMapping/>
+  </p:clrMapOvr>
+</p:sld>
+</file>
+
+<file path=ppt/slides/slide38.xml><?xml version="1.0" encoding="utf-8"?>
+<p:sld xmlns:a="http://schemas.openxmlformats.org/drawingml/2006/main" xmlns:r="http://schemas.openxmlformats.org/officeDocument/2006/relationships" xmlns:p="http://schemas.openxmlformats.org/presentationml/2006/main">
+  <p:cSld>
+    <p:bg>
+      <p:bgPr>
+        <a:solidFill>
+          <a:schemeClr val="accent6">
+            <a:lumMod val="20000"/>
+            <a:lumOff val="80000"/>
+          </a:schemeClr>
+        </a:solidFill>
+        <a:effectLst/>
+      </p:bgPr>
+    </p:bg>
+    <p:spTree>
+      <p:nvGrpSpPr>
+        <p:cNvPr id="1" name=""/>
+        <p:cNvGrpSpPr/>
+        <p:nvPr/>
+      </p:nvGrpSpPr>
+      <p:grpSpPr>
+        <a:xfrm>
+          <a:off x="0" y="0"/>
+          <a:ext cx="0" cy="0"/>
+          <a:chOff x="0" y="0"/>
+          <a:chExt cx="0" cy="0"/>
+        </a:xfrm>
+      </p:grpSpPr>
+      <p:sp>
+        <p:nvSpPr>
+          <p:cNvPr id="2" name="Title 1">
+            <a:extLst>
+              <a:ext uri="{FF2B5EF4-FFF2-40B4-BE49-F238E27FC236}">
+                <a16:creationId xmlns:a16="http://schemas.microsoft.com/office/drawing/2014/main" id="{DC598DD3-635B-4D67-ABB3-02B91E4A79B8}"/>
+              </a:ext>
+            </a:extLst>
+          </p:cNvPr>
+          <p:cNvSpPr>
+            <a:spLocks noGrp="1"/>
+          </p:cNvSpPr>
+          <p:nvPr>
+            <p:ph type="title"/>
+          </p:nvPr>
+        </p:nvSpPr>
+        <p:spPr/>
+        <p:txBody>
+          <a:bodyPr/>
+          <a:lstStyle/>
+          <a:p>
+            <a:r>
+              <a:rPr lang="lv-LV" dirty="0">
+                <a:latin typeface="Arial Black" panose="020B0A04020102020204" pitchFamily="34" charset="0"/>
+              </a:rPr>
+              <a:t>3.uzdevums</a:t>
+            </a:r>
+            <a:endParaRPr lang="en-GB" dirty="0">
+              <a:latin typeface="Arial Black" panose="020B0A04020102020204" pitchFamily="34" charset="0"/>
+            </a:endParaRPr>
+          </a:p>
+        </p:txBody>
+      </p:sp>
+      <p:sp>
+        <p:nvSpPr>
+          <p:cNvPr id="3" name="Content Placeholder 2">
+            <a:extLst>
+              <a:ext uri="{FF2B5EF4-FFF2-40B4-BE49-F238E27FC236}">
+                <a16:creationId xmlns:a16="http://schemas.microsoft.com/office/drawing/2014/main" id="{DD2D8840-CC0E-49E7-93B7-354209F90F28}"/>
+              </a:ext>
+            </a:extLst>
+          </p:cNvPr>
+          <p:cNvSpPr>
+            <a:spLocks noGrp="1"/>
+          </p:cNvSpPr>
+          <p:nvPr>
+            <p:ph idx="1"/>
+          </p:nvPr>
+        </p:nvSpPr>
+        <p:spPr>
+          <a:xfrm>
+            <a:off x="838200" y="1825625"/>
+            <a:ext cx="11021008" cy="4351338"/>
+          </a:xfrm>
+        </p:spPr>
+        <p:txBody>
+          <a:bodyPr>
+            <a:normAutofit fontScale="92500" lnSpcReduction="10000"/>
+          </a:bodyPr>
+          <a:lstStyle/>
+          <a:p>
+            <a:pPr marL="0" indent="0">
+              <a:buNone/>
+            </a:pPr>
+            <a:r>
+              <a:rPr lang="en-GB" dirty="0" err="1"/>
+              <a:t>Jums</a:t>
+            </a:r>
+            <a:r>
+              <a:rPr lang="en-GB" dirty="0"/>
+              <a:t> </a:t>
+            </a:r>
+            <a:r>
+              <a:rPr lang="en-GB" dirty="0" err="1"/>
+              <a:t>ir</a:t>
+            </a:r>
+            <a:r>
+              <a:rPr lang="en-GB" dirty="0"/>
+              <a:t> dots </a:t>
+            </a:r>
+            <a:r>
+              <a:rPr lang="en-GB" dirty="0" err="1"/>
+              <a:t>teksta</a:t>
+            </a:r>
+            <a:r>
+              <a:rPr lang="en-GB" dirty="0"/>
+              <a:t> fails "dati.txt" </a:t>
+            </a:r>
+            <a:r>
+              <a:rPr lang="en-GB" dirty="0" err="1"/>
+              <a:t>ar</a:t>
+            </a:r>
+            <a:r>
+              <a:rPr lang="en-GB" dirty="0"/>
+              <a:t> </a:t>
+            </a:r>
+            <a:r>
+              <a:rPr lang="en-GB" dirty="0" err="1"/>
+              <a:t>šādu</a:t>
+            </a:r>
+            <a:r>
+              <a:rPr lang="en-GB" dirty="0"/>
+              <a:t> </a:t>
+            </a:r>
+            <a:r>
+              <a:rPr lang="lv-LV" dirty="0"/>
+              <a:t>tekstu</a:t>
+            </a:r>
+            <a:r>
+              <a:rPr lang="en-GB" dirty="0"/>
+              <a:t>:</a:t>
+            </a:r>
+            <a:endParaRPr lang="lv-LV" dirty="0"/>
+          </a:p>
+          <a:p>
+            <a:pPr marL="0" indent="0">
+              <a:buNone/>
+            </a:pPr>
+            <a:endParaRPr lang="lv-LV" dirty="0"/>
+          </a:p>
+          <a:p>
+            <a:pPr marL="0" indent="0">
+              <a:buNone/>
+            </a:pPr>
+            <a:endParaRPr lang="lv-LV" dirty="0"/>
+          </a:p>
+          <a:p>
+            <a:pPr marL="0" indent="0">
+              <a:buNone/>
+            </a:pPr>
+            <a:endParaRPr lang="lv-LV" dirty="0"/>
+          </a:p>
+          <a:p>
+            <a:pPr marL="0" indent="0">
+              <a:buNone/>
+            </a:pPr>
+            <a:endParaRPr lang="lv-LV" dirty="0"/>
+          </a:p>
+          <a:p>
+            <a:pPr marL="0" indent="0">
+              <a:buNone/>
+            </a:pPr>
+            <a:r>
+              <a:rPr lang="lv-LV" dirty="0"/>
+              <a:t>Izveidojiet Java programmu, kas nolasa šo faila rindu pa rindai, izmantojot BufferedReader. Programmai jāizvada katra rinda konsolē. Pēc tam, izmantojot PrintWriter, jāizveido jauns fails «teksts.txt", kurā dati tiek ierakstīti formātā, piemēram: </a:t>
+            </a:r>
+          </a:p>
+          <a:p>
+            <a:pPr marL="0" indent="0">
+              <a:buNone/>
+            </a:pPr>
+            <a:r>
+              <a:rPr lang="lv-LV" dirty="0"/>
+              <a:t>"Personas dati: Vārds: Rihards, Uzvārds: Mikuts, Vecums: 17, Pilsēta: Liepāja."</a:t>
+            </a:r>
+          </a:p>
+        </p:txBody>
+      </p:sp>
+      <p:pic>
+        <p:nvPicPr>
+          <p:cNvPr id="8" name="Picture 7">
+            <a:extLst>
+              <a:ext uri="{FF2B5EF4-FFF2-40B4-BE49-F238E27FC236}">
+                <a16:creationId xmlns:a16="http://schemas.microsoft.com/office/drawing/2014/main" id="{FECEB244-8F04-4C85-A3FA-17230E3344B9}"/>
+              </a:ext>
+            </a:extLst>
+          </p:cNvPr>
+          <p:cNvPicPr>
+            <a:picLocks noChangeAspect="1"/>
+          </p:cNvPicPr>
+          <p:nvPr/>
+        </p:nvPicPr>
+        <p:blipFill>
+          <a:blip r:embed="rId2"/>
+          <a:stretch>
+            <a:fillRect/>
+          </a:stretch>
+        </p:blipFill>
+        <p:spPr>
+          <a:xfrm>
+            <a:off x="934020" y="2270310"/>
+            <a:ext cx="2574290" cy="1622583"/>
+          </a:xfrm>
+          <a:prstGeom prst="rect">
+            <a:avLst/>
+          </a:prstGeom>
+        </p:spPr>
+      </p:pic>
+    </p:spTree>
+    <p:extLst>
+      <p:ext uri="{BB962C8B-B14F-4D97-AF65-F5344CB8AC3E}">
+        <p14:creationId xmlns:p14="http://schemas.microsoft.com/office/powerpoint/2010/main" val="3556575090"/>
+      </p:ext>
+    </p:extLst>
+  </p:cSld>
+  <p:clrMapOvr>
+    <a:masterClrMapping/>
+  </p:clrMapOvr>
+</p:sld>
+</file>
+
+<file path=ppt/slides/slide39.xml><?xml version="1.0" encoding="utf-8"?>
+<p:sld xmlns:a="http://schemas.openxmlformats.org/drawingml/2006/main" xmlns:r="http://schemas.openxmlformats.org/officeDocument/2006/relationships" xmlns:p="http://schemas.openxmlformats.org/presentationml/2006/main">
+  <p:cSld>
+    <p:bg>
+      <p:bgPr>
+        <a:solidFill>
+          <a:schemeClr val="accent6">
+            <a:lumMod val="20000"/>
+            <a:lumOff val="80000"/>
+          </a:schemeClr>
+        </a:solidFill>
+        <a:effectLst/>
+      </p:bgPr>
+    </p:bg>
+    <p:spTree>
+      <p:nvGrpSpPr>
+        <p:cNvPr id="1" name=""/>
+        <p:cNvGrpSpPr/>
+        <p:nvPr/>
+      </p:nvGrpSpPr>
+      <p:grpSpPr>
+        <a:xfrm>
+          <a:off x="0" y="0"/>
+          <a:ext cx="0" cy="0"/>
+          <a:chOff x="0" y="0"/>
+          <a:chExt cx="0" cy="0"/>
+        </a:xfrm>
+      </p:grpSpPr>
+      <p:sp>
+        <p:nvSpPr>
+          <p:cNvPr id="2" name="Title 1">
+            <a:extLst>
+              <a:ext uri="{FF2B5EF4-FFF2-40B4-BE49-F238E27FC236}">
+                <a16:creationId xmlns:a16="http://schemas.microsoft.com/office/drawing/2014/main" id="{DC598DD3-635B-4D67-ABB3-02B91E4A79B8}"/>
+              </a:ext>
+            </a:extLst>
+          </p:cNvPr>
+          <p:cNvSpPr>
+            <a:spLocks noGrp="1"/>
+          </p:cNvSpPr>
+          <p:nvPr>
+            <p:ph type="title"/>
+          </p:nvPr>
+        </p:nvSpPr>
+        <p:spPr/>
+        <p:txBody>
+          <a:bodyPr/>
+          <a:lstStyle/>
+          <a:p>
+            <a:r>
+              <a:rPr lang="lv-LV" dirty="0">
+                <a:latin typeface="Arial Black" panose="020B0A04020102020204" pitchFamily="34" charset="0"/>
+              </a:rPr>
+              <a:t>3. Uzdevumam atbilde</a:t>
+            </a:r>
+            <a:endParaRPr lang="en-GB" dirty="0">
+              <a:latin typeface="Arial Black" panose="020B0A04020102020204" pitchFamily="34" charset="0"/>
+            </a:endParaRPr>
+          </a:p>
+        </p:txBody>
+      </p:sp>
+      <p:sp>
+        <p:nvSpPr>
+          <p:cNvPr id="10" name="TextBox 9">
+            <a:extLst>
+              <a:ext uri="{FF2B5EF4-FFF2-40B4-BE49-F238E27FC236}">
+                <a16:creationId xmlns:a16="http://schemas.microsoft.com/office/drawing/2014/main" id="{448C851B-2166-43E1-B072-1738CA415131}"/>
+              </a:ext>
+            </a:extLst>
+          </p:cNvPr>
+          <p:cNvSpPr txBox="1"/>
+          <p:nvPr/>
+        </p:nvSpPr>
+        <p:spPr>
+          <a:xfrm>
+            <a:off x="9190994" y="2228231"/>
+            <a:ext cx="986809" cy="369332"/>
+          </a:xfrm>
+          <a:prstGeom prst="rect">
+            <a:avLst/>
+          </a:prstGeom>
+          <a:noFill/>
+        </p:spPr>
+        <p:txBody>
+          <a:bodyPr wrap="none" rtlCol="0">
+            <a:spAutoFit/>
+          </a:bodyPr>
+          <a:lstStyle/>
+          <a:p>
+            <a:r>
+              <a:rPr lang="lv-LV" dirty="0"/>
+              <a:t>Konsolē:</a:t>
+            </a:r>
+            <a:endParaRPr lang="en-GB" dirty="0"/>
+          </a:p>
+        </p:txBody>
+      </p:sp>
+      <p:sp>
+        <p:nvSpPr>
+          <p:cNvPr id="11" name="TextBox 10">
+            <a:extLst>
+              <a:ext uri="{FF2B5EF4-FFF2-40B4-BE49-F238E27FC236}">
+                <a16:creationId xmlns:a16="http://schemas.microsoft.com/office/drawing/2014/main" id="{F2EA6AA2-0FC2-4C9B-9B82-7A719812ED2C}"/>
+              </a:ext>
+            </a:extLst>
+          </p:cNvPr>
+          <p:cNvSpPr txBox="1"/>
+          <p:nvPr/>
+        </p:nvSpPr>
+        <p:spPr>
+          <a:xfrm>
+            <a:off x="9190994" y="4385010"/>
+            <a:ext cx="1253420" cy="369332"/>
+          </a:xfrm>
+          <a:prstGeom prst="rect">
+            <a:avLst/>
+          </a:prstGeom>
+          <a:noFill/>
+        </p:spPr>
+        <p:txBody>
+          <a:bodyPr wrap="none" rtlCol="0">
+            <a:spAutoFit/>
+          </a:bodyPr>
+          <a:lstStyle/>
+          <a:p>
+            <a:r>
+              <a:rPr lang="lv-LV" dirty="0"/>
+              <a:t>Teksta fails:</a:t>
+            </a:r>
+            <a:endParaRPr lang="en-GB" dirty="0"/>
+          </a:p>
+        </p:txBody>
+      </p:sp>
+      <p:pic>
+        <p:nvPicPr>
+          <p:cNvPr id="8" name="Picture 7">
+            <a:extLst>
+              <a:ext uri="{FF2B5EF4-FFF2-40B4-BE49-F238E27FC236}">
+                <a16:creationId xmlns:a16="http://schemas.microsoft.com/office/drawing/2014/main" id="{08B90396-55F6-4008-B30B-55F26D16DAED}"/>
+              </a:ext>
+            </a:extLst>
+          </p:cNvPr>
+          <p:cNvPicPr>
+            <a:picLocks noChangeAspect="1"/>
+          </p:cNvPicPr>
+          <p:nvPr/>
+        </p:nvPicPr>
+        <p:blipFill>
+          <a:blip r:embed="rId2"/>
+          <a:stretch>
+            <a:fillRect/>
+          </a:stretch>
+        </p:blipFill>
+        <p:spPr>
+          <a:xfrm>
+            <a:off x="838200" y="5744365"/>
+            <a:ext cx="3920412" cy="1014236"/>
+          </a:xfrm>
+          <a:prstGeom prst="rect">
+            <a:avLst/>
+          </a:prstGeom>
+        </p:spPr>
+      </p:pic>
+      <p:pic>
+        <p:nvPicPr>
+          <p:cNvPr id="13" name="Picture 12">
+            <a:extLst>
+              <a:ext uri="{FF2B5EF4-FFF2-40B4-BE49-F238E27FC236}">
+                <a16:creationId xmlns:a16="http://schemas.microsoft.com/office/drawing/2014/main" id="{152DD840-A842-4E5D-B904-9A149F8751B3}"/>
+              </a:ext>
+            </a:extLst>
+          </p:cNvPr>
+          <p:cNvPicPr>
+            <a:picLocks noChangeAspect="1"/>
+          </p:cNvPicPr>
+          <p:nvPr/>
+        </p:nvPicPr>
+        <p:blipFill>
+          <a:blip r:embed="rId3"/>
+          <a:stretch>
+            <a:fillRect/>
+          </a:stretch>
+        </p:blipFill>
+        <p:spPr>
+          <a:xfrm>
+            <a:off x="7442212" y="2557967"/>
+            <a:ext cx="4345113" cy="1702471"/>
+          </a:xfrm>
+          <a:prstGeom prst="rect">
+            <a:avLst/>
+          </a:prstGeom>
+        </p:spPr>
+      </p:pic>
+      <p:pic>
+        <p:nvPicPr>
+          <p:cNvPr id="15" name="Picture 14">
+            <a:extLst>
+              <a:ext uri="{FF2B5EF4-FFF2-40B4-BE49-F238E27FC236}">
+                <a16:creationId xmlns:a16="http://schemas.microsoft.com/office/drawing/2014/main" id="{3CB1A756-3C24-4F86-ABE7-C20A8EBBC7B5}"/>
+              </a:ext>
+            </a:extLst>
+          </p:cNvPr>
+          <p:cNvPicPr>
+            <a:picLocks noChangeAspect="1"/>
+          </p:cNvPicPr>
+          <p:nvPr/>
+        </p:nvPicPr>
+        <p:blipFill>
+          <a:blip r:embed="rId4"/>
+          <a:stretch>
+            <a:fillRect/>
+          </a:stretch>
+        </p:blipFill>
+        <p:spPr>
+          <a:xfrm>
+            <a:off x="838200" y="1346478"/>
+            <a:ext cx="5170714" cy="4397887"/>
+          </a:xfrm>
+          <a:prstGeom prst="rect">
+            <a:avLst/>
+          </a:prstGeom>
+        </p:spPr>
+      </p:pic>
+      <p:pic>
+        <p:nvPicPr>
+          <p:cNvPr id="17" name="Picture 16">
+            <a:extLst>
+              <a:ext uri="{FF2B5EF4-FFF2-40B4-BE49-F238E27FC236}">
+                <a16:creationId xmlns:a16="http://schemas.microsoft.com/office/drawing/2014/main" id="{135A1006-A833-4140-8A47-72EA5B0FA838}"/>
+              </a:ext>
+            </a:extLst>
+          </p:cNvPr>
+          <p:cNvPicPr>
+            <a:picLocks noChangeAspect="1"/>
+          </p:cNvPicPr>
+          <p:nvPr/>
+        </p:nvPicPr>
+        <p:blipFill>
+          <a:blip r:embed="rId5"/>
+          <a:stretch>
+            <a:fillRect/>
+          </a:stretch>
+        </p:blipFill>
+        <p:spPr>
+          <a:xfrm>
+            <a:off x="6271915" y="4754342"/>
+            <a:ext cx="5920085" cy="504895"/>
+          </a:xfrm>
+          <a:prstGeom prst="rect">
+            <a:avLst/>
+          </a:prstGeom>
+        </p:spPr>
+      </p:pic>
+    </p:spTree>
+    <p:extLst>
+      <p:ext uri="{BB962C8B-B14F-4D97-AF65-F5344CB8AC3E}">
+        <p14:creationId xmlns:p14="http://schemas.microsoft.com/office/powerpoint/2010/main" val="2342206698"/>
+      </p:ext>
+    </p:extLst>
+  </p:cSld>
+  <p:clrMapOvr>
+    <a:masterClrMapping/>
+  </p:clrMapOvr>
+</p:sld>
+</file>
+
 <file path=ppt/slides/slide4.xml><?xml version="1.0" encoding="utf-8"?>
 <p:sld xmlns:a="http://schemas.openxmlformats.org/drawingml/2006/main" xmlns:r="http://schemas.openxmlformats.org/officeDocument/2006/relationships" xmlns:p="http://schemas.openxmlformats.org/presentationml/2006/main">
   <p:cSld>
@@ -11481,6 +12765,227 @@
     <p:extLst>
       <p:ext uri="{BB962C8B-B14F-4D97-AF65-F5344CB8AC3E}">
         <p14:creationId xmlns:p14="http://schemas.microsoft.com/office/powerpoint/2010/main" val="2234697324"/>
+      </p:ext>
+    </p:extLst>
+  </p:cSld>
+  <p:clrMapOvr>
+    <a:masterClrMapping/>
+  </p:clrMapOvr>
+</p:sld>
+</file>
+
+<file path=ppt/slides/slide40.xml><?xml version="1.0" encoding="utf-8"?>
+<p:sld xmlns:a="http://schemas.openxmlformats.org/drawingml/2006/main" xmlns:r="http://schemas.openxmlformats.org/officeDocument/2006/relationships" xmlns:p="http://schemas.openxmlformats.org/presentationml/2006/main">
+  <p:cSld>
+    <p:bg>
+      <p:bgPr>
+        <a:solidFill>
+          <a:schemeClr val="accent6">
+            <a:lumMod val="20000"/>
+            <a:lumOff val="80000"/>
+          </a:schemeClr>
+        </a:solidFill>
+        <a:effectLst/>
+      </p:bgPr>
+    </p:bg>
+    <p:spTree>
+      <p:nvGrpSpPr>
+        <p:cNvPr id="1" name=""/>
+        <p:cNvGrpSpPr/>
+        <p:nvPr/>
+      </p:nvGrpSpPr>
+      <p:grpSpPr>
+        <a:xfrm>
+          <a:off x="0" y="0"/>
+          <a:ext cx="0" cy="0"/>
+          <a:chOff x="0" y="0"/>
+          <a:chExt cx="0" cy="0"/>
+        </a:xfrm>
+      </p:grpSpPr>
+      <p:sp>
+        <p:nvSpPr>
+          <p:cNvPr id="2" name="Title 1">
+            <a:extLst>
+              <a:ext uri="{FF2B5EF4-FFF2-40B4-BE49-F238E27FC236}">
+                <a16:creationId xmlns:a16="http://schemas.microsoft.com/office/drawing/2014/main" id="{DC598DD3-635B-4D67-ABB3-02B91E4A79B8}"/>
+              </a:ext>
+            </a:extLst>
+          </p:cNvPr>
+          <p:cNvSpPr>
+            <a:spLocks noGrp="1"/>
+          </p:cNvSpPr>
+          <p:nvPr>
+            <p:ph type="title"/>
+          </p:nvPr>
+        </p:nvSpPr>
+        <p:spPr/>
+        <p:txBody>
+          <a:bodyPr/>
+          <a:lstStyle/>
+          <a:p>
+            <a:r>
+              <a:rPr lang="lv-LV" dirty="0">
+                <a:latin typeface="Arial Black" panose="020B0A04020102020204" pitchFamily="34" charset="0"/>
+              </a:rPr>
+              <a:t>Atsauces</a:t>
+            </a:r>
+            <a:endParaRPr lang="en-GB" dirty="0">
+              <a:latin typeface="Arial Black" panose="020B0A04020102020204" pitchFamily="34" charset="0"/>
+            </a:endParaRPr>
+          </a:p>
+        </p:txBody>
+      </p:sp>
+      <p:sp>
+        <p:nvSpPr>
+          <p:cNvPr id="3" name="Content Placeholder 2">
+            <a:extLst>
+              <a:ext uri="{FF2B5EF4-FFF2-40B4-BE49-F238E27FC236}">
+                <a16:creationId xmlns:a16="http://schemas.microsoft.com/office/drawing/2014/main" id="{DD2D8840-CC0E-49E7-93B7-354209F90F28}"/>
+              </a:ext>
+            </a:extLst>
+          </p:cNvPr>
+          <p:cNvSpPr>
+            <a:spLocks noGrp="1"/>
+          </p:cNvSpPr>
+          <p:nvPr>
+            <p:ph idx="1"/>
+          </p:nvPr>
+        </p:nvSpPr>
+        <p:spPr/>
+        <p:txBody>
+          <a:bodyPr>
+            <a:normAutofit fontScale="92500" lnSpcReduction="10000"/>
+          </a:bodyPr>
+          <a:lstStyle/>
+          <a:p>
+            <a:r>
+              <a:rPr lang="en-GB" b="0" i="0" dirty="0">
+                <a:effectLst/>
+                <a:latin typeface="inherit"/>
+                <a:hlinkClick r:id="rId2" tooltip="https://www.educba.com/text-file-in-java/"/>
+              </a:rPr>
+              <a:t>https://www.educba.com/text-file-in-java/</a:t>
+            </a:r>
+            <a:endParaRPr lang="lv-LV" b="0" i="0" dirty="0">
+              <a:effectLst/>
+              <a:latin typeface="inherit"/>
+            </a:endParaRPr>
+          </a:p>
+          <a:p>
+            <a:r>
+              <a:rPr lang="en-GB" b="0" i="0" dirty="0">
+                <a:effectLst/>
+                <a:latin typeface="inherit"/>
+                <a:hlinkClick r:id="rId3" tooltip="https://www.w3schools.com/java/java_files.asp"/>
+              </a:rPr>
+              <a:t>https://www.w3schools.com/java/java_files.asp</a:t>
+            </a:r>
+            <a:endParaRPr lang="lv-LV" dirty="0">
+              <a:latin typeface="inherit"/>
+            </a:endParaRPr>
+          </a:p>
+          <a:p>
+            <a:r>
+              <a:rPr lang="en-GB" b="0" i="0" dirty="0">
+                <a:effectLst/>
+                <a:latin typeface="inherit"/>
+                <a:hlinkClick r:id="rId4" tooltip="https://www.geeksforgeeks.org/file-handling-java-using-filewriter-filereader/"/>
+              </a:rPr>
+              <a:t>https://www.geeksforgeeks.org/file-handling-java-using-filewriter-filereader/</a:t>
+            </a:r>
+            <a:endParaRPr lang="lv-LV" b="0" i="0" dirty="0">
+              <a:effectLst/>
+              <a:latin typeface="inherit"/>
+            </a:endParaRPr>
+          </a:p>
+          <a:p>
+            <a:r>
+              <a:rPr lang="en-GB" b="0" i="0" dirty="0">
+                <a:effectLst/>
+                <a:latin typeface="inherit"/>
+                <a:hlinkClick r:id="rId5" tooltip="https://www.geeksforgeeks.org/filewriter-class-in-java/"/>
+              </a:rPr>
+              <a:t>https://www.geeksforgeeks.org/filewriter-class-in-java/</a:t>
+            </a:r>
+            <a:endParaRPr lang="lv-LV" b="0" i="0" dirty="0">
+              <a:effectLst/>
+              <a:latin typeface="inherit"/>
+            </a:endParaRPr>
+          </a:p>
+          <a:p>
+            <a:r>
+              <a:rPr lang="en-GB" b="0" i="0" dirty="0">
+                <a:effectLst/>
+                <a:latin typeface="inherit"/>
+                <a:hlinkClick r:id="rId6" tooltip="https://www.geeksforgeeks.org/java-io-filereader-class/"/>
+              </a:rPr>
+              <a:t>https://www.geeksforgeeks.org/java-io-filereader-class/</a:t>
+            </a:r>
+            <a:endParaRPr lang="lv-LV" b="0" i="0" dirty="0">
+              <a:effectLst/>
+              <a:latin typeface="inherit"/>
+            </a:endParaRPr>
+          </a:p>
+          <a:p>
+            <a:r>
+              <a:rPr lang="en-GB" b="0" i="0" dirty="0">
+                <a:effectLst/>
+                <a:latin typeface="inherit"/>
+                <a:hlinkClick r:id="rId7" tooltip="https://www.programiz.com/java-programming/bufferedreader"/>
+              </a:rPr>
+              <a:t>https://www.programiz.com/java-programming/bufferedreader</a:t>
+            </a:r>
+            <a:endParaRPr lang="lv-LV" b="0" i="0" dirty="0">
+              <a:effectLst/>
+              <a:latin typeface="inherit"/>
+            </a:endParaRPr>
+          </a:p>
+          <a:p>
+            <a:r>
+              <a:rPr lang="en-GB" b="0" i="0" dirty="0">
+                <a:effectLst/>
+                <a:latin typeface="inherit"/>
+                <a:hlinkClick r:id="rId8" tooltip="https://www.programiz.com/java-programming/bufferedwriter"/>
+              </a:rPr>
+              <a:t>https://www.programiz.com/java-programming/bufferedwriter</a:t>
+            </a:r>
+            <a:endParaRPr lang="lv-LV" b="0" i="0" dirty="0">
+              <a:effectLst/>
+              <a:latin typeface="inherit"/>
+            </a:endParaRPr>
+          </a:p>
+          <a:p>
+            <a:r>
+              <a:rPr lang="en-GB" b="0" i="0" dirty="0">
+                <a:effectLst/>
+                <a:latin typeface="inherit"/>
+                <a:hlinkClick r:id="rId9" tooltip="https://www.programiz.com/java-programming/printwriter"/>
+              </a:rPr>
+              <a:t>https://www.programiz.com/java-programming/printwriter</a:t>
+            </a:r>
+            <a:endParaRPr lang="lv-LV" b="0" i="0" dirty="0">
+              <a:effectLst/>
+              <a:latin typeface="inherit"/>
+            </a:endParaRPr>
+          </a:p>
+          <a:p>
+            <a:r>
+              <a:rPr lang="lv-LV" dirty="0">
+                <a:latin typeface="inherit"/>
+                <a:hlinkClick r:id="rId10"/>
+              </a:rPr>
+              <a:t>https://chatgpt.com/</a:t>
+            </a:r>
+            <a:endParaRPr lang="lv-LV" dirty="0">
+              <a:latin typeface="inherit"/>
+            </a:endParaRPr>
+          </a:p>
+        </p:txBody>
+      </p:sp>
+    </p:spTree>
+    <p:extLst>
+      <p:ext uri="{BB962C8B-B14F-4D97-AF65-F5344CB8AC3E}">
+        <p14:creationId xmlns:p14="http://schemas.microsoft.com/office/powerpoint/2010/main" val="2346029515"/>
       </p:ext>
     </p:extLst>
   </p:cSld>

</xml_diff>